<commit_message>
Docs & asset mgmt for EKS updates
</commit_message>
<xml_diff>
--- a/screenshots/extras/ElectricEye.pptx
+++ b/screenshots/extras/ElectricEye.pptx
@@ -116,7 +116,7 @@
 <file path=ppt/revisionInfo.xml><?xml version="1.0" encoding="utf-8"?>
 <p1510:revInfo xmlns:a="http://schemas.openxmlformats.org/drawingml/2006/main" xmlns:r="http://schemas.openxmlformats.org/officeDocument/2006/relationships" xmlns:p1510="http://schemas.microsoft.com/office/powerpoint/2015/10/main">
   <p1510:revLst>
-    <p1510:client id="{3F5F48D2-2934-4288-A555-E6823DD1D0AE}" v="224" dt="2023-04-16T23:19:40.541"/>
+    <p1510:client id="{3F5F48D2-2934-4288-A555-E6823DD1D0AE}" v="509" dt="2023-05-01T22:09:47.537"/>
   </p1510:revLst>
 </p1510:revInfo>
 </file>
@@ -366,18 +366,18 @@
   <pc:docChgLst>
     <pc:chgData name="Jonathan Rau" userId="01bd1429-ada3-4be3-b2f3-ae839e9d5ccc" providerId="ADAL" clId="{3F5F48D2-2934-4288-A555-E6823DD1D0AE}"/>
     <pc:docChg chg="undo custSel addSld modSld">
-      <pc:chgData name="Jonathan Rau" userId="01bd1429-ada3-4be3-b2f3-ae839e9d5ccc" providerId="ADAL" clId="{3F5F48D2-2934-4288-A555-E6823DD1D0AE}" dt="2023-04-16T23:20:41.523" v="756" actId="1076"/>
+      <pc:chgData name="Jonathan Rau" userId="01bd1429-ada3-4be3-b2f3-ae839e9d5ccc" providerId="ADAL" clId="{3F5F48D2-2934-4288-A555-E6823DD1D0AE}" dt="2023-05-01T22:11:35.855" v="1433" actId="1076"/>
       <pc:docMkLst>
         <pc:docMk/>
       </pc:docMkLst>
       <pc:sldChg chg="addSp delSp modSp new mod setBg">
-        <pc:chgData name="Jonathan Rau" userId="01bd1429-ada3-4be3-b2f3-ae839e9d5ccc" providerId="ADAL" clId="{3F5F48D2-2934-4288-A555-E6823DD1D0AE}" dt="2023-04-16T23:20:41.523" v="756" actId="1076"/>
+        <pc:chgData name="Jonathan Rau" userId="01bd1429-ada3-4be3-b2f3-ae839e9d5ccc" providerId="ADAL" clId="{3F5F48D2-2934-4288-A555-E6823DD1D0AE}" dt="2023-05-01T22:11:35.855" v="1433" actId="1076"/>
         <pc:sldMkLst>
           <pc:docMk/>
           <pc:sldMk cId="2927218767" sldId="258"/>
         </pc:sldMkLst>
-        <pc:spChg chg="add mod">
-          <ac:chgData name="Jonathan Rau" userId="01bd1429-ada3-4be3-b2f3-ae839e9d5ccc" providerId="ADAL" clId="{3F5F48D2-2934-4288-A555-E6823DD1D0AE}" dt="2023-04-16T23:20:14.261" v="751" actId="1076"/>
+        <pc:spChg chg="add mod ord">
+          <ac:chgData name="Jonathan Rau" userId="01bd1429-ada3-4be3-b2f3-ae839e9d5ccc" providerId="ADAL" clId="{3F5F48D2-2934-4288-A555-E6823DD1D0AE}" dt="2023-05-01T22:08:19.422" v="1309" actId="12789"/>
           <ac:spMkLst>
             <pc:docMk/>
             <pc:sldMk cId="2927218767" sldId="258"/>
@@ -393,11 +393,19 @@
           </ac:spMkLst>
         </pc:spChg>
         <pc:spChg chg="add mod">
-          <ac:chgData name="Jonathan Rau" userId="01bd1429-ada3-4be3-b2f3-ae839e9d5ccc" providerId="ADAL" clId="{3F5F48D2-2934-4288-A555-E6823DD1D0AE}" dt="2023-04-14T19:57:48.270" v="652" actId="1076"/>
+          <ac:chgData name="Jonathan Rau" userId="01bd1429-ada3-4be3-b2f3-ae839e9d5ccc" providerId="ADAL" clId="{3F5F48D2-2934-4288-A555-E6823DD1D0AE}" dt="2023-05-01T22:08:56.752" v="1363" actId="1076"/>
           <ac:spMkLst>
             <pc:docMk/>
             <pc:sldMk cId="2927218767" sldId="258"/>
             <ac:spMk id="5" creationId="{50B9014E-CAC8-98AE-CB22-D756ECFEB685}"/>
+          </ac:spMkLst>
+        </pc:spChg>
+        <pc:spChg chg="add mod topLvl">
+          <ac:chgData name="Jonathan Rau" userId="01bd1429-ada3-4be3-b2f3-ae839e9d5ccc" providerId="ADAL" clId="{3F5F48D2-2934-4288-A555-E6823DD1D0AE}" dt="2023-05-01T22:09:47.537" v="1401" actId="1035"/>
+          <ac:spMkLst>
+            <pc:docMk/>
+            <pc:sldMk cId="2927218767" sldId="258"/>
+            <ac:spMk id="7" creationId="{9F78F5AA-A513-5719-7273-839BFED55752}"/>
           </ac:spMkLst>
         </pc:spChg>
         <pc:spChg chg="add del">
@@ -409,7 +417,7 @@
           </ac:spMkLst>
         </pc:spChg>
         <pc:spChg chg="add mod ord">
-          <ac:chgData name="Jonathan Rau" userId="01bd1429-ada3-4be3-b2f3-ae839e9d5ccc" providerId="ADAL" clId="{3F5F48D2-2934-4288-A555-E6823DD1D0AE}" dt="2023-04-14T19:58:37.036" v="672" actId="1035"/>
+          <ac:chgData name="Jonathan Rau" userId="01bd1429-ada3-4be3-b2f3-ae839e9d5ccc" providerId="ADAL" clId="{3F5F48D2-2934-4288-A555-E6823DD1D0AE}" dt="2023-05-01T22:05:19.418" v="1287" actId="12789"/>
           <ac:spMkLst>
             <pc:docMk/>
             <pc:sldMk cId="2927218767" sldId="258"/>
@@ -417,7 +425,7 @@
           </ac:spMkLst>
         </pc:spChg>
         <pc:spChg chg="add mod">
-          <ac:chgData name="Jonathan Rau" userId="01bd1429-ada3-4be3-b2f3-ae839e9d5ccc" providerId="ADAL" clId="{3F5F48D2-2934-4288-A555-E6823DD1D0AE}" dt="2023-04-14T19:54:30.704" v="543" actId="1076"/>
+          <ac:chgData name="Jonathan Rau" userId="01bd1429-ada3-4be3-b2f3-ae839e9d5ccc" providerId="ADAL" clId="{3F5F48D2-2934-4288-A555-E6823DD1D0AE}" dt="2023-05-01T22:08:24.716" v="1310" actId="12788"/>
           <ac:spMkLst>
             <pc:docMk/>
             <pc:sldMk cId="2927218767" sldId="258"/>
@@ -425,7 +433,7 @@
           </ac:spMkLst>
         </pc:spChg>
         <pc:spChg chg="add mod">
-          <ac:chgData name="Jonathan Rau" userId="01bd1429-ada3-4be3-b2f3-ae839e9d5ccc" providerId="ADAL" clId="{3F5F48D2-2934-4288-A555-E6823DD1D0AE}" dt="2023-04-14T19:54:03.454" v="538" actId="1076"/>
+          <ac:chgData name="Jonathan Rau" userId="01bd1429-ada3-4be3-b2f3-ae839e9d5ccc" providerId="ADAL" clId="{3F5F48D2-2934-4288-A555-E6823DD1D0AE}" dt="2023-05-01T22:08:00.467" v="1305" actId="552"/>
           <ac:spMkLst>
             <pc:docMk/>
             <pc:sldMk cId="2927218767" sldId="258"/>
@@ -433,23 +441,23 @@
           </ac:spMkLst>
         </pc:spChg>
         <pc:spChg chg="add mod">
-          <ac:chgData name="Jonathan Rau" userId="01bd1429-ada3-4be3-b2f3-ae839e9d5ccc" providerId="ADAL" clId="{3F5F48D2-2934-4288-A555-E6823DD1D0AE}" dt="2023-04-14T19:53:56.124" v="537" actId="1038"/>
+          <ac:chgData name="Jonathan Rau" userId="01bd1429-ada3-4be3-b2f3-ae839e9d5ccc" providerId="ADAL" clId="{3F5F48D2-2934-4288-A555-E6823DD1D0AE}" dt="2023-05-01T22:08:10.226" v="1307" actId="553"/>
           <ac:spMkLst>
             <pc:docMk/>
             <pc:sldMk cId="2927218767" sldId="258"/>
             <ac:spMk id="17" creationId="{B6CB8600-7725-1B60-693D-12AD37216EA1}"/>
           </ac:spMkLst>
         </pc:spChg>
-        <pc:spChg chg="add mod">
-          <ac:chgData name="Jonathan Rau" userId="01bd1429-ada3-4be3-b2f3-ae839e9d5ccc" providerId="ADAL" clId="{3F5F48D2-2934-4288-A555-E6823DD1D0AE}" dt="2023-04-16T23:20:26.808" v="755" actId="1076"/>
+        <pc:spChg chg="add mod ord">
+          <ac:chgData name="Jonathan Rau" userId="01bd1429-ada3-4be3-b2f3-ae839e9d5ccc" providerId="ADAL" clId="{3F5F48D2-2934-4288-A555-E6823DD1D0AE}" dt="2023-05-01T22:06:34.060" v="1294" actId="12789"/>
           <ac:spMkLst>
             <pc:docMk/>
             <pc:sldMk cId="2927218767" sldId="258"/>
             <ac:spMk id="18" creationId="{11380B01-5C11-2679-9594-77B4B9FFAF52}"/>
           </ac:spMkLst>
         </pc:spChg>
-        <pc:spChg chg="add mod">
-          <ac:chgData name="Jonathan Rau" userId="01bd1429-ada3-4be3-b2f3-ae839e9d5ccc" providerId="ADAL" clId="{3F5F48D2-2934-4288-A555-E6823DD1D0AE}" dt="2023-04-16T23:20:41.523" v="756" actId="1076"/>
+        <pc:spChg chg="add mod ord">
+          <ac:chgData name="Jonathan Rau" userId="01bd1429-ada3-4be3-b2f3-ae839e9d5ccc" providerId="ADAL" clId="{3F5F48D2-2934-4288-A555-E6823DD1D0AE}" dt="2023-05-01T22:06:40.455" v="1295" actId="12788"/>
           <ac:spMkLst>
             <pc:docMk/>
             <pc:sldMk cId="2927218767" sldId="258"/>
@@ -457,7 +465,7 @@
           </ac:spMkLst>
         </pc:spChg>
         <pc:spChg chg="add mod ord">
-          <ac:chgData name="Jonathan Rau" userId="01bd1429-ada3-4be3-b2f3-ae839e9d5ccc" providerId="ADAL" clId="{3F5F48D2-2934-4288-A555-E6823DD1D0AE}" dt="2023-04-14T19:58:37.036" v="672" actId="1035"/>
+          <ac:chgData name="Jonathan Rau" userId="01bd1429-ada3-4be3-b2f3-ae839e9d5ccc" providerId="ADAL" clId="{3F5F48D2-2934-4288-A555-E6823DD1D0AE}" dt="2023-05-01T22:08:24.716" v="1310" actId="12788"/>
           <ac:spMkLst>
             <pc:docMk/>
             <pc:sldMk cId="2927218767" sldId="258"/>
@@ -465,7 +473,7 @@
           </ac:spMkLst>
         </pc:spChg>
         <pc:spChg chg="add mod ord">
-          <ac:chgData name="Jonathan Rau" userId="01bd1429-ada3-4be3-b2f3-ae839e9d5ccc" providerId="ADAL" clId="{3F5F48D2-2934-4288-A555-E6823DD1D0AE}" dt="2023-04-14T19:58:42.750" v="682" actId="1035"/>
+          <ac:chgData name="Jonathan Rau" userId="01bd1429-ada3-4be3-b2f3-ae839e9d5ccc" providerId="ADAL" clId="{3F5F48D2-2934-4288-A555-E6823DD1D0AE}" dt="2023-05-01T22:08:24.716" v="1310" actId="12788"/>
           <ac:spMkLst>
             <pc:docMk/>
             <pc:sldMk cId="2927218767" sldId="258"/>
@@ -473,7 +481,7 @@
           </ac:spMkLst>
         </pc:spChg>
         <pc:spChg chg="add mod">
-          <ac:chgData name="Jonathan Rau" userId="01bd1429-ada3-4be3-b2f3-ae839e9d5ccc" providerId="ADAL" clId="{3F5F48D2-2934-4288-A555-E6823DD1D0AE}" dt="2023-04-14T19:58:42.750" v="682" actId="1035"/>
+          <ac:chgData name="Jonathan Rau" userId="01bd1429-ada3-4be3-b2f3-ae839e9d5ccc" providerId="ADAL" clId="{3F5F48D2-2934-4288-A555-E6823DD1D0AE}" dt="2023-05-01T22:08:19.422" v="1309" actId="12789"/>
           <ac:spMkLst>
             <pc:docMk/>
             <pc:sldMk cId="2927218767" sldId="258"/>
@@ -488,56 +496,56 @@
             <ac:spMk id="34" creationId="{CF211332-0D27-B046-09A3-AE3A5EDFAB1C}"/>
           </ac:spMkLst>
         </pc:spChg>
-        <pc:spChg chg="add mod">
-          <ac:chgData name="Jonathan Rau" userId="01bd1429-ada3-4be3-b2f3-ae839e9d5ccc" providerId="ADAL" clId="{3F5F48D2-2934-4288-A555-E6823DD1D0AE}" dt="2023-04-14T20:02:30.113" v="747" actId="12788"/>
+        <pc:spChg chg="add mod topLvl">
+          <ac:chgData name="Jonathan Rau" userId="01bd1429-ada3-4be3-b2f3-ae839e9d5ccc" providerId="ADAL" clId="{3F5F48D2-2934-4288-A555-E6823DD1D0AE}" dt="2023-05-01T22:09:47.537" v="1401" actId="1035"/>
           <ac:spMkLst>
             <pc:docMk/>
             <pc:sldMk cId="2927218767" sldId="258"/>
             <ac:spMk id="36" creationId="{3168B3C9-C653-D5A4-3A61-2E0ED75D4320}"/>
           </ac:spMkLst>
         </pc:spChg>
-        <pc:spChg chg="add mod">
-          <ac:chgData name="Jonathan Rau" userId="01bd1429-ada3-4be3-b2f3-ae839e9d5ccc" providerId="ADAL" clId="{3F5F48D2-2934-4288-A555-E6823DD1D0AE}" dt="2023-04-14T20:02:30.113" v="747" actId="12788"/>
+        <pc:spChg chg="add del mod topLvl">
+          <ac:chgData name="Jonathan Rau" userId="01bd1429-ada3-4be3-b2f3-ae839e9d5ccc" providerId="ADAL" clId="{3F5F48D2-2934-4288-A555-E6823DD1D0AE}" dt="2023-05-01T21:45:03.283" v="780" actId="478"/>
           <ac:spMkLst>
             <pc:docMk/>
             <pc:sldMk cId="2927218767" sldId="258"/>
             <ac:spMk id="37" creationId="{72850DCE-AA01-4284-6BAB-E56678FBD6F8}"/>
           </ac:spMkLst>
         </pc:spChg>
-        <pc:spChg chg="add mod">
-          <ac:chgData name="Jonathan Rau" userId="01bd1429-ada3-4be3-b2f3-ae839e9d5ccc" providerId="ADAL" clId="{3F5F48D2-2934-4288-A555-E6823DD1D0AE}" dt="2023-04-14T20:02:30.113" v="747" actId="12788"/>
+        <pc:spChg chg="add mod topLvl">
+          <ac:chgData name="Jonathan Rau" userId="01bd1429-ada3-4be3-b2f3-ae839e9d5ccc" providerId="ADAL" clId="{3F5F48D2-2934-4288-A555-E6823DD1D0AE}" dt="2023-05-01T22:09:47.537" v="1401" actId="1035"/>
           <ac:spMkLst>
             <pc:docMk/>
             <pc:sldMk cId="2927218767" sldId="258"/>
             <ac:spMk id="40" creationId="{2B9F4387-007C-A863-E06D-057C44D1A8B7}"/>
           </ac:spMkLst>
         </pc:spChg>
-        <pc:spChg chg="add mod">
-          <ac:chgData name="Jonathan Rau" userId="01bd1429-ada3-4be3-b2f3-ae839e9d5ccc" providerId="ADAL" clId="{3F5F48D2-2934-4288-A555-E6823DD1D0AE}" dt="2023-04-14T20:02:30.113" v="747" actId="12788"/>
+        <pc:spChg chg="add del mod topLvl">
+          <ac:chgData name="Jonathan Rau" userId="01bd1429-ada3-4be3-b2f3-ae839e9d5ccc" providerId="ADAL" clId="{3F5F48D2-2934-4288-A555-E6823DD1D0AE}" dt="2023-05-01T21:45:03.283" v="780" actId="478"/>
           <ac:spMkLst>
             <pc:docMk/>
             <pc:sldMk cId="2927218767" sldId="258"/>
             <ac:spMk id="42" creationId="{75A37B31-03FB-0E19-883C-B831E3DD86E8}"/>
           </ac:spMkLst>
         </pc:spChg>
-        <pc:spChg chg="add mod">
-          <ac:chgData name="Jonathan Rau" userId="01bd1429-ada3-4be3-b2f3-ae839e9d5ccc" providerId="ADAL" clId="{3F5F48D2-2934-4288-A555-E6823DD1D0AE}" dt="2023-04-14T20:02:30.113" v="747" actId="12788"/>
+        <pc:spChg chg="add mod topLvl">
+          <ac:chgData name="Jonathan Rau" userId="01bd1429-ada3-4be3-b2f3-ae839e9d5ccc" providerId="ADAL" clId="{3F5F48D2-2934-4288-A555-E6823DD1D0AE}" dt="2023-05-01T22:09:47.537" v="1401" actId="1035"/>
           <ac:spMkLst>
             <pc:docMk/>
             <pc:sldMk cId="2927218767" sldId="258"/>
             <ac:spMk id="44" creationId="{AF0DFB57-0EA5-1522-9EE9-03E1643EF3C4}"/>
           </ac:spMkLst>
         </pc:spChg>
-        <pc:spChg chg="add mod">
-          <ac:chgData name="Jonathan Rau" userId="01bd1429-ada3-4be3-b2f3-ae839e9d5ccc" providerId="ADAL" clId="{3F5F48D2-2934-4288-A555-E6823DD1D0AE}" dt="2023-04-14T20:02:30.113" v="747" actId="12788"/>
+        <pc:spChg chg="add mod topLvl">
+          <ac:chgData name="Jonathan Rau" userId="01bd1429-ada3-4be3-b2f3-ae839e9d5ccc" providerId="ADAL" clId="{3F5F48D2-2934-4288-A555-E6823DD1D0AE}" dt="2023-05-01T22:09:47.537" v="1401" actId="1035"/>
           <ac:spMkLst>
             <pc:docMk/>
             <pc:sldMk cId="2927218767" sldId="258"/>
             <ac:spMk id="45" creationId="{5403259A-FD0E-15A7-723A-F88B42E0162C}"/>
           </ac:spMkLst>
         </pc:spChg>
-        <pc:spChg chg="add mod ord">
-          <ac:chgData name="Jonathan Rau" userId="01bd1429-ada3-4be3-b2f3-ae839e9d5ccc" providerId="ADAL" clId="{3F5F48D2-2934-4288-A555-E6823DD1D0AE}" dt="2023-04-14T20:02:30.113" v="747" actId="12788"/>
+        <pc:spChg chg="add mod ord topLvl">
+          <ac:chgData name="Jonathan Rau" userId="01bd1429-ada3-4be3-b2f3-ae839e9d5ccc" providerId="ADAL" clId="{3F5F48D2-2934-4288-A555-E6823DD1D0AE}" dt="2023-05-01T22:09:47.537" v="1401" actId="1035"/>
           <ac:spMkLst>
             <pc:docMk/>
             <pc:sldMk cId="2927218767" sldId="258"/>
@@ -553,31 +561,95 @@
           </ac:spMkLst>
         </pc:spChg>
         <pc:spChg chg="add mod">
-          <ac:chgData name="Jonathan Rau" userId="01bd1429-ada3-4be3-b2f3-ae839e9d5ccc" providerId="ADAL" clId="{3F5F48D2-2934-4288-A555-E6823DD1D0AE}" dt="2023-04-14T20:01:30.470" v="735" actId="1076"/>
+          <ac:chgData name="Jonathan Rau" userId="01bd1429-ada3-4be3-b2f3-ae839e9d5ccc" providerId="ADAL" clId="{3F5F48D2-2934-4288-A555-E6823DD1D0AE}" dt="2023-05-01T22:11:35.855" v="1433" actId="1076"/>
           <ac:spMkLst>
             <pc:docMk/>
             <pc:sldMk cId="2927218767" sldId="258"/>
             <ac:spMk id="51" creationId="{1693654B-B9C5-BB57-C5AF-C57E58130215}"/>
           </ac:spMkLst>
         </pc:spChg>
+        <pc:spChg chg="add mod">
+          <ac:chgData name="Jonathan Rau" userId="01bd1429-ada3-4be3-b2f3-ae839e9d5ccc" providerId="ADAL" clId="{3F5F48D2-2934-4288-A555-E6823DD1D0AE}" dt="2023-05-01T22:09:17.588" v="1371" actId="14100"/>
+          <ac:spMkLst>
+            <pc:docMk/>
+            <pc:sldMk cId="2927218767" sldId="258"/>
+            <ac:spMk id="57" creationId="{87EC92A5-9254-25F8-0C42-0E676A517662}"/>
+          </ac:spMkLst>
+        </pc:spChg>
+        <pc:spChg chg="mod">
+          <ac:chgData name="Jonathan Rau" userId="01bd1429-ada3-4be3-b2f3-ae839e9d5ccc" providerId="ADAL" clId="{3F5F48D2-2934-4288-A555-E6823DD1D0AE}" dt="2023-05-01T22:05:15.503" v="1286" actId="571"/>
+          <ac:spMkLst>
+            <pc:docMk/>
+            <pc:sldMk cId="2927218767" sldId="258"/>
+            <ac:spMk id="59" creationId="{6CD57F62-034A-6DD1-B797-A65BBA7A1DEE}"/>
+          </ac:spMkLst>
+        </pc:spChg>
+        <pc:spChg chg="mod">
+          <ac:chgData name="Jonathan Rau" userId="01bd1429-ada3-4be3-b2f3-ae839e9d5ccc" providerId="ADAL" clId="{3F5F48D2-2934-4288-A555-E6823DD1D0AE}" dt="2023-05-01T22:05:15.503" v="1286" actId="571"/>
+          <ac:spMkLst>
+            <pc:docMk/>
+            <pc:sldMk cId="2927218767" sldId="258"/>
+            <ac:spMk id="62" creationId="{BB2850FC-D34E-5792-D9CD-FCCF401BA238}"/>
+          </ac:spMkLst>
+        </pc:spChg>
         <pc:grpChg chg="add mod">
-          <ac:chgData name="Jonathan Rau" userId="01bd1429-ada3-4be3-b2f3-ae839e9d5ccc" providerId="ADAL" clId="{3F5F48D2-2934-4288-A555-E6823DD1D0AE}" dt="2023-04-14T19:58:37.036" v="672" actId="1035"/>
+          <ac:chgData name="Jonathan Rau" userId="01bd1429-ada3-4be3-b2f3-ae839e9d5ccc" providerId="ADAL" clId="{3F5F48D2-2934-4288-A555-E6823DD1D0AE}" dt="2023-05-01T22:08:00.467" v="1305" actId="552"/>
           <ac:grpSpMkLst>
             <pc:docMk/>
             <pc:sldMk cId="2927218767" sldId="258"/>
             <ac:grpSpMk id="10" creationId="{7BB619AD-693A-3B9C-6D20-247888B0204F}"/>
           </ac:grpSpMkLst>
         </pc:grpChg>
+        <pc:grpChg chg="add del mod">
+          <ac:chgData name="Jonathan Rau" userId="01bd1429-ada3-4be3-b2f3-ae839e9d5ccc" providerId="ADAL" clId="{3F5F48D2-2934-4288-A555-E6823DD1D0AE}" dt="2023-05-01T21:47:00.031" v="843" actId="165"/>
+          <ac:grpSpMkLst>
+            <pc:docMk/>
+            <pc:sldMk cId="2927218767" sldId="258"/>
+            <ac:grpSpMk id="11" creationId="{A3C8BF8A-A597-E40D-28E3-BB4DF4567CE3}"/>
+          </ac:grpSpMkLst>
+        </pc:grpChg>
+        <pc:grpChg chg="add del mod">
+          <ac:chgData name="Jonathan Rau" userId="01bd1429-ada3-4be3-b2f3-ae839e9d5ccc" providerId="ADAL" clId="{3F5F48D2-2934-4288-A555-E6823DD1D0AE}" dt="2023-05-01T21:52:07.405" v="1014" actId="165"/>
+          <ac:grpSpMkLst>
+            <pc:docMk/>
+            <pc:sldMk cId="2927218767" sldId="258"/>
+            <ac:grpSpMk id="12" creationId="{88EED4C6-963B-3C13-BCB7-9CE42780D7E6}"/>
+          </ac:grpSpMkLst>
+        </pc:grpChg>
+        <pc:grpChg chg="add del mod">
+          <ac:chgData name="Jonathan Rau" userId="01bd1429-ada3-4be3-b2f3-ae839e9d5ccc" providerId="ADAL" clId="{3F5F48D2-2934-4288-A555-E6823DD1D0AE}" dt="2023-05-01T21:52:07.405" v="1014" actId="165"/>
+          <ac:grpSpMkLst>
+            <pc:docMk/>
+            <pc:sldMk cId="2927218767" sldId="258"/>
+            <ac:grpSpMk id="13" creationId="{F6FA9303-CEFF-A9D8-4998-EC58587FE3AD}"/>
+          </ac:grpSpMkLst>
+        </pc:grpChg>
+        <pc:grpChg chg="add del mod">
+          <ac:chgData name="Jonathan Rau" userId="01bd1429-ada3-4be3-b2f3-ae839e9d5ccc" providerId="ADAL" clId="{3F5F48D2-2934-4288-A555-E6823DD1D0AE}" dt="2023-05-01T21:52:07.405" v="1014" actId="165"/>
+          <ac:grpSpMkLst>
+            <pc:docMk/>
+            <pc:sldMk cId="2927218767" sldId="258"/>
+            <ac:grpSpMk id="14" creationId="{4881A3DD-EE65-27DB-671F-8B799B3F4A08}"/>
+          </ac:grpSpMkLst>
+        </pc:grpChg>
         <pc:grpChg chg="add mod">
-          <ac:chgData name="Jonathan Rau" userId="01bd1429-ada3-4be3-b2f3-ae839e9d5ccc" providerId="ADAL" clId="{3F5F48D2-2934-4288-A555-E6823DD1D0AE}" dt="2023-04-14T19:58:37.036" v="672" actId="1035"/>
+          <ac:chgData name="Jonathan Rau" userId="01bd1429-ada3-4be3-b2f3-ae839e9d5ccc" providerId="ADAL" clId="{3F5F48D2-2934-4288-A555-E6823DD1D0AE}" dt="2023-05-01T22:08:24.716" v="1310" actId="12788"/>
           <ac:grpSpMkLst>
             <pc:docMk/>
             <pc:sldMk cId="2927218767" sldId="258"/>
             <ac:grpSpMk id="21" creationId="{3710CA1F-8C31-5042-8A25-C3AD5A9F72C9}"/>
           </ac:grpSpMkLst>
         </pc:grpChg>
+        <pc:grpChg chg="add del mod">
+          <ac:chgData name="Jonathan Rau" userId="01bd1429-ada3-4be3-b2f3-ae839e9d5ccc" providerId="ADAL" clId="{3F5F48D2-2934-4288-A555-E6823DD1D0AE}" dt="2023-05-01T21:49:36.827" v="869" actId="165"/>
+          <ac:grpSpMkLst>
+            <pc:docMk/>
+            <pc:sldMk cId="2927218767" sldId="258"/>
+            <ac:grpSpMk id="22" creationId="{A4B1F169-4EBA-F8E1-64A9-45F89C6E71F1}"/>
+          </ac:grpSpMkLst>
+        </pc:grpChg>
         <pc:grpChg chg="add mod">
-          <ac:chgData name="Jonathan Rau" userId="01bd1429-ada3-4be3-b2f3-ae839e9d5ccc" providerId="ADAL" clId="{3F5F48D2-2934-4288-A555-E6823DD1D0AE}" dt="2023-04-14T19:58:42.750" v="682" actId="1035"/>
+          <ac:chgData name="Jonathan Rau" userId="01bd1429-ada3-4be3-b2f3-ae839e9d5ccc" providerId="ADAL" clId="{3F5F48D2-2934-4288-A555-E6823DD1D0AE}" dt="2023-05-01T22:08:24.716" v="1310" actId="12788"/>
           <ac:grpSpMkLst>
             <pc:docMk/>
             <pc:sldMk cId="2927218767" sldId="258"/>
@@ -585,23 +657,95 @@
           </ac:grpSpMkLst>
         </pc:grpChg>
         <pc:grpChg chg="add mod">
-          <ac:chgData name="Jonathan Rau" userId="01bd1429-ada3-4be3-b2f3-ae839e9d5ccc" providerId="ADAL" clId="{3F5F48D2-2934-4288-A555-E6823DD1D0AE}" dt="2023-04-14T20:02:30.113" v="747" actId="12788"/>
+          <ac:chgData name="Jonathan Rau" userId="01bd1429-ada3-4be3-b2f3-ae839e9d5ccc" providerId="ADAL" clId="{3F5F48D2-2934-4288-A555-E6823DD1D0AE}" dt="2023-05-01T22:09:47.537" v="1401" actId="1035"/>
+          <ac:grpSpMkLst>
+            <pc:docMk/>
+            <pc:sldMk cId="2927218767" sldId="258"/>
+            <ac:grpSpMk id="26" creationId="{6BAEA63F-A29D-8D2F-2B83-0919927ED399}"/>
+          </ac:grpSpMkLst>
+        </pc:grpChg>
+        <pc:grpChg chg="add mod">
+          <ac:chgData name="Jonathan Rau" userId="01bd1429-ada3-4be3-b2f3-ae839e9d5ccc" providerId="ADAL" clId="{3F5F48D2-2934-4288-A555-E6823DD1D0AE}" dt="2023-05-01T22:09:47.537" v="1401" actId="1035"/>
+          <ac:grpSpMkLst>
+            <pc:docMk/>
+            <pc:sldMk cId="2927218767" sldId="258"/>
+            <ac:grpSpMk id="29" creationId="{6C2D2B36-7017-0273-DE0A-222DC8FB537F}"/>
+          </ac:grpSpMkLst>
+        </pc:grpChg>
+        <pc:grpChg chg="add mod">
+          <ac:chgData name="Jonathan Rau" userId="01bd1429-ada3-4be3-b2f3-ae839e9d5ccc" providerId="ADAL" clId="{3F5F48D2-2934-4288-A555-E6823DD1D0AE}" dt="2023-05-01T22:09:47.537" v="1401" actId="1035"/>
+          <ac:grpSpMkLst>
+            <pc:docMk/>
+            <pc:sldMk cId="2927218767" sldId="258"/>
+            <ac:grpSpMk id="30" creationId="{E30E038F-7FA5-A920-3A09-7E35AF378EA6}"/>
+          </ac:grpSpMkLst>
+        </pc:grpChg>
+        <pc:grpChg chg="add mod">
+          <ac:chgData name="Jonathan Rau" userId="01bd1429-ada3-4be3-b2f3-ae839e9d5ccc" providerId="ADAL" clId="{3F5F48D2-2934-4288-A555-E6823DD1D0AE}" dt="2023-05-01T22:09:47.537" v="1401" actId="1035"/>
+          <ac:grpSpMkLst>
+            <pc:docMk/>
+            <pc:sldMk cId="2927218767" sldId="258"/>
+            <ac:grpSpMk id="32" creationId="{61FE9FAF-8CEE-A9FC-9802-5B6239F41C7B}"/>
+          </ac:grpSpMkLst>
+        </pc:grpChg>
+        <pc:grpChg chg="add mod">
+          <ac:chgData name="Jonathan Rau" userId="01bd1429-ada3-4be3-b2f3-ae839e9d5ccc" providerId="ADAL" clId="{3F5F48D2-2934-4288-A555-E6823DD1D0AE}" dt="2023-05-01T22:09:47.537" v="1401" actId="1035"/>
+          <ac:grpSpMkLst>
+            <pc:docMk/>
+            <pc:sldMk cId="2927218767" sldId="258"/>
+            <ac:grpSpMk id="33" creationId="{2F9B88CF-29AE-2D89-CD2B-F21FFEE9D7B8}"/>
+          </ac:grpSpMkLst>
+        </pc:grpChg>
+        <pc:grpChg chg="add mod">
+          <ac:chgData name="Jonathan Rau" userId="01bd1429-ada3-4be3-b2f3-ae839e9d5ccc" providerId="ADAL" clId="{3F5F48D2-2934-4288-A555-E6823DD1D0AE}" dt="2023-05-01T22:09:47.537" v="1401" actId="1035"/>
+          <ac:grpSpMkLst>
+            <pc:docMk/>
+            <pc:sldMk cId="2927218767" sldId="258"/>
+            <ac:grpSpMk id="34" creationId="{B0B80858-9883-3F5E-0753-1842B54739B1}"/>
+          </ac:grpSpMkLst>
+        </pc:grpChg>
+        <pc:grpChg chg="add del mod topLvl">
+          <ac:chgData name="Jonathan Rau" userId="01bd1429-ada3-4be3-b2f3-ae839e9d5ccc" providerId="ADAL" clId="{3F5F48D2-2934-4288-A555-E6823DD1D0AE}" dt="2023-05-01T21:44:58.129" v="779" actId="165"/>
           <ac:grpSpMkLst>
             <pc:docMk/>
             <pc:sldMk cId="2927218767" sldId="258"/>
             <ac:grpSpMk id="48" creationId="{C271047F-ADF7-6A2F-210B-142ADF8FE177}"/>
           </ac:grpSpMkLst>
         </pc:grpChg>
-        <pc:grpChg chg="add mod">
-          <ac:chgData name="Jonathan Rau" userId="01bd1429-ada3-4be3-b2f3-ae839e9d5ccc" providerId="ADAL" clId="{3F5F48D2-2934-4288-A555-E6823DD1D0AE}" dt="2023-04-14T20:02:30.113" v="747" actId="12788"/>
+        <pc:grpChg chg="add del mod">
+          <ac:chgData name="Jonathan Rau" userId="01bd1429-ada3-4be3-b2f3-ae839e9d5ccc" providerId="ADAL" clId="{3F5F48D2-2934-4288-A555-E6823DD1D0AE}" dt="2023-05-01T21:44:52.913" v="778" actId="165"/>
           <ac:grpSpMkLst>
             <pc:docMk/>
             <pc:sldMk cId="2927218767" sldId="258"/>
             <ac:grpSpMk id="49" creationId="{544F67E2-9F7F-A7FC-E95C-2D6E4BBFD252}"/>
           </ac:grpSpMkLst>
         </pc:grpChg>
+        <pc:grpChg chg="add mod">
+          <ac:chgData name="Jonathan Rau" userId="01bd1429-ada3-4be3-b2f3-ae839e9d5ccc" providerId="ADAL" clId="{3F5F48D2-2934-4288-A555-E6823DD1D0AE}" dt="2023-05-01T22:05:15.503" v="1286" actId="571"/>
+          <ac:grpSpMkLst>
+            <pc:docMk/>
+            <pc:sldMk cId="2927218767" sldId="258"/>
+            <ac:grpSpMk id="58" creationId="{264AA946-2DEC-FFFE-2570-ED57F57E4670}"/>
+          </ac:grpSpMkLst>
+        </pc:grpChg>
+        <pc:grpChg chg="add mod">
+          <ac:chgData name="Jonathan Rau" userId="01bd1429-ada3-4be3-b2f3-ae839e9d5ccc" providerId="ADAL" clId="{3F5F48D2-2934-4288-A555-E6823DD1D0AE}" dt="2023-05-01T22:05:15.503" v="1286" actId="571"/>
+          <ac:grpSpMkLst>
+            <pc:docMk/>
+            <pc:sldMk cId="2927218767" sldId="258"/>
+            <ac:grpSpMk id="61" creationId="{5DE8B0B6-FE61-F05A-64FD-88B68BF4735C}"/>
+          </ac:grpSpMkLst>
+        </pc:grpChg>
+        <pc:picChg chg="add del mod topLvl">
+          <ac:chgData name="Jonathan Rau" userId="01bd1429-ada3-4be3-b2f3-ae839e9d5ccc" providerId="ADAL" clId="{3F5F48D2-2934-4288-A555-E6823DD1D0AE}" dt="2023-05-01T21:49:39.203" v="870" actId="478"/>
+          <ac:picMkLst>
+            <pc:docMk/>
+            <pc:sldMk cId="2927218767" sldId="258"/>
+            <ac:picMk id="3" creationId="{1332A199-18EB-4E2B-DE68-1C157EDEB4F8}"/>
+          </ac:picMkLst>
+        </pc:picChg>
         <pc:picChg chg="add mod">
-          <ac:chgData name="Jonathan Rau" userId="01bd1429-ada3-4be3-b2f3-ae839e9d5ccc" providerId="ADAL" clId="{3F5F48D2-2934-4288-A555-E6823DD1D0AE}" dt="2023-04-14T19:57:44.692" v="651" actId="1076"/>
+          <ac:chgData name="Jonathan Rau" userId="01bd1429-ada3-4be3-b2f3-ae839e9d5ccc" providerId="ADAL" clId="{3F5F48D2-2934-4288-A555-E6823DD1D0AE}" dt="2023-05-01T22:08:47.780" v="1362" actId="12789"/>
           <ac:picMkLst>
             <pc:docMk/>
             <pc:sldMk cId="2927218767" sldId="258"/>
@@ -609,7 +753,7 @@
           </ac:picMkLst>
         </pc:picChg>
         <pc:picChg chg="add mod">
-          <ac:chgData name="Jonathan Rau" userId="01bd1429-ada3-4be3-b2f3-ae839e9d5ccc" providerId="ADAL" clId="{3F5F48D2-2934-4288-A555-E6823DD1D0AE}" dt="2023-04-14T19:58:42.750" v="682" actId="1035"/>
+          <ac:chgData name="Jonathan Rau" userId="01bd1429-ada3-4be3-b2f3-ae839e9d5ccc" providerId="ADAL" clId="{3F5F48D2-2934-4288-A555-E6823DD1D0AE}" dt="2023-05-01T22:08:00.467" v="1305" actId="552"/>
           <ac:picMkLst>
             <pc:docMk/>
             <pc:sldMk cId="2927218767" sldId="258"/>
@@ -617,7 +761,7 @@
           </ac:picMkLst>
         </pc:picChg>
         <pc:picChg chg="add mod">
-          <ac:chgData name="Jonathan Rau" userId="01bd1429-ada3-4be3-b2f3-ae839e9d5ccc" providerId="ADAL" clId="{3F5F48D2-2934-4288-A555-E6823DD1D0AE}" dt="2023-04-14T19:58:37.036" v="672" actId="1035"/>
+          <ac:chgData name="Jonathan Rau" userId="01bd1429-ada3-4be3-b2f3-ae839e9d5ccc" providerId="ADAL" clId="{3F5F48D2-2934-4288-A555-E6823DD1D0AE}" dt="2023-05-01T22:05:19.418" v="1287" actId="12789"/>
           <ac:picMkLst>
             <pc:docMk/>
             <pc:sldMk cId="2927218767" sldId="258"/>
@@ -664,48 +808,48 @@
             <ac:picMk id="22" creationId="{C1FF35FC-AD1A-F89F-25C1-CD3E8DD9CC4F}"/>
           </ac:picMkLst>
         </pc:picChg>
-        <pc:picChg chg="add mod">
-          <ac:chgData name="Jonathan Rau" userId="01bd1429-ada3-4be3-b2f3-ae839e9d5ccc" providerId="ADAL" clId="{3F5F48D2-2934-4288-A555-E6823DD1D0AE}" dt="2023-04-14T20:02:30.113" v="747" actId="12788"/>
+        <pc:picChg chg="add mod topLvl">
+          <ac:chgData name="Jonathan Rau" userId="01bd1429-ada3-4be3-b2f3-ae839e9d5ccc" providerId="ADAL" clId="{3F5F48D2-2934-4288-A555-E6823DD1D0AE}" dt="2023-05-01T22:09:47.537" v="1401" actId="1035"/>
           <ac:picMkLst>
             <pc:docMk/>
             <pc:sldMk cId="2927218767" sldId="258"/>
             <ac:picMk id="35" creationId="{D2DAF613-D8BD-3380-58A8-5BAB202AF083}"/>
           </ac:picMkLst>
         </pc:picChg>
-        <pc:picChg chg="add mod">
-          <ac:chgData name="Jonathan Rau" userId="01bd1429-ada3-4be3-b2f3-ae839e9d5ccc" providerId="ADAL" clId="{3F5F48D2-2934-4288-A555-E6823DD1D0AE}" dt="2023-04-14T20:02:30.113" v="747" actId="12788"/>
+        <pc:picChg chg="add del mod topLvl">
+          <ac:chgData name="Jonathan Rau" userId="01bd1429-ada3-4be3-b2f3-ae839e9d5ccc" providerId="ADAL" clId="{3F5F48D2-2934-4288-A555-E6823DD1D0AE}" dt="2023-05-01T21:45:03.283" v="780" actId="478"/>
           <ac:picMkLst>
             <pc:docMk/>
             <pc:sldMk cId="2927218767" sldId="258"/>
             <ac:picMk id="38" creationId="{8B967596-2604-AD15-668D-7E808ADAB5D3}"/>
           </ac:picMkLst>
         </pc:picChg>
-        <pc:picChg chg="add mod">
-          <ac:chgData name="Jonathan Rau" userId="01bd1429-ada3-4be3-b2f3-ae839e9d5ccc" providerId="ADAL" clId="{3F5F48D2-2934-4288-A555-E6823DD1D0AE}" dt="2023-04-14T20:02:30.113" v="747" actId="12788"/>
+        <pc:picChg chg="add mod topLvl">
+          <ac:chgData name="Jonathan Rau" userId="01bd1429-ada3-4be3-b2f3-ae839e9d5ccc" providerId="ADAL" clId="{3F5F48D2-2934-4288-A555-E6823DD1D0AE}" dt="2023-05-01T22:09:47.537" v="1401" actId="1035"/>
           <ac:picMkLst>
             <pc:docMk/>
             <pc:sldMk cId="2927218767" sldId="258"/>
             <ac:picMk id="39" creationId="{0B15E7EF-81AB-9F76-740A-808EC8C56C65}"/>
           </ac:picMkLst>
         </pc:picChg>
-        <pc:picChg chg="add mod">
-          <ac:chgData name="Jonathan Rau" userId="01bd1429-ada3-4be3-b2f3-ae839e9d5ccc" providerId="ADAL" clId="{3F5F48D2-2934-4288-A555-E6823DD1D0AE}" dt="2023-04-14T20:02:30.113" v="747" actId="12788"/>
+        <pc:picChg chg="add del mod topLvl">
+          <ac:chgData name="Jonathan Rau" userId="01bd1429-ada3-4be3-b2f3-ae839e9d5ccc" providerId="ADAL" clId="{3F5F48D2-2934-4288-A555-E6823DD1D0AE}" dt="2023-05-01T21:45:03.283" v="780" actId="478"/>
           <ac:picMkLst>
             <pc:docMk/>
             <pc:sldMk cId="2927218767" sldId="258"/>
             <ac:picMk id="41" creationId="{20A3568B-2519-DB9D-EC3F-37EE079E3586}"/>
           </ac:picMkLst>
         </pc:picChg>
-        <pc:picChg chg="add mod">
-          <ac:chgData name="Jonathan Rau" userId="01bd1429-ada3-4be3-b2f3-ae839e9d5ccc" providerId="ADAL" clId="{3F5F48D2-2934-4288-A555-E6823DD1D0AE}" dt="2023-04-14T20:02:30.113" v="747" actId="12788"/>
+        <pc:picChg chg="add mod topLvl">
+          <ac:chgData name="Jonathan Rau" userId="01bd1429-ada3-4be3-b2f3-ae839e9d5ccc" providerId="ADAL" clId="{3F5F48D2-2934-4288-A555-E6823DD1D0AE}" dt="2023-05-01T22:09:47.537" v="1401" actId="1035"/>
           <ac:picMkLst>
             <pc:docMk/>
             <pc:sldMk cId="2927218767" sldId="258"/>
             <ac:picMk id="43" creationId="{46C1D956-00C8-E3E3-A65B-3466292AEC94}"/>
           </ac:picMkLst>
         </pc:picChg>
-        <pc:picChg chg="add mod">
-          <ac:chgData name="Jonathan Rau" userId="01bd1429-ada3-4be3-b2f3-ae839e9d5ccc" providerId="ADAL" clId="{3F5F48D2-2934-4288-A555-E6823DD1D0AE}" dt="2023-04-14T20:02:30.113" v="747" actId="12788"/>
+        <pc:picChg chg="add mod topLvl">
+          <ac:chgData name="Jonathan Rau" userId="01bd1429-ada3-4be3-b2f3-ae839e9d5ccc" providerId="ADAL" clId="{3F5F48D2-2934-4288-A555-E6823DD1D0AE}" dt="2023-05-01T22:09:47.537" v="1401" actId="1035"/>
           <ac:picMkLst>
             <pc:docMk/>
             <pc:sldMk cId="2927218767" sldId="258"/>
@@ -713,11 +857,59 @@
           </ac:picMkLst>
         </pc:picChg>
         <pc:picChg chg="add mod">
-          <ac:chgData name="Jonathan Rau" userId="01bd1429-ada3-4be3-b2f3-ae839e9d5ccc" providerId="ADAL" clId="{3F5F48D2-2934-4288-A555-E6823DD1D0AE}" dt="2023-04-14T20:02:21.805" v="746" actId="1076"/>
+          <ac:chgData name="Jonathan Rau" userId="01bd1429-ada3-4be3-b2f3-ae839e9d5ccc" providerId="ADAL" clId="{3F5F48D2-2934-4288-A555-E6823DD1D0AE}" dt="2023-05-01T22:05:19.418" v="1287" actId="12789"/>
+          <ac:picMkLst>
+            <pc:docMk/>
+            <pc:sldMk cId="2927218767" sldId="258"/>
+            <ac:picMk id="50" creationId="{73D0EF48-EE4F-CAD8-9887-48C5E7772023}"/>
+          </ac:picMkLst>
+        </pc:picChg>
+        <pc:picChg chg="add mod">
+          <ac:chgData name="Jonathan Rau" userId="01bd1429-ada3-4be3-b2f3-ae839e9d5ccc" providerId="ADAL" clId="{3F5F48D2-2934-4288-A555-E6823DD1D0AE}" dt="2023-05-01T22:08:10.226" v="1307" actId="553"/>
+          <ac:picMkLst>
+            <pc:docMk/>
+            <pc:sldMk cId="2927218767" sldId="258"/>
+            <ac:picMk id="53" creationId="{8903D04C-6DA0-E7D0-7EDF-6AE6E6C6EF0E}"/>
+          </ac:picMkLst>
+        </pc:picChg>
+        <pc:picChg chg="add mod">
+          <ac:chgData name="Jonathan Rau" userId="01bd1429-ada3-4be3-b2f3-ae839e9d5ccc" providerId="ADAL" clId="{3F5F48D2-2934-4288-A555-E6823DD1D0AE}" dt="2023-05-01T22:07:54.272" v="1304" actId="552"/>
           <ac:picMkLst>
             <pc:docMk/>
             <pc:sldMk cId="2927218767" sldId="258"/>
             <ac:picMk id="55" creationId="{5FB33C35-4ABC-C3EF-7377-9B5091661884}"/>
+          </ac:picMkLst>
+        </pc:picChg>
+        <pc:picChg chg="mod">
+          <ac:chgData name="Jonathan Rau" userId="01bd1429-ada3-4be3-b2f3-ae839e9d5ccc" providerId="ADAL" clId="{3F5F48D2-2934-4288-A555-E6823DD1D0AE}" dt="2023-05-01T22:05:15.503" v="1286" actId="571"/>
+          <ac:picMkLst>
+            <pc:docMk/>
+            <pc:sldMk cId="2927218767" sldId="258"/>
+            <ac:picMk id="60" creationId="{1789B676-E28C-E0F8-B66E-7044FE06C5FA}"/>
+          </ac:picMkLst>
+        </pc:picChg>
+        <pc:picChg chg="mod">
+          <ac:chgData name="Jonathan Rau" userId="01bd1429-ada3-4be3-b2f3-ae839e9d5ccc" providerId="ADAL" clId="{3F5F48D2-2934-4288-A555-E6823DD1D0AE}" dt="2023-05-01T22:05:15.503" v="1286" actId="571"/>
+          <ac:picMkLst>
+            <pc:docMk/>
+            <pc:sldMk cId="2927218767" sldId="258"/>
+            <ac:picMk id="63" creationId="{68785ECA-834A-CF97-FD2E-AF6ADAAA29DF}"/>
+          </ac:picMkLst>
+        </pc:picChg>
+        <pc:picChg chg="add mod">
+          <ac:chgData name="Jonathan Rau" userId="01bd1429-ada3-4be3-b2f3-ae839e9d5ccc" providerId="ADAL" clId="{3F5F48D2-2934-4288-A555-E6823DD1D0AE}" dt="2023-05-01T22:05:15.503" v="1286" actId="571"/>
+          <ac:picMkLst>
+            <pc:docMk/>
+            <pc:sldMk cId="2927218767" sldId="258"/>
+            <ac:picMk id="1024" creationId="{B5B2DF3F-3F6F-44E9-5017-4CA7B9DFF52C}"/>
+          </ac:picMkLst>
+        </pc:picChg>
+        <pc:picChg chg="add mod">
+          <ac:chgData name="Jonathan Rau" userId="01bd1429-ada3-4be3-b2f3-ae839e9d5ccc" providerId="ADAL" clId="{3F5F48D2-2934-4288-A555-E6823DD1D0AE}" dt="2023-05-01T22:05:15.503" v="1286" actId="571"/>
+          <ac:picMkLst>
+            <pc:docMk/>
+            <pc:sldMk cId="2927218767" sldId="258"/>
+            <ac:picMk id="1025" creationId="{2DEBD243-003B-B356-DBEB-FE8C84AA7735}"/>
           </ac:picMkLst>
         </pc:picChg>
         <pc:picChg chg="add del">
@@ -729,11 +921,35 @@
           </ac:picMkLst>
         </pc:picChg>
         <pc:picChg chg="add mod">
-          <ac:chgData name="Jonathan Rau" userId="01bd1429-ada3-4be3-b2f3-ae839e9d5ccc" providerId="ADAL" clId="{3F5F48D2-2934-4288-A555-E6823DD1D0AE}" dt="2023-04-14T19:52:40.115" v="380" actId="1035"/>
+          <ac:chgData name="Jonathan Rau" userId="01bd1429-ada3-4be3-b2f3-ae839e9d5ccc" providerId="ADAL" clId="{3F5F48D2-2934-4288-A555-E6823DD1D0AE}" dt="2023-05-01T22:09:47.537" v="1401" actId="1035"/>
+          <ac:picMkLst>
+            <pc:docMk/>
+            <pc:sldMk cId="2927218767" sldId="258"/>
+            <ac:picMk id="1026" creationId="{EEFAA6CA-7B0D-3179-A8B7-CE0BB5626AD2}"/>
+          </ac:picMkLst>
+        </pc:picChg>
+        <pc:picChg chg="add mod">
+          <ac:chgData name="Jonathan Rau" userId="01bd1429-ada3-4be3-b2f3-ae839e9d5ccc" providerId="ADAL" clId="{3F5F48D2-2934-4288-A555-E6823DD1D0AE}" dt="2023-05-01T22:07:40.815" v="1302" actId="12789"/>
           <ac:picMkLst>
             <pc:docMk/>
             <pc:sldMk cId="2927218767" sldId="258"/>
             <ac:picMk id="1028" creationId="{07E8CB6A-59CD-2711-37CA-9505B61B0841}"/>
+          </ac:picMkLst>
+        </pc:picChg>
+        <pc:picChg chg="add mod">
+          <ac:chgData name="Jonathan Rau" userId="01bd1429-ada3-4be3-b2f3-ae839e9d5ccc" providerId="ADAL" clId="{3F5F48D2-2934-4288-A555-E6823DD1D0AE}" dt="2023-05-01T22:07:54.272" v="1304" actId="552"/>
+          <ac:picMkLst>
+            <pc:docMk/>
+            <pc:sldMk cId="2927218767" sldId="258"/>
+            <ac:picMk id="1030" creationId="{ED0DC73D-5646-3483-56E7-858CFC2DE900}"/>
+          </ac:picMkLst>
+        </pc:picChg>
+        <pc:picChg chg="add del">
+          <ac:chgData name="Jonathan Rau" userId="01bd1429-ada3-4be3-b2f3-ae839e9d5ccc" providerId="ADAL" clId="{3F5F48D2-2934-4288-A555-E6823DD1D0AE}" dt="2023-05-01T22:01:28.715" v="1093"/>
+          <ac:picMkLst>
+            <pc:docMk/>
+            <pc:sldMk cId="2927218767" sldId="258"/>
+            <ac:picMk id="1032" creationId="{5E66348A-4D93-475D-DC66-4361BC1A746B}"/>
           </ac:picMkLst>
         </pc:picChg>
         <pc:picChg chg="add del mod">
@@ -745,7 +961,7 @@
           </ac:picMkLst>
         </pc:picChg>
         <pc:picChg chg="add mod">
-          <ac:chgData name="Jonathan Rau" userId="01bd1429-ada3-4be3-b2f3-ae839e9d5ccc" providerId="ADAL" clId="{3F5F48D2-2934-4288-A555-E6823DD1D0AE}" dt="2023-04-14T19:58:37.036" v="672" actId="1035"/>
+          <ac:chgData name="Jonathan Rau" userId="01bd1429-ada3-4be3-b2f3-ae839e9d5ccc" providerId="ADAL" clId="{3F5F48D2-2934-4288-A555-E6823DD1D0AE}" dt="2023-05-01T22:08:14.951" v="1308" actId="12789"/>
           <ac:picMkLst>
             <pc:docMk/>
             <pc:sldMk cId="2927218767" sldId="258"/>
@@ -753,7 +969,7 @@
           </ac:picMkLst>
         </pc:picChg>
         <pc:picChg chg="add mod">
-          <ac:chgData name="Jonathan Rau" userId="01bd1429-ada3-4be3-b2f3-ae839e9d5ccc" providerId="ADAL" clId="{3F5F48D2-2934-4288-A555-E6823DD1D0AE}" dt="2023-04-14T19:58:42.750" v="682" actId="1035"/>
+          <ac:chgData name="Jonathan Rau" userId="01bd1429-ada3-4be3-b2f3-ae839e9d5ccc" providerId="ADAL" clId="{3F5F48D2-2934-4288-A555-E6823DD1D0AE}" dt="2023-05-01T22:08:14.951" v="1308" actId="12789"/>
           <ac:picMkLst>
             <pc:docMk/>
             <pc:sldMk cId="2927218767" sldId="258"/>
@@ -769,7 +985,7 @@
           </ac:picMkLst>
         </pc:picChg>
         <pc:picChg chg="add mod">
-          <ac:chgData name="Jonathan Rau" userId="01bd1429-ada3-4be3-b2f3-ae839e9d5ccc" providerId="ADAL" clId="{3F5F48D2-2934-4288-A555-E6823DD1D0AE}" dt="2023-04-14T19:56:04.439" v="569" actId="1076"/>
+          <ac:chgData name="Jonathan Rau" userId="01bd1429-ada3-4be3-b2f3-ae839e9d5ccc" providerId="ADAL" clId="{3F5F48D2-2934-4288-A555-E6823DD1D0AE}" dt="2023-05-01T22:08:24.716" v="1310" actId="12788"/>
           <ac:picMkLst>
             <pc:docMk/>
             <pc:sldMk cId="2927218767" sldId="258"/>
@@ -777,7 +993,7 @@
           </ac:picMkLst>
         </pc:picChg>
         <pc:picChg chg="add mod">
-          <ac:chgData name="Jonathan Rau" userId="01bd1429-ada3-4be3-b2f3-ae839e9d5ccc" providerId="ADAL" clId="{3F5F48D2-2934-4288-A555-E6823DD1D0AE}" dt="2023-04-14T19:58:37.036" v="672" actId="1035"/>
+          <ac:chgData name="Jonathan Rau" userId="01bd1429-ada3-4be3-b2f3-ae839e9d5ccc" providerId="ADAL" clId="{3F5F48D2-2934-4288-A555-E6823DD1D0AE}" dt="2023-05-01T22:08:24.716" v="1310" actId="12788"/>
           <ac:picMkLst>
             <pc:docMk/>
             <pc:sldMk cId="2927218767" sldId="258"/>
@@ -785,7 +1001,7 @@
           </ac:picMkLst>
         </pc:picChg>
         <pc:picChg chg="add mod">
-          <ac:chgData name="Jonathan Rau" userId="01bd1429-ada3-4be3-b2f3-ae839e9d5ccc" providerId="ADAL" clId="{3F5F48D2-2934-4288-A555-E6823DD1D0AE}" dt="2023-04-14T19:58:42.750" v="682" actId="1035"/>
+          <ac:chgData name="Jonathan Rau" userId="01bd1429-ada3-4be3-b2f3-ae839e9d5ccc" providerId="ADAL" clId="{3F5F48D2-2934-4288-A555-E6823DD1D0AE}" dt="2023-05-01T22:08:24.716" v="1310" actId="12788"/>
           <ac:picMkLst>
             <pc:docMk/>
             <pc:sldMk cId="2927218767" sldId="258"/>
@@ -793,7 +1009,7 @@
           </ac:picMkLst>
         </pc:picChg>
         <pc:cxnChg chg="add mod">
-          <ac:chgData name="Jonathan Rau" userId="01bd1429-ada3-4be3-b2f3-ae839e9d5ccc" providerId="ADAL" clId="{3F5F48D2-2934-4288-A555-E6823DD1D0AE}" dt="2023-04-14T19:58:13.093" v="656" actId="1582"/>
+          <ac:chgData name="Jonathan Rau" userId="01bd1429-ada3-4be3-b2f3-ae839e9d5ccc" providerId="ADAL" clId="{3F5F48D2-2934-4288-A555-E6823DD1D0AE}" dt="2023-05-01T22:08:47.780" v="1362" actId="12789"/>
           <ac:cxnSpMkLst>
             <pc:docMk/>
             <pc:sldMk cId="2927218767" sldId="258"/>
@@ -801,7 +1017,7 @@
           </ac:cxnSpMkLst>
         </pc:cxnChg>
         <pc:cxnChg chg="add mod">
-          <ac:chgData name="Jonathan Rau" userId="01bd1429-ada3-4be3-b2f3-ae839e9d5ccc" providerId="ADAL" clId="{3F5F48D2-2934-4288-A555-E6823DD1D0AE}" dt="2023-04-14T19:58:20.596" v="659" actId="14100"/>
+          <ac:chgData name="Jonathan Rau" userId="01bd1429-ada3-4be3-b2f3-ae839e9d5ccc" providerId="ADAL" clId="{3F5F48D2-2934-4288-A555-E6823DD1D0AE}" dt="2023-05-01T22:08:47.780" v="1362" actId="12789"/>
           <ac:cxnSpMkLst>
             <pc:docMk/>
             <pc:sldMk cId="2927218767" sldId="258"/>
@@ -809,7 +1025,7 @@
           </ac:cxnSpMkLst>
         </pc:cxnChg>
         <pc:cxnChg chg="add mod">
-          <ac:chgData name="Jonathan Rau" userId="01bd1429-ada3-4be3-b2f3-ae839e9d5ccc" providerId="ADAL" clId="{3F5F48D2-2934-4288-A555-E6823DD1D0AE}" dt="2023-04-14T19:58:26.821" v="662" actId="14100"/>
+          <ac:chgData name="Jonathan Rau" userId="01bd1429-ada3-4be3-b2f3-ae839e9d5ccc" providerId="ADAL" clId="{3F5F48D2-2934-4288-A555-E6823DD1D0AE}" dt="2023-05-01T22:08:47.780" v="1362" actId="12789"/>
           <ac:cxnSpMkLst>
             <pc:docMk/>
             <pc:sldMk cId="2927218767" sldId="258"/>
@@ -817,7 +1033,7 @@
           </ac:cxnSpMkLst>
         </pc:cxnChg>
         <pc:cxnChg chg="add mod">
-          <ac:chgData name="Jonathan Rau" userId="01bd1429-ada3-4be3-b2f3-ae839e9d5ccc" providerId="ADAL" clId="{3F5F48D2-2934-4288-A555-E6823DD1D0AE}" dt="2023-04-14T20:01:40.209" v="738" actId="14100"/>
+          <ac:chgData name="Jonathan Rau" userId="01bd1429-ada3-4be3-b2f3-ae839e9d5ccc" providerId="ADAL" clId="{3F5F48D2-2934-4288-A555-E6823DD1D0AE}" dt="2023-05-01T22:11:35.855" v="1433" actId="1076"/>
           <ac:cxnSpMkLst>
             <pc:docMk/>
             <pc:sldMk cId="2927218767" sldId="258"/>
@@ -977,7 +1193,7 @@
           <a:p>
             <a:fld id="{A3104859-06A7-4B6C-9EBE-0886FFE8171A}" type="datetimeFigureOut">
               <a:rPr lang="en-US" smtClean="0"/>
-              <a:t>4/16/2023</a:t>
+              <a:t>5/1/2023</a:t>
             </a:fld>
             <a:endParaRPr lang="en-US"/>
           </a:p>
@@ -1175,7 +1391,7 @@
           <a:p>
             <a:fld id="{A3104859-06A7-4B6C-9EBE-0886FFE8171A}" type="datetimeFigureOut">
               <a:rPr lang="en-US" smtClean="0"/>
-              <a:t>4/16/2023</a:t>
+              <a:t>5/1/2023</a:t>
             </a:fld>
             <a:endParaRPr lang="en-US"/>
           </a:p>
@@ -1383,7 +1599,7 @@
           <a:p>
             <a:fld id="{A3104859-06A7-4B6C-9EBE-0886FFE8171A}" type="datetimeFigureOut">
               <a:rPr lang="en-US" smtClean="0"/>
-              <a:t>4/16/2023</a:t>
+              <a:t>5/1/2023</a:t>
             </a:fld>
             <a:endParaRPr lang="en-US"/>
           </a:p>
@@ -1581,7 +1797,7 @@
           <a:p>
             <a:fld id="{A3104859-06A7-4B6C-9EBE-0886FFE8171A}" type="datetimeFigureOut">
               <a:rPr lang="en-US" smtClean="0"/>
-              <a:t>4/16/2023</a:t>
+              <a:t>5/1/2023</a:t>
             </a:fld>
             <a:endParaRPr lang="en-US"/>
           </a:p>
@@ -1856,7 +2072,7 @@
           <a:p>
             <a:fld id="{A3104859-06A7-4B6C-9EBE-0886FFE8171A}" type="datetimeFigureOut">
               <a:rPr lang="en-US" smtClean="0"/>
-              <a:t>4/16/2023</a:t>
+              <a:t>5/1/2023</a:t>
             </a:fld>
             <a:endParaRPr lang="en-US"/>
           </a:p>
@@ -2121,7 +2337,7 @@
           <a:p>
             <a:fld id="{A3104859-06A7-4B6C-9EBE-0886FFE8171A}" type="datetimeFigureOut">
               <a:rPr lang="en-US" smtClean="0"/>
-              <a:t>4/16/2023</a:t>
+              <a:t>5/1/2023</a:t>
             </a:fld>
             <a:endParaRPr lang="en-US"/>
           </a:p>
@@ -2533,7 +2749,7 @@
           <a:p>
             <a:fld id="{A3104859-06A7-4B6C-9EBE-0886FFE8171A}" type="datetimeFigureOut">
               <a:rPr lang="en-US" smtClean="0"/>
-              <a:t>4/16/2023</a:t>
+              <a:t>5/1/2023</a:t>
             </a:fld>
             <a:endParaRPr lang="en-US"/>
           </a:p>
@@ -2674,7 +2890,7 @@
           <a:p>
             <a:fld id="{A3104859-06A7-4B6C-9EBE-0886FFE8171A}" type="datetimeFigureOut">
               <a:rPr lang="en-US" smtClean="0"/>
-              <a:t>4/16/2023</a:t>
+              <a:t>5/1/2023</a:t>
             </a:fld>
             <a:endParaRPr lang="en-US"/>
           </a:p>
@@ -2787,7 +3003,7 @@
           <a:p>
             <a:fld id="{A3104859-06A7-4B6C-9EBE-0886FFE8171A}" type="datetimeFigureOut">
               <a:rPr lang="en-US" smtClean="0"/>
-              <a:t>4/16/2023</a:t>
+              <a:t>5/1/2023</a:t>
             </a:fld>
             <a:endParaRPr lang="en-US"/>
           </a:p>
@@ -3098,7 +3314,7 @@
           <a:p>
             <a:fld id="{A3104859-06A7-4B6C-9EBE-0886FFE8171A}" type="datetimeFigureOut">
               <a:rPr lang="en-US" smtClean="0"/>
-              <a:t>4/16/2023</a:t>
+              <a:t>5/1/2023</a:t>
             </a:fld>
             <a:endParaRPr lang="en-US"/>
           </a:p>
@@ -3386,7 +3602,7 @@
           <a:p>
             <a:fld id="{A3104859-06A7-4B6C-9EBE-0886FFE8171A}" type="datetimeFigureOut">
               <a:rPr lang="en-US" smtClean="0"/>
-              <a:t>4/16/2023</a:t>
+              <a:t>5/1/2023</a:t>
             </a:fld>
             <a:endParaRPr lang="en-US"/>
           </a:p>
@@ -3627,7 +3843,7 @@
           <a:p>
             <a:fld id="{A3104859-06A7-4B6C-9EBE-0886FFE8171A}" type="datetimeFigureOut">
               <a:rPr lang="en-US" smtClean="0"/>
-              <a:t>4/16/2023</a:t>
+              <a:t>5/1/2023</a:t>
             </a:fld>
             <a:endParaRPr lang="en-US"/>
           </a:p>
@@ -11709,7 +11925,7 @@
         </p:blipFill>
         <p:spPr>
           <a:xfrm>
-            <a:off x="274403" y="1479608"/>
+            <a:off x="670643" y="2692675"/>
             <a:ext cx="1472650" cy="1472650"/>
           </a:xfrm>
           <a:prstGeom prst="rect">
@@ -11731,7 +11947,7 @@
         </p:nvSpPr>
         <p:spPr>
           <a:xfrm>
-            <a:off x="198065" y="2952258"/>
+            <a:off x="594305" y="4110498"/>
             <a:ext cx="1625326" cy="923330"/>
           </a:xfrm>
           <a:prstGeom prst="rect">
@@ -11797,7 +12013,7 @@
         </p:blipFill>
         <p:spPr bwMode="auto">
           <a:xfrm>
-            <a:off x="3768006" y="1518572"/>
+            <a:off x="4671563" y="1481111"/>
             <a:ext cx="996153" cy="996153"/>
           </a:xfrm>
           <a:prstGeom prst="rect">
@@ -11842,7 +12058,7 @@
         </p:blipFill>
         <p:spPr>
           <a:xfrm>
-            <a:off x="3768006" y="4158555"/>
+            <a:off x="2863630" y="1481111"/>
             <a:ext cx="996153" cy="996153"/>
           </a:xfrm>
           <a:prstGeom prst="rect">
@@ -11864,7 +12080,7 @@
         </p:nvGrpSpPr>
         <p:grpSpPr>
           <a:xfrm>
-            <a:off x="3768005" y="2838292"/>
+            <a:off x="2863630" y="2867643"/>
             <a:ext cx="996696" cy="996696"/>
             <a:chOff x="7220319" y="1826836"/>
             <a:chExt cx="996696" cy="996696"/>
@@ -11982,7 +12198,7 @@
         </p:blipFill>
         <p:spPr bwMode="auto">
           <a:xfrm>
-            <a:off x="6954963" y="2838292"/>
+            <a:off x="7858522" y="4253215"/>
             <a:ext cx="996696" cy="996696"/>
           </a:xfrm>
           <a:prstGeom prst="rect">
@@ -12029,7 +12245,7 @@
         </p:blipFill>
         <p:spPr bwMode="auto">
           <a:xfrm>
-            <a:off x="6954963" y="4158555"/>
+            <a:off x="6051403" y="4253215"/>
             <a:ext cx="996696" cy="996696"/>
           </a:xfrm>
           <a:prstGeom prst="rect">
@@ -12061,7 +12277,7 @@
         </p:nvSpPr>
         <p:spPr>
           <a:xfrm>
-            <a:off x="9238633" y="452428"/>
+            <a:off x="9238633" y="335588"/>
             <a:ext cx="2803815" cy="633926"/>
           </a:xfrm>
           <a:prstGeom prst="roundRect">
@@ -12122,7 +12338,7 @@
         </p:nvSpPr>
         <p:spPr>
           <a:xfrm>
-            <a:off x="2864173" y="452428"/>
+            <a:off x="2863630" y="335588"/>
             <a:ext cx="2803815" cy="633926"/>
           </a:xfrm>
           <a:prstGeom prst="roundRect">
@@ -12183,7 +12399,7 @@
         </p:nvSpPr>
         <p:spPr>
           <a:xfrm>
-            <a:off x="6051403" y="452428"/>
+            <a:off x="6051403" y="335588"/>
             <a:ext cx="2803815" cy="633926"/>
           </a:xfrm>
           <a:prstGeom prst="roundRect">
@@ -12230,124 +12446,6 @@
           </a:p>
         </p:txBody>
       </p:sp>
-      <p:sp>
-        <p:nvSpPr>
-          <p:cNvPr id="18" name="Rectangle: Rounded Corners 17">
-            <a:extLst>
-              <a:ext uri="{FF2B5EF4-FFF2-40B4-BE49-F238E27FC236}">
-                <a16:creationId xmlns:a16="http://schemas.microsoft.com/office/drawing/2014/main" id="{11380B01-5C11-2679-9594-77B4B9FFAF52}"/>
-              </a:ext>
-            </a:extLst>
-          </p:cNvPr>
-          <p:cNvSpPr/>
-          <p:nvPr/>
-        </p:nvSpPr>
-        <p:spPr>
-          <a:xfrm>
-            <a:off x="4593568" y="2684210"/>
-            <a:ext cx="1074420" cy="463441"/>
-          </a:xfrm>
-          <a:prstGeom prst="roundRect">
-            <a:avLst/>
-          </a:prstGeom>
-          <a:solidFill>
-            <a:srgbClr val="00B0F0"/>
-          </a:solidFill>
-          <a:ln>
-            <a:noFill/>
-          </a:ln>
-        </p:spPr>
-        <p:style>
-          <a:lnRef idx="2">
-            <a:schemeClr val="accent1">
-              <a:shade val="50000"/>
-            </a:schemeClr>
-          </a:lnRef>
-          <a:fillRef idx="1">
-            <a:schemeClr val="accent1"/>
-          </a:fillRef>
-          <a:effectRef idx="0">
-            <a:schemeClr val="accent1"/>
-          </a:effectRef>
-          <a:fontRef idx="minor">
-            <a:schemeClr val="lt1"/>
-          </a:fontRef>
-        </p:style>
-        <p:txBody>
-          <a:bodyPr rtlCol="0" anchor="ctr"/>
-          <a:lstStyle/>
-          <a:p>
-            <a:pPr algn="ctr"/>
-            <a:r>
-              <a:rPr lang="en-US" sz="1600" b="1" dirty="0">
-                <a:solidFill>
-                  <a:schemeClr val="tx1"/>
-                </a:solidFill>
-              </a:rPr>
-              <a:t>COMING SOON!</a:t>
-            </a:r>
-          </a:p>
-        </p:txBody>
-      </p:sp>
-      <p:sp>
-        <p:nvSpPr>
-          <p:cNvPr id="19" name="Rectangle: Rounded Corners 18">
-            <a:extLst>
-              <a:ext uri="{FF2B5EF4-FFF2-40B4-BE49-F238E27FC236}">
-                <a16:creationId xmlns:a16="http://schemas.microsoft.com/office/drawing/2014/main" id="{5777DF44-469B-7A2F-8877-71FC31533BAB}"/>
-              </a:ext>
-            </a:extLst>
-          </p:cNvPr>
-          <p:cNvSpPr/>
-          <p:nvPr/>
-        </p:nvSpPr>
-        <p:spPr>
-          <a:xfrm>
-            <a:off x="7764789" y="2684209"/>
-            <a:ext cx="1074420" cy="463441"/>
-          </a:xfrm>
-          <a:prstGeom prst="roundRect">
-            <a:avLst/>
-          </a:prstGeom>
-          <a:solidFill>
-            <a:srgbClr val="00B0F0"/>
-          </a:solidFill>
-          <a:ln>
-            <a:noFill/>
-          </a:ln>
-        </p:spPr>
-        <p:style>
-          <a:lnRef idx="2">
-            <a:schemeClr val="accent1">
-              <a:shade val="50000"/>
-            </a:schemeClr>
-          </a:lnRef>
-          <a:fillRef idx="1">
-            <a:schemeClr val="accent1"/>
-          </a:fillRef>
-          <a:effectRef idx="0">
-            <a:schemeClr val="accent1"/>
-          </a:effectRef>
-          <a:fontRef idx="minor">
-            <a:schemeClr val="lt1"/>
-          </a:fontRef>
-        </p:style>
-        <p:txBody>
-          <a:bodyPr rtlCol="0" anchor="ctr"/>
-          <a:lstStyle/>
-          <a:p>
-            <a:pPr algn="ctr"/>
-            <a:r>
-              <a:rPr lang="en-US" sz="1600" b="1" dirty="0">
-                <a:solidFill>
-                  <a:schemeClr val="tx1"/>
-                </a:solidFill>
-              </a:rPr>
-              <a:t>COMING SOON!</a:t>
-            </a:r>
-          </a:p>
-        </p:txBody>
-      </p:sp>
       <p:pic>
         <p:nvPicPr>
           <p:cNvPr id="1040" name="Picture 16" descr="ALMOST GONE: Save 90% on Shodan.io! Only $5 Lifetime! - LowEndBox">
@@ -12377,7 +12475,7 @@
         </p:blipFill>
         <p:spPr bwMode="auto">
           <a:xfrm>
-            <a:off x="10146764" y="1522601"/>
+            <a:off x="10146764" y="1485411"/>
             <a:ext cx="987552" cy="987552"/>
           </a:xfrm>
           <a:prstGeom prst="rect">
@@ -12414,7 +12512,7 @@
         </p:nvGrpSpPr>
         <p:grpSpPr>
           <a:xfrm>
-            <a:off x="10142192" y="2838292"/>
+            <a:off x="10142192" y="2867643"/>
             <a:ext cx="996696" cy="996696"/>
             <a:chOff x="7974302" y="4505311"/>
             <a:chExt cx="996696" cy="996696"/>
@@ -12534,7 +12632,7 @@
         </p:nvGrpSpPr>
         <p:grpSpPr>
           <a:xfrm>
-            <a:off x="10142192" y="4153983"/>
+            <a:off x="10142192" y="4253215"/>
             <a:ext cx="996696" cy="996696"/>
             <a:chOff x="8853054" y="4006272"/>
             <a:chExt cx="996696" cy="996696"/>
@@ -12654,7 +12752,7 @@
         </p:nvSpPr>
         <p:spPr>
           <a:xfrm>
-            <a:off x="10790904" y="3941141"/>
+            <a:off x="10699464" y="3967028"/>
             <a:ext cx="1074420" cy="463441"/>
           </a:xfrm>
           <a:prstGeom prst="roundRect">
@@ -12709,6 +12807,7 @@
             </a:extLst>
           </p:cNvPr>
           <p:cNvCxnSpPr>
+            <a:cxnSpLocks/>
             <a:stCxn id="4" idx="0"/>
             <a:endCxn id="16" idx="0"/>
           </p:cNvCxnSpPr>
@@ -12716,12 +12815,12 @@
         </p:nvCxnSpPr>
         <p:spPr>
           <a:xfrm rot="5400000" flipH="1" flipV="1">
-            <a:off x="2124814" y="-661658"/>
-            <a:ext cx="1027180" cy="3255353"/>
+            <a:off x="1657710" y="84847"/>
+            <a:ext cx="2357087" cy="2858570"/>
           </a:xfrm>
           <a:prstGeom prst="bentConnector3">
             <a:avLst>
-              <a:gd name="adj1" fmla="val 122255"/>
+              <a:gd name="adj1" fmla="val 109698"/>
             </a:avLst>
           </a:prstGeom>
           <a:ln w="19050">
@@ -12763,12 +12862,12 @@
         </p:nvCxnSpPr>
         <p:spPr>
           <a:xfrm rot="5400000" flipH="1" flipV="1">
-            <a:off x="3718429" y="-2255273"/>
-            <a:ext cx="1027180" cy="6442583"/>
+            <a:off x="3251596" y="-1509039"/>
+            <a:ext cx="2357087" cy="6046343"/>
           </a:xfrm>
           <a:prstGeom prst="bentConnector3">
             <a:avLst>
-              <a:gd name="adj1" fmla="val 122255"/>
+              <a:gd name="adj1" fmla="val 109698"/>
             </a:avLst>
           </a:prstGeom>
           <a:ln w="19050">
@@ -12810,12 +12909,12 @@
         </p:nvCxnSpPr>
         <p:spPr>
           <a:xfrm rot="5400000" flipH="1" flipV="1">
-            <a:off x="5312044" y="-3848888"/>
-            <a:ext cx="1027180" cy="9629813"/>
+            <a:off x="4845211" y="-3102654"/>
+            <a:ext cx="2357087" cy="9233573"/>
           </a:xfrm>
           <a:prstGeom prst="bentConnector3">
             <a:avLst>
-              <a:gd name="adj1" fmla="val 122255"/>
+              <a:gd name="adj1" fmla="val 109698"/>
             </a:avLst>
           </a:prstGeom>
           <a:ln w="19050">
@@ -12839,12 +12938,165 @@
           </a:fontRef>
         </p:style>
       </p:cxnSp>
+      <p:sp>
+        <p:nvSpPr>
+          <p:cNvPr id="51" name="Rectangle: Rounded Corners 50">
+            <a:extLst>
+              <a:ext uri="{FF2B5EF4-FFF2-40B4-BE49-F238E27FC236}">
+                <a16:creationId xmlns:a16="http://schemas.microsoft.com/office/drawing/2014/main" id="{1693654B-B9C5-BB57-C5AF-C57E58130215}"/>
+              </a:ext>
+            </a:extLst>
+          </p:cNvPr>
+          <p:cNvSpPr/>
+          <p:nvPr/>
+        </p:nvSpPr>
+        <p:spPr>
+          <a:xfrm>
+            <a:off x="3101224" y="5100320"/>
+            <a:ext cx="2139756" cy="365760"/>
+          </a:xfrm>
+          <a:prstGeom prst="roundRect">
+            <a:avLst/>
+          </a:prstGeom>
+          <a:solidFill>
+            <a:schemeClr val="bg1">
+              <a:lumMod val="75000"/>
+            </a:schemeClr>
+          </a:solidFill>
+          <a:ln>
+            <a:noFill/>
+          </a:ln>
+        </p:spPr>
+        <p:style>
+          <a:lnRef idx="2">
+            <a:schemeClr val="accent1">
+              <a:shade val="50000"/>
+            </a:schemeClr>
+          </a:lnRef>
+          <a:fillRef idx="1">
+            <a:schemeClr val="accent1"/>
+          </a:fillRef>
+          <a:effectRef idx="0">
+            <a:schemeClr val="accent1"/>
+          </a:effectRef>
+          <a:fontRef idx="minor">
+            <a:schemeClr val="lt1"/>
+          </a:fontRef>
+        </p:style>
+        <p:txBody>
+          <a:bodyPr rtlCol="0" anchor="ctr"/>
+          <a:lstStyle/>
+          <a:p>
+            <a:pPr algn="ctr"/>
+            <a:r>
+              <a:rPr lang="en-US" sz="1600" b="1" dirty="0">
+                <a:solidFill>
+                  <a:schemeClr val="tx1"/>
+                </a:solidFill>
+              </a:rPr>
+              <a:t>SUPPORTED OUTPUTS</a:t>
+            </a:r>
+          </a:p>
+        </p:txBody>
+      </p:sp>
+      <p:cxnSp>
+        <p:nvCxnSpPr>
+          <p:cNvPr id="52" name="Connector: Elbow 51">
+            <a:extLst>
+              <a:ext uri="{FF2B5EF4-FFF2-40B4-BE49-F238E27FC236}">
+                <a16:creationId xmlns:a16="http://schemas.microsoft.com/office/drawing/2014/main" id="{951CB380-36EC-ADD9-7F54-C01D45161AAF}"/>
+              </a:ext>
+            </a:extLst>
+          </p:cNvPr>
+          <p:cNvCxnSpPr>
+            <a:cxnSpLocks/>
+            <a:stCxn id="5" idx="2"/>
+            <a:endCxn id="51" idx="1"/>
+          </p:cNvCxnSpPr>
+          <p:nvPr/>
+        </p:nvCxnSpPr>
+        <p:spPr>
+          <a:xfrm rot="16200000" flipH="1">
+            <a:off x="2129410" y="4311386"/>
+            <a:ext cx="249372" cy="1694256"/>
+          </a:xfrm>
+          <a:prstGeom prst="bentConnector2">
+            <a:avLst/>
+          </a:prstGeom>
+          <a:ln w="19050">
+            <a:solidFill>
+              <a:schemeClr val="bg1"/>
+            </a:solidFill>
+          </a:ln>
+        </p:spPr>
+        <p:style>
+          <a:lnRef idx="1">
+            <a:schemeClr val="accent1"/>
+          </a:lnRef>
+          <a:fillRef idx="0">
+            <a:schemeClr val="accent1"/>
+          </a:fillRef>
+          <a:effectRef idx="0">
+            <a:schemeClr val="accent1"/>
+          </a:effectRef>
+          <a:fontRef idx="minor">
+            <a:schemeClr val="tx1"/>
+          </a:fontRef>
+        </p:style>
+      </p:cxnSp>
+      <p:pic>
+        <p:nvPicPr>
+          <p:cNvPr id="55" name="Picture 20">
+            <a:extLst>
+              <a:ext uri="{FF2B5EF4-FFF2-40B4-BE49-F238E27FC236}">
+                <a16:creationId xmlns:a16="http://schemas.microsoft.com/office/drawing/2014/main" id="{5FB33C35-4ABC-C3EF-7377-9B5091661884}"/>
+              </a:ext>
+            </a:extLst>
+          </p:cNvPr>
+          <p:cNvPicPr>
+            <a:picLocks noChangeAspect="1" noChangeArrowheads="1"/>
+          </p:cNvPicPr>
+          <p:nvPr/>
+        </p:nvPicPr>
+        <p:blipFill>
+          <a:blip r:embed="rId13">
+            <a:extLst>
+              <a:ext uri="{28A0092B-C50C-407E-A947-70E740481C1C}">
+                <a14:useLocalDpi xmlns:a14="http://schemas.microsoft.com/office/drawing/2010/main" val="0"/>
+              </a:ext>
+            </a:extLst>
+          </a:blip>
+          <a:srcRect/>
+          <a:stretch>
+            <a:fillRect/>
+          </a:stretch>
+        </p:blipFill>
+        <p:spPr bwMode="auto">
+          <a:xfrm>
+            <a:off x="6051403" y="1480839"/>
+            <a:ext cx="996696" cy="996696"/>
+          </a:xfrm>
+          <a:prstGeom prst="rect">
+            <a:avLst/>
+          </a:prstGeom>
+          <a:noFill/>
+          <a:extLst>
+            <a:ext uri="{909E8E84-426E-40DD-AFC4-6F175D3DCCD1}">
+              <a14:hiddenFill xmlns:a14="http://schemas.microsoft.com/office/drawing/2010/main">
+                <a:solidFill>
+                  <a:srgbClr val="FFFFFF"/>
+                </a:solidFill>
+              </a14:hiddenFill>
+            </a:ext>
+          </a:extLst>
+        </p:spPr>
+      </p:pic>
       <p:grpSp>
         <p:nvGrpSpPr>
-          <p:cNvPr id="49" name="Group 48">
-            <a:extLst>
-              <a:ext uri="{FF2B5EF4-FFF2-40B4-BE49-F238E27FC236}">
-                <a16:creationId xmlns:a16="http://schemas.microsoft.com/office/drawing/2014/main" id="{544F67E2-9F7F-A7FC-E95C-2D6E4BBFD252}"/>
+          <p:cNvPr id="34" name="Group 33">
+            <a:extLst>
+              <a:ext uri="{FF2B5EF4-FFF2-40B4-BE49-F238E27FC236}">
+                <a16:creationId xmlns:a16="http://schemas.microsoft.com/office/drawing/2014/main" id="{B0B80858-9883-3F5E-0753-1842B54739B1}"/>
               </a:ext>
             </a:extLst>
           </p:cNvPr>
@@ -12853,10 +13105,10 @@
         </p:nvGrpSpPr>
         <p:grpSpPr>
           <a:xfrm>
-            <a:off x="3101319" y="5478275"/>
-            <a:ext cx="5989362" cy="1254295"/>
-            <a:chOff x="-7623" y="5124372"/>
-            <a:chExt cx="5989362" cy="1254295"/>
+            <a:off x="3101225" y="5437380"/>
+            <a:ext cx="5514361" cy="1254295"/>
+            <a:chOff x="3101319" y="5488180"/>
+            <a:chExt cx="5514361" cy="1254295"/>
           </a:xfrm>
         </p:grpSpPr>
         <p:sp>
@@ -12873,8 +13125,8 @@
           </p:nvSpPr>
           <p:spPr>
             <a:xfrm>
-              <a:off x="-7623" y="5124372"/>
-              <a:ext cx="5989362" cy="1254295"/>
+              <a:off x="3101319" y="5488180"/>
+              <a:ext cx="5514361" cy="1254295"/>
             </a:xfrm>
             <a:prstGeom prst="rect">
               <a:avLst/>
@@ -12930,10 +13182,10 @@
         </p:sp>
         <p:grpSp>
           <p:nvGrpSpPr>
-            <p:cNvPr id="48" name="Group 47">
+            <p:cNvPr id="33" name="Group 32">
               <a:extLst>
                 <a:ext uri="{FF2B5EF4-FFF2-40B4-BE49-F238E27FC236}">
-                  <a16:creationId xmlns:a16="http://schemas.microsoft.com/office/drawing/2014/main" id="{C271047F-ADF7-6A2F-210B-142ADF8FE177}"/>
+                  <a16:creationId xmlns:a16="http://schemas.microsoft.com/office/drawing/2014/main" id="{2F9B88CF-29AE-2D89-CD2B-F21FFEE9D7B8}"/>
                 </a:ext>
               </a:extLst>
             </p:cNvPr>
@@ -12942,10 +13194,10 @@
           </p:nvGrpSpPr>
           <p:grpSpPr>
             <a:xfrm>
-              <a:off x="93036" y="5254296"/>
-              <a:ext cx="5788044" cy="994446"/>
-              <a:chOff x="3768005" y="5665244"/>
-              <a:chExt cx="5788044" cy="994446"/>
+              <a:off x="6448419" y="5625564"/>
+              <a:ext cx="1051560" cy="979527"/>
+              <a:chOff x="6162386" y="5606254"/>
+              <a:chExt cx="1051560" cy="979527"/>
             </a:xfrm>
           </p:grpSpPr>
           <p:pic>
@@ -12963,7 +13215,7 @@
               <p:nvPr/>
             </p:nvPicPr>
             <p:blipFill>
-              <a:blip r:embed="rId13">
+              <a:blip r:embed="rId14">
                 <a:extLst>
                   <a:ext uri="{28A0092B-C50C-407E-A947-70E740481C1C}">
                     <a14:useLocalDpi xmlns:a14="http://schemas.microsoft.com/office/drawing/2010/main" val="0"/>
@@ -12977,7 +13229,7 @@
             </p:blipFill>
             <p:spPr bwMode="auto">
               <a:xfrm>
-                <a:off x="6019592" y="5665244"/>
+                <a:off x="6413846" y="5606254"/>
                 <a:ext cx="548640" cy="548640"/>
               </a:xfrm>
               <a:prstGeom prst="rect">
@@ -13024,8 +13276,8 @@
             </p:nvSpPr>
             <p:spPr bwMode="auto">
               <a:xfrm>
-                <a:off x="5823853" y="6228803"/>
-                <a:ext cx="940117" cy="430887"/>
+                <a:off x="6162386" y="6154894"/>
+                <a:ext cx="1051560" cy="430887"/>
               </a:xfrm>
               <a:prstGeom prst="rect">
                 <a:avLst/>
@@ -13172,251 +13424,27 @@
               </a:p>
             </p:txBody>
           </p:sp>
-          <p:sp>
-            <p:nvSpPr>
-              <p:cNvPr id="37" name="TextBox 11">
-                <a:extLst>
-                  <a:ext uri="{FF2B5EF4-FFF2-40B4-BE49-F238E27FC236}">
-                    <a16:creationId xmlns:a16="http://schemas.microsoft.com/office/drawing/2014/main" id="{72850DCE-AA01-4284-6BAB-E56678FBD6F8}"/>
-                  </a:ext>
-                </a:extLst>
-              </p:cNvPr>
-              <p:cNvSpPr txBox="1">
-                <a:spLocks noChangeArrowheads="1"/>
-              </p:cNvSpPr>
-              <p:nvPr/>
-            </p:nvSpPr>
-            <p:spPr bwMode="auto">
-              <a:xfrm>
-                <a:off x="7722916" y="6228803"/>
-                <a:ext cx="1082000" cy="430887"/>
-              </a:xfrm>
-              <a:prstGeom prst="rect">
-                <a:avLst/>
-              </a:prstGeom>
-              <a:noFill/>
-              <a:ln>
-                <a:noFill/>
-              </a:ln>
+        </p:grpSp>
+        <p:grpSp>
+          <p:nvGrpSpPr>
+            <p:cNvPr id="30" name="Group 29">
               <a:extLst>
-                <a:ext uri="{909E8E84-426E-40DD-AFC4-6F175D3DCCD1}">
-                  <a14:hiddenFill xmlns:a14="http://schemas.microsoft.com/office/drawing/2010/main">
-                    <a:solidFill>
-                      <a:srgbClr val="FFFFFF"/>
-                    </a:solidFill>
-                  </a14:hiddenFill>
-                </a:ext>
-                <a:ext uri="{91240B29-F687-4F45-9708-019B960494DF}">
-                  <a14:hiddenLine xmlns:a14="http://schemas.microsoft.com/office/drawing/2010/main" w="9525">
-                    <a:solidFill>
-                      <a:srgbClr val="000000"/>
-                    </a:solidFill>
-                    <a:miter lim="800000"/>
-                    <a:headEnd/>
-                    <a:tailEnd/>
-                  </a14:hiddenLine>
+                <a:ext uri="{FF2B5EF4-FFF2-40B4-BE49-F238E27FC236}">
+                  <a16:creationId xmlns:a16="http://schemas.microsoft.com/office/drawing/2014/main" id="{E30E038F-7FA5-A920-3A09-7E35AF378EA6}"/>
                 </a:ext>
               </a:extLst>
-            </p:spPr>
-            <p:txBody>
-              <a:bodyPr wrap="square">
-                <a:spAutoFit/>
-              </a:bodyPr>
-              <a:lstStyle>
-                <a:lvl1pPr>
-                  <a:defRPr>
-                    <a:solidFill>
-                      <a:schemeClr val="tx1"/>
-                    </a:solidFill>
-                    <a:latin typeface="Calibri" panose="020F0502020204030204" pitchFamily="34" charset="0"/>
-                  </a:defRPr>
-                </a:lvl1pPr>
-                <a:lvl2pPr marL="742950" indent="-285750">
-                  <a:defRPr>
-                    <a:solidFill>
-                      <a:schemeClr val="tx1"/>
-                    </a:solidFill>
-                    <a:latin typeface="Calibri" panose="020F0502020204030204" pitchFamily="34" charset="0"/>
-                  </a:defRPr>
-                </a:lvl2pPr>
-                <a:lvl3pPr marL="1143000" indent="-228600">
-                  <a:defRPr>
-                    <a:solidFill>
-                      <a:schemeClr val="tx1"/>
-                    </a:solidFill>
-                    <a:latin typeface="Calibri" panose="020F0502020204030204" pitchFamily="34" charset="0"/>
-                  </a:defRPr>
-                </a:lvl3pPr>
-                <a:lvl4pPr marL="1600200" indent="-228600">
-                  <a:defRPr>
-                    <a:solidFill>
-                      <a:schemeClr val="tx1"/>
-                    </a:solidFill>
-                    <a:latin typeface="Calibri" panose="020F0502020204030204" pitchFamily="34" charset="0"/>
-                  </a:defRPr>
-                </a:lvl4pPr>
-                <a:lvl5pPr marL="2057400" indent="-228600">
-                  <a:defRPr>
-                    <a:solidFill>
-                      <a:schemeClr val="tx1"/>
-                    </a:solidFill>
-                    <a:latin typeface="Calibri" panose="020F0502020204030204" pitchFamily="34" charset="0"/>
-                  </a:defRPr>
-                </a:lvl5pPr>
-                <a:lvl6pPr marL="2514600" indent="-228600" eaLnBrk="0" fontAlgn="base" hangingPunct="0">
-                  <a:spcBef>
-                    <a:spcPct val="0"/>
-                  </a:spcBef>
-                  <a:spcAft>
-                    <a:spcPct val="0"/>
-                  </a:spcAft>
-                  <a:defRPr>
-                    <a:solidFill>
-                      <a:schemeClr val="tx1"/>
-                    </a:solidFill>
-                    <a:latin typeface="Calibri" panose="020F0502020204030204" pitchFamily="34" charset="0"/>
-                  </a:defRPr>
-                </a:lvl6pPr>
-                <a:lvl7pPr marL="2971800" indent="-228600" eaLnBrk="0" fontAlgn="base" hangingPunct="0">
-                  <a:spcBef>
-                    <a:spcPct val="0"/>
-                  </a:spcBef>
-                  <a:spcAft>
-                    <a:spcPct val="0"/>
-                  </a:spcAft>
-                  <a:defRPr>
-                    <a:solidFill>
-                      <a:schemeClr val="tx1"/>
-                    </a:solidFill>
-                    <a:latin typeface="Calibri" panose="020F0502020204030204" pitchFamily="34" charset="0"/>
-                  </a:defRPr>
-                </a:lvl7pPr>
-                <a:lvl8pPr marL="3429000" indent="-228600" eaLnBrk="0" fontAlgn="base" hangingPunct="0">
-                  <a:spcBef>
-                    <a:spcPct val="0"/>
-                  </a:spcBef>
-                  <a:spcAft>
-                    <a:spcPct val="0"/>
-                  </a:spcAft>
-                  <a:defRPr>
-                    <a:solidFill>
-                      <a:schemeClr val="tx1"/>
-                    </a:solidFill>
-                    <a:latin typeface="Calibri" panose="020F0502020204030204" pitchFamily="34" charset="0"/>
-                  </a:defRPr>
-                </a:lvl8pPr>
-                <a:lvl9pPr marL="3886200" indent="-228600" eaLnBrk="0" fontAlgn="base" hangingPunct="0">
-                  <a:spcBef>
-                    <a:spcPct val="0"/>
-                  </a:spcBef>
-                  <a:spcAft>
-                    <a:spcPct val="0"/>
-                  </a:spcAft>
-                  <a:defRPr>
-                    <a:solidFill>
-                      <a:schemeClr val="tx1"/>
-                    </a:solidFill>
-                    <a:latin typeface="Calibri" panose="020F0502020204030204" pitchFamily="34" charset="0"/>
-                  </a:defRPr>
-                </a:lvl9pPr>
-              </a:lstStyle>
-              <a:p>
-                <a:pPr algn="ctr" eaLnBrk="1" hangingPunct="1"/>
-                <a:r>
-                  <a:rPr lang="en-US" altLang="en-US" sz="1100" dirty="0">
-                    <a:solidFill>
-                      <a:schemeClr val="bg1"/>
-                    </a:solidFill>
-                    <a:latin typeface="+mj-lt"/>
-                    <a:ea typeface="Amazon Ember" panose="020B0603020204020204" pitchFamily="34" charset="0"/>
-                    <a:cs typeface="Arial" panose="020B0604020202020204" pitchFamily="34" charset="0"/>
-                  </a:rPr>
-                  <a:t>PostgreSQL </a:t>
-                </a:r>
-                <a:br>
-                  <a:rPr lang="en-US" altLang="en-US" sz="1100" dirty="0">
-                    <a:solidFill>
-                      <a:schemeClr val="bg1"/>
-                    </a:solidFill>
-                    <a:latin typeface="+mj-lt"/>
-                    <a:ea typeface="Amazon Ember" panose="020B0603020204020204" pitchFamily="34" charset="0"/>
-                    <a:cs typeface="Arial" panose="020B0604020202020204" pitchFamily="34" charset="0"/>
-                  </a:rPr>
-                </a:br>
-                <a:r>
-                  <a:rPr lang="en-US" altLang="en-US" sz="1100" dirty="0">
-                    <a:solidFill>
-                      <a:schemeClr val="bg1"/>
-                    </a:solidFill>
-                    <a:latin typeface="+mj-lt"/>
-                    <a:ea typeface="Amazon Ember" panose="020B0603020204020204" pitchFamily="34" charset="0"/>
-                    <a:cs typeface="Arial" panose="020B0604020202020204" pitchFamily="34" charset="0"/>
-                  </a:rPr>
-                  <a:t>DB</a:t>
-                </a:r>
-              </a:p>
-            </p:txBody>
-          </p:sp>
-          <p:pic>
-            <p:nvPicPr>
-              <p:cNvPr id="38" name="Graphic 10">
-                <a:extLst>
-                  <a:ext uri="{FF2B5EF4-FFF2-40B4-BE49-F238E27FC236}">
-                    <a16:creationId xmlns:a16="http://schemas.microsoft.com/office/drawing/2014/main" id="{8B967596-2604-AD15-668D-7E808ADAB5D3}"/>
-                  </a:ext>
-                </a:extLst>
-              </p:cNvPr>
-              <p:cNvPicPr>
-                <a:picLocks noChangeAspect="1" noChangeArrowheads="1"/>
-              </p:cNvPicPr>
-              <p:nvPr/>
-            </p:nvPicPr>
-            <p:blipFill>
-              <a:blip r:embed="rId14">
-                <a:extLst>
-                  <a:ext uri="{28A0092B-C50C-407E-A947-70E740481C1C}">
-                    <a14:useLocalDpi xmlns:a14="http://schemas.microsoft.com/office/drawing/2010/main" val="0"/>
-                  </a:ext>
-                </a:extLst>
-              </a:blip>
-              <a:srcRect/>
-              <a:stretch>
-                <a:fillRect/>
-              </a:stretch>
-            </p:blipFill>
-            <p:spPr bwMode="auto">
-              <a:xfrm>
-                <a:off x="8028966" y="5704614"/>
-                <a:ext cx="469900" cy="469900"/>
-              </a:xfrm>
-              <a:prstGeom prst="rect">
-                <a:avLst/>
-              </a:prstGeom>
-              <a:noFill/>
-              <a:ln>
-                <a:noFill/>
-              </a:ln>
-              <a:extLst>
-                <a:ext uri="{909E8E84-426E-40DD-AFC4-6F175D3DCCD1}">
-                  <a14:hiddenFill xmlns:a14="http://schemas.microsoft.com/office/drawing/2010/main">
-                    <a:solidFill>
-                      <a:srgbClr val="FFFFFF"/>
-                    </a:solidFill>
-                  </a14:hiddenFill>
-                </a:ext>
-                <a:ext uri="{91240B29-F687-4F45-9708-019B960494DF}">
-                  <a14:hiddenLine xmlns:a14="http://schemas.microsoft.com/office/drawing/2010/main" w="9525">
-                    <a:solidFill>
-                      <a:srgbClr val="000000"/>
-                    </a:solidFill>
-                    <a:miter lim="800000"/>
-                    <a:headEnd/>
-                    <a:tailEnd/>
-                  </a14:hiddenLine>
-                </a:ext>
-              </a:extLst>
-            </p:spPr>
-          </p:pic>
+            </p:cNvPr>
+            <p:cNvGrpSpPr/>
+            <p:nvPr/>
+          </p:nvGrpSpPr>
+          <p:grpSpPr>
+            <a:xfrm>
+              <a:off x="4217019" y="5619305"/>
+              <a:ext cx="1051560" cy="992045"/>
+              <a:chOff x="4190372" y="5593736"/>
+              <a:chExt cx="1051560" cy="992045"/>
+            </a:xfrm>
+          </p:grpSpPr>
           <p:pic>
             <p:nvPicPr>
               <p:cNvPr id="39" name="Graphic 16">
@@ -13444,8 +13472,8 @@
             </p:blipFill>
             <p:spPr bwMode="auto">
               <a:xfrm>
-                <a:off x="8935336" y="5704614"/>
-                <a:ext cx="469900" cy="469900"/>
+                <a:off x="4441832" y="5593736"/>
+                <a:ext cx="548640" cy="548640"/>
               </a:xfrm>
               <a:prstGeom prst="rect">
                 <a:avLst/>
@@ -13491,8 +13519,8 @@
             </p:nvSpPr>
             <p:spPr bwMode="auto">
               <a:xfrm>
-                <a:off x="8784524" y="6228803"/>
-                <a:ext cx="771525" cy="430887"/>
+                <a:off x="4190372" y="6154894"/>
+                <a:ext cx="1051560" cy="430887"/>
               </a:xfrm>
               <a:prstGeom prst="rect">
                 <a:avLst/>
@@ -13633,17 +13661,51 @@
                     <a:latin typeface="+mj-lt"/>
                     <a:cs typeface="Arial" panose="020B0604020202020204" pitchFamily="34" charset="0"/>
                   </a:rPr>
-                  <a:t>JSON &amp; CSV</a:t>
+                  <a:t>JSON,</a:t>
+                </a:r>
+              </a:p>
+              <a:p>
+                <a:pPr algn="ctr" eaLnBrk="1" hangingPunct="1"/>
+                <a:r>
+                  <a:rPr lang="en-US" altLang="en-US" sz="1100" dirty="0">
+                    <a:solidFill>
+                      <a:schemeClr val="bg1"/>
+                    </a:solidFill>
+                    <a:latin typeface="+mj-lt"/>
+                    <a:cs typeface="Arial" panose="020B0604020202020204" pitchFamily="34" charset="0"/>
+                  </a:rPr>
+                  <a:t>CSV</a:t>
                 </a:r>
               </a:p>
             </p:txBody>
           </p:sp>
+        </p:grpSp>
+        <p:grpSp>
+          <p:nvGrpSpPr>
+            <p:cNvPr id="32" name="Group 31">
+              <a:extLst>
+                <a:ext uri="{FF2B5EF4-FFF2-40B4-BE49-F238E27FC236}">
+                  <a16:creationId xmlns:a16="http://schemas.microsoft.com/office/drawing/2014/main" id="{61FE9FAF-8CEE-A9FC-9802-5B6239F41C7B}"/>
+                </a:ext>
+              </a:extLst>
+            </p:cNvPr>
+            <p:cNvGrpSpPr/>
+            <p:nvPr/>
+          </p:nvGrpSpPr>
+          <p:grpSpPr>
+            <a:xfrm>
+              <a:off x="5332719" y="5619305"/>
+              <a:ext cx="1051560" cy="992045"/>
+              <a:chOff x="5172059" y="5593736"/>
+              <a:chExt cx="1051560" cy="992045"/>
+            </a:xfrm>
+          </p:grpSpPr>
           <p:pic>
             <p:nvPicPr>
-              <p:cNvPr id="41" name="Graphic 6">
+              <p:cNvPr id="43" name="Graphic 18">
                 <a:extLst>
                   <a:ext uri="{FF2B5EF4-FFF2-40B4-BE49-F238E27FC236}">
-                    <a16:creationId xmlns:a16="http://schemas.microsoft.com/office/drawing/2014/main" id="{20A3568B-2519-DB9D-EC3F-37EE079E3586}"/>
+                    <a16:creationId xmlns:a16="http://schemas.microsoft.com/office/drawing/2014/main" id="{46C1D956-00C8-E3E3-A65B-3466292AEC94}"/>
                   </a:ext>
                 </a:extLst>
               </p:cNvPr>
@@ -13667,245 +13729,7 @@
             </p:blipFill>
             <p:spPr bwMode="auto">
               <a:xfrm>
-                <a:off x="7026119" y="5665244"/>
-                <a:ext cx="548640" cy="548640"/>
-              </a:xfrm>
-              <a:prstGeom prst="rect">
-                <a:avLst/>
-              </a:prstGeom>
-              <a:noFill/>
-              <a:ln>
-                <a:noFill/>
-              </a:ln>
-              <a:extLst>
-                <a:ext uri="{909E8E84-426E-40DD-AFC4-6F175D3DCCD1}">
-                  <a14:hiddenFill xmlns:a14="http://schemas.microsoft.com/office/drawing/2010/main">
-                    <a:solidFill>
-                      <a:srgbClr val="FFFFFF"/>
-                    </a:solidFill>
-                  </a14:hiddenFill>
-                </a:ext>
-                <a:ext uri="{91240B29-F687-4F45-9708-019B960494DF}">
-                  <a14:hiddenLine xmlns:a14="http://schemas.microsoft.com/office/drawing/2010/main" w="9525">
-                    <a:solidFill>
-                      <a:srgbClr val="000000"/>
-                    </a:solidFill>
-                    <a:miter lim="800000"/>
-                    <a:headEnd/>
-                    <a:tailEnd/>
-                  </a14:hiddenLine>
-                </a:ext>
-              </a:extLst>
-            </p:spPr>
-          </p:pic>
-          <p:sp>
-            <p:nvSpPr>
-              <p:cNvPr id="42" name="TextBox 9">
-                <a:extLst>
-                  <a:ext uri="{FF2B5EF4-FFF2-40B4-BE49-F238E27FC236}">
-                    <a16:creationId xmlns:a16="http://schemas.microsoft.com/office/drawing/2014/main" id="{75A37B31-03FB-0E19-883C-B831E3DD86E8}"/>
-                  </a:ext>
-                </a:extLst>
-              </p:cNvPr>
-              <p:cNvSpPr txBox="1">
-                <a:spLocks noChangeArrowheads="1"/>
-              </p:cNvSpPr>
-              <p:nvPr/>
-            </p:nvSpPr>
-            <p:spPr bwMode="auto">
-              <a:xfrm>
-                <a:off x="6699152" y="6228803"/>
-                <a:ext cx="1202574" cy="430887"/>
-              </a:xfrm>
-              <a:prstGeom prst="rect">
-                <a:avLst/>
-              </a:prstGeom>
-              <a:noFill/>
-              <a:ln>
-                <a:noFill/>
-              </a:ln>
-              <a:extLst>
-                <a:ext uri="{909E8E84-426E-40DD-AFC4-6F175D3DCCD1}">
-                  <a14:hiddenFill xmlns:a14="http://schemas.microsoft.com/office/drawing/2010/main">
-                    <a:solidFill>
-                      <a:srgbClr val="FFFFFF"/>
-                    </a:solidFill>
-                  </a14:hiddenFill>
-                </a:ext>
-                <a:ext uri="{91240B29-F687-4F45-9708-019B960494DF}">
-                  <a14:hiddenLine xmlns:a14="http://schemas.microsoft.com/office/drawing/2010/main" w="9525">
-                    <a:solidFill>
-                      <a:srgbClr val="000000"/>
-                    </a:solidFill>
-                    <a:miter lim="800000"/>
-                    <a:headEnd/>
-                    <a:tailEnd/>
-                  </a14:hiddenLine>
-                </a:ext>
-              </a:extLst>
-            </p:spPr>
-            <p:txBody>
-              <a:bodyPr wrap="square">
-                <a:spAutoFit/>
-              </a:bodyPr>
-              <a:lstStyle>
-                <a:lvl1pPr>
-                  <a:defRPr>
-                    <a:solidFill>
-                      <a:schemeClr val="tx1"/>
-                    </a:solidFill>
-                    <a:latin typeface="Calibri" panose="020F0502020204030204" pitchFamily="34" charset="0"/>
-                  </a:defRPr>
-                </a:lvl1pPr>
-                <a:lvl2pPr marL="742950" indent="-285750">
-                  <a:defRPr>
-                    <a:solidFill>
-                      <a:schemeClr val="tx1"/>
-                    </a:solidFill>
-                    <a:latin typeface="Calibri" panose="020F0502020204030204" pitchFamily="34" charset="0"/>
-                  </a:defRPr>
-                </a:lvl2pPr>
-                <a:lvl3pPr marL="1143000" indent="-228600">
-                  <a:defRPr>
-                    <a:solidFill>
-                      <a:schemeClr val="tx1"/>
-                    </a:solidFill>
-                    <a:latin typeface="Calibri" panose="020F0502020204030204" pitchFamily="34" charset="0"/>
-                  </a:defRPr>
-                </a:lvl3pPr>
-                <a:lvl4pPr marL="1600200" indent="-228600">
-                  <a:defRPr>
-                    <a:solidFill>
-                      <a:schemeClr val="tx1"/>
-                    </a:solidFill>
-                    <a:latin typeface="Calibri" panose="020F0502020204030204" pitchFamily="34" charset="0"/>
-                  </a:defRPr>
-                </a:lvl4pPr>
-                <a:lvl5pPr marL="2057400" indent="-228600">
-                  <a:defRPr>
-                    <a:solidFill>
-                      <a:schemeClr val="tx1"/>
-                    </a:solidFill>
-                    <a:latin typeface="Calibri" panose="020F0502020204030204" pitchFamily="34" charset="0"/>
-                  </a:defRPr>
-                </a:lvl5pPr>
-                <a:lvl6pPr marL="2514600" indent="-228600" eaLnBrk="0" fontAlgn="base" hangingPunct="0">
-                  <a:spcBef>
-                    <a:spcPct val="0"/>
-                  </a:spcBef>
-                  <a:spcAft>
-                    <a:spcPct val="0"/>
-                  </a:spcAft>
-                  <a:defRPr>
-                    <a:solidFill>
-                      <a:schemeClr val="tx1"/>
-                    </a:solidFill>
-                    <a:latin typeface="Calibri" panose="020F0502020204030204" pitchFamily="34" charset="0"/>
-                  </a:defRPr>
-                </a:lvl6pPr>
-                <a:lvl7pPr marL="2971800" indent="-228600" eaLnBrk="0" fontAlgn="base" hangingPunct="0">
-                  <a:spcBef>
-                    <a:spcPct val="0"/>
-                  </a:spcBef>
-                  <a:spcAft>
-                    <a:spcPct val="0"/>
-                  </a:spcAft>
-                  <a:defRPr>
-                    <a:solidFill>
-                      <a:schemeClr val="tx1"/>
-                    </a:solidFill>
-                    <a:latin typeface="Calibri" panose="020F0502020204030204" pitchFamily="34" charset="0"/>
-                  </a:defRPr>
-                </a:lvl7pPr>
-                <a:lvl8pPr marL="3429000" indent="-228600" eaLnBrk="0" fontAlgn="base" hangingPunct="0">
-                  <a:spcBef>
-                    <a:spcPct val="0"/>
-                  </a:spcBef>
-                  <a:spcAft>
-                    <a:spcPct val="0"/>
-                  </a:spcAft>
-                  <a:defRPr>
-                    <a:solidFill>
-                      <a:schemeClr val="tx1"/>
-                    </a:solidFill>
-                    <a:latin typeface="Calibri" panose="020F0502020204030204" pitchFamily="34" charset="0"/>
-                  </a:defRPr>
-                </a:lvl8pPr>
-                <a:lvl9pPr marL="3886200" indent="-228600" eaLnBrk="0" fontAlgn="base" hangingPunct="0">
-                  <a:spcBef>
-                    <a:spcPct val="0"/>
-                  </a:spcBef>
-                  <a:spcAft>
-                    <a:spcPct val="0"/>
-                  </a:spcAft>
-                  <a:defRPr>
-                    <a:solidFill>
-                      <a:schemeClr val="tx1"/>
-                    </a:solidFill>
-                    <a:latin typeface="Calibri" panose="020F0502020204030204" pitchFamily="34" charset="0"/>
-                  </a:defRPr>
-                </a:lvl9pPr>
-              </a:lstStyle>
-              <a:p>
-                <a:pPr algn="ctr" eaLnBrk="1" hangingPunct="1"/>
-                <a:r>
-                  <a:rPr lang="en-US" altLang="en-US" sz="1100" dirty="0">
-                    <a:solidFill>
-                      <a:schemeClr val="bg1"/>
-                    </a:solidFill>
-                    <a:latin typeface="+mj-lt"/>
-                    <a:ea typeface="Amazon Ember" panose="020B0603020204020204" pitchFamily="34" charset="0"/>
-                    <a:cs typeface="Arial" panose="020B0604020202020204" pitchFamily="34" charset="0"/>
-                  </a:rPr>
-                  <a:t>Amazon RDS</a:t>
-                </a:r>
-              </a:p>
-              <a:p>
-                <a:pPr algn="ctr" eaLnBrk="1" hangingPunct="1"/>
-                <a:r>
-                  <a:rPr lang="en-US" altLang="en-US" sz="1100" dirty="0">
-                    <a:solidFill>
-                      <a:schemeClr val="bg1"/>
-                    </a:solidFill>
-                    <a:latin typeface="+mj-lt"/>
-                    <a:ea typeface="Amazon Ember" panose="020B0603020204020204" pitchFamily="34" charset="0"/>
-                    <a:cs typeface="Arial" panose="020B0604020202020204" pitchFamily="34" charset="0"/>
-                  </a:rPr>
-                  <a:t>(PostgreSQL)</a:t>
-                </a:r>
-              </a:p>
-            </p:txBody>
-          </p:sp>
-          <p:pic>
-            <p:nvPicPr>
-              <p:cNvPr id="43" name="Graphic 18">
-                <a:extLst>
-                  <a:ext uri="{FF2B5EF4-FFF2-40B4-BE49-F238E27FC236}">
-                    <a16:creationId xmlns:a16="http://schemas.microsoft.com/office/drawing/2014/main" id="{46C1D956-00C8-E3E3-A65B-3466292AEC94}"/>
-                  </a:ext>
-                </a:extLst>
-              </p:cNvPr>
-              <p:cNvPicPr>
-                <a:picLocks noChangeAspect="1" noChangeArrowheads="1"/>
-              </p:cNvPicPr>
-              <p:nvPr/>
-            </p:nvPicPr>
-            <p:blipFill>
-              <a:blip r:embed="rId18">
-                <a:extLst>
-                  <a:ext uri="{28A0092B-C50C-407E-A947-70E740481C1C}">
-                    <a14:useLocalDpi xmlns:a14="http://schemas.microsoft.com/office/drawing/2010/main" val="0"/>
-                  </a:ext>
-                </a:extLst>
-              </a:blip>
-              <a:srcRect/>
-              <a:stretch>
-                <a:fillRect/>
-              </a:stretch>
-            </p:blipFill>
-            <p:spPr bwMode="auto">
-              <a:xfrm>
-                <a:off x="4941055" y="5665244"/>
+                <a:off x="5423519" y="5593736"/>
                 <a:ext cx="548640" cy="548640"/>
               </a:xfrm>
               <a:prstGeom prst="rect">
@@ -13952,8 +13776,8 @@
             </p:nvSpPr>
             <p:spPr bwMode="auto">
               <a:xfrm>
-                <a:off x="4735554" y="6228803"/>
-                <a:ext cx="959642" cy="430887"/>
+                <a:off x="5172059" y="6154894"/>
+                <a:ext cx="1051560" cy="430887"/>
               </a:xfrm>
               <a:prstGeom prst="rect">
                 <a:avLst/>
@@ -14100,6 +13924,27 @@
               </a:p>
             </p:txBody>
           </p:sp>
+        </p:grpSp>
+        <p:grpSp>
+          <p:nvGrpSpPr>
+            <p:cNvPr id="29" name="Group 28">
+              <a:extLst>
+                <a:ext uri="{FF2B5EF4-FFF2-40B4-BE49-F238E27FC236}">
+                  <a16:creationId xmlns:a16="http://schemas.microsoft.com/office/drawing/2014/main" id="{6C2D2B36-7017-0273-DE0A-222DC8FB537F}"/>
+                </a:ext>
+              </a:extLst>
+            </p:cNvPr>
+            <p:cNvGrpSpPr/>
+            <p:nvPr/>
+          </p:nvGrpSpPr>
+          <p:grpSpPr>
+            <a:xfrm>
+              <a:off x="3101319" y="5625564"/>
+              <a:ext cx="1051560" cy="979527"/>
+              <a:chOff x="3204365" y="5606254"/>
+              <a:chExt cx="1051560" cy="979527"/>
+            </a:xfrm>
+          </p:grpSpPr>
           <p:sp>
             <p:nvSpPr>
               <p:cNvPr id="45" name="TextBox 11">
@@ -14116,8 +13961,8 @@
             </p:nvSpPr>
             <p:spPr bwMode="auto">
               <a:xfrm>
-                <a:off x="3768005" y="6228803"/>
-                <a:ext cx="1082000" cy="261610"/>
+                <a:off x="3204365" y="6154894"/>
+                <a:ext cx="1051560" cy="430887"/>
               </a:xfrm>
               <a:prstGeom prst="rect">
                 <a:avLst/>
@@ -14259,7 +14104,21 @@
                     <a:ea typeface="Amazon Ember" panose="020B0603020204020204" pitchFamily="34" charset="0"/>
                     <a:cs typeface="Arial" panose="020B0604020202020204" pitchFamily="34" charset="0"/>
                   </a:rPr>
-                  <a:t>MongoDB</a:t>
+                  <a:t>MongoDB,</a:t>
+                </a:r>
+              </a:p>
+              <a:p>
+                <a:pPr algn="ctr" eaLnBrk="1" hangingPunct="1"/>
+                <a:r>
+                  <a:rPr lang="en-US" altLang="en-US" sz="1100" dirty="0">
+                    <a:solidFill>
+                      <a:schemeClr val="bg1"/>
+                    </a:solidFill>
+                    <a:latin typeface="+mj-lt"/>
+                    <a:ea typeface="Amazon Ember" panose="020B0603020204020204" pitchFamily="34" charset="0"/>
+                    <a:cs typeface="Arial" panose="020B0604020202020204" pitchFamily="34" charset="0"/>
+                  </a:rPr>
+                  <a:t>PostgreSQL</a:t>
                 </a:r>
               </a:p>
             </p:txBody>
@@ -14279,7 +14138,7 @@
               <p:nvPr/>
             </p:nvPicPr>
             <p:blipFill>
-              <a:blip r:embed="rId14">
+              <a:blip r:embed="rId18">
                 <a:extLst>
                   <a:ext uri="{28A0092B-C50C-407E-A947-70E740481C1C}">
                     <a14:useLocalDpi xmlns:a14="http://schemas.microsoft.com/office/drawing/2010/main" val="0"/>
@@ -14293,8 +14152,8 @@
             </p:blipFill>
             <p:spPr bwMode="auto">
               <a:xfrm>
-                <a:off x="4074055" y="5704614"/>
-                <a:ext cx="469900" cy="469900"/>
+                <a:off x="3455825" y="5606254"/>
+                <a:ext cx="548640" cy="548640"/>
               </a:xfrm>
               <a:prstGeom prst="rect">
                 <a:avLst/>
@@ -14325,13 +14184,292 @@
             </p:spPr>
           </p:pic>
         </p:grpSp>
+        <p:grpSp>
+          <p:nvGrpSpPr>
+            <p:cNvPr id="26" name="Group 25">
+              <a:extLst>
+                <a:ext uri="{FF2B5EF4-FFF2-40B4-BE49-F238E27FC236}">
+                  <a16:creationId xmlns:a16="http://schemas.microsoft.com/office/drawing/2014/main" id="{6BAEA63F-A29D-8D2F-2B83-0919927ED399}"/>
+                </a:ext>
+              </a:extLst>
+            </p:cNvPr>
+            <p:cNvGrpSpPr/>
+            <p:nvPr/>
+          </p:nvGrpSpPr>
+          <p:grpSpPr>
+            <a:xfrm>
+              <a:off x="7564120" y="5619305"/>
+              <a:ext cx="1051560" cy="992045"/>
+              <a:chOff x="7148392" y="5593736"/>
+              <a:chExt cx="1051560" cy="992045"/>
+            </a:xfrm>
+          </p:grpSpPr>
+          <p:sp>
+            <p:nvSpPr>
+              <p:cNvPr id="7" name="TextBox 11">
+                <a:extLst>
+                  <a:ext uri="{FF2B5EF4-FFF2-40B4-BE49-F238E27FC236}">
+                    <a16:creationId xmlns:a16="http://schemas.microsoft.com/office/drawing/2014/main" id="{9F78F5AA-A513-5719-7273-839BFED55752}"/>
+                  </a:ext>
+                </a:extLst>
+              </p:cNvPr>
+              <p:cNvSpPr txBox="1">
+                <a:spLocks noChangeArrowheads="1"/>
+              </p:cNvSpPr>
+              <p:nvPr/>
+            </p:nvSpPr>
+            <p:spPr bwMode="auto">
+              <a:xfrm>
+                <a:off x="7148392" y="6154894"/>
+                <a:ext cx="1051560" cy="430887"/>
+              </a:xfrm>
+              <a:prstGeom prst="rect">
+                <a:avLst/>
+              </a:prstGeom>
+              <a:noFill/>
+              <a:ln>
+                <a:noFill/>
+              </a:ln>
+              <a:extLst>
+                <a:ext uri="{909E8E84-426E-40DD-AFC4-6F175D3DCCD1}">
+                  <a14:hiddenFill xmlns:a14="http://schemas.microsoft.com/office/drawing/2010/main">
+                    <a:solidFill>
+                      <a:srgbClr val="FFFFFF"/>
+                    </a:solidFill>
+                  </a14:hiddenFill>
+                </a:ext>
+                <a:ext uri="{91240B29-F687-4F45-9708-019B960494DF}">
+                  <a14:hiddenLine xmlns:a14="http://schemas.microsoft.com/office/drawing/2010/main" w="9525">
+                    <a:solidFill>
+                      <a:srgbClr val="000000"/>
+                    </a:solidFill>
+                    <a:miter lim="800000"/>
+                    <a:headEnd/>
+                    <a:tailEnd/>
+                  </a14:hiddenLine>
+                </a:ext>
+              </a:extLst>
+            </p:spPr>
+            <p:txBody>
+              <a:bodyPr wrap="square">
+                <a:spAutoFit/>
+              </a:bodyPr>
+              <a:lstStyle>
+                <a:lvl1pPr>
+                  <a:defRPr>
+                    <a:solidFill>
+                      <a:schemeClr val="tx1"/>
+                    </a:solidFill>
+                    <a:latin typeface="Calibri" panose="020F0502020204030204" pitchFamily="34" charset="0"/>
+                  </a:defRPr>
+                </a:lvl1pPr>
+                <a:lvl2pPr marL="742950" indent="-285750">
+                  <a:defRPr>
+                    <a:solidFill>
+                      <a:schemeClr val="tx1"/>
+                    </a:solidFill>
+                    <a:latin typeface="Calibri" panose="020F0502020204030204" pitchFamily="34" charset="0"/>
+                  </a:defRPr>
+                </a:lvl2pPr>
+                <a:lvl3pPr marL="1143000" indent="-228600">
+                  <a:defRPr>
+                    <a:solidFill>
+                      <a:schemeClr val="tx1"/>
+                    </a:solidFill>
+                    <a:latin typeface="Calibri" panose="020F0502020204030204" pitchFamily="34" charset="0"/>
+                  </a:defRPr>
+                </a:lvl3pPr>
+                <a:lvl4pPr marL="1600200" indent="-228600">
+                  <a:defRPr>
+                    <a:solidFill>
+                      <a:schemeClr val="tx1"/>
+                    </a:solidFill>
+                    <a:latin typeface="Calibri" panose="020F0502020204030204" pitchFamily="34" charset="0"/>
+                  </a:defRPr>
+                </a:lvl4pPr>
+                <a:lvl5pPr marL="2057400" indent="-228600">
+                  <a:defRPr>
+                    <a:solidFill>
+                      <a:schemeClr val="tx1"/>
+                    </a:solidFill>
+                    <a:latin typeface="Calibri" panose="020F0502020204030204" pitchFamily="34" charset="0"/>
+                  </a:defRPr>
+                </a:lvl5pPr>
+                <a:lvl6pPr marL="2514600" indent="-228600" eaLnBrk="0" fontAlgn="base" hangingPunct="0">
+                  <a:spcBef>
+                    <a:spcPct val="0"/>
+                  </a:spcBef>
+                  <a:spcAft>
+                    <a:spcPct val="0"/>
+                  </a:spcAft>
+                  <a:defRPr>
+                    <a:solidFill>
+                      <a:schemeClr val="tx1"/>
+                    </a:solidFill>
+                    <a:latin typeface="Calibri" panose="020F0502020204030204" pitchFamily="34" charset="0"/>
+                  </a:defRPr>
+                </a:lvl6pPr>
+                <a:lvl7pPr marL="2971800" indent="-228600" eaLnBrk="0" fontAlgn="base" hangingPunct="0">
+                  <a:spcBef>
+                    <a:spcPct val="0"/>
+                  </a:spcBef>
+                  <a:spcAft>
+                    <a:spcPct val="0"/>
+                  </a:spcAft>
+                  <a:defRPr>
+                    <a:solidFill>
+                      <a:schemeClr val="tx1"/>
+                    </a:solidFill>
+                    <a:latin typeface="Calibri" panose="020F0502020204030204" pitchFamily="34" charset="0"/>
+                  </a:defRPr>
+                </a:lvl7pPr>
+                <a:lvl8pPr marL="3429000" indent="-228600" eaLnBrk="0" fontAlgn="base" hangingPunct="0">
+                  <a:spcBef>
+                    <a:spcPct val="0"/>
+                  </a:spcBef>
+                  <a:spcAft>
+                    <a:spcPct val="0"/>
+                  </a:spcAft>
+                  <a:defRPr>
+                    <a:solidFill>
+                      <a:schemeClr val="tx1"/>
+                    </a:solidFill>
+                    <a:latin typeface="Calibri" panose="020F0502020204030204" pitchFamily="34" charset="0"/>
+                  </a:defRPr>
+                </a:lvl8pPr>
+                <a:lvl9pPr marL="3886200" indent="-228600" eaLnBrk="0" fontAlgn="base" hangingPunct="0">
+                  <a:spcBef>
+                    <a:spcPct val="0"/>
+                  </a:spcBef>
+                  <a:spcAft>
+                    <a:spcPct val="0"/>
+                  </a:spcAft>
+                  <a:defRPr>
+                    <a:solidFill>
+                      <a:schemeClr val="tx1"/>
+                    </a:solidFill>
+                    <a:latin typeface="Calibri" panose="020F0502020204030204" pitchFamily="34" charset="0"/>
+                  </a:defRPr>
+                </a:lvl9pPr>
+              </a:lstStyle>
+              <a:p>
+                <a:pPr algn="ctr" eaLnBrk="1" hangingPunct="1"/>
+                <a:r>
+                  <a:rPr lang="en-US" altLang="en-US" sz="1100" dirty="0">
+                    <a:solidFill>
+                      <a:schemeClr val="bg1"/>
+                    </a:solidFill>
+                    <a:latin typeface="+mj-lt"/>
+                    <a:ea typeface="Amazon Ember" panose="020B0603020204020204" pitchFamily="34" charset="0"/>
+                    <a:cs typeface="Arial" panose="020B0604020202020204" pitchFamily="34" charset="0"/>
+                  </a:rPr>
+                  <a:t>Firemon Cloud Defense</a:t>
+                </a:r>
+              </a:p>
+            </p:txBody>
+          </p:sp>
+          <p:pic>
+            <p:nvPicPr>
+              <p:cNvPr id="1026" name="Picture 2" descr="FireMon Company Updates | Glassdoor">
+                <a:extLst>
+                  <a:ext uri="{FF2B5EF4-FFF2-40B4-BE49-F238E27FC236}">
+                    <a16:creationId xmlns:a16="http://schemas.microsoft.com/office/drawing/2014/main" id="{EEFAA6CA-7B0D-3179-A8B7-CE0BB5626AD2}"/>
+                  </a:ext>
+                </a:extLst>
+              </p:cNvPr>
+              <p:cNvPicPr>
+                <a:picLocks noChangeAspect="1" noChangeArrowheads="1"/>
+              </p:cNvPicPr>
+              <p:nvPr/>
+            </p:nvPicPr>
+            <p:blipFill>
+              <a:blip r:embed="rId19">
+                <a:extLst>
+                  <a:ext uri="{28A0092B-C50C-407E-A947-70E740481C1C}">
+                    <a14:useLocalDpi xmlns:a14="http://schemas.microsoft.com/office/drawing/2010/main" val="0"/>
+                  </a:ext>
+                </a:extLst>
+              </a:blip>
+              <a:srcRect/>
+              <a:stretch>
+                <a:fillRect/>
+              </a:stretch>
+            </p:blipFill>
+            <p:spPr bwMode="auto">
+              <a:xfrm>
+                <a:off x="7399852" y="5593736"/>
+                <a:ext cx="548640" cy="548640"/>
+              </a:xfrm>
+              <a:prstGeom prst="rect">
+                <a:avLst/>
+              </a:prstGeom>
+              <a:noFill/>
+              <a:extLst>
+                <a:ext uri="{909E8E84-426E-40DD-AFC4-6F175D3DCCD1}">
+                  <a14:hiddenFill xmlns:a14="http://schemas.microsoft.com/office/drawing/2010/main">
+                    <a:solidFill>
+                      <a:srgbClr val="FFFFFF"/>
+                    </a:solidFill>
+                  </a14:hiddenFill>
+                </a:ext>
+              </a:extLst>
+            </p:spPr>
+          </p:pic>
+        </p:grpSp>
       </p:grpSp>
+      <p:pic>
+        <p:nvPicPr>
+          <p:cNvPr id="50" name="Picture 4" descr="Oracle Cloud Infrastructure - YouTube">
+            <a:extLst>
+              <a:ext uri="{FF2B5EF4-FFF2-40B4-BE49-F238E27FC236}">
+                <a16:creationId xmlns:a16="http://schemas.microsoft.com/office/drawing/2014/main" id="{73D0EF48-EE4F-CAD8-9887-48C5E7772023}"/>
+              </a:ext>
+            </a:extLst>
+          </p:cNvPr>
+          <p:cNvPicPr>
+            <a:picLocks noChangeAspect="1" noChangeArrowheads="1"/>
+          </p:cNvPicPr>
+          <p:nvPr/>
+        </p:nvPicPr>
+        <p:blipFill>
+          <a:blip r:embed="rId20">
+            <a:extLst>
+              <a:ext uri="{28A0092B-C50C-407E-A947-70E740481C1C}">
+                <a14:useLocalDpi xmlns:a14="http://schemas.microsoft.com/office/drawing/2010/main" val="0"/>
+              </a:ext>
+            </a:extLst>
+          </a:blip>
+          <a:srcRect/>
+          <a:stretch>
+            <a:fillRect/>
+          </a:stretch>
+        </p:blipFill>
+        <p:spPr bwMode="auto">
+          <a:xfrm>
+            <a:off x="4671020" y="2867643"/>
+            <a:ext cx="996696" cy="996696"/>
+          </a:xfrm>
+          <a:prstGeom prst="rect">
+            <a:avLst/>
+          </a:prstGeom>
+          <a:noFill/>
+          <a:extLst>
+            <a:ext uri="{909E8E84-426E-40DD-AFC4-6F175D3DCCD1}">
+              <a14:hiddenFill xmlns:a14="http://schemas.microsoft.com/office/drawing/2010/main">
+                <a:solidFill>
+                  <a:srgbClr val="FFFFFF"/>
+                </a:solidFill>
+              </a14:hiddenFill>
+            </a:ext>
+          </a:extLst>
+        </p:spPr>
+      </p:pic>
       <p:sp>
         <p:nvSpPr>
-          <p:cNvPr id="51" name="Rectangle: Rounded Corners 50">
-            <a:extLst>
-              <a:ext uri="{FF2B5EF4-FFF2-40B4-BE49-F238E27FC236}">
-                <a16:creationId xmlns:a16="http://schemas.microsoft.com/office/drawing/2014/main" id="{1693654B-B9C5-BB57-C5AF-C57E58130215}"/>
+          <p:cNvPr id="18" name="Rectangle: Rounded Corners 17">
+            <a:extLst>
+              <a:ext uri="{FF2B5EF4-FFF2-40B4-BE49-F238E27FC236}">
+                <a16:creationId xmlns:a16="http://schemas.microsoft.com/office/drawing/2014/main" id="{11380B01-5C11-2679-9594-77B4B9FFAF52}"/>
               </a:ext>
             </a:extLst>
           </p:cNvPr>
@@ -14340,8 +14478,161 @@
         </p:nvSpPr>
         <p:spPr>
           <a:xfrm>
-            <a:off x="3095107" y="5256044"/>
-            <a:ext cx="1074420" cy="261600"/>
+            <a:off x="3728463" y="2650721"/>
+            <a:ext cx="1074420" cy="463441"/>
+          </a:xfrm>
+          <a:prstGeom prst="roundRect">
+            <a:avLst/>
+          </a:prstGeom>
+          <a:solidFill>
+            <a:srgbClr val="00B0F0"/>
+          </a:solidFill>
+          <a:ln>
+            <a:noFill/>
+          </a:ln>
+        </p:spPr>
+        <p:style>
+          <a:lnRef idx="2">
+            <a:schemeClr val="accent1">
+              <a:shade val="50000"/>
+            </a:schemeClr>
+          </a:lnRef>
+          <a:fillRef idx="1">
+            <a:schemeClr val="accent1"/>
+          </a:fillRef>
+          <a:effectRef idx="0">
+            <a:schemeClr val="accent1"/>
+          </a:effectRef>
+          <a:fontRef idx="minor">
+            <a:schemeClr val="lt1"/>
+          </a:fontRef>
+        </p:style>
+        <p:txBody>
+          <a:bodyPr rtlCol="0" anchor="ctr"/>
+          <a:lstStyle/>
+          <a:p>
+            <a:pPr algn="ctr"/>
+            <a:r>
+              <a:rPr lang="en-US" sz="1600" b="1" dirty="0">
+                <a:solidFill>
+                  <a:schemeClr val="tx1"/>
+                </a:solidFill>
+              </a:rPr>
+              <a:t>COMING SOON!</a:t>
+            </a:r>
+          </a:p>
+        </p:txBody>
+      </p:sp>
+      <p:pic>
+        <p:nvPicPr>
+          <p:cNvPr id="1030" name="Picture 6" descr="Google Workspace | Business Apps &amp; Collaboration Tools">
+            <a:extLst>
+              <a:ext uri="{FF2B5EF4-FFF2-40B4-BE49-F238E27FC236}">
+                <a16:creationId xmlns:a16="http://schemas.microsoft.com/office/drawing/2014/main" id="{ED0DC73D-5646-3483-56E7-858CFC2DE900}"/>
+              </a:ext>
+            </a:extLst>
+          </p:cNvPr>
+          <p:cNvPicPr>
+            <a:picLocks noChangeAspect="1" noChangeArrowheads="1"/>
+          </p:cNvPicPr>
+          <p:nvPr/>
+        </p:nvPicPr>
+        <p:blipFill>
+          <a:blip r:embed="rId21">
+            <a:extLst>
+              <a:ext uri="{28A0092B-C50C-407E-A947-70E740481C1C}">
+                <a14:useLocalDpi xmlns:a14="http://schemas.microsoft.com/office/drawing/2010/main" val="0"/>
+              </a:ext>
+            </a:extLst>
+          </a:blip>
+          <a:srcRect/>
+          <a:stretch>
+            <a:fillRect/>
+          </a:stretch>
+        </p:blipFill>
+        <p:spPr bwMode="auto">
+          <a:xfrm>
+            <a:off x="6051403" y="2867643"/>
+            <a:ext cx="996696" cy="996696"/>
+          </a:xfrm>
+          <a:prstGeom prst="rect">
+            <a:avLst/>
+          </a:prstGeom>
+          <a:noFill/>
+          <a:extLst>
+            <a:ext uri="{909E8E84-426E-40DD-AFC4-6F175D3DCCD1}">
+              <a14:hiddenFill xmlns:a14="http://schemas.microsoft.com/office/drawing/2010/main">
+                <a:solidFill>
+                  <a:srgbClr val="FFFFFF"/>
+                </a:solidFill>
+              </a14:hiddenFill>
+            </a:ext>
+          </a:extLst>
+        </p:spPr>
+      </p:pic>
+      <p:pic>
+        <p:nvPicPr>
+          <p:cNvPr id="53" name="Picture 10" descr="Workday - Apps on Google Play">
+            <a:extLst>
+              <a:ext uri="{FF2B5EF4-FFF2-40B4-BE49-F238E27FC236}">
+                <a16:creationId xmlns:a16="http://schemas.microsoft.com/office/drawing/2014/main" id="{8903D04C-6DA0-E7D0-7EDF-6AE6E6C6EF0E}"/>
+              </a:ext>
+            </a:extLst>
+          </p:cNvPr>
+          <p:cNvPicPr>
+            <a:picLocks noChangeAspect="1" noChangeArrowheads="1"/>
+          </p:cNvPicPr>
+          <p:nvPr/>
+        </p:nvPicPr>
+        <p:blipFill>
+          <a:blip r:embed="rId22">
+            <a:extLst>
+              <a:ext uri="{28A0092B-C50C-407E-A947-70E740481C1C}">
+                <a14:useLocalDpi xmlns:a14="http://schemas.microsoft.com/office/drawing/2010/main" val="0"/>
+              </a:ext>
+            </a:extLst>
+          </a:blip>
+          <a:srcRect/>
+          <a:stretch>
+            <a:fillRect/>
+          </a:stretch>
+        </p:blipFill>
+        <p:spPr bwMode="auto">
+          <a:xfrm>
+            <a:off x="7858522" y="2881022"/>
+            <a:ext cx="996696" cy="996696"/>
+          </a:xfrm>
+          <a:prstGeom prst="rect">
+            <a:avLst/>
+          </a:prstGeom>
+          <a:noFill/>
+          <a:extLst>
+            <a:ext uri="{909E8E84-426E-40DD-AFC4-6F175D3DCCD1}">
+              <a14:hiddenFill xmlns:a14="http://schemas.microsoft.com/office/drawing/2010/main">
+                <a:solidFill>
+                  <a:srgbClr val="FFFFFF"/>
+                </a:solidFill>
+              </a14:hiddenFill>
+            </a:ext>
+          </a:extLst>
+        </p:spPr>
+      </p:pic>
+      <p:sp>
+        <p:nvSpPr>
+          <p:cNvPr id="57" name="Rectangle: Rounded Corners 56">
+            <a:extLst>
+              <a:ext uri="{FF2B5EF4-FFF2-40B4-BE49-F238E27FC236}">
+                <a16:creationId xmlns:a16="http://schemas.microsoft.com/office/drawing/2014/main" id="{87EC92A5-9254-25F8-0C42-0E676A517662}"/>
+              </a:ext>
+            </a:extLst>
+          </p:cNvPr>
+          <p:cNvSpPr/>
+          <p:nvPr/>
+        </p:nvSpPr>
+        <p:spPr>
+          <a:xfrm>
+            <a:off x="2865667" y="1033195"/>
+            <a:ext cx="5989551" cy="365760"/>
           </a:xfrm>
           <a:prstGeom prst="roundRect">
             <a:avLst/>
@@ -14382,103 +14673,70 @@
                   <a:schemeClr val="tx1"/>
                 </a:solidFill>
               </a:rPr>
-              <a:t>REPORT</a:t>
+              <a:t>CLOUD ASSET MANAGEMENT (CAM)</a:t>
             </a:r>
           </a:p>
         </p:txBody>
       </p:sp>
-      <p:cxnSp>
-        <p:nvCxnSpPr>
-          <p:cNvPr id="52" name="Connector: Elbow 51">
-            <a:extLst>
-              <a:ext uri="{FF2B5EF4-FFF2-40B4-BE49-F238E27FC236}">
-                <a16:creationId xmlns:a16="http://schemas.microsoft.com/office/drawing/2014/main" id="{951CB380-36EC-ADD9-7F54-C01D45161AAF}"/>
-              </a:ext>
-            </a:extLst>
-          </p:cNvPr>
-          <p:cNvCxnSpPr>
-            <a:cxnSpLocks/>
-            <a:stCxn id="5" idx="2"/>
-            <a:endCxn id="51" idx="1"/>
-          </p:cNvCxnSpPr>
+      <p:sp>
+        <p:nvSpPr>
+          <p:cNvPr id="19" name="Rectangle: Rounded Corners 18">
+            <a:extLst>
+              <a:ext uri="{FF2B5EF4-FFF2-40B4-BE49-F238E27FC236}">
+                <a16:creationId xmlns:a16="http://schemas.microsoft.com/office/drawing/2014/main" id="{5777DF44-469B-7A2F-8877-71FC31533BAB}"/>
+              </a:ext>
+            </a:extLst>
+          </p:cNvPr>
+          <p:cNvSpPr/>
           <p:nvPr/>
-        </p:nvCxnSpPr>
+        </p:nvSpPr>
         <p:spPr>
-          <a:xfrm rot="16200000" flipH="1">
-            <a:off x="1297289" y="3589026"/>
-            <a:ext cx="1511256" cy="2084379"/>
+          <a:xfrm>
+            <a:off x="6916100" y="2650721"/>
+            <a:ext cx="1074420" cy="463441"/>
           </a:xfrm>
-          <a:prstGeom prst="bentConnector2">
+          <a:prstGeom prst="roundRect">
             <a:avLst/>
           </a:prstGeom>
-          <a:ln w="19050">
-            <a:solidFill>
-              <a:schemeClr val="bg1"/>
-            </a:solidFill>
+          <a:solidFill>
+            <a:srgbClr val="00B0F0"/>
+          </a:solidFill>
+          <a:ln>
+            <a:noFill/>
           </a:ln>
         </p:spPr>
         <p:style>
-          <a:lnRef idx="1">
-            <a:schemeClr val="accent1"/>
+          <a:lnRef idx="2">
+            <a:schemeClr val="accent1">
+              <a:shade val="50000"/>
+            </a:schemeClr>
           </a:lnRef>
-          <a:fillRef idx="0">
+          <a:fillRef idx="1">
             <a:schemeClr val="accent1"/>
           </a:fillRef>
           <a:effectRef idx="0">
             <a:schemeClr val="accent1"/>
           </a:effectRef>
           <a:fontRef idx="minor">
-            <a:schemeClr val="tx1"/>
+            <a:schemeClr val="lt1"/>
           </a:fontRef>
         </p:style>
-      </p:cxnSp>
-      <p:pic>
-        <p:nvPicPr>
-          <p:cNvPr id="55" name="Picture 20">
-            <a:extLst>
-              <a:ext uri="{FF2B5EF4-FFF2-40B4-BE49-F238E27FC236}">
-                <a16:creationId xmlns:a16="http://schemas.microsoft.com/office/drawing/2014/main" id="{5FB33C35-4ABC-C3EF-7377-9B5091661884}"/>
-              </a:ext>
-            </a:extLst>
-          </p:cNvPr>
-          <p:cNvPicPr>
-            <a:picLocks noChangeAspect="1" noChangeArrowheads="1"/>
-          </p:cNvPicPr>
-          <p:nvPr/>
-        </p:nvPicPr>
-        <p:blipFill>
-          <a:blip r:embed="rId19">
-            <a:extLst>
-              <a:ext uri="{28A0092B-C50C-407E-A947-70E740481C1C}">
-                <a14:useLocalDpi xmlns:a14="http://schemas.microsoft.com/office/drawing/2010/main" val="0"/>
-              </a:ext>
-            </a:extLst>
-          </a:blip>
-          <a:srcRect/>
-          <a:stretch>
-            <a:fillRect/>
-          </a:stretch>
-        </p:blipFill>
-        <p:spPr bwMode="auto">
-          <a:xfrm>
-            <a:off x="6954962" y="1518301"/>
-            <a:ext cx="996696" cy="996696"/>
-          </a:xfrm>
-          <a:prstGeom prst="rect">
-            <a:avLst/>
-          </a:prstGeom>
-          <a:noFill/>
-          <a:extLst>
-            <a:ext uri="{909E8E84-426E-40DD-AFC4-6F175D3DCCD1}">
-              <a14:hiddenFill xmlns:a14="http://schemas.microsoft.com/office/drawing/2010/main">
-                <a:solidFill>
-                  <a:srgbClr val="FFFFFF"/>
-                </a:solidFill>
-              </a14:hiddenFill>
-            </a:ext>
-          </a:extLst>
-        </p:spPr>
-      </p:pic>
+        <p:txBody>
+          <a:bodyPr rtlCol="0" anchor="ctr"/>
+          <a:lstStyle/>
+          <a:p>
+            <a:pPr algn="ctr"/>
+            <a:r>
+              <a:rPr lang="en-US" sz="1600" b="1" dirty="0">
+                <a:solidFill>
+                  <a:schemeClr val="tx1"/>
+                </a:solidFill>
+              </a:rPr>
+              <a:t>COMING SOON!</a:t>
+            </a:r>
+          </a:p>
+        </p:txBody>
+      </p:sp>
       <p:sp>
         <p:nvSpPr>
           <p:cNvPr id="2" name="Rectangle: Rounded Corners 1">
@@ -14493,7 +14751,7 @@
         </p:nvSpPr>
         <p:spPr>
           <a:xfrm>
-            <a:off x="7764789" y="3921946"/>
+            <a:off x="6916100" y="3967028"/>
             <a:ext cx="1074420" cy="463441"/>
           </a:xfrm>
           <a:prstGeom prst="roundRect">

</xml_diff>

<commit_message>
update architecture, add dependabot, alpine 3.18
</commit_message>
<xml_diff>
--- a/screenshots/extras/ElectricEye.pptx
+++ b/screenshots/extras/ElectricEye.pptx
@@ -116,13 +116,181 @@
 <file path=ppt/revisionInfo.xml><?xml version="1.0" encoding="utf-8"?>
 <p1510:revInfo xmlns:a="http://schemas.openxmlformats.org/drawingml/2006/main" xmlns:r="http://schemas.openxmlformats.org/officeDocument/2006/relationships" xmlns:p1510="http://schemas.microsoft.com/office/powerpoint/2015/10/main">
   <p1510:revLst>
-    <p1510:client id="{3F5F48D2-2934-4288-A555-E6823DD1D0AE}" v="509" dt="2023-05-01T22:09:47.537"/>
+    <p1510:client id="{81BFAC01-EC3C-47A5-AFF3-09E0F97B7B12}" v="10" dt="2023-05-15T00:45:04.280"/>
   </p1510:revLst>
 </p1510:revInfo>
 </file>
 
 <file path=ppt/changesInfos/changesInfo1.xml><?xml version="1.0" encoding="utf-8"?>
 <pc:chgInfo xmlns:a="http://schemas.openxmlformats.org/drawingml/2006/main" xmlns:r="http://schemas.openxmlformats.org/officeDocument/2006/relationships" xmlns:ac="http://schemas.microsoft.com/office/drawing/2013/main/command" xmlns:pc="http://schemas.microsoft.com/office/powerpoint/2013/main/command">
+  <pc:docChgLst>
+    <pc:chgData name="Jonathan Rau" userId="01bd1429-ada3-4be3-b2f3-ae839e9d5ccc" providerId="ADAL" clId="{81BFAC01-EC3C-47A5-AFF3-09E0F97B7B12}"/>
+    <pc:docChg chg="undo custSel modSld">
+      <pc:chgData name="Jonathan Rau" userId="01bd1429-ada3-4be3-b2f3-ae839e9d5ccc" providerId="ADAL" clId="{81BFAC01-EC3C-47A5-AFF3-09E0F97B7B12}" dt="2023-05-15T00:42:28.894" v="22" actId="165"/>
+      <pc:docMkLst>
+        <pc:docMk/>
+      </pc:docMkLst>
+      <pc:sldChg chg="addSp delSp modSp mod">
+        <pc:chgData name="Jonathan Rau" userId="01bd1429-ada3-4be3-b2f3-ae839e9d5ccc" providerId="ADAL" clId="{81BFAC01-EC3C-47A5-AFF3-09E0F97B7B12}" dt="2023-05-15T00:42:28.894" v="22" actId="165"/>
+        <pc:sldMkLst>
+          <pc:docMk/>
+          <pc:sldMk cId="2927218767" sldId="258"/>
+        </pc:sldMkLst>
+        <pc:spChg chg="mod">
+          <ac:chgData name="Jonathan Rau" userId="01bd1429-ada3-4be3-b2f3-ae839e9d5ccc" providerId="ADAL" clId="{81BFAC01-EC3C-47A5-AFF3-09E0F97B7B12}" dt="2023-05-15T00:42:28.894" v="22" actId="165"/>
+          <ac:spMkLst>
+            <pc:docMk/>
+            <pc:sldMk cId="2927218767" sldId="258"/>
+            <ac:spMk id="7" creationId="{9F78F5AA-A513-5719-7273-839BFED55752}"/>
+          </ac:spMkLst>
+        </pc:spChg>
+        <pc:spChg chg="mod">
+          <ac:chgData name="Jonathan Rau" userId="01bd1429-ada3-4be3-b2f3-ae839e9d5ccc" providerId="ADAL" clId="{81BFAC01-EC3C-47A5-AFF3-09E0F97B7B12}" dt="2023-05-15T00:40:49.804" v="0" actId="1076"/>
+          <ac:spMkLst>
+            <pc:docMk/>
+            <pc:sldMk cId="2927218767" sldId="258"/>
+            <ac:spMk id="18" creationId="{11380B01-5C11-2679-9594-77B4B9FFAF52}"/>
+          </ac:spMkLst>
+        </pc:spChg>
+        <pc:spChg chg="mod">
+          <ac:chgData name="Jonathan Rau" userId="01bd1429-ada3-4be3-b2f3-ae839e9d5ccc" providerId="ADAL" clId="{81BFAC01-EC3C-47A5-AFF3-09E0F97B7B12}" dt="2023-05-15T00:42:28.894" v="22" actId="165"/>
+          <ac:spMkLst>
+            <pc:docMk/>
+            <pc:sldMk cId="2927218767" sldId="258"/>
+            <ac:spMk id="36" creationId="{3168B3C9-C653-D5A4-3A61-2E0ED75D4320}"/>
+          </ac:spMkLst>
+        </pc:spChg>
+        <pc:spChg chg="mod">
+          <ac:chgData name="Jonathan Rau" userId="01bd1429-ada3-4be3-b2f3-ae839e9d5ccc" providerId="ADAL" clId="{81BFAC01-EC3C-47A5-AFF3-09E0F97B7B12}" dt="2023-05-15T00:42:28.894" v="22" actId="165"/>
+          <ac:spMkLst>
+            <pc:docMk/>
+            <pc:sldMk cId="2927218767" sldId="258"/>
+            <ac:spMk id="40" creationId="{2B9F4387-007C-A863-E06D-057C44D1A8B7}"/>
+          </ac:spMkLst>
+        </pc:spChg>
+        <pc:spChg chg="mod">
+          <ac:chgData name="Jonathan Rau" userId="01bd1429-ada3-4be3-b2f3-ae839e9d5ccc" providerId="ADAL" clId="{81BFAC01-EC3C-47A5-AFF3-09E0F97B7B12}" dt="2023-05-15T00:42:28.894" v="22" actId="165"/>
+          <ac:spMkLst>
+            <pc:docMk/>
+            <pc:sldMk cId="2927218767" sldId="258"/>
+            <ac:spMk id="44" creationId="{AF0DFB57-0EA5-1522-9EE9-03E1643EF3C4}"/>
+          </ac:spMkLst>
+        </pc:spChg>
+        <pc:spChg chg="mod">
+          <ac:chgData name="Jonathan Rau" userId="01bd1429-ada3-4be3-b2f3-ae839e9d5ccc" providerId="ADAL" clId="{81BFAC01-EC3C-47A5-AFF3-09E0F97B7B12}" dt="2023-05-15T00:42:28.894" v="22" actId="165"/>
+          <ac:spMkLst>
+            <pc:docMk/>
+            <pc:sldMk cId="2927218767" sldId="258"/>
+            <ac:spMk id="45" creationId="{5403259A-FD0E-15A7-723A-F88B42E0162C}"/>
+          </ac:spMkLst>
+        </pc:spChg>
+        <pc:spChg chg="mod topLvl">
+          <ac:chgData name="Jonathan Rau" userId="01bd1429-ada3-4be3-b2f3-ae839e9d5ccc" providerId="ADAL" clId="{81BFAC01-EC3C-47A5-AFF3-09E0F97B7B12}" dt="2023-05-15T00:42:28.894" v="22" actId="165"/>
+          <ac:spMkLst>
+            <pc:docMk/>
+            <pc:sldMk cId="2927218767" sldId="258"/>
+            <ac:spMk id="47" creationId="{EDA5DF41-D325-4378-3FDC-CBE766C0E32E}"/>
+          </ac:spMkLst>
+        </pc:spChg>
+        <pc:spChg chg="mod">
+          <ac:chgData name="Jonathan Rau" userId="01bd1429-ada3-4be3-b2f3-ae839e9d5ccc" providerId="ADAL" clId="{81BFAC01-EC3C-47A5-AFF3-09E0F97B7B12}" dt="2023-05-15T00:41:02.480" v="1" actId="14100"/>
+          <ac:spMkLst>
+            <pc:docMk/>
+            <pc:sldMk cId="2927218767" sldId="258"/>
+            <ac:spMk id="57" creationId="{87EC92A5-9254-25F8-0C42-0E676A517662}"/>
+          </ac:spMkLst>
+        </pc:spChg>
+        <pc:grpChg chg="mod topLvl">
+          <ac:chgData name="Jonathan Rau" userId="01bd1429-ada3-4be3-b2f3-ae839e9d5ccc" providerId="ADAL" clId="{81BFAC01-EC3C-47A5-AFF3-09E0F97B7B12}" dt="2023-05-15T00:42:28.894" v="22" actId="165"/>
+          <ac:grpSpMkLst>
+            <pc:docMk/>
+            <pc:sldMk cId="2927218767" sldId="258"/>
+            <ac:grpSpMk id="26" creationId="{6BAEA63F-A29D-8D2F-2B83-0919927ED399}"/>
+          </ac:grpSpMkLst>
+        </pc:grpChg>
+        <pc:grpChg chg="mod topLvl">
+          <ac:chgData name="Jonathan Rau" userId="01bd1429-ada3-4be3-b2f3-ae839e9d5ccc" providerId="ADAL" clId="{81BFAC01-EC3C-47A5-AFF3-09E0F97B7B12}" dt="2023-05-15T00:42:28.894" v="22" actId="165"/>
+          <ac:grpSpMkLst>
+            <pc:docMk/>
+            <pc:sldMk cId="2927218767" sldId="258"/>
+            <ac:grpSpMk id="29" creationId="{6C2D2B36-7017-0273-DE0A-222DC8FB537F}"/>
+          </ac:grpSpMkLst>
+        </pc:grpChg>
+        <pc:grpChg chg="mod topLvl">
+          <ac:chgData name="Jonathan Rau" userId="01bd1429-ada3-4be3-b2f3-ae839e9d5ccc" providerId="ADAL" clId="{81BFAC01-EC3C-47A5-AFF3-09E0F97B7B12}" dt="2023-05-15T00:42:28.894" v="22" actId="165"/>
+          <ac:grpSpMkLst>
+            <pc:docMk/>
+            <pc:sldMk cId="2927218767" sldId="258"/>
+            <ac:grpSpMk id="30" creationId="{E30E038F-7FA5-A920-3A09-7E35AF378EA6}"/>
+          </ac:grpSpMkLst>
+        </pc:grpChg>
+        <pc:grpChg chg="mod topLvl">
+          <ac:chgData name="Jonathan Rau" userId="01bd1429-ada3-4be3-b2f3-ae839e9d5ccc" providerId="ADAL" clId="{81BFAC01-EC3C-47A5-AFF3-09E0F97B7B12}" dt="2023-05-15T00:42:28.894" v="22" actId="165"/>
+          <ac:grpSpMkLst>
+            <pc:docMk/>
+            <pc:sldMk cId="2927218767" sldId="258"/>
+            <ac:grpSpMk id="32" creationId="{61FE9FAF-8CEE-A9FC-9802-5B6239F41C7B}"/>
+          </ac:grpSpMkLst>
+        </pc:grpChg>
+        <pc:grpChg chg="mod topLvl">
+          <ac:chgData name="Jonathan Rau" userId="01bd1429-ada3-4be3-b2f3-ae839e9d5ccc" providerId="ADAL" clId="{81BFAC01-EC3C-47A5-AFF3-09E0F97B7B12}" dt="2023-05-15T00:42:28.894" v="22" actId="165"/>
+          <ac:grpSpMkLst>
+            <pc:docMk/>
+            <pc:sldMk cId="2927218767" sldId="258"/>
+            <ac:grpSpMk id="33" creationId="{2F9B88CF-29AE-2D89-CD2B-F21FFEE9D7B8}"/>
+          </ac:grpSpMkLst>
+        </pc:grpChg>
+        <pc:grpChg chg="add del mod">
+          <ac:chgData name="Jonathan Rau" userId="01bd1429-ada3-4be3-b2f3-ae839e9d5ccc" providerId="ADAL" clId="{81BFAC01-EC3C-47A5-AFF3-09E0F97B7B12}" dt="2023-05-15T00:42:28.894" v="22" actId="165"/>
+          <ac:grpSpMkLst>
+            <pc:docMk/>
+            <pc:sldMk cId="2927218767" sldId="258"/>
+            <ac:grpSpMk id="34" creationId="{B0B80858-9883-3F5E-0753-1842B54739B1}"/>
+          </ac:grpSpMkLst>
+        </pc:grpChg>
+        <pc:picChg chg="mod">
+          <ac:chgData name="Jonathan Rau" userId="01bd1429-ada3-4be3-b2f3-ae839e9d5ccc" providerId="ADAL" clId="{81BFAC01-EC3C-47A5-AFF3-09E0F97B7B12}" dt="2023-05-15T00:42:28.894" v="22" actId="165"/>
+          <ac:picMkLst>
+            <pc:docMk/>
+            <pc:sldMk cId="2927218767" sldId="258"/>
+            <ac:picMk id="35" creationId="{D2DAF613-D8BD-3380-58A8-5BAB202AF083}"/>
+          </ac:picMkLst>
+        </pc:picChg>
+        <pc:picChg chg="mod">
+          <ac:chgData name="Jonathan Rau" userId="01bd1429-ada3-4be3-b2f3-ae839e9d5ccc" providerId="ADAL" clId="{81BFAC01-EC3C-47A5-AFF3-09E0F97B7B12}" dt="2023-05-15T00:42:28.894" v="22" actId="165"/>
+          <ac:picMkLst>
+            <pc:docMk/>
+            <pc:sldMk cId="2927218767" sldId="258"/>
+            <ac:picMk id="39" creationId="{0B15E7EF-81AB-9F76-740A-808EC8C56C65}"/>
+          </ac:picMkLst>
+        </pc:picChg>
+        <pc:picChg chg="mod">
+          <ac:chgData name="Jonathan Rau" userId="01bd1429-ada3-4be3-b2f3-ae839e9d5ccc" providerId="ADAL" clId="{81BFAC01-EC3C-47A5-AFF3-09E0F97B7B12}" dt="2023-05-15T00:42:28.894" v="22" actId="165"/>
+          <ac:picMkLst>
+            <pc:docMk/>
+            <pc:sldMk cId="2927218767" sldId="258"/>
+            <ac:picMk id="43" creationId="{46C1D956-00C8-E3E3-A65B-3466292AEC94}"/>
+          </ac:picMkLst>
+        </pc:picChg>
+        <pc:picChg chg="mod">
+          <ac:chgData name="Jonathan Rau" userId="01bd1429-ada3-4be3-b2f3-ae839e9d5ccc" providerId="ADAL" clId="{81BFAC01-EC3C-47A5-AFF3-09E0F97B7B12}" dt="2023-05-15T00:42:28.894" v="22" actId="165"/>
+          <ac:picMkLst>
+            <pc:docMk/>
+            <pc:sldMk cId="2927218767" sldId="258"/>
+            <ac:picMk id="46" creationId="{6617A1D9-409F-15DE-CC52-DE413211DE73}"/>
+          </ac:picMkLst>
+        </pc:picChg>
+        <pc:picChg chg="mod">
+          <ac:chgData name="Jonathan Rau" userId="01bd1429-ada3-4be3-b2f3-ae839e9d5ccc" providerId="ADAL" clId="{81BFAC01-EC3C-47A5-AFF3-09E0F97B7B12}" dt="2023-05-15T00:42:28.894" v="22" actId="165"/>
+          <ac:picMkLst>
+            <pc:docMk/>
+            <pc:sldMk cId="2927218767" sldId="258"/>
+            <ac:picMk id="1026" creationId="{EEFAA6CA-7B0D-3179-A8B7-CE0BB5626AD2}"/>
+          </ac:picMkLst>
+        </pc:picChg>
+      </pc:sldChg>
+    </pc:docChg>
+  </pc:docChgLst>
   <pc:docChgLst>
     <pc:chgData name="Jonathan Rau" userId="01bd1429-ada3-4be3-b2f3-ae839e9d5ccc" providerId="ADAL" clId="{55106960-EEA4-41B7-A7A3-EDD0113A0EFE}"/>
     <pc:docChg chg="undo custSel modSld">
@@ -1193,7 +1361,7 @@
           <a:p>
             <a:fld id="{A3104859-06A7-4B6C-9EBE-0886FFE8171A}" type="datetimeFigureOut">
               <a:rPr lang="en-US" smtClean="0"/>
-              <a:t>5/1/2023</a:t>
+              <a:t>5/14/2023</a:t>
             </a:fld>
             <a:endParaRPr lang="en-US"/>
           </a:p>
@@ -1391,7 +1559,7 @@
           <a:p>
             <a:fld id="{A3104859-06A7-4B6C-9EBE-0886FFE8171A}" type="datetimeFigureOut">
               <a:rPr lang="en-US" smtClean="0"/>
-              <a:t>5/1/2023</a:t>
+              <a:t>5/14/2023</a:t>
             </a:fld>
             <a:endParaRPr lang="en-US"/>
           </a:p>
@@ -1599,7 +1767,7 @@
           <a:p>
             <a:fld id="{A3104859-06A7-4B6C-9EBE-0886FFE8171A}" type="datetimeFigureOut">
               <a:rPr lang="en-US" smtClean="0"/>
-              <a:t>5/1/2023</a:t>
+              <a:t>5/14/2023</a:t>
             </a:fld>
             <a:endParaRPr lang="en-US"/>
           </a:p>
@@ -1797,7 +1965,7 @@
           <a:p>
             <a:fld id="{A3104859-06A7-4B6C-9EBE-0886FFE8171A}" type="datetimeFigureOut">
               <a:rPr lang="en-US" smtClean="0"/>
-              <a:t>5/1/2023</a:t>
+              <a:t>5/14/2023</a:t>
             </a:fld>
             <a:endParaRPr lang="en-US"/>
           </a:p>
@@ -2072,7 +2240,7 @@
           <a:p>
             <a:fld id="{A3104859-06A7-4B6C-9EBE-0886FFE8171A}" type="datetimeFigureOut">
               <a:rPr lang="en-US" smtClean="0"/>
-              <a:t>5/1/2023</a:t>
+              <a:t>5/14/2023</a:t>
             </a:fld>
             <a:endParaRPr lang="en-US"/>
           </a:p>
@@ -2337,7 +2505,7 @@
           <a:p>
             <a:fld id="{A3104859-06A7-4B6C-9EBE-0886FFE8171A}" type="datetimeFigureOut">
               <a:rPr lang="en-US" smtClean="0"/>
-              <a:t>5/1/2023</a:t>
+              <a:t>5/14/2023</a:t>
             </a:fld>
             <a:endParaRPr lang="en-US"/>
           </a:p>
@@ -2749,7 +2917,7 @@
           <a:p>
             <a:fld id="{A3104859-06A7-4B6C-9EBE-0886FFE8171A}" type="datetimeFigureOut">
               <a:rPr lang="en-US" smtClean="0"/>
-              <a:t>5/1/2023</a:t>
+              <a:t>5/14/2023</a:t>
             </a:fld>
             <a:endParaRPr lang="en-US"/>
           </a:p>
@@ -2890,7 +3058,7 @@
           <a:p>
             <a:fld id="{A3104859-06A7-4B6C-9EBE-0886FFE8171A}" type="datetimeFigureOut">
               <a:rPr lang="en-US" smtClean="0"/>
-              <a:t>5/1/2023</a:t>
+              <a:t>5/14/2023</a:t>
             </a:fld>
             <a:endParaRPr lang="en-US"/>
           </a:p>
@@ -3003,7 +3171,7 @@
           <a:p>
             <a:fld id="{A3104859-06A7-4B6C-9EBE-0886FFE8171A}" type="datetimeFigureOut">
               <a:rPr lang="en-US" smtClean="0"/>
-              <a:t>5/1/2023</a:t>
+              <a:t>5/14/2023</a:t>
             </a:fld>
             <a:endParaRPr lang="en-US"/>
           </a:p>
@@ -3314,7 +3482,7 @@
           <a:p>
             <a:fld id="{A3104859-06A7-4B6C-9EBE-0886FFE8171A}" type="datetimeFigureOut">
               <a:rPr lang="en-US" smtClean="0"/>
-              <a:t>5/1/2023</a:t>
+              <a:t>5/14/2023</a:t>
             </a:fld>
             <a:endParaRPr lang="en-US"/>
           </a:p>
@@ -3602,7 +3770,7 @@
           <a:p>
             <a:fld id="{A3104859-06A7-4B6C-9EBE-0886FFE8171A}" type="datetimeFigureOut">
               <a:rPr lang="en-US" smtClean="0"/>
-              <a:t>5/1/2023</a:t>
+              <a:t>5/14/2023</a:t>
             </a:fld>
             <a:endParaRPr lang="en-US"/>
           </a:p>
@@ -3843,7 +4011,7 @@
           <a:p>
             <a:fld id="{A3104859-06A7-4B6C-9EBE-0886FFE8171A}" type="datetimeFigureOut">
               <a:rPr lang="en-US" smtClean="0"/>
-              <a:t>5/1/2023</a:t>
+              <a:t>5/14/2023</a:t>
             </a:fld>
             <a:endParaRPr lang="en-US"/>
           </a:p>
@@ -13411,7 +13579,7 @@
               <a:p>
                 <a:pPr algn="ctr" eaLnBrk="1" hangingPunct="1"/>
                 <a:r>
-                  <a:rPr lang="en-US" altLang="en-US" sz="1100" dirty="0">
+                  <a:rPr lang="en-US" altLang="en-US" sz="1100" b="1" dirty="0">
                     <a:solidFill>
                       <a:schemeClr val="bg1"/>
                     </a:solidFill>
@@ -13654,20 +13822,20 @@
               <a:p>
                 <a:pPr algn="ctr" eaLnBrk="1" hangingPunct="1"/>
                 <a:r>
-                  <a:rPr lang="en-US" altLang="en-US" sz="1100" dirty="0">
+                  <a:rPr lang="en-US" altLang="en-US" sz="1100" b="1" dirty="0">
                     <a:solidFill>
                       <a:schemeClr val="bg1"/>
                     </a:solidFill>
                     <a:latin typeface="+mj-lt"/>
                     <a:cs typeface="Arial" panose="020B0604020202020204" pitchFamily="34" charset="0"/>
                   </a:rPr>
-                  <a:t>JSON,</a:t>
+                  <a:t>HTML, JSON,</a:t>
                 </a:r>
               </a:p>
               <a:p>
                 <a:pPr algn="ctr" eaLnBrk="1" hangingPunct="1"/>
                 <a:r>
-                  <a:rPr lang="en-US" altLang="en-US" sz="1100" dirty="0">
+                  <a:rPr lang="en-US" altLang="en-US" sz="1100" b="1" dirty="0">
                     <a:solidFill>
                       <a:schemeClr val="bg1"/>
                     </a:solidFill>
@@ -13911,7 +14079,7 @@
               <a:p>
                 <a:pPr algn="ctr" eaLnBrk="1" hangingPunct="1"/>
                 <a:r>
-                  <a:rPr lang="en-US" altLang="en-US" sz="1100" dirty="0">
+                  <a:rPr lang="en-US" altLang="en-US" sz="1100" b="1" dirty="0">
                     <a:solidFill>
                       <a:schemeClr val="bg1"/>
                     </a:solidFill>
@@ -14096,7 +14264,7 @@
               <a:p>
                 <a:pPr algn="ctr" eaLnBrk="1" hangingPunct="1"/>
                 <a:r>
-                  <a:rPr lang="en-US" altLang="en-US" sz="1100" dirty="0">
+                  <a:rPr lang="en-US" altLang="en-US" sz="1100" b="1" dirty="0">
                     <a:solidFill>
                       <a:schemeClr val="bg1"/>
                     </a:solidFill>
@@ -14110,7 +14278,7 @@
               <a:p>
                 <a:pPr algn="ctr" eaLnBrk="1" hangingPunct="1"/>
                 <a:r>
-                  <a:rPr lang="en-US" altLang="en-US" sz="1100" dirty="0">
+                  <a:rPr lang="en-US" altLang="en-US" sz="1100" b="1" dirty="0">
                     <a:solidFill>
                       <a:schemeClr val="bg1"/>
                     </a:solidFill>
@@ -14355,7 +14523,7 @@
               <a:p>
                 <a:pPr algn="ctr" eaLnBrk="1" hangingPunct="1"/>
                 <a:r>
-                  <a:rPr lang="en-US" altLang="en-US" sz="1100" dirty="0">
+                  <a:rPr lang="en-US" altLang="en-US" sz="1100" b="1" dirty="0">
                     <a:solidFill>
                       <a:schemeClr val="bg1"/>
                     </a:solidFill>
@@ -14478,7 +14646,7 @@
         </p:nvSpPr>
         <p:spPr>
           <a:xfrm>
-            <a:off x="3728463" y="2650721"/>
+            <a:off x="2271320" y="2648424"/>
             <a:ext cx="1074420" cy="463441"/>
           </a:xfrm>
           <a:prstGeom prst="roundRect">
@@ -14632,7 +14800,7 @@
         <p:spPr>
           <a:xfrm>
             <a:off x="2865667" y="1033195"/>
-            <a:ext cx="5989551" cy="365760"/>
+            <a:ext cx="9176781" cy="365760"/>
           </a:xfrm>
           <a:prstGeom prst="roundRect">
             <a:avLst/>

</xml_diff>

<commit_message>
Stage OBS, architecture updates!
</commit_message>
<xml_diff>
--- a/screenshots/extras/ElectricEye.pptx
+++ b/screenshots/extras/ElectricEye.pptx
@@ -116,7 +116,7 @@
 <file path=ppt/revisionInfo.xml><?xml version="1.0" encoding="utf-8"?>
 <p1510:revInfo xmlns:a="http://schemas.openxmlformats.org/drawingml/2006/main" xmlns:r="http://schemas.openxmlformats.org/officeDocument/2006/relationships" xmlns:p1510="http://schemas.microsoft.com/office/powerpoint/2015/10/main">
   <p1510:revLst>
-    <p1510:client id="{81BFAC01-EC3C-47A5-AFF3-09E0F97B7B12}" v="10" dt="2023-05-15T00:45:04.280"/>
+    <p1510:client id="{81BFAC01-EC3C-47A5-AFF3-09E0F97B7B12}" v="241" dt="2023-05-17T00:45:01.274"/>
   </p1510:revLst>
 </p1510:revInfo>
 </file>
@@ -126,18 +126,26 @@
   <pc:docChgLst>
     <pc:chgData name="Jonathan Rau" userId="01bd1429-ada3-4be3-b2f3-ae839e9d5ccc" providerId="ADAL" clId="{81BFAC01-EC3C-47A5-AFF3-09E0F97B7B12}"/>
     <pc:docChg chg="undo custSel modSld">
-      <pc:chgData name="Jonathan Rau" userId="01bd1429-ada3-4be3-b2f3-ae839e9d5ccc" providerId="ADAL" clId="{81BFAC01-EC3C-47A5-AFF3-09E0F97B7B12}" dt="2023-05-15T00:42:28.894" v="22" actId="165"/>
+      <pc:chgData name="Jonathan Rau" userId="01bd1429-ada3-4be3-b2f3-ae839e9d5ccc" providerId="ADAL" clId="{81BFAC01-EC3C-47A5-AFF3-09E0F97B7B12}" dt="2023-05-17T00:42:47.603" v="331" actId="1076"/>
       <pc:docMkLst>
         <pc:docMk/>
       </pc:docMkLst>
       <pc:sldChg chg="addSp delSp modSp mod">
-        <pc:chgData name="Jonathan Rau" userId="01bd1429-ada3-4be3-b2f3-ae839e9d5ccc" providerId="ADAL" clId="{81BFAC01-EC3C-47A5-AFF3-09E0F97B7B12}" dt="2023-05-15T00:42:28.894" v="22" actId="165"/>
+        <pc:chgData name="Jonathan Rau" userId="01bd1429-ada3-4be3-b2f3-ae839e9d5ccc" providerId="ADAL" clId="{81BFAC01-EC3C-47A5-AFF3-09E0F97B7B12}" dt="2023-05-17T00:42:47.603" v="331" actId="1076"/>
         <pc:sldMkLst>
           <pc:docMk/>
           <pc:sldMk cId="2927218767" sldId="258"/>
         </pc:sldMkLst>
         <pc:spChg chg="mod">
-          <ac:chgData name="Jonathan Rau" userId="01bd1429-ada3-4be3-b2f3-ae839e9d5ccc" providerId="ADAL" clId="{81BFAC01-EC3C-47A5-AFF3-09E0F97B7B12}" dt="2023-05-15T00:42:28.894" v="22" actId="165"/>
+          <ac:chgData name="Jonathan Rau" userId="01bd1429-ada3-4be3-b2f3-ae839e9d5ccc" providerId="ADAL" clId="{81BFAC01-EC3C-47A5-AFF3-09E0F97B7B12}" dt="2023-05-17T00:24:56.523" v="80" actId="12788"/>
+          <ac:spMkLst>
+            <pc:docMk/>
+            <pc:sldMk cId="2927218767" sldId="258"/>
+            <ac:spMk id="2" creationId="{2CBB7894-144C-A36C-3DB9-4368ED6A1E03}"/>
+          </ac:spMkLst>
+        </pc:spChg>
+        <pc:spChg chg="mod topLvl">
+          <ac:chgData name="Jonathan Rau" userId="01bd1429-ada3-4be3-b2f3-ae839e9d5ccc" providerId="ADAL" clId="{81BFAC01-EC3C-47A5-AFF3-09E0F97B7B12}" dt="2023-05-17T00:42:33.807" v="327" actId="554"/>
           <ac:spMkLst>
             <pc:docMk/>
             <pc:sldMk cId="2927218767" sldId="258"/>
@@ -145,39 +153,135 @@
           </ac:spMkLst>
         </pc:spChg>
         <pc:spChg chg="mod">
-          <ac:chgData name="Jonathan Rau" userId="01bd1429-ada3-4be3-b2f3-ae839e9d5ccc" providerId="ADAL" clId="{81BFAC01-EC3C-47A5-AFF3-09E0F97B7B12}" dt="2023-05-15T00:40:49.804" v="0" actId="1076"/>
+          <ac:chgData name="Jonathan Rau" userId="01bd1429-ada3-4be3-b2f3-ae839e9d5ccc" providerId="ADAL" clId="{81BFAC01-EC3C-47A5-AFF3-09E0F97B7B12}" dt="2023-05-17T00:36:09.077" v="201" actId="552"/>
+          <ac:spMkLst>
+            <pc:docMk/>
+            <pc:sldMk cId="2927218767" sldId="258"/>
+            <ac:spMk id="9" creationId="{743AA06B-1021-9D58-8136-63E9F09D80F6}"/>
+          </ac:spMkLst>
+        </pc:spChg>
+        <pc:spChg chg="add del mod">
+          <ac:chgData name="Jonathan Rau" userId="01bd1429-ada3-4be3-b2f3-ae839e9d5ccc" providerId="ADAL" clId="{81BFAC01-EC3C-47A5-AFF3-09E0F97B7B12}" dt="2023-05-17T00:35:13.195" v="189" actId="478"/>
+          <ac:spMkLst>
+            <pc:docMk/>
+            <pc:sldMk cId="2927218767" sldId="258"/>
+            <ac:spMk id="12" creationId="{58895021-F83E-D759-168D-06CBA01F4452}"/>
+          </ac:spMkLst>
+        </pc:spChg>
+        <pc:spChg chg="mod">
+          <ac:chgData name="Jonathan Rau" userId="01bd1429-ada3-4be3-b2f3-ae839e9d5ccc" providerId="ADAL" clId="{81BFAC01-EC3C-47A5-AFF3-09E0F97B7B12}" dt="2023-05-17T00:36:16.668" v="202" actId="553"/>
+          <ac:spMkLst>
+            <pc:docMk/>
+            <pc:sldMk cId="2927218767" sldId="258"/>
+            <ac:spMk id="15" creationId="{DD5C6FDF-7C59-4946-2CD5-F72284FC5851}"/>
+          </ac:spMkLst>
+        </pc:spChg>
+        <pc:spChg chg="mod">
+          <ac:chgData name="Jonathan Rau" userId="01bd1429-ada3-4be3-b2f3-ae839e9d5ccc" providerId="ADAL" clId="{81BFAC01-EC3C-47A5-AFF3-09E0F97B7B12}" dt="2023-05-17T00:36:09.077" v="201" actId="552"/>
+          <ac:spMkLst>
+            <pc:docMk/>
+            <pc:sldMk cId="2927218767" sldId="258"/>
+            <ac:spMk id="16" creationId="{DFDE86E7-AF7B-3343-B83E-DFC8327B6214}"/>
+          </ac:spMkLst>
+        </pc:spChg>
+        <pc:spChg chg="mod">
+          <ac:chgData name="Jonathan Rau" userId="01bd1429-ada3-4be3-b2f3-ae839e9d5ccc" providerId="ADAL" clId="{81BFAC01-EC3C-47A5-AFF3-09E0F97B7B12}" dt="2023-05-17T00:24:56.523" v="80" actId="12788"/>
+          <ac:spMkLst>
+            <pc:docMk/>
+            <pc:sldMk cId="2927218767" sldId="258"/>
+            <ac:spMk id="17" creationId="{B6CB8600-7725-1B60-693D-12AD37216EA1}"/>
+          </ac:spMkLst>
+        </pc:spChg>
+        <pc:spChg chg="mod">
+          <ac:chgData name="Jonathan Rau" userId="01bd1429-ada3-4be3-b2f3-ae839e9d5ccc" providerId="ADAL" clId="{81BFAC01-EC3C-47A5-AFF3-09E0F97B7B12}" dt="2023-05-17T00:24:50.028" v="79" actId="12789"/>
           <ac:spMkLst>
             <pc:docMk/>
             <pc:sldMk cId="2927218767" sldId="258"/>
             <ac:spMk id="18" creationId="{11380B01-5C11-2679-9594-77B4B9FFAF52}"/>
           </ac:spMkLst>
         </pc:spChg>
+        <pc:spChg chg="del">
+          <ac:chgData name="Jonathan Rau" userId="01bd1429-ada3-4be3-b2f3-ae839e9d5ccc" providerId="ADAL" clId="{81BFAC01-EC3C-47A5-AFF3-09E0F97B7B12}" dt="2023-05-17T00:23:43.094" v="60" actId="478"/>
+          <ac:spMkLst>
+            <pc:docMk/>
+            <pc:sldMk cId="2927218767" sldId="258"/>
+            <ac:spMk id="19" creationId="{5777DF44-469B-7A2F-8877-71FC31533BAB}"/>
+          </ac:spMkLst>
+        </pc:spChg>
         <pc:spChg chg="mod">
-          <ac:chgData name="Jonathan Rau" userId="01bd1429-ada3-4be3-b2f3-ae839e9d5ccc" providerId="ADAL" clId="{81BFAC01-EC3C-47A5-AFF3-09E0F97B7B12}" dt="2023-05-15T00:42:28.894" v="22" actId="165"/>
+          <ac:chgData name="Jonathan Rau" userId="01bd1429-ada3-4be3-b2f3-ae839e9d5ccc" providerId="ADAL" clId="{81BFAC01-EC3C-47A5-AFF3-09E0F97B7B12}" dt="2023-05-17T00:36:16.668" v="202" actId="553"/>
+          <ac:spMkLst>
+            <pc:docMk/>
+            <pc:sldMk cId="2927218767" sldId="258"/>
+            <ac:spMk id="20" creationId="{955587C0-591B-918F-2EFF-90D940181BF4}"/>
+          </ac:spMkLst>
+        </pc:spChg>
+        <pc:spChg chg="add mod">
+          <ac:chgData name="Jonathan Rau" userId="01bd1429-ada3-4be3-b2f3-ae839e9d5ccc" providerId="ADAL" clId="{81BFAC01-EC3C-47A5-AFF3-09E0F97B7B12}" dt="2023-05-17T00:24:56.523" v="80" actId="12788"/>
+          <ac:spMkLst>
+            <pc:docMk/>
+            <pc:sldMk cId="2927218767" sldId="258"/>
+            <ac:spMk id="22" creationId="{9BC42681-91A3-C97D-E6CA-4B3ED1F1160A}"/>
+          </ac:spMkLst>
+        </pc:spChg>
+        <pc:spChg chg="mod">
+          <ac:chgData name="Jonathan Rau" userId="01bd1429-ada3-4be3-b2f3-ae839e9d5ccc" providerId="ADAL" clId="{81BFAC01-EC3C-47A5-AFF3-09E0F97B7B12}" dt="2023-05-17T00:24:33.663" v="65" actId="12789"/>
+          <ac:spMkLst>
+            <pc:docMk/>
+            <pc:sldMk cId="2927218767" sldId="258"/>
+            <ac:spMk id="23" creationId="{C3FF9F8B-DA2B-B229-1266-64F4BAA0AA3E}"/>
+          </ac:spMkLst>
+        </pc:spChg>
+        <pc:spChg chg="mod">
+          <ac:chgData name="Jonathan Rau" userId="01bd1429-ada3-4be3-b2f3-ae839e9d5ccc" providerId="ADAL" clId="{81BFAC01-EC3C-47A5-AFF3-09E0F97B7B12}" dt="2023-05-17T00:24:50.028" v="79" actId="12789"/>
+          <ac:spMkLst>
+            <pc:docMk/>
+            <pc:sldMk cId="2927218767" sldId="258"/>
+            <ac:spMk id="25" creationId="{060A3261-575A-DB40-A7E1-36B64B9B5F6A}"/>
+          </ac:spMkLst>
+        </pc:spChg>
+        <pc:spChg chg="mod topLvl">
+          <ac:chgData name="Jonathan Rau" userId="01bd1429-ada3-4be3-b2f3-ae839e9d5ccc" providerId="ADAL" clId="{81BFAC01-EC3C-47A5-AFF3-09E0F97B7B12}" dt="2023-05-17T00:42:33.807" v="327" actId="554"/>
           <ac:spMkLst>
             <pc:docMk/>
             <pc:sldMk cId="2927218767" sldId="258"/>
             <ac:spMk id="36" creationId="{3168B3C9-C653-D5A4-3A61-2E0ED75D4320}"/>
           </ac:spMkLst>
         </pc:spChg>
-        <pc:spChg chg="mod">
-          <ac:chgData name="Jonathan Rau" userId="01bd1429-ada3-4be3-b2f3-ae839e9d5ccc" providerId="ADAL" clId="{81BFAC01-EC3C-47A5-AFF3-09E0F97B7B12}" dt="2023-05-15T00:42:28.894" v="22" actId="165"/>
+        <pc:spChg chg="mod topLvl">
+          <ac:chgData name="Jonathan Rau" userId="01bd1429-ada3-4be3-b2f3-ae839e9d5ccc" providerId="ADAL" clId="{81BFAC01-EC3C-47A5-AFF3-09E0F97B7B12}" dt="2023-05-17T00:42:33.807" v="327" actId="554"/>
           <ac:spMkLst>
             <pc:docMk/>
             <pc:sldMk cId="2927218767" sldId="258"/>
             <ac:spMk id="40" creationId="{2B9F4387-007C-A863-E06D-057C44D1A8B7}"/>
           </ac:spMkLst>
         </pc:spChg>
-        <pc:spChg chg="mod">
-          <ac:chgData name="Jonathan Rau" userId="01bd1429-ada3-4be3-b2f3-ae839e9d5ccc" providerId="ADAL" clId="{81BFAC01-EC3C-47A5-AFF3-09E0F97B7B12}" dt="2023-05-15T00:42:28.894" v="22" actId="165"/>
+        <pc:spChg chg="add mod">
+          <ac:chgData name="Jonathan Rau" userId="01bd1429-ada3-4be3-b2f3-ae839e9d5ccc" providerId="ADAL" clId="{81BFAC01-EC3C-47A5-AFF3-09E0F97B7B12}" dt="2023-05-17T00:42:33.807" v="327" actId="554"/>
+          <ac:spMkLst>
+            <pc:docMk/>
+            <pc:sldMk cId="2927218767" sldId="258"/>
+            <ac:spMk id="41" creationId="{2D3DDA4F-AACD-3441-9AAF-BF1A75B056B4}"/>
+          </ac:spMkLst>
+        </pc:spChg>
+        <pc:spChg chg="add mod">
+          <ac:chgData name="Jonathan Rau" userId="01bd1429-ada3-4be3-b2f3-ae839e9d5ccc" providerId="ADAL" clId="{81BFAC01-EC3C-47A5-AFF3-09E0F97B7B12}" dt="2023-05-17T00:42:33.807" v="327" actId="554"/>
+          <ac:spMkLst>
+            <pc:docMk/>
+            <pc:sldMk cId="2927218767" sldId="258"/>
+            <ac:spMk id="42" creationId="{C1DA38EA-1CFF-5F23-E10A-60E40B1F1D76}"/>
+          </ac:spMkLst>
+        </pc:spChg>
+        <pc:spChg chg="mod topLvl">
+          <ac:chgData name="Jonathan Rau" userId="01bd1429-ada3-4be3-b2f3-ae839e9d5ccc" providerId="ADAL" clId="{81BFAC01-EC3C-47A5-AFF3-09E0F97B7B12}" dt="2023-05-17T00:42:33.807" v="327" actId="554"/>
           <ac:spMkLst>
             <pc:docMk/>
             <pc:sldMk cId="2927218767" sldId="258"/>
             <ac:spMk id="44" creationId="{AF0DFB57-0EA5-1522-9EE9-03E1643EF3C4}"/>
           </ac:spMkLst>
         </pc:spChg>
-        <pc:spChg chg="mod">
-          <ac:chgData name="Jonathan Rau" userId="01bd1429-ada3-4be3-b2f3-ae839e9d5ccc" providerId="ADAL" clId="{81BFAC01-EC3C-47A5-AFF3-09E0F97B7B12}" dt="2023-05-15T00:42:28.894" v="22" actId="165"/>
+        <pc:spChg chg="mod topLvl">
+          <ac:chgData name="Jonathan Rau" userId="01bd1429-ada3-4be3-b2f3-ae839e9d5ccc" providerId="ADAL" clId="{81BFAC01-EC3C-47A5-AFF3-09E0F97B7B12}" dt="2023-05-17T00:42:33.807" v="327" actId="554"/>
           <ac:spMkLst>
             <pc:docMk/>
             <pc:sldMk cId="2927218767" sldId="258"/>
@@ -185,55 +289,143 @@
           </ac:spMkLst>
         </pc:spChg>
         <pc:spChg chg="mod topLvl">
-          <ac:chgData name="Jonathan Rau" userId="01bd1429-ada3-4be3-b2f3-ae839e9d5ccc" providerId="ADAL" clId="{81BFAC01-EC3C-47A5-AFF3-09E0F97B7B12}" dt="2023-05-15T00:42:28.894" v="22" actId="165"/>
+          <ac:chgData name="Jonathan Rau" userId="01bd1429-ada3-4be3-b2f3-ae839e9d5ccc" providerId="ADAL" clId="{81BFAC01-EC3C-47A5-AFF3-09E0F97B7B12}" dt="2023-05-17T00:37:47.637" v="220" actId="1076"/>
           <ac:spMkLst>
             <pc:docMk/>
             <pc:sldMk cId="2927218767" sldId="258"/>
             <ac:spMk id="47" creationId="{EDA5DF41-D325-4378-3FDC-CBE766C0E32E}"/>
           </ac:spMkLst>
         </pc:spChg>
+        <pc:spChg chg="add mod ord">
+          <ac:chgData name="Jonathan Rau" userId="01bd1429-ada3-4be3-b2f3-ae839e9d5ccc" providerId="ADAL" clId="{81BFAC01-EC3C-47A5-AFF3-09E0F97B7B12}" dt="2023-05-17T00:27:17.352" v="135" actId="164"/>
+          <ac:spMkLst>
+            <pc:docMk/>
+            <pc:sldMk cId="2927218767" sldId="258"/>
+            <ac:spMk id="49" creationId="{C283C2D1-7622-013F-23B4-6A5F810DFB12}"/>
+          </ac:spMkLst>
+        </pc:spChg>
         <pc:spChg chg="mod">
-          <ac:chgData name="Jonathan Rau" userId="01bd1429-ada3-4be3-b2f3-ae839e9d5ccc" providerId="ADAL" clId="{81BFAC01-EC3C-47A5-AFF3-09E0F97B7B12}" dt="2023-05-15T00:41:02.480" v="1" actId="14100"/>
+          <ac:chgData name="Jonathan Rau" userId="01bd1429-ada3-4be3-b2f3-ae839e9d5ccc" providerId="ADAL" clId="{81BFAC01-EC3C-47A5-AFF3-09E0F97B7B12}" dt="2023-05-17T00:33:06.691" v="145" actId="1076"/>
+          <ac:spMkLst>
+            <pc:docMk/>
+            <pc:sldMk cId="2927218767" sldId="258"/>
+            <ac:spMk id="51" creationId="{1693654B-B9C5-BB57-C5AF-C57E58130215}"/>
+          </ac:spMkLst>
+        </pc:spChg>
+        <pc:spChg chg="mod">
+          <ac:chgData name="Jonathan Rau" userId="01bd1429-ada3-4be3-b2f3-ae839e9d5ccc" providerId="ADAL" clId="{81BFAC01-EC3C-47A5-AFF3-09E0F97B7B12}" dt="2023-05-17T00:36:23.521" v="203" actId="14100"/>
           <ac:spMkLst>
             <pc:docMk/>
             <pc:sldMk cId="2927218767" sldId="258"/>
             <ac:spMk id="57" creationId="{87EC92A5-9254-25F8-0C42-0E676A517662}"/>
           </ac:spMkLst>
         </pc:spChg>
-        <pc:grpChg chg="mod topLvl">
-          <ac:chgData name="Jonathan Rau" userId="01bd1429-ada3-4be3-b2f3-ae839e9d5ccc" providerId="ADAL" clId="{81BFAC01-EC3C-47A5-AFF3-09E0F97B7B12}" dt="2023-05-15T00:42:28.894" v="22" actId="165"/>
+        <pc:spChg chg="mod">
+          <ac:chgData name="Jonathan Rau" userId="01bd1429-ada3-4be3-b2f3-ae839e9d5ccc" providerId="ADAL" clId="{81BFAC01-EC3C-47A5-AFF3-09E0F97B7B12}" dt="2023-05-17T00:27:17.906" v="136"/>
+          <ac:spMkLst>
+            <pc:docMk/>
+            <pc:sldMk cId="2927218767" sldId="258"/>
+            <ac:spMk id="58" creationId="{7D53848C-4F02-9DE4-51C4-5AF149C5558E}"/>
+          </ac:spMkLst>
+        </pc:spChg>
+        <pc:spChg chg="add mod">
+          <ac:chgData name="Jonathan Rau" userId="01bd1429-ada3-4be3-b2f3-ae839e9d5ccc" providerId="ADAL" clId="{81BFAC01-EC3C-47A5-AFF3-09E0F97B7B12}" dt="2023-05-17T00:35:23.494" v="190" actId="1076"/>
+          <ac:spMkLst>
+            <pc:docMk/>
+            <pc:sldMk cId="2927218767" sldId="258"/>
+            <ac:spMk id="63" creationId="{4C8F1166-317D-1DDF-0A35-7E87254180DC}"/>
+          </ac:spMkLst>
+        </pc:spChg>
+        <pc:spChg chg="add mod">
+          <ac:chgData name="Jonathan Rau" userId="01bd1429-ada3-4be3-b2f3-ae839e9d5ccc" providerId="ADAL" clId="{81BFAC01-EC3C-47A5-AFF3-09E0F97B7B12}" dt="2023-05-17T00:42:33.807" v="327" actId="554"/>
+          <ac:spMkLst>
+            <pc:docMk/>
+            <pc:sldMk cId="2927218767" sldId="258"/>
+            <ac:spMk id="1029" creationId="{D811A520-7264-4934-594F-B88FB3CB1538}"/>
+          </ac:spMkLst>
+        </pc:spChg>
+        <pc:spChg chg="add mod">
+          <ac:chgData name="Jonathan Rau" userId="01bd1429-ada3-4be3-b2f3-ae839e9d5ccc" providerId="ADAL" clId="{81BFAC01-EC3C-47A5-AFF3-09E0F97B7B12}" dt="2023-05-17T00:42:33.807" v="327" actId="554"/>
+          <ac:spMkLst>
+            <pc:docMk/>
+            <pc:sldMk cId="2927218767" sldId="258"/>
+            <ac:spMk id="1032" creationId="{A89816FC-B69F-1BC3-D26E-A9FBD4A1FB7C}"/>
+          </ac:spMkLst>
+        </pc:spChg>
+        <pc:spChg chg="add mod">
+          <ac:chgData name="Jonathan Rau" userId="01bd1429-ada3-4be3-b2f3-ae839e9d5ccc" providerId="ADAL" clId="{81BFAC01-EC3C-47A5-AFF3-09E0F97B7B12}" dt="2023-05-17T00:42:43.764" v="329" actId="1076"/>
+          <ac:spMkLst>
+            <pc:docMk/>
+            <pc:sldMk cId="2927218767" sldId="258"/>
+            <ac:spMk id="1033" creationId="{44868CD6-A658-7D5E-D668-C3C0F5679508}"/>
+          </ac:spMkLst>
+        </pc:spChg>
+        <pc:spChg chg="add mod">
+          <ac:chgData name="Jonathan Rau" userId="01bd1429-ada3-4be3-b2f3-ae839e9d5ccc" providerId="ADAL" clId="{81BFAC01-EC3C-47A5-AFF3-09E0F97B7B12}" dt="2023-05-17T00:42:47.603" v="331" actId="1076"/>
+          <ac:spMkLst>
+            <pc:docMk/>
+            <pc:sldMk cId="2927218767" sldId="258"/>
+            <ac:spMk id="1035" creationId="{7B10FD35-E90C-F251-3773-D31CEAD0A08F}"/>
+          </ac:spMkLst>
+        </pc:spChg>
+        <pc:grpChg chg="mod">
+          <ac:chgData name="Jonathan Rau" userId="01bd1429-ada3-4be3-b2f3-ae839e9d5ccc" providerId="ADAL" clId="{81BFAC01-EC3C-47A5-AFF3-09E0F97B7B12}" dt="2023-05-17T00:36:09.077" v="201" actId="552"/>
+          <ac:grpSpMkLst>
+            <pc:docMk/>
+            <pc:sldMk cId="2927218767" sldId="258"/>
+            <ac:grpSpMk id="10" creationId="{7BB619AD-693A-3B9C-6D20-247888B0204F}"/>
+          </ac:grpSpMkLst>
+        </pc:grpChg>
+        <pc:grpChg chg="mod">
+          <ac:chgData name="Jonathan Rau" userId="01bd1429-ada3-4be3-b2f3-ae839e9d5ccc" providerId="ADAL" clId="{81BFAC01-EC3C-47A5-AFF3-09E0F97B7B12}" dt="2023-05-17T00:36:16.668" v="202" actId="553"/>
+          <ac:grpSpMkLst>
+            <pc:docMk/>
+            <pc:sldMk cId="2927218767" sldId="258"/>
+            <ac:grpSpMk id="21" creationId="{3710CA1F-8C31-5042-8A25-C3AD5A9F72C9}"/>
+          </ac:grpSpMkLst>
+        </pc:grpChg>
+        <pc:grpChg chg="mod">
+          <ac:chgData name="Jonathan Rau" userId="01bd1429-ada3-4be3-b2f3-ae839e9d5ccc" providerId="ADAL" clId="{81BFAC01-EC3C-47A5-AFF3-09E0F97B7B12}" dt="2023-05-17T00:24:33.663" v="65" actId="12789"/>
+          <ac:grpSpMkLst>
+            <pc:docMk/>
+            <pc:sldMk cId="2927218767" sldId="258"/>
+            <ac:grpSpMk id="24" creationId="{5AFCC57C-5A45-6C97-6F50-C7F1EA3CE99B}"/>
+          </ac:grpSpMkLst>
+        </pc:grpChg>
+        <pc:grpChg chg="del mod topLvl">
+          <ac:chgData name="Jonathan Rau" userId="01bd1429-ada3-4be3-b2f3-ae839e9d5ccc" providerId="ADAL" clId="{81BFAC01-EC3C-47A5-AFF3-09E0F97B7B12}" dt="2023-05-17T00:25:50.027" v="112" actId="165"/>
           <ac:grpSpMkLst>
             <pc:docMk/>
             <pc:sldMk cId="2927218767" sldId="258"/>
             <ac:grpSpMk id="26" creationId="{6BAEA63F-A29D-8D2F-2B83-0919927ED399}"/>
           </ac:grpSpMkLst>
         </pc:grpChg>
-        <pc:grpChg chg="mod topLvl">
-          <ac:chgData name="Jonathan Rau" userId="01bd1429-ada3-4be3-b2f3-ae839e9d5ccc" providerId="ADAL" clId="{81BFAC01-EC3C-47A5-AFF3-09E0F97B7B12}" dt="2023-05-15T00:42:28.894" v="22" actId="165"/>
+        <pc:grpChg chg="del mod topLvl">
+          <ac:chgData name="Jonathan Rau" userId="01bd1429-ada3-4be3-b2f3-ae839e9d5ccc" providerId="ADAL" clId="{81BFAC01-EC3C-47A5-AFF3-09E0F97B7B12}" dt="2023-05-17T00:25:50.027" v="112" actId="165"/>
           <ac:grpSpMkLst>
             <pc:docMk/>
             <pc:sldMk cId="2927218767" sldId="258"/>
             <ac:grpSpMk id="29" creationId="{6C2D2B36-7017-0273-DE0A-222DC8FB537F}"/>
           </ac:grpSpMkLst>
         </pc:grpChg>
-        <pc:grpChg chg="mod topLvl">
-          <ac:chgData name="Jonathan Rau" userId="01bd1429-ada3-4be3-b2f3-ae839e9d5ccc" providerId="ADAL" clId="{81BFAC01-EC3C-47A5-AFF3-09E0F97B7B12}" dt="2023-05-15T00:42:28.894" v="22" actId="165"/>
+        <pc:grpChg chg="del mod topLvl">
+          <ac:chgData name="Jonathan Rau" userId="01bd1429-ada3-4be3-b2f3-ae839e9d5ccc" providerId="ADAL" clId="{81BFAC01-EC3C-47A5-AFF3-09E0F97B7B12}" dt="2023-05-17T00:25:50.027" v="112" actId="165"/>
           <ac:grpSpMkLst>
             <pc:docMk/>
             <pc:sldMk cId="2927218767" sldId="258"/>
             <ac:grpSpMk id="30" creationId="{E30E038F-7FA5-A920-3A09-7E35AF378EA6}"/>
           </ac:grpSpMkLst>
         </pc:grpChg>
-        <pc:grpChg chg="mod topLvl">
-          <ac:chgData name="Jonathan Rau" userId="01bd1429-ada3-4be3-b2f3-ae839e9d5ccc" providerId="ADAL" clId="{81BFAC01-EC3C-47A5-AFF3-09E0F97B7B12}" dt="2023-05-15T00:42:28.894" v="22" actId="165"/>
+        <pc:grpChg chg="del mod topLvl">
+          <ac:chgData name="Jonathan Rau" userId="01bd1429-ada3-4be3-b2f3-ae839e9d5ccc" providerId="ADAL" clId="{81BFAC01-EC3C-47A5-AFF3-09E0F97B7B12}" dt="2023-05-17T00:25:50.027" v="112" actId="165"/>
           <ac:grpSpMkLst>
             <pc:docMk/>
             <pc:sldMk cId="2927218767" sldId="258"/>
             <ac:grpSpMk id="32" creationId="{61FE9FAF-8CEE-A9FC-9802-5B6239F41C7B}"/>
           </ac:grpSpMkLst>
         </pc:grpChg>
-        <pc:grpChg chg="mod topLvl">
-          <ac:chgData name="Jonathan Rau" userId="01bd1429-ada3-4be3-b2f3-ae839e9d5ccc" providerId="ADAL" clId="{81BFAC01-EC3C-47A5-AFF3-09E0F97B7B12}" dt="2023-05-15T00:42:28.894" v="22" actId="165"/>
+        <pc:grpChg chg="del mod topLvl">
+          <ac:chgData name="Jonathan Rau" userId="01bd1429-ada3-4be3-b2f3-ae839e9d5ccc" providerId="ADAL" clId="{81BFAC01-EC3C-47A5-AFF3-09E0F97B7B12}" dt="2023-05-17T00:25:50.027" v="112" actId="165"/>
           <ac:grpSpMkLst>
             <pc:docMk/>
             <pc:sldMk cId="2927218767" sldId="258"/>
@@ -241,53 +433,301 @@
           </ac:grpSpMkLst>
         </pc:grpChg>
         <pc:grpChg chg="add del mod">
-          <ac:chgData name="Jonathan Rau" userId="01bd1429-ada3-4be3-b2f3-ae839e9d5ccc" providerId="ADAL" clId="{81BFAC01-EC3C-47A5-AFF3-09E0F97B7B12}" dt="2023-05-15T00:42:28.894" v="22" actId="165"/>
+          <ac:chgData name="Jonathan Rau" userId="01bd1429-ada3-4be3-b2f3-ae839e9d5ccc" providerId="ADAL" clId="{81BFAC01-EC3C-47A5-AFF3-09E0F97B7B12}" dt="2023-05-17T00:25:14.761" v="104" actId="165"/>
           <ac:grpSpMkLst>
             <pc:docMk/>
             <pc:sldMk cId="2927218767" sldId="258"/>
             <ac:grpSpMk id="34" creationId="{B0B80858-9883-3F5E-0753-1842B54739B1}"/>
           </ac:grpSpMkLst>
         </pc:grpChg>
+        <pc:grpChg chg="add del mod">
+          <ac:chgData name="Jonathan Rau" userId="01bd1429-ada3-4be3-b2f3-ae839e9d5ccc" providerId="ADAL" clId="{81BFAC01-EC3C-47A5-AFF3-09E0F97B7B12}" dt="2023-05-17T00:27:21.907" v="140" actId="478"/>
+          <ac:grpSpMkLst>
+            <pc:docMk/>
+            <pc:sldMk cId="2927218767" sldId="258"/>
+            <ac:grpSpMk id="54" creationId="{C51952BB-F81A-0762-AC0E-86CB73DDDEDE}"/>
+          </ac:grpSpMkLst>
+        </pc:grpChg>
+        <pc:grpChg chg="add del mod">
+          <ac:chgData name="Jonathan Rau" userId="01bd1429-ada3-4be3-b2f3-ae839e9d5ccc" providerId="ADAL" clId="{81BFAC01-EC3C-47A5-AFF3-09E0F97B7B12}" dt="2023-05-17T00:27:19.406" v="137"/>
+          <ac:grpSpMkLst>
+            <pc:docMk/>
+            <pc:sldMk cId="2927218767" sldId="258"/>
+            <ac:grpSpMk id="56" creationId="{62092A8F-8713-1E66-3181-2095E6DE189A}"/>
+          </ac:grpSpMkLst>
+        </pc:grpChg>
+        <pc:picChg chg="add mod">
+          <ac:chgData name="Jonathan Rau" userId="01bd1429-ada3-4be3-b2f3-ae839e9d5ccc" providerId="ADAL" clId="{81BFAC01-EC3C-47A5-AFF3-09E0F97B7B12}" dt="2023-05-17T00:36:16.668" v="202" actId="553"/>
+          <ac:picMkLst>
+            <pc:docMk/>
+            <pc:sldMk cId="2927218767" sldId="258"/>
+            <ac:picMk id="3" creationId="{B2203F62-B0B5-3ECC-F801-BAE4FC12F9F0}"/>
+          </ac:picMkLst>
+        </pc:picChg>
         <pc:picChg chg="mod">
-          <ac:chgData name="Jonathan Rau" userId="01bd1429-ada3-4be3-b2f3-ae839e9d5ccc" providerId="ADAL" clId="{81BFAC01-EC3C-47A5-AFF3-09E0F97B7B12}" dt="2023-05-15T00:42:28.894" v="22" actId="165"/>
+          <ac:chgData name="Jonathan Rau" userId="01bd1429-ada3-4be3-b2f3-ae839e9d5ccc" providerId="ADAL" clId="{81BFAC01-EC3C-47A5-AFF3-09E0F97B7B12}" dt="2023-05-17T00:36:09.077" v="201" actId="552"/>
+          <ac:picMkLst>
+            <pc:docMk/>
+            <pc:sldMk cId="2927218767" sldId="258"/>
+            <ac:picMk id="6" creationId="{D3A71050-9A8D-D474-72E2-01BDD0982569}"/>
+          </ac:picMkLst>
+        </pc:picChg>
+        <pc:picChg chg="mod">
+          <ac:chgData name="Jonathan Rau" userId="01bd1429-ada3-4be3-b2f3-ae839e9d5ccc" providerId="ADAL" clId="{81BFAC01-EC3C-47A5-AFF3-09E0F97B7B12}" dt="2023-05-17T00:36:09.077" v="201" actId="552"/>
+          <ac:picMkLst>
+            <pc:docMk/>
+            <pc:sldMk cId="2927218767" sldId="258"/>
+            <ac:picMk id="8" creationId="{521D7AAB-D2BB-6EAD-3EDF-F0812CA538DE}"/>
+          </ac:picMkLst>
+        </pc:picChg>
+        <pc:picChg chg="add del mod">
+          <ac:chgData name="Jonathan Rau" userId="01bd1429-ada3-4be3-b2f3-ae839e9d5ccc" providerId="ADAL" clId="{81BFAC01-EC3C-47A5-AFF3-09E0F97B7B12}" dt="2023-05-17T00:35:37.808" v="191" actId="478"/>
+          <ac:picMkLst>
+            <pc:docMk/>
+            <pc:sldMk cId="2927218767" sldId="258"/>
+            <ac:picMk id="11" creationId="{D418EA10-B69A-67EE-5365-0563704D2E0A}"/>
+          </ac:picMkLst>
+        </pc:picChg>
+        <pc:picChg chg="add mod">
+          <ac:chgData name="Jonathan Rau" userId="01bd1429-ada3-4be3-b2f3-ae839e9d5ccc" providerId="ADAL" clId="{81BFAC01-EC3C-47A5-AFF3-09E0F97B7B12}" dt="2023-05-17T00:22:51.004" v="49" actId="571"/>
+          <ac:picMkLst>
+            <pc:docMk/>
+            <pc:sldMk cId="2927218767" sldId="258"/>
+            <ac:picMk id="13" creationId="{4177623B-20ED-1A6B-6636-961B5A73F997}"/>
+          </ac:picMkLst>
+        </pc:picChg>
+        <pc:picChg chg="add mod">
+          <ac:chgData name="Jonathan Rau" userId="01bd1429-ada3-4be3-b2f3-ae839e9d5ccc" providerId="ADAL" clId="{81BFAC01-EC3C-47A5-AFF3-09E0F97B7B12}" dt="2023-05-17T00:22:51.004" v="49" actId="571"/>
+          <ac:picMkLst>
+            <pc:docMk/>
+            <pc:sldMk cId="2927218767" sldId="258"/>
+            <ac:picMk id="14" creationId="{11831F83-B7E8-E39F-0B97-FD45B487E616}"/>
+          </ac:picMkLst>
+        </pc:picChg>
+        <pc:picChg chg="mod topLvl">
+          <ac:chgData name="Jonathan Rau" userId="01bd1429-ada3-4be3-b2f3-ae839e9d5ccc" providerId="ADAL" clId="{81BFAC01-EC3C-47A5-AFF3-09E0F97B7B12}" dt="2023-05-17T00:41:15.912" v="313" actId="408"/>
           <ac:picMkLst>
             <pc:docMk/>
             <pc:sldMk cId="2927218767" sldId="258"/>
             <ac:picMk id="35" creationId="{D2DAF613-D8BD-3380-58A8-5BAB202AF083}"/>
           </ac:picMkLst>
         </pc:picChg>
-        <pc:picChg chg="mod">
-          <ac:chgData name="Jonathan Rau" userId="01bd1429-ada3-4be3-b2f3-ae839e9d5ccc" providerId="ADAL" clId="{81BFAC01-EC3C-47A5-AFF3-09E0F97B7B12}" dt="2023-05-15T00:42:28.894" v="22" actId="165"/>
+        <pc:picChg chg="add mod">
+          <ac:chgData name="Jonathan Rau" userId="01bd1429-ada3-4be3-b2f3-ae839e9d5ccc" providerId="ADAL" clId="{81BFAC01-EC3C-47A5-AFF3-09E0F97B7B12}" dt="2023-05-17T00:27:17.352" v="135" actId="164"/>
+          <ac:picMkLst>
+            <pc:docMk/>
+            <pc:sldMk cId="2927218767" sldId="258"/>
+            <ac:picMk id="37" creationId="{83843397-451E-433B-8160-B7FE3BFFDBEA}"/>
+          </ac:picMkLst>
+        </pc:picChg>
+        <pc:picChg chg="add mod">
+          <ac:chgData name="Jonathan Rau" userId="01bd1429-ada3-4be3-b2f3-ae839e9d5ccc" providerId="ADAL" clId="{81BFAC01-EC3C-47A5-AFF3-09E0F97B7B12}" dt="2023-05-17T00:41:15.912" v="313" actId="408"/>
+          <ac:picMkLst>
+            <pc:docMk/>
+            <pc:sldMk cId="2927218767" sldId="258"/>
+            <ac:picMk id="38" creationId="{0A7F71D9-2FE9-EA9E-D0F5-34648CAD34C9}"/>
+          </ac:picMkLst>
+        </pc:picChg>
+        <pc:picChg chg="mod topLvl">
+          <ac:chgData name="Jonathan Rau" userId="01bd1429-ada3-4be3-b2f3-ae839e9d5ccc" providerId="ADAL" clId="{81BFAC01-EC3C-47A5-AFF3-09E0F97B7B12}" dt="2023-05-17T00:41:15.912" v="313" actId="408"/>
           <ac:picMkLst>
             <pc:docMk/>
             <pc:sldMk cId="2927218767" sldId="258"/>
             <ac:picMk id="39" creationId="{0B15E7EF-81AB-9F76-740A-808EC8C56C65}"/>
           </ac:picMkLst>
         </pc:picChg>
-        <pc:picChg chg="mod">
-          <ac:chgData name="Jonathan Rau" userId="01bd1429-ada3-4be3-b2f3-ae839e9d5ccc" providerId="ADAL" clId="{81BFAC01-EC3C-47A5-AFF3-09E0F97B7B12}" dt="2023-05-15T00:42:28.894" v="22" actId="165"/>
+        <pc:picChg chg="mod topLvl">
+          <ac:chgData name="Jonathan Rau" userId="01bd1429-ada3-4be3-b2f3-ae839e9d5ccc" providerId="ADAL" clId="{81BFAC01-EC3C-47A5-AFF3-09E0F97B7B12}" dt="2023-05-17T00:41:15.912" v="313" actId="408"/>
           <ac:picMkLst>
             <pc:docMk/>
             <pc:sldMk cId="2927218767" sldId="258"/>
             <ac:picMk id="43" creationId="{46C1D956-00C8-E3E3-A65B-3466292AEC94}"/>
           </ac:picMkLst>
         </pc:picChg>
-        <pc:picChg chg="mod">
-          <ac:chgData name="Jonathan Rau" userId="01bd1429-ada3-4be3-b2f3-ae839e9d5ccc" providerId="ADAL" clId="{81BFAC01-EC3C-47A5-AFF3-09E0F97B7B12}" dt="2023-05-15T00:42:28.894" v="22" actId="165"/>
+        <pc:picChg chg="mod topLvl">
+          <ac:chgData name="Jonathan Rau" userId="01bd1429-ada3-4be3-b2f3-ae839e9d5ccc" providerId="ADAL" clId="{81BFAC01-EC3C-47A5-AFF3-09E0F97B7B12}" dt="2023-05-17T00:41:15.912" v="313" actId="408"/>
           <ac:picMkLst>
             <pc:docMk/>
             <pc:sldMk cId="2927218767" sldId="258"/>
             <ac:picMk id="46" creationId="{6617A1D9-409F-15DE-CC52-DE413211DE73}"/>
           </ac:picMkLst>
         </pc:picChg>
+        <pc:picChg chg="add del mod">
+          <ac:chgData name="Jonathan Rau" userId="01bd1429-ada3-4be3-b2f3-ae839e9d5ccc" providerId="ADAL" clId="{81BFAC01-EC3C-47A5-AFF3-09E0F97B7B12}" dt="2023-05-17T00:26:37.468" v="118"/>
+          <ac:picMkLst>
+            <pc:docMk/>
+            <pc:sldMk cId="2927218767" sldId="258"/>
+            <ac:picMk id="48" creationId="{A4564476-731A-47FC-E4FF-56B1FB190235}"/>
+          </ac:picMkLst>
+        </pc:picChg>
         <pc:picChg chg="mod">
-          <ac:chgData name="Jonathan Rau" userId="01bd1429-ada3-4be3-b2f3-ae839e9d5ccc" providerId="ADAL" clId="{81BFAC01-EC3C-47A5-AFF3-09E0F97B7B12}" dt="2023-05-15T00:42:28.894" v="22" actId="165"/>
+          <ac:chgData name="Jonathan Rau" userId="01bd1429-ada3-4be3-b2f3-ae839e9d5ccc" providerId="ADAL" clId="{81BFAC01-EC3C-47A5-AFF3-09E0F97B7B12}" dt="2023-05-17T00:24:33.663" v="65" actId="12789"/>
+          <ac:picMkLst>
+            <pc:docMk/>
+            <pc:sldMk cId="2927218767" sldId="258"/>
+            <ac:picMk id="50" creationId="{73D0EF48-EE4F-CAD8-9887-48C5E7772023}"/>
+          </ac:picMkLst>
+        </pc:picChg>
+        <pc:picChg chg="mod">
+          <ac:chgData name="Jonathan Rau" userId="01bd1429-ada3-4be3-b2f3-ae839e9d5ccc" providerId="ADAL" clId="{81BFAC01-EC3C-47A5-AFF3-09E0F97B7B12}" dt="2023-05-17T00:24:33.663" v="65" actId="12789"/>
+          <ac:picMkLst>
+            <pc:docMk/>
+            <pc:sldMk cId="2927218767" sldId="258"/>
+            <ac:picMk id="53" creationId="{8903D04C-6DA0-E7D0-7EDF-6AE6E6C6EF0E}"/>
+          </ac:picMkLst>
+        </pc:picChg>
+        <pc:picChg chg="mod">
+          <ac:chgData name="Jonathan Rau" userId="01bd1429-ada3-4be3-b2f3-ae839e9d5ccc" providerId="ADAL" clId="{81BFAC01-EC3C-47A5-AFF3-09E0F97B7B12}" dt="2023-05-17T00:20:11.936" v="32" actId="14100"/>
+          <ac:picMkLst>
+            <pc:docMk/>
+            <pc:sldMk cId="2927218767" sldId="258"/>
+            <ac:picMk id="55" creationId="{5FB33C35-4ABC-C3EF-7377-9B5091661884}"/>
+          </ac:picMkLst>
+        </pc:picChg>
+        <pc:picChg chg="mod">
+          <ac:chgData name="Jonathan Rau" userId="01bd1429-ada3-4be3-b2f3-ae839e9d5ccc" providerId="ADAL" clId="{81BFAC01-EC3C-47A5-AFF3-09E0F97B7B12}" dt="2023-05-17T00:27:17.906" v="136"/>
+          <ac:picMkLst>
+            <pc:docMk/>
+            <pc:sldMk cId="2927218767" sldId="258"/>
+            <ac:picMk id="59" creationId="{A8CFE5E6-D816-FCF3-7807-3A5F246AFE62}"/>
+          </ac:picMkLst>
+        </pc:picChg>
+        <pc:picChg chg="add mod">
+          <ac:chgData name="Jonathan Rau" userId="01bd1429-ada3-4be3-b2f3-ae839e9d5ccc" providerId="ADAL" clId="{81BFAC01-EC3C-47A5-AFF3-09E0F97B7B12}" dt="2023-05-17T00:41:15.912" v="313" actId="408"/>
+          <ac:picMkLst>
+            <pc:docMk/>
+            <pc:sldMk cId="2927218767" sldId="258"/>
+            <ac:picMk id="60" creationId="{67EC8B23-2028-B168-86CF-367439AADE84}"/>
+          </ac:picMkLst>
+        </pc:picChg>
+        <pc:picChg chg="add mod">
+          <ac:chgData name="Jonathan Rau" userId="01bd1429-ada3-4be3-b2f3-ae839e9d5ccc" providerId="ADAL" clId="{81BFAC01-EC3C-47A5-AFF3-09E0F97B7B12}" dt="2023-05-17T00:35:09.067" v="187" actId="1076"/>
+          <ac:picMkLst>
+            <pc:docMk/>
+            <pc:sldMk cId="2927218767" sldId="258"/>
+            <ac:picMk id="62" creationId="{45CC141F-4B90-8FF2-8929-8C2F0CCEE089}"/>
+          </ac:picMkLst>
+        </pc:picChg>
+        <pc:picChg chg="add mod">
+          <ac:chgData name="Jonathan Rau" userId="01bd1429-ada3-4be3-b2f3-ae839e9d5ccc" providerId="ADAL" clId="{81BFAC01-EC3C-47A5-AFF3-09E0F97B7B12}" dt="2023-05-17T00:36:09.077" v="201" actId="552"/>
+          <ac:picMkLst>
+            <pc:docMk/>
+            <pc:sldMk cId="2927218767" sldId="258"/>
+            <ac:picMk id="1024" creationId="{4F33251F-56E6-35B2-121C-37506A1E71F8}"/>
+          </ac:picMkLst>
+        </pc:picChg>
+        <pc:picChg chg="mod topLvl">
+          <ac:chgData name="Jonathan Rau" userId="01bd1429-ada3-4be3-b2f3-ae839e9d5ccc" providerId="ADAL" clId="{81BFAC01-EC3C-47A5-AFF3-09E0F97B7B12}" dt="2023-05-17T00:42:06.277" v="322" actId="1076"/>
           <ac:picMkLst>
             <pc:docMk/>
             <pc:sldMk cId="2927218767" sldId="258"/>
             <ac:picMk id="1026" creationId="{EEFAA6CA-7B0D-3179-A8B7-CE0BB5626AD2}"/>
           </ac:picMkLst>
         </pc:picChg>
+        <pc:picChg chg="add mod">
+          <ac:chgData name="Jonathan Rau" userId="01bd1429-ada3-4be3-b2f3-ae839e9d5ccc" providerId="ADAL" clId="{81BFAC01-EC3C-47A5-AFF3-09E0F97B7B12}" dt="2023-05-17T00:41:15.912" v="313" actId="408"/>
+          <ac:picMkLst>
+            <pc:docMk/>
+            <pc:sldMk cId="2927218767" sldId="258"/>
+            <ac:picMk id="1027" creationId="{C35311AC-E12E-6956-D63C-7D915D9009EF}"/>
+          </ac:picMkLst>
+        </pc:picChg>
+        <pc:picChg chg="mod">
+          <ac:chgData name="Jonathan Rau" userId="01bd1429-ada3-4be3-b2f3-ae839e9d5ccc" providerId="ADAL" clId="{81BFAC01-EC3C-47A5-AFF3-09E0F97B7B12}" dt="2023-05-17T00:20:23.333" v="33" actId="1076"/>
+          <ac:picMkLst>
+            <pc:docMk/>
+            <pc:sldMk cId="2927218767" sldId="258"/>
+            <ac:picMk id="1028" creationId="{07E8CB6A-59CD-2711-37CA-9505B61B0841}"/>
+          </ac:picMkLst>
+        </pc:picChg>
+        <pc:picChg chg="mod">
+          <ac:chgData name="Jonathan Rau" userId="01bd1429-ada3-4be3-b2f3-ae839e9d5ccc" providerId="ADAL" clId="{81BFAC01-EC3C-47A5-AFF3-09E0F97B7B12}" dt="2023-05-17T00:24:33.663" v="65" actId="12789"/>
+          <ac:picMkLst>
+            <pc:docMk/>
+            <pc:sldMk cId="2927218767" sldId="258"/>
+            <ac:picMk id="1030" creationId="{ED0DC73D-5646-3483-56E7-858CFC2DE900}"/>
+          </ac:picMkLst>
+        </pc:picChg>
+        <pc:picChg chg="add mod">
+          <ac:chgData name="Jonathan Rau" userId="01bd1429-ada3-4be3-b2f3-ae839e9d5ccc" providerId="ADAL" clId="{81BFAC01-EC3C-47A5-AFF3-09E0F97B7B12}" dt="2023-05-17T00:41:15.912" v="313" actId="408"/>
+          <ac:picMkLst>
+            <pc:docMk/>
+            <pc:sldMk cId="2927218767" sldId="258"/>
+            <ac:picMk id="1031" creationId="{CD18E920-16E4-6328-6DB3-B1C85C5C0463}"/>
+          </ac:picMkLst>
+        </pc:picChg>
+        <pc:picChg chg="mod">
+          <ac:chgData name="Jonathan Rau" userId="01bd1429-ada3-4be3-b2f3-ae839e9d5ccc" providerId="ADAL" clId="{81BFAC01-EC3C-47A5-AFF3-09E0F97B7B12}" dt="2023-05-17T00:23:15.468" v="54" actId="1076"/>
+          <ac:picMkLst>
+            <pc:docMk/>
+            <pc:sldMk cId="2927218767" sldId="258"/>
+            <ac:picMk id="1034" creationId="{DCB85329-15A2-70C1-24B7-F19FB2212E48}"/>
+          </ac:picMkLst>
+        </pc:picChg>
+        <pc:picChg chg="mod">
+          <ac:chgData name="Jonathan Rau" userId="01bd1429-ada3-4be3-b2f3-ae839e9d5ccc" providerId="ADAL" clId="{81BFAC01-EC3C-47A5-AFF3-09E0F97B7B12}" dt="2023-05-17T00:23:26.403" v="56" actId="1076"/>
+          <ac:picMkLst>
+            <pc:docMk/>
+            <pc:sldMk cId="2927218767" sldId="258"/>
+            <ac:picMk id="1036" creationId="{496A2C14-BC60-9D5D-ABEA-6629D23751CC}"/>
+          </ac:picMkLst>
+        </pc:picChg>
+        <pc:picChg chg="mod">
+          <ac:chgData name="Jonathan Rau" userId="01bd1429-ada3-4be3-b2f3-ae839e9d5ccc" providerId="ADAL" clId="{81BFAC01-EC3C-47A5-AFF3-09E0F97B7B12}" dt="2023-05-17T00:22:42.053" v="45" actId="552"/>
+          <ac:picMkLst>
+            <pc:docMk/>
+            <pc:sldMk cId="2927218767" sldId="258"/>
+            <ac:picMk id="1040" creationId="{DC856B39-E488-167A-CF4E-0B57775F3A28}"/>
+          </ac:picMkLst>
+        </pc:picChg>
+        <pc:picChg chg="mod">
+          <ac:chgData name="Jonathan Rau" userId="01bd1429-ada3-4be3-b2f3-ae839e9d5ccc" providerId="ADAL" clId="{81BFAC01-EC3C-47A5-AFF3-09E0F97B7B12}" dt="2023-05-17T00:36:16.668" v="202" actId="553"/>
+          <ac:picMkLst>
+            <pc:docMk/>
+            <pc:sldMk cId="2927218767" sldId="258"/>
+            <ac:picMk id="1042" creationId="{38EDB2A1-0556-030E-BFBC-A4AC66DC2B57}"/>
+          </ac:picMkLst>
+        </pc:picChg>
+        <pc:picChg chg="mod">
+          <ac:chgData name="Jonathan Rau" userId="01bd1429-ada3-4be3-b2f3-ae839e9d5ccc" providerId="ADAL" clId="{81BFAC01-EC3C-47A5-AFF3-09E0F97B7B12}" dt="2023-05-17T00:24:33.663" v="65" actId="12789"/>
+          <ac:picMkLst>
+            <pc:docMk/>
+            <pc:sldMk cId="2927218767" sldId="258"/>
+            <ac:picMk id="1044" creationId="{568F28A0-1D11-A2E1-AD71-20DEEE9FAF32}"/>
+          </ac:picMkLst>
+        </pc:picChg>
+        <pc:cxnChg chg="mod">
+          <ac:chgData name="Jonathan Rau" userId="01bd1429-ada3-4be3-b2f3-ae839e9d5ccc" providerId="ADAL" clId="{81BFAC01-EC3C-47A5-AFF3-09E0F97B7B12}" dt="2023-05-17T00:36:09.077" v="201" actId="552"/>
+          <ac:cxnSpMkLst>
+            <pc:docMk/>
+            <pc:sldMk cId="2927218767" sldId="258"/>
+            <ac:cxnSpMk id="27" creationId="{61E8C62B-50C0-3EC7-F385-8397A4D38430}"/>
+          </ac:cxnSpMkLst>
+        </pc:cxnChg>
+        <pc:cxnChg chg="mod">
+          <ac:chgData name="Jonathan Rau" userId="01bd1429-ada3-4be3-b2f3-ae839e9d5ccc" providerId="ADAL" clId="{81BFAC01-EC3C-47A5-AFF3-09E0F97B7B12}" dt="2023-05-17T00:24:56.523" v="80" actId="12788"/>
+          <ac:cxnSpMkLst>
+            <pc:docMk/>
+            <pc:sldMk cId="2927218767" sldId="258"/>
+            <ac:cxnSpMk id="28" creationId="{8EBD9BCC-9CC5-5009-83BE-6623A4D8D15B}"/>
+          </ac:cxnSpMkLst>
+        </pc:cxnChg>
+        <pc:cxnChg chg="mod">
+          <ac:chgData name="Jonathan Rau" userId="01bd1429-ada3-4be3-b2f3-ae839e9d5ccc" providerId="ADAL" clId="{81BFAC01-EC3C-47A5-AFF3-09E0F97B7B12}" dt="2023-05-17T00:36:16.668" v="202" actId="553"/>
+          <ac:cxnSpMkLst>
+            <pc:docMk/>
+            <pc:sldMk cId="2927218767" sldId="258"/>
+            <ac:cxnSpMk id="31" creationId="{7301F961-8B38-8B35-35DF-F4E2017D427A}"/>
+          </ac:cxnSpMkLst>
+        </pc:cxnChg>
+        <pc:cxnChg chg="mod">
+          <ac:chgData name="Jonathan Rau" userId="01bd1429-ada3-4be3-b2f3-ae839e9d5ccc" providerId="ADAL" clId="{81BFAC01-EC3C-47A5-AFF3-09E0F97B7B12}" dt="2023-05-17T00:33:06.691" v="145" actId="1076"/>
+          <ac:cxnSpMkLst>
+            <pc:docMk/>
+            <pc:sldMk cId="2927218767" sldId="258"/>
+            <ac:cxnSpMk id="52" creationId="{951CB380-36EC-ADD9-7F54-C01D45161AAF}"/>
+          </ac:cxnSpMkLst>
+        </pc:cxnChg>
       </pc:sldChg>
     </pc:docChg>
   </pc:docChgLst>
@@ -1361,7 +1801,7 @@
           <a:p>
             <a:fld id="{A3104859-06A7-4B6C-9EBE-0886FFE8171A}" type="datetimeFigureOut">
               <a:rPr lang="en-US" smtClean="0"/>
-              <a:t>5/14/2023</a:t>
+              <a:t>5/16/2023</a:t>
             </a:fld>
             <a:endParaRPr lang="en-US"/>
           </a:p>
@@ -1559,7 +1999,7 @@
           <a:p>
             <a:fld id="{A3104859-06A7-4B6C-9EBE-0886FFE8171A}" type="datetimeFigureOut">
               <a:rPr lang="en-US" smtClean="0"/>
-              <a:t>5/14/2023</a:t>
+              <a:t>5/16/2023</a:t>
             </a:fld>
             <a:endParaRPr lang="en-US"/>
           </a:p>
@@ -1767,7 +2207,7 @@
           <a:p>
             <a:fld id="{A3104859-06A7-4B6C-9EBE-0886FFE8171A}" type="datetimeFigureOut">
               <a:rPr lang="en-US" smtClean="0"/>
-              <a:t>5/14/2023</a:t>
+              <a:t>5/16/2023</a:t>
             </a:fld>
             <a:endParaRPr lang="en-US"/>
           </a:p>
@@ -1965,7 +2405,7 @@
           <a:p>
             <a:fld id="{A3104859-06A7-4B6C-9EBE-0886FFE8171A}" type="datetimeFigureOut">
               <a:rPr lang="en-US" smtClean="0"/>
-              <a:t>5/14/2023</a:t>
+              <a:t>5/16/2023</a:t>
             </a:fld>
             <a:endParaRPr lang="en-US"/>
           </a:p>
@@ -2240,7 +2680,7 @@
           <a:p>
             <a:fld id="{A3104859-06A7-4B6C-9EBE-0886FFE8171A}" type="datetimeFigureOut">
               <a:rPr lang="en-US" smtClean="0"/>
-              <a:t>5/14/2023</a:t>
+              <a:t>5/16/2023</a:t>
             </a:fld>
             <a:endParaRPr lang="en-US"/>
           </a:p>
@@ -2505,7 +2945,7 @@
           <a:p>
             <a:fld id="{A3104859-06A7-4B6C-9EBE-0886FFE8171A}" type="datetimeFigureOut">
               <a:rPr lang="en-US" smtClean="0"/>
-              <a:t>5/14/2023</a:t>
+              <a:t>5/16/2023</a:t>
             </a:fld>
             <a:endParaRPr lang="en-US"/>
           </a:p>
@@ -2917,7 +3357,7 @@
           <a:p>
             <a:fld id="{A3104859-06A7-4B6C-9EBE-0886FFE8171A}" type="datetimeFigureOut">
               <a:rPr lang="en-US" smtClean="0"/>
-              <a:t>5/14/2023</a:t>
+              <a:t>5/16/2023</a:t>
             </a:fld>
             <a:endParaRPr lang="en-US"/>
           </a:p>
@@ -3058,7 +3498,7 @@
           <a:p>
             <a:fld id="{A3104859-06A7-4B6C-9EBE-0886FFE8171A}" type="datetimeFigureOut">
               <a:rPr lang="en-US" smtClean="0"/>
-              <a:t>5/14/2023</a:t>
+              <a:t>5/16/2023</a:t>
             </a:fld>
             <a:endParaRPr lang="en-US"/>
           </a:p>
@@ -3171,7 +3611,7 @@
           <a:p>
             <a:fld id="{A3104859-06A7-4B6C-9EBE-0886FFE8171A}" type="datetimeFigureOut">
               <a:rPr lang="en-US" smtClean="0"/>
-              <a:t>5/14/2023</a:t>
+              <a:t>5/16/2023</a:t>
             </a:fld>
             <a:endParaRPr lang="en-US"/>
           </a:p>
@@ -3482,7 +3922,7 @@
           <a:p>
             <a:fld id="{A3104859-06A7-4B6C-9EBE-0886FFE8171A}" type="datetimeFigureOut">
               <a:rPr lang="en-US" smtClean="0"/>
-              <a:t>5/14/2023</a:t>
+              <a:t>5/16/2023</a:t>
             </a:fld>
             <a:endParaRPr lang="en-US"/>
           </a:p>
@@ -3770,7 +4210,7 @@
           <a:p>
             <a:fld id="{A3104859-06A7-4B6C-9EBE-0886FFE8171A}" type="datetimeFigureOut">
               <a:rPr lang="en-US" smtClean="0"/>
-              <a:t>5/14/2023</a:t>
+              <a:t>5/16/2023</a:t>
             </a:fld>
             <a:endParaRPr lang="en-US"/>
           </a:p>
@@ -4011,7 +4451,7 @@
           <a:p>
             <a:fld id="{A3104859-06A7-4B6C-9EBE-0886FFE8171A}" type="datetimeFigureOut">
               <a:rPr lang="en-US" smtClean="0"/>
-              <a:t>5/14/2023</a:t>
+              <a:t>5/16/2023</a:t>
             </a:fld>
             <a:endParaRPr lang="en-US"/>
           </a:p>
@@ -12064,6 +12504,66 @@
       </p:grpSpPr>
       <p:pic>
         <p:nvPicPr>
+          <p:cNvPr id="1024" name="Graphic 7">
+            <a:extLst>
+              <a:ext uri="{FF2B5EF4-FFF2-40B4-BE49-F238E27FC236}">
+                <a16:creationId xmlns:a16="http://schemas.microsoft.com/office/drawing/2014/main" id="{4F33251F-56E6-35B2-121C-37506A1E71F8}"/>
+              </a:ext>
+            </a:extLst>
+          </p:cNvPr>
+          <p:cNvPicPr>
+            <a:picLocks noChangeAspect="1" noChangeArrowheads="1"/>
+          </p:cNvPicPr>
+          <p:nvPr/>
+        </p:nvPicPr>
+        <p:blipFill>
+          <a:blip r:embed="rId2">
+            <a:extLst>
+              <a:ext uri="{28A0092B-C50C-407E-A947-70E740481C1C}">
+                <a14:useLocalDpi xmlns:a14="http://schemas.microsoft.com/office/drawing/2010/main" val="0"/>
+              </a:ext>
+            </a:extLst>
+          </a:blip>
+          <a:srcRect/>
+          <a:stretch>
+            <a:fillRect/>
+          </a:stretch>
+        </p:blipFill>
+        <p:spPr bwMode="auto">
+          <a:xfrm>
+            <a:off x="2855111" y="3776099"/>
+            <a:ext cx="822960" cy="822960"/>
+          </a:xfrm>
+          <a:prstGeom prst="rect">
+            <a:avLst/>
+          </a:prstGeom>
+          <a:noFill/>
+          <a:ln>
+            <a:noFill/>
+          </a:ln>
+          <a:extLst>
+            <a:ext uri="{909E8E84-426E-40DD-AFC4-6F175D3DCCD1}">
+              <a14:hiddenFill xmlns:a14="http://schemas.microsoft.com/office/drawing/2010/main">
+                <a:solidFill>
+                  <a:srgbClr val="FFFFFF"/>
+                </a:solidFill>
+              </a14:hiddenFill>
+            </a:ext>
+            <a:ext uri="{91240B29-F687-4F45-9708-019B960494DF}">
+              <a14:hiddenLine xmlns:a14="http://schemas.microsoft.com/office/drawing/2010/main" w="9525">
+                <a:solidFill>
+                  <a:srgbClr val="000000"/>
+                </a:solidFill>
+                <a:miter lim="800000"/>
+                <a:headEnd/>
+                <a:tailEnd/>
+              </a14:hiddenLine>
+            </a:ext>
+          </a:extLst>
+        </p:spPr>
+      </p:pic>
+      <p:pic>
+        <p:nvPicPr>
           <p:cNvPr id="4" name="Graphic 3">
             <a:extLst>
               <a:ext uri="{FF2B5EF4-FFF2-40B4-BE49-F238E27FC236}">
@@ -12077,13 +12577,13 @@
           <p:nvPr/>
         </p:nvPicPr>
         <p:blipFill>
-          <a:blip r:embed="rId2">
+          <a:blip r:embed="rId3">
             <a:extLst>
               <a:ext uri="{28A0092B-C50C-407E-A947-70E740481C1C}">
                 <a14:useLocalDpi xmlns:a14="http://schemas.microsoft.com/office/drawing/2010/main" val="0"/>
               </a:ext>
               <a:ext uri="{96DAC541-7B7A-43D3-8B79-37D633B846F1}">
-                <asvg:svgBlip xmlns:asvg="http://schemas.microsoft.com/office/drawing/2016/SVG/main" r:embed="rId3"/>
+                <asvg:svgBlip xmlns:asvg="http://schemas.microsoft.com/office/drawing/2016/SVG/main" r:embed="rId4"/>
               </a:ext>
             </a:extLst>
           </a:blip>
@@ -12167,7 +12667,7 @@
           <p:nvPr/>
         </p:nvPicPr>
         <p:blipFill>
-          <a:blip r:embed="rId4">
+          <a:blip r:embed="rId5">
             <a:extLst>
               <a:ext uri="{28A0092B-C50C-407E-A947-70E740481C1C}">
                 <a14:useLocalDpi xmlns:a14="http://schemas.microsoft.com/office/drawing/2010/main" val="0"/>
@@ -12181,8 +12681,8 @@
         </p:blipFill>
         <p:spPr bwMode="auto">
           <a:xfrm>
-            <a:off x="4671563" y="1481111"/>
-            <a:ext cx="996153" cy="996153"/>
+            <a:off x="4844485" y="1480839"/>
+            <a:ext cx="822960" cy="822960"/>
           </a:xfrm>
           <a:prstGeom prst="rect">
             <a:avLst/>
@@ -12214,10 +12714,10 @@
           <p:nvPr/>
         </p:nvPicPr>
         <p:blipFill>
-          <a:blip r:embed="rId5">
+          <a:blip r:embed="rId6">
             <a:extLst>
               <a:ext uri="{96DAC541-7B7A-43D3-8B79-37D633B846F1}">
-                <asvg:svgBlip xmlns:asvg="http://schemas.microsoft.com/office/drawing/2016/SVG/main" r:embed="rId6"/>
+                <asvg:svgBlip xmlns:asvg="http://schemas.microsoft.com/office/drawing/2016/SVG/main" r:embed="rId7"/>
               </a:ext>
             </a:extLst>
           </a:blip>
@@ -12226,8 +12726,8 @@
         </p:blipFill>
         <p:spPr>
           <a:xfrm>
-            <a:off x="2863630" y="1481111"/>
-            <a:ext cx="996153" cy="996153"/>
+            <a:off x="2855111" y="1481111"/>
+            <a:ext cx="822960" cy="822960"/>
           </a:xfrm>
           <a:prstGeom prst="rect">
             <a:avLst/>
@@ -12248,8 +12748,8 @@
         </p:nvGrpSpPr>
         <p:grpSpPr>
           <a:xfrm>
-            <a:off x="2863630" y="2867643"/>
-            <a:ext cx="996696" cy="996696"/>
+            <a:off x="2855111" y="2666457"/>
+            <a:ext cx="822960" cy="822960"/>
             <a:chOff x="7220319" y="1826836"/>
             <a:chExt cx="996696" cy="996696"/>
           </a:xfrm>
@@ -12321,7 +12821,7 @@
             <p:nvPr/>
           </p:nvPicPr>
           <p:blipFill>
-            <a:blip r:embed="rId7"/>
+            <a:blip r:embed="rId8"/>
             <a:stretch>
               <a:fillRect/>
             </a:stretch>
@@ -12352,7 +12852,7 @@
           <p:nvPr/>
         </p:nvPicPr>
         <p:blipFill>
-          <a:blip r:embed="rId8">
+          <a:blip r:embed="rId9">
             <a:extLst>
               <a:ext uri="{28A0092B-C50C-407E-A947-70E740481C1C}">
                 <a14:useLocalDpi xmlns:a14="http://schemas.microsoft.com/office/drawing/2010/main" val="0"/>
@@ -12366,8 +12866,8 @@
         </p:blipFill>
         <p:spPr bwMode="auto">
           <a:xfrm>
-            <a:off x="7858522" y="4253215"/>
-            <a:ext cx="996696" cy="996696"/>
+            <a:off x="8032257" y="3779981"/>
+            <a:ext cx="822960" cy="822960"/>
           </a:xfrm>
           <a:prstGeom prst="rect">
             <a:avLst/>
@@ -12399,7 +12899,7 @@
           <p:nvPr/>
         </p:nvPicPr>
         <p:blipFill>
-          <a:blip r:embed="rId9">
+          <a:blip r:embed="rId10">
             <a:extLst>
               <a:ext uri="{28A0092B-C50C-407E-A947-70E740481C1C}">
                 <a14:useLocalDpi xmlns:a14="http://schemas.microsoft.com/office/drawing/2010/main" val="0"/>
@@ -12413,8 +12913,8 @@
         </p:blipFill>
         <p:spPr bwMode="auto">
           <a:xfrm>
-            <a:off x="6051403" y="4253215"/>
-            <a:ext cx="996696" cy="996696"/>
+            <a:off x="6048273" y="3779981"/>
+            <a:ext cx="822960" cy="822960"/>
           </a:xfrm>
           <a:prstGeom prst="rect">
             <a:avLst/>
@@ -12506,7 +13006,7 @@
         </p:nvSpPr>
         <p:spPr>
           <a:xfrm>
-            <a:off x="2863630" y="335588"/>
+            <a:off x="2855111" y="335588"/>
             <a:ext cx="2803815" cy="633926"/>
           </a:xfrm>
           <a:prstGeom prst="roundRect">
@@ -12629,7 +13129,7 @@
           <p:nvPr/>
         </p:nvPicPr>
         <p:blipFill>
-          <a:blip r:embed="rId10">
+          <a:blip r:embed="rId11">
             <a:extLst>
               <a:ext uri="{28A0092B-C50C-407E-A947-70E740481C1C}">
                 <a14:useLocalDpi xmlns:a14="http://schemas.microsoft.com/office/drawing/2010/main" val="0"/>
@@ -12643,8 +13143,8 @@
         </p:blipFill>
         <p:spPr bwMode="auto">
           <a:xfrm>
-            <a:off x="10146764" y="1485411"/>
-            <a:ext cx="987552" cy="987552"/>
+            <a:off x="9238633" y="1485411"/>
+            <a:ext cx="822960" cy="822960"/>
           </a:xfrm>
           <a:prstGeom prst="rect">
             <a:avLst/>
@@ -12680,8 +13180,8 @@
         </p:nvGrpSpPr>
         <p:grpSpPr>
           <a:xfrm>
-            <a:off x="10142192" y="2867643"/>
-            <a:ext cx="996696" cy="996696"/>
+            <a:off x="11219488" y="2666457"/>
+            <a:ext cx="822960" cy="822960"/>
             <a:chOff x="7974302" y="4505311"/>
             <a:chExt cx="996696" cy="996696"/>
           </a:xfrm>
@@ -12753,7 +13253,7 @@
             <p:nvPr/>
           </p:nvPicPr>
           <p:blipFill>
-            <a:blip r:embed="rId11">
+            <a:blip r:embed="rId12">
               <a:extLst>
                 <a:ext uri="{28A0092B-C50C-407E-A947-70E740481C1C}">
                   <a14:useLocalDpi xmlns:a14="http://schemas.microsoft.com/office/drawing/2010/main" val="0"/>
@@ -12800,8 +13300,8 @@
         </p:nvGrpSpPr>
         <p:grpSpPr>
           <a:xfrm>
-            <a:off x="10142192" y="4253215"/>
-            <a:ext cx="996696" cy="996696"/>
+            <a:off x="9234061" y="2666457"/>
+            <a:ext cx="822960" cy="822960"/>
             <a:chOff x="8853054" y="4006272"/>
             <a:chExt cx="996696" cy="996696"/>
           </a:xfrm>
@@ -12873,7 +13373,7 @@
             <p:nvPr/>
           </p:nvPicPr>
           <p:blipFill>
-            <a:blip r:embed="rId12">
+            <a:blip r:embed="rId13">
               <a:extLst>
                 <a:ext uri="{28A0092B-C50C-407E-A947-70E740481C1C}">
                   <a14:useLocalDpi xmlns:a14="http://schemas.microsoft.com/office/drawing/2010/main" val="0"/>
@@ -12920,7 +13420,7 @@
         </p:nvSpPr>
         <p:spPr>
           <a:xfrm>
-            <a:off x="10699464" y="3967028"/>
+            <a:off x="9823414" y="2413720"/>
             <a:ext cx="1074420" cy="463441"/>
           </a:xfrm>
           <a:prstGeom prst="roundRect">
@@ -12983,8 +13483,8 @@
         </p:nvCxnSpPr>
         <p:spPr>
           <a:xfrm rot="5400000" flipH="1" flipV="1">
-            <a:off x="1657710" y="84847"/>
-            <a:ext cx="2357087" cy="2858570"/>
+            <a:off x="1653450" y="89107"/>
+            <a:ext cx="2357087" cy="2850051"/>
           </a:xfrm>
           <a:prstGeom prst="bentConnector3">
             <a:avLst>
@@ -13120,7 +13620,7 @@
         </p:nvSpPr>
         <p:spPr>
           <a:xfrm>
-            <a:off x="3101224" y="5100320"/>
+            <a:off x="2143293" y="5045216"/>
             <a:ext cx="2139756" cy="365760"/>
           </a:xfrm>
           <a:prstGeom prst="roundRect">
@@ -13185,8 +13685,8 @@
         </p:nvCxnSpPr>
         <p:spPr>
           <a:xfrm rot="16200000" flipH="1">
-            <a:off x="2129410" y="4311386"/>
-            <a:ext cx="249372" cy="1694256"/>
+            <a:off x="1677996" y="4762799"/>
+            <a:ext cx="194268" cy="736325"/>
           </a:xfrm>
           <a:prstGeom prst="bentConnector2">
             <a:avLst/>
@@ -13227,7 +13727,7 @@
           <p:nvPr/>
         </p:nvPicPr>
         <p:blipFill>
-          <a:blip r:embed="rId13">
+          <a:blip r:embed="rId14">
             <a:extLst>
               <a:ext uri="{28A0092B-C50C-407E-A947-70E740481C1C}">
                 <a14:useLocalDpi xmlns:a14="http://schemas.microsoft.com/office/drawing/2010/main" val="0"/>
@@ -13242,7 +13742,7 @@
         <p:spPr bwMode="auto">
           <a:xfrm>
             <a:off x="6051403" y="1480839"/>
-            <a:ext cx="996696" cy="996696"/>
+            <a:ext cx="822960" cy="822960"/>
           </a:xfrm>
           <a:prstGeom prst="rect">
             <a:avLst/>
@@ -13259,1338 +13759,81 @@
           </a:extLst>
         </p:spPr>
       </p:pic>
-      <p:grpSp>
-        <p:nvGrpSpPr>
-          <p:cNvPr id="34" name="Group 33">
-            <a:extLst>
-              <a:ext uri="{FF2B5EF4-FFF2-40B4-BE49-F238E27FC236}">
-                <a16:creationId xmlns:a16="http://schemas.microsoft.com/office/drawing/2014/main" id="{B0B80858-9883-3F5E-0753-1842B54739B1}"/>
-              </a:ext>
-            </a:extLst>
-          </p:cNvPr>
-          <p:cNvGrpSpPr/>
+      <p:sp>
+        <p:nvSpPr>
+          <p:cNvPr id="47" name="Rectangle 46">
+            <a:extLst>
+              <a:ext uri="{FF2B5EF4-FFF2-40B4-BE49-F238E27FC236}">
+                <a16:creationId xmlns:a16="http://schemas.microsoft.com/office/drawing/2014/main" id="{EDA5DF41-D325-4378-3FDC-CBE766C0E32E}"/>
+              </a:ext>
+            </a:extLst>
+          </p:cNvPr>
+          <p:cNvSpPr/>
           <p:nvPr/>
-        </p:nvGrpSpPr>
-        <p:grpSpPr>
+        </p:nvSpPr>
+        <p:spPr>
           <a:xfrm>
-            <a:off x="3101225" y="5437380"/>
-            <a:ext cx="5514361" cy="1254295"/>
-            <a:chOff x="3101319" y="5488180"/>
-            <a:chExt cx="5514361" cy="1254295"/>
+            <a:off x="2143293" y="5301103"/>
+            <a:ext cx="9244411" cy="1390573"/>
           </a:xfrm>
-        </p:grpSpPr>
-        <p:sp>
-          <p:nvSpPr>
-            <p:cNvPr id="47" name="Rectangle 46">
-              <a:extLst>
-                <a:ext uri="{FF2B5EF4-FFF2-40B4-BE49-F238E27FC236}">
-                  <a16:creationId xmlns:a16="http://schemas.microsoft.com/office/drawing/2014/main" id="{EDA5DF41-D325-4378-3FDC-CBE766C0E32E}"/>
-                </a:ext>
-              </a:extLst>
-            </p:cNvPr>
-            <p:cNvSpPr/>
-            <p:nvPr/>
-          </p:nvSpPr>
-          <p:spPr>
-            <a:xfrm>
-              <a:off x="3101319" y="5488180"/>
-              <a:ext cx="5514361" cy="1254295"/>
-            </a:xfrm>
-            <a:prstGeom prst="rect">
-              <a:avLst/>
-            </a:prstGeom>
-            <a:solidFill>
-              <a:srgbClr val="FAFAFA">
-                <a:alpha val="20000"/>
-              </a:srgbClr>
-            </a:solidFill>
-            <a:ln w="12700">
-              <a:noFill/>
-              <a:prstDash val="dash"/>
-            </a:ln>
-          </p:spPr>
-          <p:style>
-            <a:lnRef idx="2">
-              <a:schemeClr val="accent1">
-                <a:shade val="50000"/>
-              </a:schemeClr>
-            </a:lnRef>
-            <a:fillRef idx="1">
-              <a:schemeClr val="accent1"/>
-            </a:fillRef>
-            <a:effectRef idx="0">
-              <a:schemeClr val="accent1"/>
-            </a:effectRef>
-            <a:fontRef idx="minor">
-              <a:schemeClr val="lt1"/>
-            </a:fontRef>
-          </p:style>
-          <p:txBody>
-            <a:bodyPr tIns="91440"/>
-            <a:lstStyle/>
-            <a:p>
-              <a:pPr algn="ctr" eaLnBrk="1" fontAlgn="auto" hangingPunct="1">
-                <a:spcBef>
-                  <a:spcPts val="0"/>
-                </a:spcBef>
-                <a:spcAft>
-                  <a:spcPts val="0"/>
-                </a:spcAft>
-                <a:defRPr/>
-              </a:pPr>
-              <a:endParaRPr lang="en-US" sz="1100" dirty="0">
-                <a:solidFill>
-                  <a:schemeClr val="bg1"/>
-                </a:solidFill>
-                <a:latin typeface="+mj-lt"/>
-                <a:cs typeface="Arial" panose="020B0604020202020204" pitchFamily="34" charset="0"/>
-              </a:endParaRPr>
-            </a:p>
-          </p:txBody>
-        </p:sp>
-        <p:grpSp>
-          <p:nvGrpSpPr>
-            <p:cNvPr id="33" name="Group 32">
-              <a:extLst>
-                <a:ext uri="{FF2B5EF4-FFF2-40B4-BE49-F238E27FC236}">
-                  <a16:creationId xmlns:a16="http://schemas.microsoft.com/office/drawing/2014/main" id="{2F9B88CF-29AE-2D89-CD2B-F21FFEE9D7B8}"/>
-                </a:ext>
-              </a:extLst>
-            </p:cNvPr>
-            <p:cNvGrpSpPr/>
-            <p:nvPr/>
-          </p:nvGrpSpPr>
-          <p:grpSpPr>
-            <a:xfrm>
-              <a:off x="6448419" y="5625564"/>
-              <a:ext cx="1051560" cy="979527"/>
-              <a:chOff x="6162386" y="5606254"/>
-              <a:chExt cx="1051560" cy="979527"/>
-            </a:xfrm>
-          </p:grpSpPr>
-          <p:pic>
-            <p:nvPicPr>
-              <p:cNvPr id="35" name="Graphic 19">
-                <a:extLst>
-                  <a:ext uri="{FF2B5EF4-FFF2-40B4-BE49-F238E27FC236}">
-                    <a16:creationId xmlns:a16="http://schemas.microsoft.com/office/drawing/2014/main" id="{D2DAF613-D8BD-3380-58A8-5BAB202AF083}"/>
-                  </a:ext>
-                </a:extLst>
-              </p:cNvPr>
-              <p:cNvPicPr>
-                <a:picLocks noChangeAspect="1" noChangeArrowheads="1"/>
-              </p:cNvPicPr>
-              <p:nvPr/>
-            </p:nvPicPr>
-            <p:blipFill>
-              <a:blip r:embed="rId14">
-                <a:extLst>
-                  <a:ext uri="{28A0092B-C50C-407E-A947-70E740481C1C}">
-                    <a14:useLocalDpi xmlns:a14="http://schemas.microsoft.com/office/drawing/2010/main" val="0"/>
-                  </a:ext>
-                </a:extLst>
-              </a:blip>
-              <a:srcRect/>
-              <a:stretch>
-                <a:fillRect/>
-              </a:stretch>
-            </p:blipFill>
-            <p:spPr bwMode="auto">
-              <a:xfrm>
-                <a:off x="6413846" y="5606254"/>
-                <a:ext cx="548640" cy="548640"/>
-              </a:xfrm>
-              <a:prstGeom prst="rect">
-                <a:avLst/>
-              </a:prstGeom>
-              <a:noFill/>
-              <a:ln>
-                <a:noFill/>
-              </a:ln>
-              <a:extLst>
-                <a:ext uri="{909E8E84-426E-40DD-AFC4-6F175D3DCCD1}">
-                  <a14:hiddenFill xmlns:a14="http://schemas.microsoft.com/office/drawing/2010/main">
-                    <a:solidFill>
-                      <a:srgbClr val="FFFFFF"/>
-                    </a:solidFill>
-                  </a14:hiddenFill>
-                </a:ext>
-                <a:ext uri="{91240B29-F687-4F45-9708-019B960494DF}">
-                  <a14:hiddenLine xmlns:a14="http://schemas.microsoft.com/office/drawing/2010/main" w="9525">
-                    <a:solidFill>
-                      <a:srgbClr val="000000"/>
-                    </a:solidFill>
-                    <a:miter lim="800000"/>
-                    <a:headEnd/>
-                    <a:tailEnd/>
-                  </a14:hiddenLine>
-                </a:ext>
-              </a:extLst>
-            </p:spPr>
-          </p:pic>
-          <p:sp>
-            <p:nvSpPr>
-              <p:cNvPr id="36" name="TextBox 12">
-                <a:extLst>
-                  <a:ext uri="{FF2B5EF4-FFF2-40B4-BE49-F238E27FC236}">
-                    <a16:creationId xmlns:a16="http://schemas.microsoft.com/office/drawing/2014/main" id="{3168B3C9-C653-D5A4-3A61-2E0ED75D4320}"/>
-                  </a:ext>
-                </a:extLst>
-              </p:cNvPr>
-              <p:cNvSpPr txBox="1">
-                <a:spLocks noChangeArrowheads="1"/>
-              </p:cNvSpPr>
-              <p:nvPr/>
-            </p:nvSpPr>
-            <p:spPr bwMode="auto">
-              <a:xfrm>
-                <a:off x="6162386" y="6154894"/>
-                <a:ext cx="1051560" cy="430887"/>
-              </a:xfrm>
-              <a:prstGeom prst="rect">
-                <a:avLst/>
-              </a:prstGeom>
-              <a:noFill/>
-              <a:ln>
-                <a:noFill/>
-              </a:ln>
-              <a:extLst>
-                <a:ext uri="{909E8E84-426E-40DD-AFC4-6F175D3DCCD1}">
-                  <a14:hiddenFill xmlns:a14="http://schemas.microsoft.com/office/drawing/2010/main">
-                    <a:solidFill>
-                      <a:srgbClr val="FFFFFF"/>
-                    </a:solidFill>
-                  </a14:hiddenFill>
-                </a:ext>
-                <a:ext uri="{91240B29-F687-4F45-9708-019B960494DF}">
-                  <a14:hiddenLine xmlns:a14="http://schemas.microsoft.com/office/drawing/2010/main" w="9525">
-                    <a:solidFill>
-                      <a:srgbClr val="000000"/>
-                    </a:solidFill>
-                    <a:miter lim="800000"/>
-                    <a:headEnd/>
-                    <a:tailEnd/>
-                  </a14:hiddenLine>
-                </a:ext>
-              </a:extLst>
-            </p:spPr>
-            <p:txBody>
-              <a:bodyPr wrap="square">
-                <a:spAutoFit/>
-              </a:bodyPr>
-              <a:lstStyle>
-                <a:lvl1pPr>
-                  <a:defRPr>
-                    <a:solidFill>
-                      <a:schemeClr val="tx1"/>
-                    </a:solidFill>
-                    <a:latin typeface="Calibri" panose="020F0502020204030204" pitchFamily="34" charset="0"/>
-                  </a:defRPr>
-                </a:lvl1pPr>
-                <a:lvl2pPr marL="742950" indent="-285750">
-                  <a:defRPr>
-                    <a:solidFill>
-                      <a:schemeClr val="tx1"/>
-                    </a:solidFill>
-                    <a:latin typeface="Calibri" panose="020F0502020204030204" pitchFamily="34" charset="0"/>
-                  </a:defRPr>
-                </a:lvl2pPr>
-                <a:lvl3pPr marL="1143000" indent="-228600">
-                  <a:defRPr>
-                    <a:solidFill>
-                      <a:schemeClr val="tx1"/>
-                    </a:solidFill>
-                    <a:latin typeface="Calibri" panose="020F0502020204030204" pitchFamily="34" charset="0"/>
-                  </a:defRPr>
-                </a:lvl3pPr>
-                <a:lvl4pPr marL="1600200" indent="-228600">
-                  <a:defRPr>
-                    <a:solidFill>
-                      <a:schemeClr val="tx1"/>
-                    </a:solidFill>
-                    <a:latin typeface="Calibri" panose="020F0502020204030204" pitchFamily="34" charset="0"/>
-                  </a:defRPr>
-                </a:lvl4pPr>
-                <a:lvl5pPr marL="2057400" indent="-228600">
-                  <a:defRPr>
-                    <a:solidFill>
-                      <a:schemeClr val="tx1"/>
-                    </a:solidFill>
-                    <a:latin typeface="Calibri" panose="020F0502020204030204" pitchFamily="34" charset="0"/>
-                  </a:defRPr>
-                </a:lvl5pPr>
-                <a:lvl6pPr marL="2514600" indent="-228600" eaLnBrk="0" fontAlgn="base" hangingPunct="0">
-                  <a:spcBef>
-                    <a:spcPct val="0"/>
-                  </a:spcBef>
-                  <a:spcAft>
-                    <a:spcPct val="0"/>
-                  </a:spcAft>
-                  <a:defRPr>
-                    <a:solidFill>
-                      <a:schemeClr val="tx1"/>
-                    </a:solidFill>
-                    <a:latin typeface="Calibri" panose="020F0502020204030204" pitchFamily="34" charset="0"/>
-                  </a:defRPr>
-                </a:lvl6pPr>
-                <a:lvl7pPr marL="2971800" indent="-228600" eaLnBrk="0" fontAlgn="base" hangingPunct="0">
-                  <a:spcBef>
-                    <a:spcPct val="0"/>
-                  </a:spcBef>
-                  <a:spcAft>
-                    <a:spcPct val="0"/>
-                  </a:spcAft>
-                  <a:defRPr>
-                    <a:solidFill>
-                      <a:schemeClr val="tx1"/>
-                    </a:solidFill>
-                    <a:latin typeface="Calibri" panose="020F0502020204030204" pitchFamily="34" charset="0"/>
-                  </a:defRPr>
-                </a:lvl7pPr>
-                <a:lvl8pPr marL="3429000" indent="-228600" eaLnBrk="0" fontAlgn="base" hangingPunct="0">
-                  <a:spcBef>
-                    <a:spcPct val="0"/>
-                  </a:spcBef>
-                  <a:spcAft>
-                    <a:spcPct val="0"/>
-                  </a:spcAft>
-                  <a:defRPr>
-                    <a:solidFill>
-                      <a:schemeClr val="tx1"/>
-                    </a:solidFill>
-                    <a:latin typeface="Calibri" panose="020F0502020204030204" pitchFamily="34" charset="0"/>
-                  </a:defRPr>
-                </a:lvl8pPr>
-                <a:lvl9pPr marL="3886200" indent="-228600" eaLnBrk="0" fontAlgn="base" hangingPunct="0">
-                  <a:spcBef>
-                    <a:spcPct val="0"/>
-                  </a:spcBef>
-                  <a:spcAft>
-                    <a:spcPct val="0"/>
-                  </a:spcAft>
-                  <a:defRPr>
-                    <a:solidFill>
-                      <a:schemeClr val="tx1"/>
-                    </a:solidFill>
-                    <a:latin typeface="Calibri" panose="020F0502020204030204" pitchFamily="34" charset="0"/>
-                  </a:defRPr>
-                </a:lvl9pPr>
-              </a:lstStyle>
-              <a:p>
-                <a:pPr algn="ctr" eaLnBrk="1" hangingPunct="1"/>
-                <a:r>
-                  <a:rPr lang="en-US" altLang="en-US" sz="1100" b="1" dirty="0">
-                    <a:solidFill>
-                      <a:schemeClr val="bg1"/>
-                    </a:solidFill>
-                    <a:latin typeface="+mj-lt"/>
-                    <a:ea typeface="Amazon Ember" panose="020B0603020204020204" pitchFamily="34" charset="0"/>
-                    <a:cs typeface="Arial" panose="020B0604020202020204" pitchFamily="34" charset="0"/>
-                  </a:rPr>
-                  <a:t>AWS Security Hub</a:t>
-                </a:r>
-              </a:p>
-            </p:txBody>
-          </p:sp>
-        </p:grpSp>
-        <p:grpSp>
-          <p:nvGrpSpPr>
-            <p:cNvPr id="30" name="Group 29">
-              <a:extLst>
-                <a:ext uri="{FF2B5EF4-FFF2-40B4-BE49-F238E27FC236}">
-                  <a16:creationId xmlns:a16="http://schemas.microsoft.com/office/drawing/2014/main" id="{E30E038F-7FA5-A920-3A09-7E35AF378EA6}"/>
-                </a:ext>
-              </a:extLst>
-            </p:cNvPr>
-            <p:cNvGrpSpPr/>
-            <p:nvPr/>
-          </p:nvGrpSpPr>
-          <p:grpSpPr>
-            <a:xfrm>
-              <a:off x="4217019" y="5619305"/>
-              <a:ext cx="1051560" cy="992045"/>
-              <a:chOff x="4190372" y="5593736"/>
-              <a:chExt cx="1051560" cy="992045"/>
-            </a:xfrm>
-          </p:grpSpPr>
-          <p:pic>
-            <p:nvPicPr>
-              <p:cNvPr id="39" name="Graphic 16">
-                <a:extLst>
-                  <a:ext uri="{FF2B5EF4-FFF2-40B4-BE49-F238E27FC236}">
-                    <a16:creationId xmlns:a16="http://schemas.microsoft.com/office/drawing/2014/main" id="{0B15E7EF-81AB-9F76-740A-808EC8C56C65}"/>
-                  </a:ext>
-                </a:extLst>
-              </p:cNvPr>
-              <p:cNvPicPr>
-                <a:picLocks noChangeAspect="1" noChangeArrowheads="1"/>
-              </p:cNvPicPr>
-              <p:nvPr/>
-            </p:nvPicPr>
-            <p:blipFill>
-              <a:blip r:embed="rId15">
-                <a:extLst>
-                  <a:ext uri="{96DAC541-7B7A-43D3-8B79-37D633B846F1}">
-                    <asvg:svgBlip xmlns:asvg="http://schemas.microsoft.com/office/drawing/2016/SVG/main" r:embed="rId16"/>
-                  </a:ext>
-                </a:extLst>
-              </a:blip>
-              <a:srcRect/>
-              <a:stretch/>
-            </p:blipFill>
-            <p:spPr bwMode="auto">
-              <a:xfrm>
-                <a:off x="4441832" y="5593736"/>
-                <a:ext cx="548640" cy="548640"/>
-              </a:xfrm>
-              <a:prstGeom prst="rect">
-                <a:avLst/>
-              </a:prstGeom>
-              <a:noFill/>
-              <a:ln>
-                <a:noFill/>
-              </a:ln>
-              <a:extLst>
-                <a:ext uri="{909E8E84-426E-40DD-AFC4-6F175D3DCCD1}">
-                  <a14:hiddenFill xmlns:a14="http://schemas.microsoft.com/office/drawing/2010/main">
-                    <a:solidFill>
-                      <a:srgbClr val="FFFFFF"/>
-                    </a:solidFill>
-                  </a14:hiddenFill>
-                </a:ext>
-                <a:ext uri="{91240B29-F687-4F45-9708-019B960494DF}">
-                  <a14:hiddenLine xmlns:a14="http://schemas.microsoft.com/office/drawing/2010/main" w="9525">
-                    <a:solidFill>
-                      <a:srgbClr val="000000"/>
-                    </a:solidFill>
-                    <a:miter lim="800000"/>
-                    <a:headEnd/>
-                    <a:tailEnd/>
-                  </a14:hiddenLine>
-                </a:ext>
-              </a:extLst>
-            </p:spPr>
-          </p:pic>
-          <p:sp>
-            <p:nvSpPr>
-              <p:cNvPr id="40" name="TextBox 33">
-                <a:extLst>
-                  <a:ext uri="{FF2B5EF4-FFF2-40B4-BE49-F238E27FC236}">
-                    <a16:creationId xmlns:a16="http://schemas.microsoft.com/office/drawing/2014/main" id="{2B9F4387-007C-A863-E06D-057C44D1A8B7}"/>
-                  </a:ext>
-                </a:extLst>
-              </p:cNvPr>
-              <p:cNvSpPr txBox="1">
-                <a:spLocks noChangeArrowheads="1"/>
-              </p:cNvSpPr>
-              <p:nvPr/>
-            </p:nvSpPr>
-            <p:spPr bwMode="auto">
-              <a:xfrm>
-                <a:off x="4190372" y="6154894"/>
-                <a:ext cx="1051560" cy="430887"/>
-              </a:xfrm>
-              <a:prstGeom prst="rect">
-                <a:avLst/>
-              </a:prstGeom>
-              <a:noFill/>
-              <a:ln>
-                <a:noFill/>
-              </a:ln>
-              <a:extLst>
-                <a:ext uri="{909E8E84-426E-40DD-AFC4-6F175D3DCCD1}">
-                  <a14:hiddenFill xmlns:a14="http://schemas.microsoft.com/office/drawing/2010/main">
-                    <a:solidFill>
-                      <a:srgbClr val="FFFFFF"/>
-                    </a:solidFill>
-                  </a14:hiddenFill>
-                </a:ext>
-                <a:ext uri="{91240B29-F687-4F45-9708-019B960494DF}">
-                  <a14:hiddenLine xmlns:a14="http://schemas.microsoft.com/office/drawing/2010/main" w="9525">
-                    <a:solidFill>
-                      <a:srgbClr val="000000"/>
-                    </a:solidFill>
-                    <a:miter lim="800000"/>
-                    <a:headEnd/>
-                    <a:tailEnd/>
-                  </a14:hiddenLine>
-                </a:ext>
-              </a:extLst>
-            </p:spPr>
-            <p:txBody>
-              <a:bodyPr wrap="square">
-                <a:spAutoFit/>
-              </a:bodyPr>
-              <a:lstStyle>
-                <a:lvl1pPr>
-                  <a:defRPr>
-                    <a:solidFill>
-                      <a:schemeClr val="tx1"/>
-                    </a:solidFill>
-                    <a:latin typeface="Calibri" panose="020F0502020204030204" pitchFamily="34" charset="0"/>
-                  </a:defRPr>
-                </a:lvl1pPr>
-                <a:lvl2pPr marL="742950" indent="-285750">
-                  <a:defRPr>
-                    <a:solidFill>
-                      <a:schemeClr val="tx1"/>
-                    </a:solidFill>
-                    <a:latin typeface="Calibri" panose="020F0502020204030204" pitchFamily="34" charset="0"/>
-                  </a:defRPr>
-                </a:lvl2pPr>
-                <a:lvl3pPr marL="1143000" indent="-228600">
-                  <a:defRPr>
-                    <a:solidFill>
-                      <a:schemeClr val="tx1"/>
-                    </a:solidFill>
-                    <a:latin typeface="Calibri" panose="020F0502020204030204" pitchFamily="34" charset="0"/>
-                  </a:defRPr>
-                </a:lvl3pPr>
-                <a:lvl4pPr marL="1600200" indent="-228600">
-                  <a:defRPr>
-                    <a:solidFill>
-                      <a:schemeClr val="tx1"/>
-                    </a:solidFill>
-                    <a:latin typeface="Calibri" panose="020F0502020204030204" pitchFamily="34" charset="0"/>
-                  </a:defRPr>
-                </a:lvl4pPr>
-                <a:lvl5pPr marL="2057400" indent="-228600">
-                  <a:defRPr>
-                    <a:solidFill>
-                      <a:schemeClr val="tx1"/>
-                    </a:solidFill>
-                    <a:latin typeface="Calibri" panose="020F0502020204030204" pitchFamily="34" charset="0"/>
-                  </a:defRPr>
-                </a:lvl5pPr>
-                <a:lvl6pPr marL="2514600" indent="-228600" eaLnBrk="0" fontAlgn="base" hangingPunct="0">
-                  <a:spcBef>
-                    <a:spcPct val="0"/>
-                  </a:spcBef>
-                  <a:spcAft>
-                    <a:spcPct val="0"/>
-                  </a:spcAft>
-                  <a:defRPr>
-                    <a:solidFill>
-                      <a:schemeClr val="tx1"/>
-                    </a:solidFill>
-                    <a:latin typeface="Calibri" panose="020F0502020204030204" pitchFamily="34" charset="0"/>
-                  </a:defRPr>
-                </a:lvl6pPr>
-                <a:lvl7pPr marL="2971800" indent="-228600" eaLnBrk="0" fontAlgn="base" hangingPunct="0">
-                  <a:spcBef>
-                    <a:spcPct val="0"/>
-                  </a:spcBef>
-                  <a:spcAft>
-                    <a:spcPct val="0"/>
-                  </a:spcAft>
-                  <a:defRPr>
-                    <a:solidFill>
-                      <a:schemeClr val="tx1"/>
-                    </a:solidFill>
-                    <a:latin typeface="Calibri" panose="020F0502020204030204" pitchFamily="34" charset="0"/>
-                  </a:defRPr>
-                </a:lvl7pPr>
-                <a:lvl8pPr marL="3429000" indent="-228600" eaLnBrk="0" fontAlgn="base" hangingPunct="0">
-                  <a:spcBef>
-                    <a:spcPct val="0"/>
-                  </a:spcBef>
-                  <a:spcAft>
-                    <a:spcPct val="0"/>
-                  </a:spcAft>
-                  <a:defRPr>
-                    <a:solidFill>
-                      <a:schemeClr val="tx1"/>
-                    </a:solidFill>
-                    <a:latin typeface="Calibri" panose="020F0502020204030204" pitchFamily="34" charset="0"/>
-                  </a:defRPr>
-                </a:lvl8pPr>
-                <a:lvl9pPr marL="3886200" indent="-228600" eaLnBrk="0" fontAlgn="base" hangingPunct="0">
-                  <a:spcBef>
-                    <a:spcPct val="0"/>
-                  </a:spcBef>
-                  <a:spcAft>
-                    <a:spcPct val="0"/>
-                  </a:spcAft>
-                  <a:defRPr>
-                    <a:solidFill>
-                      <a:schemeClr val="tx1"/>
-                    </a:solidFill>
-                    <a:latin typeface="Calibri" panose="020F0502020204030204" pitchFamily="34" charset="0"/>
-                  </a:defRPr>
-                </a:lvl9pPr>
-              </a:lstStyle>
-              <a:p>
-                <a:pPr algn="ctr" eaLnBrk="1" hangingPunct="1"/>
-                <a:r>
-                  <a:rPr lang="en-US" altLang="en-US" sz="1100" b="1" dirty="0">
-                    <a:solidFill>
-                      <a:schemeClr val="bg1"/>
-                    </a:solidFill>
-                    <a:latin typeface="+mj-lt"/>
-                    <a:cs typeface="Arial" panose="020B0604020202020204" pitchFamily="34" charset="0"/>
-                  </a:rPr>
-                  <a:t>HTML, JSON,</a:t>
-                </a:r>
-              </a:p>
-              <a:p>
-                <a:pPr algn="ctr" eaLnBrk="1" hangingPunct="1"/>
-                <a:r>
-                  <a:rPr lang="en-US" altLang="en-US" sz="1100" b="1" dirty="0">
-                    <a:solidFill>
-                      <a:schemeClr val="bg1"/>
-                    </a:solidFill>
-                    <a:latin typeface="+mj-lt"/>
-                    <a:cs typeface="Arial" panose="020B0604020202020204" pitchFamily="34" charset="0"/>
-                  </a:rPr>
-                  <a:t>CSV</a:t>
-                </a:r>
-              </a:p>
-            </p:txBody>
-          </p:sp>
-        </p:grpSp>
-        <p:grpSp>
-          <p:nvGrpSpPr>
-            <p:cNvPr id="32" name="Group 31">
-              <a:extLst>
-                <a:ext uri="{FF2B5EF4-FFF2-40B4-BE49-F238E27FC236}">
-                  <a16:creationId xmlns:a16="http://schemas.microsoft.com/office/drawing/2014/main" id="{61FE9FAF-8CEE-A9FC-9802-5B6239F41C7B}"/>
-                </a:ext>
-              </a:extLst>
-            </p:cNvPr>
-            <p:cNvGrpSpPr/>
-            <p:nvPr/>
-          </p:nvGrpSpPr>
-          <p:grpSpPr>
-            <a:xfrm>
-              <a:off x="5332719" y="5619305"/>
-              <a:ext cx="1051560" cy="992045"/>
-              <a:chOff x="5172059" y="5593736"/>
-              <a:chExt cx="1051560" cy="992045"/>
-            </a:xfrm>
-          </p:grpSpPr>
-          <p:pic>
-            <p:nvPicPr>
-              <p:cNvPr id="43" name="Graphic 18">
-                <a:extLst>
-                  <a:ext uri="{FF2B5EF4-FFF2-40B4-BE49-F238E27FC236}">
-                    <a16:creationId xmlns:a16="http://schemas.microsoft.com/office/drawing/2014/main" id="{46C1D956-00C8-E3E3-A65B-3466292AEC94}"/>
-                  </a:ext>
-                </a:extLst>
-              </p:cNvPr>
-              <p:cNvPicPr>
-                <a:picLocks noChangeAspect="1" noChangeArrowheads="1"/>
-              </p:cNvPicPr>
-              <p:nvPr/>
-            </p:nvPicPr>
-            <p:blipFill>
-              <a:blip r:embed="rId17">
-                <a:extLst>
-                  <a:ext uri="{28A0092B-C50C-407E-A947-70E740481C1C}">
-                    <a14:useLocalDpi xmlns:a14="http://schemas.microsoft.com/office/drawing/2010/main" val="0"/>
-                  </a:ext>
-                </a:extLst>
-              </a:blip>
-              <a:srcRect/>
-              <a:stretch>
-                <a:fillRect/>
-              </a:stretch>
-            </p:blipFill>
-            <p:spPr bwMode="auto">
-              <a:xfrm>
-                <a:off x="5423519" y="5593736"/>
-                <a:ext cx="548640" cy="548640"/>
-              </a:xfrm>
-              <a:prstGeom prst="rect">
-                <a:avLst/>
-              </a:prstGeom>
-              <a:noFill/>
-              <a:ln>
-                <a:noFill/>
-              </a:ln>
-              <a:extLst>
-                <a:ext uri="{909E8E84-426E-40DD-AFC4-6F175D3DCCD1}">
-                  <a14:hiddenFill xmlns:a14="http://schemas.microsoft.com/office/drawing/2010/main">
-                    <a:solidFill>
-                      <a:srgbClr val="FFFFFF"/>
-                    </a:solidFill>
-                  </a14:hiddenFill>
-                </a:ext>
-                <a:ext uri="{91240B29-F687-4F45-9708-019B960494DF}">
-                  <a14:hiddenLine xmlns:a14="http://schemas.microsoft.com/office/drawing/2010/main" w="9525">
-                    <a:solidFill>
-                      <a:srgbClr val="000000"/>
-                    </a:solidFill>
-                    <a:miter lim="800000"/>
-                    <a:headEnd/>
-                    <a:tailEnd/>
-                  </a14:hiddenLine>
-                </a:ext>
-              </a:extLst>
-            </p:spPr>
-          </p:pic>
-          <p:sp>
-            <p:nvSpPr>
-              <p:cNvPr id="44" name="TextBox 11">
-                <a:extLst>
-                  <a:ext uri="{FF2B5EF4-FFF2-40B4-BE49-F238E27FC236}">
-                    <a16:creationId xmlns:a16="http://schemas.microsoft.com/office/drawing/2014/main" id="{AF0DFB57-0EA5-1522-9EE9-03E1643EF3C4}"/>
-                  </a:ext>
-                </a:extLst>
-              </p:cNvPr>
-              <p:cNvSpPr txBox="1">
-                <a:spLocks noChangeArrowheads="1"/>
-              </p:cNvSpPr>
-              <p:nvPr/>
-            </p:nvSpPr>
-            <p:spPr bwMode="auto">
-              <a:xfrm>
-                <a:off x="5172059" y="6154894"/>
-                <a:ext cx="1051560" cy="430887"/>
-              </a:xfrm>
-              <a:prstGeom prst="rect">
-                <a:avLst/>
-              </a:prstGeom>
-              <a:noFill/>
-              <a:ln>
-                <a:noFill/>
-              </a:ln>
-              <a:extLst>
-                <a:ext uri="{909E8E84-426E-40DD-AFC4-6F175D3DCCD1}">
-                  <a14:hiddenFill xmlns:a14="http://schemas.microsoft.com/office/drawing/2010/main">
-                    <a:solidFill>
-                      <a:srgbClr val="FFFFFF"/>
-                    </a:solidFill>
-                  </a14:hiddenFill>
-                </a:ext>
-                <a:ext uri="{91240B29-F687-4F45-9708-019B960494DF}">
-                  <a14:hiddenLine xmlns:a14="http://schemas.microsoft.com/office/drawing/2010/main" w="9525">
-                    <a:solidFill>
-                      <a:srgbClr val="000000"/>
-                    </a:solidFill>
-                    <a:miter lim="800000"/>
-                    <a:headEnd/>
-                    <a:tailEnd/>
-                  </a14:hiddenLine>
-                </a:ext>
-              </a:extLst>
-            </p:spPr>
-            <p:txBody>
-              <a:bodyPr wrap="square">
-                <a:spAutoFit/>
-              </a:bodyPr>
-              <a:lstStyle>
-                <a:lvl1pPr>
-                  <a:defRPr>
-                    <a:solidFill>
-                      <a:schemeClr val="tx1"/>
-                    </a:solidFill>
-                    <a:latin typeface="Calibri" panose="020F0502020204030204" pitchFamily="34" charset="0"/>
-                  </a:defRPr>
-                </a:lvl1pPr>
-                <a:lvl2pPr marL="742950" indent="-285750">
-                  <a:defRPr>
-                    <a:solidFill>
-                      <a:schemeClr val="tx1"/>
-                    </a:solidFill>
-                    <a:latin typeface="Calibri" panose="020F0502020204030204" pitchFamily="34" charset="0"/>
-                  </a:defRPr>
-                </a:lvl2pPr>
-                <a:lvl3pPr marL="1143000" indent="-228600">
-                  <a:defRPr>
-                    <a:solidFill>
-                      <a:schemeClr val="tx1"/>
-                    </a:solidFill>
-                    <a:latin typeface="Calibri" panose="020F0502020204030204" pitchFamily="34" charset="0"/>
-                  </a:defRPr>
-                </a:lvl3pPr>
-                <a:lvl4pPr marL="1600200" indent="-228600">
-                  <a:defRPr>
-                    <a:solidFill>
-                      <a:schemeClr val="tx1"/>
-                    </a:solidFill>
-                    <a:latin typeface="Calibri" panose="020F0502020204030204" pitchFamily="34" charset="0"/>
-                  </a:defRPr>
-                </a:lvl4pPr>
-                <a:lvl5pPr marL="2057400" indent="-228600">
-                  <a:defRPr>
-                    <a:solidFill>
-                      <a:schemeClr val="tx1"/>
-                    </a:solidFill>
-                    <a:latin typeface="Calibri" panose="020F0502020204030204" pitchFamily="34" charset="0"/>
-                  </a:defRPr>
-                </a:lvl5pPr>
-                <a:lvl6pPr marL="2514600" indent="-228600" eaLnBrk="0" fontAlgn="base" hangingPunct="0">
-                  <a:spcBef>
-                    <a:spcPct val="0"/>
-                  </a:spcBef>
-                  <a:spcAft>
-                    <a:spcPct val="0"/>
-                  </a:spcAft>
-                  <a:defRPr>
-                    <a:solidFill>
-                      <a:schemeClr val="tx1"/>
-                    </a:solidFill>
-                    <a:latin typeface="Calibri" panose="020F0502020204030204" pitchFamily="34" charset="0"/>
-                  </a:defRPr>
-                </a:lvl6pPr>
-                <a:lvl7pPr marL="2971800" indent="-228600" eaLnBrk="0" fontAlgn="base" hangingPunct="0">
-                  <a:spcBef>
-                    <a:spcPct val="0"/>
-                  </a:spcBef>
-                  <a:spcAft>
-                    <a:spcPct val="0"/>
-                  </a:spcAft>
-                  <a:defRPr>
-                    <a:solidFill>
-                      <a:schemeClr val="tx1"/>
-                    </a:solidFill>
-                    <a:latin typeface="Calibri" panose="020F0502020204030204" pitchFamily="34" charset="0"/>
-                  </a:defRPr>
-                </a:lvl7pPr>
-                <a:lvl8pPr marL="3429000" indent="-228600" eaLnBrk="0" fontAlgn="base" hangingPunct="0">
-                  <a:spcBef>
-                    <a:spcPct val="0"/>
-                  </a:spcBef>
-                  <a:spcAft>
-                    <a:spcPct val="0"/>
-                  </a:spcAft>
-                  <a:defRPr>
-                    <a:solidFill>
-                      <a:schemeClr val="tx1"/>
-                    </a:solidFill>
-                    <a:latin typeface="Calibri" panose="020F0502020204030204" pitchFamily="34" charset="0"/>
-                  </a:defRPr>
-                </a:lvl8pPr>
-                <a:lvl9pPr marL="3886200" indent="-228600" eaLnBrk="0" fontAlgn="base" hangingPunct="0">
-                  <a:spcBef>
-                    <a:spcPct val="0"/>
-                  </a:spcBef>
-                  <a:spcAft>
-                    <a:spcPct val="0"/>
-                  </a:spcAft>
-                  <a:defRPr>
-                    <a:solidFill>
-                      <a:schemeClr val="tx1"/>
-                    </a:solidFill>
-                    <a:latin typeface="Calibri" panose="020F0502020204030204" pitchFamily="34" charset="0"/>
-                  </a:defRPr>
-                </a:lvl9pPr>
-              </a:lstStyle>
-              <a:p>
-                <a:pPr algn="ctr" eaLnBrk="1" hangingPunct="1"/>
-                <a:r>
-                  <a:rPr lang="en-US" altLang="en-US" sz="1100" b="1" dirty="0">
-                    <a:solidFill>
-                      <a:schemeClr val="bg1"/>
-                    </a:solidFill>
-                    <a:latin typeface="+mj-lt"/>
-                    <a:ea typeface="Amazon Ember" panose="020B0603020204020204" pitchFamily="34" charset="0"/>
-                    <a:cs typeface="Arial" panose="020B0604020202020204" pitchFamily="34" charset="0"/>
-                  </a:rPr>
-                  <a:t>Amazon DocumentDB</a:t>
-                </a:r>
-              </a:p>
-            </p:txBody>
-          </p:sp>
-        </p:grpSp>
-        <p:grpSp>
-          <p:nvGrpSpPr>
-            <p:cNvPr id="29" name="Group 28">
-              <a:extLst>
-                <a:ext uri="{FF2B5EF4-FFF2-40B4-BE49-F238E27FC236}">
-                  <a16:creationId xmlns:a16="http://schemas.microsoft.com/office/drawing/2014/main" id="{6C2D2B36-7017-0273-DE0A-222DC8FB537F}"/>
-                </a:ext>
-              </a:extLst>
-            </p:cNvPr>
-            <p:cNvGrpSpPr/>
-            <p:nvPr/>
-          </p:nvGrpSpPr>
-          <p:grpSpPr>
-            <a:xfrm>
-              <a:off x="3101319" y="5625564"/>
-              <a:ext cx="1051560" cy="979527"/>
-              <a:chOff x="3204365" y="5606254"/>
-              <a:chExt cx="1051560" cy="979527"/>
-            </a:xfrm>
-          </p:grpSpPr>
-          <p:sp>
-            <p:nvSpPr>
-              <p:cNvPr id="45" name="TextBox 11">
-                <a:extLst>
-                  <a:ext uri="{FF2B5EF4-FFF2-40B4-BE49-F238E27FC236}">
-                    <a16:creationId xmlns:a16="http://schemas.microsoft.com/office/drawing/2014/main" id="{5403259A-FD0E-15A7-723A-F88B42E0162C}"/>
-                  </a:ext>
-                </a:extLst>
-              </p:cNvPr>
-              <p:cNvSpPr txBox="1">
-                <a:spLocks noChangeArrowheads="1"/>
-              </p:cNvSpPr>
-              <p:nvPr/>
-            </p:nvSpPr>
-            <p:spPr bwMode="auto">
-              <a:xfrm>
-                <a:off x="3204365" y="6154894"/>
-                <a:ext cx="1051560" cy="430887"/>
-              </a:xfrm>
-              <a:prstGeom prst="rect">
-                <a:avLst/>
-              </a:prstGeom>
-              <a:noFill/>
-              <a:ln>
-                <a:noFill/>
-              </a:ln>
-              <a:extLst>
-                <a:ext uri="{909E8E84-426E-40DD-AFC4-6F175D3DCCD1}">
-                  <a14:hiddenFill xmlns:a14="http://schemas.microsoft.com/office/drawing/2010/main">
-                    <a:solidFill>
-                      <a:srgbClr val="FFFFFF"/>
-                    </a:solidFill>
-                  </a14:hiddenFill>
-                </a:ext>
-                <a:ext uri="{91240B29-F687-4F45-9708-019B960494DF}">
-                  <a14:hiddenLine xmlns:a14="http://schemas.microsoft.com/office/drawing/2010/main" w="9525">
-                    <a:solidFill>
-                      <a:srgbClr val="000000"/>
-                    </a:solidFill>
-                    <a:miter lim="800000"/>
-                    <a:headEnd/>
-                    <a:tailEnd/>
-                  </a14:hiddenLine>
-                </a:ext>
-              </a:extLst>
-            </p:spPr>
-            <p:txBody>
-              <a:bodyPr wrap="square">
-                <a:spAutoFit/>
-              </a:bodyPr>
-              <a:lstStyle>
-                <a:lvl1pPr>
-                  <a:defRPr>
-                    <a:solidFill>
-                      <a:schemeClr val="tx1"/>
-                    </a:solidFill>
-                    <a:latin typeface="Calibri" panose="020F0502020204030204" pitchFamily="34" charset="0"/>
-                  </a:defRPr>
-                </a:lvl1pPr>
-                <a:lvl2pPr marL="742950" indent="-285750">
-                  <a:defRPr>
-                    <a:solidFill>
-                      <a:schemeClr val="tx1"/>
-                    </a:solidFill>
-                    <a:latin typeface="Calibri" panose="020F0502020204030204" pitchFamily="34" charset="0"/>
-                  </a:defRPr>
-                </a:lvl2pPr>
-                <a:lvl3pPr marL="1143000" indent="-228600">
-                  <a:defRPr>
-                    <a:solidFill>
-                      <a:schemeClr val="tx1"/>
-                    </a:solidFill>
-                    <a:latin typeface="Calibri" panose="020F0502020204030204" pitchFamily="34" charset="0"/>
-                  </a:defRPr>
-                </a:lvl3pPr>
-                <a:lvl4pPr marL="1600200" indent="-228600">
-                  <a:defRPr>
-                    <a:solidFill>
-                      <a:schemeClr val="tx1"/>
-                    </a:solidFill>
-                    <a:latin typeface="Calibri" panose="020F0502020204030204" pitchFamily="34" charset="0"/>
-                  </a:defRPr>
-                </a:lvl4pPr>
-                <a:lvl5pPr marL="2057400" indent="-228600">
-                  <a:defRPr>
-                    <a:solidFill>
-                      <a:schemeClr val="tx1"/>
-                    </a:solidFill>
-                    <a:latin typeface="Calibri" panose="020F0502020204030204" pitchFamily="34" charset="0"/>
-                  </a:defRPr>
-                </a:lvl5pPr>
-                <a:lvl6pPr marL="2514600" indent="-228600" eaLnBrk="0" fontAlgn="base" hangingPunct="0">
-                  <a:spcBef>
-                    <a:spcPct val="0"/>
-                  </a:spcBef>
-                  <a:spcAft>
-                    <a:spcPct val="0"/>
-                  </a:spcAft>
-                  <a:defRPr>
-                    <a:solidFill>
-                      <a:schemeClr val="tx1"/>
-                    </a:solidFill>
-                    <a:latin typeface="Calibri" panose="020F0502020204030204" pitchFamily="34" charset="0"/>
-                  </a:defRPr>
-                </a:lvl6pPr>
-                <a:lvl7pPr marL="2971800" indent="-228600" eaLnBrk="0" fontAlgn="base" hangingPunct="0">
-                  <a:spcBef>
-                    <a:spcPct val="0"/>
-                  </a:spcBef>
-                  <a:spcAft>
-                    <a:spcPct val="0"/>
-                  </a:spcAft>
-                  <a:defRPr>
-                    <a:solidFill>
-                      <a:schemeClr val="tx1"/>
-                    </a:solidFill>
-                    <a:latin typeface="Calibri" panose="020F0502020204030204" pitchFamily="34" charset="0"/>
-                  </a:defRPr>
-                </a:lvl7pPr>
-                <a:lvl8pPr marL="3429000" indent="-228600" eaLnBrk="0" fontAlgn="base" hangingPunct="0">
-                  <a:spcBef>
-                    <a:spcPct val="0"/>
-                  </a:spcBef>
-                  <a:spcAft>
-                    <a:spcPct val="0"/>
-                  </a:spcAft>
-                  <a:defRPr>
-                    <a:solidFill>
-                      <a:schemeClr val="tx1"/>
-                    </a:solidFill>
-                    <a:latin typeface="Calibri" panose="020F0502020204030204" pitchFamily="34" charset="0"/>
-                  </a:defRPr>
-                </a:lvl8pPr>
-                <a:lvl9pPr marL="3886200" indent="-228600" eaLnBrk="0" fontAlgn="base" hangingPunct="0">
-                  <a:spcBef>
-                    <a:spcPct val="0"/>
-                  </a:spcBef>
-                  <a:spcAft>
-                    <a:spcPct val="0"/>
-                  </a:spcAft>
-                  <a:defRPr>
-                    <a:solidFill>
-                      <a:schemeClr val="tx1"/>
-                    </a:solidFill>
-                    <a:latin typeface="Calibri" panose="020F0502020204030204" pitchFamily="34" charset="0"/>
-                  </a:defRPr>
-                </a:lvl9pPr>
-              </a:lstStyle>
-              <a:p>
-                <a:pPr algn="ctr" eaLnBrk="1" hangingPunct="1"/>
-                <a:r>
-                  <a:rPr lang="en-US" altLang="en-US" sz="1100" b="1" dirty="0">
-                    <a:solidFill>
-                      <a:schemeClr val="bg1"/>
-                    </a:solidFill>
-                    <a:latin typeface="+mj-lt"/>
-                    <a:ea typeface="Amazon Ember" panose="020B0603020204020204" pitchFamily="34" charset="0"/>
-                    <a:cs typeface="Arial" panose="020B0604020202020204" pitchFamily="34" charset="0"/>
-                  </a:rPr>
-                  <a:t>MongoDB,</a:t>
-                </a:r>
-              </a:p>
-              <a:p>
-                <a:pPr algn="ctr" eaLnBrk="1" hangingPunct="1"/>
-                <a:r>
-                  <a:rPr lang="en-US" altLang="en-US" sz="1100" b="1" dirty="0">
-                    <a:solidFill>
-                      <a:schemeClr val="bg1"/>
-                    </a:solidFill>
-                    <a:latin typeface="+mj-lt"/>
-                    <a:ea typeface="Amazon Ember" panose="020B0603020204020204" pitchFamily="34" charset="0"/>
-                    <a:cs typeface="Arial" panose="020B0604020202020204" pitchFamily="34" charset="0"/>
-                  </a:rPr>
-                  <a:t>PostgreSQL</a:t>
-                </a:r>
-              </a:p>
-            </p:txBody>
-          </p:sp>
-          <p:pic>
-            <p:nvPicPr>
-              <p:cNvPr id="46" name="Graphic 10">
-                <a:extLst>
-                  <a:ext uri="{FF2B5EF4-FFF2-40B4-BE49-F238E27FC236}">
-                    <a16:creationId xmlns:a16="http://schemas.microsoft.com/office/drawing/2014/main" id="{6617A1D9-409F-15DE-CC52-DE413211DE73}"/>
-                  </a:ext>
-                </a:extLst>
-              </p:cNvPr>
-              <p:cNvPicPr>
-                <a:picLocks noChangeAspect="1" noChangeArrowheads="1"/>
-              </p:cNvPicPr>
-              <p:nvPr/>
-            </p:nvPicPr>
-            <p:blipFill>
-              <a:blip r:embed="rId18">
-                <a:extLst>
-                  <a:ext uri="{28A0092B-C50C-407E-A947-70E740481C1C}">
-                    <a14:useLocalDpi xmlns:a14="http://schemas.microsoft.com/office/drawing/2010/main" val="0"/>
-                  </a:ext>
-                </a:extLst>
-              </a:blip>
-              <a:srcRect/>
-              <a:stretch>
-                <a:fillRect/>
-              </a:stretch>
-            </p:blipFill>
-            <p:spPr bwMode="auto">
-              <a:xfrm>
-                <a:off x="3455825" y="5606254"/>
-                <a:ext cx="548640" cy="548640"/>
-              </a:xfrm>
-              <a:prstGeom prst="rect">
-                <a:avLst/>
-              </a:prstGeom>
-              <a:noFill/>
-              <a:ln>
-                <a:noFill/>
-              </a:ln>
-              <a:extLst>
-                <a:ext uri="{909E8E84-426E-40DD-AFC4-6F175D3DCCD1}">
-                  <a14:hiddenFill xmlns:a14="http://schemas.microsoft.com/office/drawing/2010/main">
-                    <a:solidFill>
-                      <a:srgbClr val="FFFFFF"/>
-                    </a:solidFill>
-                  </a14:hiddenFill>
-                </a:ext>
-                <a:ext uri="{91240B29-F687-4F45-9708-019B960494DF}">
-                  <a14:hiddenLine xmlns:a14="http://schemas.microsoft.com/office/drawing/2010/main" w="9525">
-                    <a:solidFill>
-                      <a:srgbClr val="000000"/>
-                    </a:solidFill>
-                    <a:miter lim="800000"/>
-                    <a:headEnd/>
-                    <a:tailEnd/>
-                  </a14:hiddenLine>
-                </a:ext>
-              </a:extLst>
-            </p:spPr>
-          </p:pic>
-        </p:grpSp>
-        <p:grpSp>
-          <p:nvGrpSpPr>
-            <p:cNvPr id="26" name="Group 25">
-              <a:extLst>
-                <a:ext uri="{FF2B5EF4-FFF2-40B4-BE49-F238E27FC236}">
-                  <a16:creationId xmlns:a16="http://schemas.microsoft.com/office/drawing/2014/main" id="{6BAEA63F-A29D-8D2F-2B83-0919927ED399}"/>
-                </a:ext>
-              </a:extLst>
-            </p:cNvPr>
-            <p:cNvGrpSpPr/>
-            <p:nvPr/>
-          </p:nvGrpSpPr>
-          <p:grpSpPr>
-            <a:xfrm>
-              <a:off x="7564120" y="5619305"/>
-              <a:ext cx="1051560" cy="992045"/>
-              <a:chOff x="7148392" y="5593736"/>
-              <a:chExt cx="1051560" cy="992045"/>
-            </a:xfrm>
-          </p:grpSpPr>
-          <p:sp>
-            <p:nvSpPr>
-              <p:cNvPr id="7" name="TextBox 11">
-                <a:extLst>
-                  <a:ext uri="{FF2B5EF4-FFF2-40B4-BE49-F238E27FC236}">
-                    <a16:creationId xmlns:a16="http://schemas.microsoft.com/office/drawing/2014/main" id="{9F78F5AA-A513-5719-7273-839BFED55752}"/>
-                  </a:ext>
-                </a:extLst>
-              </p:cNvPr>
-              <p:cNvSpPr txBox="1">
-                <a:spLocks noChangeArrowheads="1"/>
-              </p:cNvSpPr>
-              <p:nvPr/>
-            </p:nvSpPr>
-            <p:spPr bwMode="auto">
-              <a:xfrm>
-                <a:off x="7148392" y="6154894"/>
-                <a:ext cx="1051560" cy="430887"/>
-              </a:xfrm>
-              <a:prstGeom prst="rect">
-                <a:avLst/>
-              </a:prstGeom>
-              <a:noFill/>
-              <a:ln>
-                <a:noFill/>
-              </a:ln>
-              <a:extLst>
-                <a:ext uri="{909E8E84-426E-40DD-AFC4-6F175D3DCCD1}">
-                  <a14:hiddenFill xmlns:a14="http://schemas.microsoft.com/office/drawing/2010/main">
-                    <a:solidFill>
-                      <a:srgbClr val="FFFFFF"/>
-                    </a:solidFill>
-                  </a14:hiddenFill>
-                </a:ext>
-                <a:ext uri="{91240B29-F687-4F45-9708-019B960494DF}">
-                  <a14:hiddenLine xmlns:a14="http://schemas.microsoft.com/office/drawing/2010/main" w="9525">
-                    <a:solidFill>
-                      <a:srgbClr val="000000"/>
-                    </a:solidFill>
-                    <a:miter lim="800000"/>
-                    <a:headEnd/>
-                    <a:tailEnd/>
-                  </a14:hiddenLine>
-                </a:ext>
-              </a:extLst>
-            </p:spPr>
-            <p:txBody>
-              <a:bodyPr wrap="square">
-                <a:spAutoFit/>
-              </a:bodyPr>
-              <a:lstStyle>
-                <a:lvl1pPr>
-                  <a:defRPr>
-                    <a:solidFill>
-                      <a:schemeClr val="tx1"/>
-                    </a:solidFill>
-                    <a:latin typeface="Calibri" panose="020F0502020204030204" pitchFamily="34" charset="0"/>
-                  </a:defRPr>
-                </a:lvl1pPr>
-                <a:lvl2pPr marL="742950" indent="-285750">
-                  <a:defRPr>
-                    <a:solidFill>
-                      <a:schemeClr val="tx1"/>
-                    </a:solidFill>
-                    <a:latin typeface="Calibri" panose="020F0502020204030204" pitchFamily="34" charset="0"/>
-                  </a:defRPr>
-                </a:lvl2pPr>
-                <a:lvl3pPr marL="1143000" indent="-228600">
-                  <a:defRPr>
-                    <a:solidFill>
-                      <a:schemeClr val="tx1"/>
-                    </a:solidFill>
-                    <a:latin typeface="Calibri" panose="020F0502020204030204" pitchFamily="34" charset="0"/>
-                  </a:defRPr>
-                </a:lvl3pPr>
-                <a:lvl4pPr marL="1600200" indent="-228600">
-                  <a:defRPr>
-                    <a:solidFill>
-                      <a:schemeClr val="tx1"/>
-                    </a:solidFill>
-                    <a:latin typeface="Calibri" panose="020F0502020204030204" pitchFamily="34" charset="0"/>
-                  </a:defRPr>
-                </a:lvl4pPr>
-                <a:lvl5pPr marL="2057400" indent="-228600">
-                  <a:defRPr>
-                    <a:solidFill>
-                      <a:schemeClr val="tx1"/>
-                    </a:solidFill>
-                    <a:latin typeface="Calibri" panose="020F0502020204030204" pitchFamily="34" charset="0"/>
-                  </a:defRPr>
-                </a:lvl5pPr>
-                <a:lvl6pPr marL="2514600" indent="-228600" eaLnBrk="0" fontAlgn="base" hangingPunct="0">
-                  <a:spcBef>
-                    <a:spcPct val="0"/>
-                  </a:spcBef>
-                  <a:spcAft>
-                    <a:spcPct val="0"/>
-                  </a:spcAft>
-                  <a:defRPr>
-                    <a:solidFill>
-                      <a:schemeClr val="tx1"/>
-                    </a:solidFill>
-                    <a:latin typeface="Calibri" panose="020F0502020204030204" pitchFamily="34" charset="0"/>
-                  </a:defRPr>
-                </a:lvl6pPr>
-                <a:lvl7pPr marL="2971800" indent="-228600" eaLnBrk="0" fontAlgn="base" hangingPunct="0">
-                  <a:spcBef>
-                    <a:spcPct val="0"/>
-                  </a:spcBef>
-                  <a:spcAft>
-                    <a:spcPct val="0"/>
-                  </a:spcAft>
-                  <a:defRPr>
-                    <a:solidFill>
-                      <a:schemeClr val="tx1"/>
-                    </a:solidFill>
-                    <a:latin typeface="Calibri" panose="020F0502020204030204" pitchFamily="34" charset="0"/>
-                  </a:defRPr>
-                </a:lvl7pPr>
-                <a:lvl8pPr marL="3429000" indent="-228600" eaLnBrk="0" fontAlgn="base" hangingPunct="0">
-                  <a:spcBef>
-                    <a:spcPct val="0"/>
-                  </a:spcBef>
-                  <a:spcAft>
-                    <a:spcPct val="0"/>
-                  </a:spcAft>
-                  <a:defRPr>
-                    <a:solidFill>
-                      <a:schemeClr val="tx1"/>
-                    </a:solidFill>
-                    <a:latin typeface="Calibri" panose="020F0502020204030204" pitchFamily="34" charset="0"/>
-                  </a:defRPr>
-                </a:lvl8pPr>
-                <a:lvl9pPr marL="3886200" indent="-228600" eaLnBrk="0" fontAlgn="base" hangingPunct="0">
-                  <a:spcBef>
-                    <a:spcPct val="0"/>
-                  </a:spcBef>
-                  <a:spcAft>
-                    <a:spcPct val="0"/>
-                  </a:spcAft>
-                  <a:defRPr>
-                    <a:solidFill>
-                      <a:schemeClr val="tx1"/>
-                    </a:solidFill>
-                    <a:latin typeface="Calibri" panose="020F0502020204030204" pitchFamily="34" charset="0"/>
-                  </a:defRPr>
-                </a:lvl9pPr>
-              </a:lstStyle>
-              <a:p>
-                <a:pPr algn="ctr" eaLnBrk="1" hangingPunct="1"/>
-                <a:r>
-                  <a:rPr lang="en-US" altLang="en-US" sz="1100" b="1" dirty="0">
-                    <a:solidFill>
-                      <a:schemeClr val="bg1"/>
-                    </a:solidFill>
-                    <a:latin typeface="+mj-lt"/>
-                    <a:ea typeface="Amazon Ember" panose="020B0603020204020204" pitchFamily="34" charset="0"/>
-                    <a:cs typeface="Arial" panose="020B0604020202020204" pitchFamily="34" charset="0"/>
-                  </a:rPr>
-                  <a:t>Firemon Cloud Defense</a:t>
-                </a:r>
-              </a:p>
-            </p:txBody>
-          </p:sp>
-          <p:pic>
-            <p:nvPicPr>
-              <p:cNvPr id="1026" name="Picture 2" descr="FireMon Company Updates | Glassdoor">
-                <a:extLst>
-                  <a:ext uri="{FF2B5EF4-FFF2-40B4-BE49-F238E27FC236}">
-                    <a16:creationId xmlns:a16="http://schemas.microsoft.com/office/drawing/2014/main" id="{EEFAA6CA-7B0D-3179-A8B7-CE0BB5626AD2}"/>
-                  </a:ext>
-                </a:extLst>
-              </p:cNvPr>
-              <p:cNvPicPr>
-                <a:picLocks noChangeAspect="1" noChangeArrowheads="1"/>
-              </p:cNvPicPr>
-              <p:nvPr/>
-            </p:nvPicPr>
-            <p:blipFill>
-              <a:blip r:embed="rId19">
-                <a:extLst>
-                  <a:ext uri="{28A0092B-C50C-407E-A947-70E740481C1C}">
-                    <a14:useLocalDpi xmlns:a14="http://schemas.microsoft.com/office/drawing/2010/main" val="0"/>
-                  </a:ext>
-                </a:extLst>
-              </a:blip>
-              <a:srcRect/>
-              <a:stretch>
-                <a:fillRect/>
-              </a:stretch>
-            </p:blipFill>
-            <p:spPr bwMode="auto">
-              <a:xfrm>
-                <a:off x="7399852" y="5593736"/>
-                <a:ext cx="548640" cy="548640"/>
-              </a:xfrm>
-              <a:prstGeom prst="rect">
-                <a:avLst/>
-              </a:prstGeom>
-              <a:noFill/>
-              <a:extLst>
-                <a:ext uri="{909E8E84-426E-40DD-AFC4-6F175D3DCCD1}">
-                  <a14:hiddenFill xmlns:a14="http://schemas.microsoft.com/office/drawing/2010/main">
-                    <a:solidFill>
-                      <a:srgbClr val="FFFFFF"/>
-                    </a:solidFill>
-                  </a14:hiddenFill>
-                </a:ext>
-              </a:extLst>
-            </p:spPr>
-          </p:pic>
-        </p:grpSp>
-      </p:grpSp>
+          <a:prstGeom prst="rect">
+            <a:avLst/>
+          </a:prstGeom>
+          <a:solidFill>
+            <a:srgbClr val="FAFAFA">
+              <a:alpha val="20000"/>
+            </a:srgbClr>
+          </a:solidFill>
+          <a:ln w="12700">
+            <a:noFill/>
+            <a:prstDash val="dash"/>
+          </a:ln>
+        </p:spPr>
+        <p:style>
+          <a:lnRef idx="2">
+            <a:schemeClr val="accent1">
+              <a:shade val="50000"/>
+            </a:schemeClr>
+          </a:lnRef>
+          <a:fillRef idx="1">
+            <a:schemeClr val="accent1"/>
+          </a:fillRef>
+          <a:effectRef idx="0">
+            <a:schemeClr val="accent1"/>
+          </a:effectRef>
+          <a:fontRef idx="minor">
+            <a:schemeClr val="lt1"/>
+          </a:fontRef>
+        </p:style>
+        <p:txBody>
+          <a:bodyPr tIns="91440"/>
+          <a:lstStyle/>
+          <a:p>
+            <a:pPr algn="ctr" eaLnBrk="1" fontAlgn="auto" hangingPunct="1">
+              <a:spcBef>
+                <a:spcPts val="0"/>
+              </a:spcBef>
+              <a:spcAft>
+                <a:spcPts val="0"/>
+              </a:spcAft>
+              <a:defRPr/>
+            </a:pPr>
+            <a:endParaRPr lang="en-US" sz="1100" dirty="0">
+              <a:solidFill>
+                <a:schemeClr val="bg1"/>
+              </a:solidFill>
+              <a:latin typeface="+mj-lt"/>
+              <a:cs typeface="Arial" panose="020B0604020202020204" pitchFamily="34" charset="0"/>
+            </a:endParaRPr>
+          </a:p>
+        </p:txBody>
+      </p:sp>
       <p:pic>
         <p:nvPicPr>
-          <p:cNvPr id="50" name="Picture 4" descr="Oracle Cloud Infrastructure - YouTube">
-            <a:extLst>
-              <a:ext uri="{FF2B5EF4-FFF2-40B4-BE49-F238E27FC236}">
-                <a16:creationId xmlns:a16="http://schemas.microsoft.com/office/drawing/2014/main" id="{73D0EF48-EE4F-CAD8-9887-48C5E7772023}"/>
+          <p:cNvPr id="35" name="Graphic 19">
+            <a:extLst>
+              <a:ext uri="{FF2B5EF4-FFF2-40B4-BE49-F238E27FC236}">
+                <a16:creationId xmlns:a16="http://schemas.microsoft.com/office/drawing/2014/main" id="{D2DAF613-D8BD-3380-58A8-5BAB202AF083}"/>
               </a:ext>
             </a:extLst>
           </p:cNvPr>
@@ -14600,7 +13843,7 @@
           <p:nvPr/>
         </p:nvPicPr>
         <p:blipFill>
-          <a:blip r:embed="rId20">
+          <a:blip r:embed="rId15">
             <a:extLst>
               <a:ext uri="{28A0092B-C50C-407E-A947-70E740481C1C}">
                 <a14:useLocalDpi xmlns:a14="http://schemas.microsoft.com/office/drawing/2010/main" val="0"/>
@@ -14614,8 +13857,1092 @@
         </p:blipFill>
         <p:spPr bwMode="auto">
           <a:xfrm>
-            <a:off x="4671020" y="2867643"/>
-            <a:ext cx="996696" cy="996696"/>
+            <a:off x="5443180" y="5552367"/>
+            <a:ext cx="640080" cy="640080"/>
+          </a:xfrm>
+          <a:prstGeom prst="rect">
+            <a:avLst/>
+          </a:prstGeom>
+          <a:noFill/>
+          <a:ln>
+            <a:noFill/>
+          </a:ln>
+          <a:extLst>
+            <a:ext uri="{909E8E84-426E-40DD-AFC4-6F175D3DCCD1}">
+              <a14:hiddenFill xmlns:a14="http://schemas.microsoft.com/office/drawing/2010/main">
+                <a:solidFill>
+                  <a:srgbClr val="FFFFFF"/>
+                </a:solidFill>
+              </a14:hiddenFill>
+            </a:ext>
+            <a:ext uri="{91240B29-F687-4F45-9708-019B960494DF}">
+              <a14:hiddenLine xmlns:a14="http://schemas.microsoft.com/office/drawing/2010/main" w="9525">
+                <a:solidFill>
+                  <a:srgbClr val="000000"/>
+                </a:solidFill>
+                <a:miter lim="800000"/>
+                <a:headEnd/>
+                <a:tailEnd/>
+              </a14:hiddenLine>
+            </a:ext>
+          </a:extLst>
+        </p:spPr>
+      </p:pic>
+      <p:sp>
+        <p:nvSpPr>
+          <p:cNvPr id="36" name="TextBox 12">
+            <a:extLst>
+              <a:ext uri="{FF2B5EF4-FFF2-40B4-BE49-F238E27FC236}">
+                <a16:creationId xmlns:a16="http://schemas.microsoft.com/office/drawing/2014/main" id="{3168B3C9-C653-D5A4-3A61-2E0ED75D4320}"/>
+              </a:ext>
+            </a:extLst>
+          </p:cNvPr>
+          <p:cNvSpPr txBox="1">
+            <a:spLocks noChangeArrowheads="1"/>
+          </p:cNvSpPr>
+          <p:nvPr/>
+        </p:nvSpPr>
+        <p:spPr bwMode="auto">
+          <a:xfrm>
+            <a:off x="5193622" y="6189532"/>
+            <a:ext cx="1129637" cy="523220"/>
+          </a:xfrm>
+          <a:prstGeom prst="rect">
+            <a:avLst/>
+          </a:prstGeom>
+          <a:noFill/>
+          <a:ln>
+            <a:noFill/>
+          </a:ln>
+          <a:extLst>
+            <a:ext uri="{909E8E84-426E-40DD-AFC4-6F175D3DCCD1}">
+              <a14:hiddenFill xmlns:a14="http://schemas.microsoft.com/office/drawing/2010/main">
+                <a:solidFill>
+                  <a:srgbClr val="FFFFFF"/>
+                </a:solidFill>
+              </a14:hiddenFill>
+            </a:ext>
+            <a:ext uri="{91240B29-F687-4F45-9708-019B960494DF}">
+              <a14:hiddenLine xmlns:a14="http://schemas.microsoft.com/office/drawing/2010/main" w="9525">
+                <a:solidFill>
+                  <a:srgbClr val="000000"/>
+                </a:solidFill>
+                <a:miter lim="800000"/>
+                <a:headEnd/>
+                <a:tailEnd/>
+              </a14:hiddenLine>
+            </a:ext>
+          </a:extLst>
+        </p:spPr>
+        <p:txBody>
+          <a:bodyPr wrap="square">
+            <a:spAutoFit/>
+          </a:bodyPr>
+          <a:lstStyle>
+            <a:lvl1pPr>
+              <a:defRPr>
+                <a:solidFill>
+                  <a:schemeClr val="tx1"/>
+                </a:solidFill>
+                <a:latin typeface="Calibri" panose="020F0502020204030204" pitchFamily="34" charset="0"/>
+              </a:defRPr>
+            </a:lvl1pPr>
+            <a:lvl2pPr marL="742950" indent="-285750">
+              <a:defRPr>
+                <a:solidFill>
+                  <a:schemeClr val="tx1"/>
+                </a:solidFill>
+                <a:latin typeface="Calibri" panose="020F0502020204030204" pitchFamily="34" charset="0"/>
+              </a:defRPr>
+            </a:lvl2pPr>
+            <a:lvl3pPr marL="1143000" indent="-228600">
+              <a:defRPr>
+                <a:solidFill>
+                  <a:schemeClr val="tx1"/>
+                </a:solidFill>
+                <a:latin typeface="Calibri" panose="020F0502020204030204" pitchFamily="34" charset="0"/>
+              </a:defRPr>
+            </a:lvl3pPr>
+            <a:lvl4pPr marL="1600200" indent="-228600">
+              <a:defRPr>
+                <a:solidFill>
+                  <a:schemeClr val="tx1"/>
+                </a:solidFill>
+                <a:latin typeface="Calibri" panose="020F0502020204030204" pitchFamily="34" charset="0"/>
+              </a:defRPr>
+            </a:lvl4pPr>
+            <a:lvl5pPr marL="2057400" indent="-228600">
+              <a:defRPr>
+                <a:solidFill>
+                  <a:schemeClr val="tx1"/>
+                </a:solidFill>
+                <a:latin typeface="Calibri" panose="020F0502020204030204" pitchFamily="34" charset="0"/>
+              </a:defRPr>
+            </a:lvl5pPr>
+            <a:lvl6pPr marL="2514600" indent="-228600" eaLnBrk="0" fontAlgn="base" hangingPunct="0">
+              <a:spcBef>
+                <a:spcPct val="0"/>
+              </a:spcBef>
+              <a:spcAft>
+                <a:spcPct val="0"/>
+              </a:spcAft>
+              <a:defRPr>
+                <a:solidFill>
+                  <a:schemeClr val="tx1"/>
+                </a:solidFill>
+                <a:latin typeface="Calibri" panose="020F0502020204030204" pitchFamily="34" charset="0"/>
+              </a:defRPr>
+            </a:lvl6pPr>
+            <a:lvl7pPr marL="2971800" indent="-228600" eaLnBrk="0" fontAlgn="base" hangingPunct="0">
+              <a:spcBef>
+                <a:spcPct val="0"/>
+              </a:spcBef>
+              <a:spcAft>
+                <a:spcPct val="0"/>
+              </a:spcAft>
+              <a:defRPr>
+                <a:solidFill>
+                  <a:schemeClr val="tx1"/>
+                </a:solidFill>
+                <a:latin typeface="Calibri" panose="020F0502020204030204" pitchFamily="34" charset="0"/>
+              </a:defRPr>
+            </a:lvl7pPr>
+            <a:lvl8pPr marL="3429000" indent="-228600" eaLnBrk="0" fontAlgn="base" hangingPunct="0">
+              <a:spcBef>
+                <a:spcPct val="0"/>
+              </a:spcBef>
+              <a:spcAft>
+                <a:spcPct val="0"/>
+              </a:spcAft>
+              <a:defRPr>
+                <a:solidFill>
+                  <a:schemeClr val="tx1"/>
+                </a:solidFill>
+                <a:latin typeface="Calibri" panose="020F0502020204030204" pitchFamily="34" charset="0"/>
+              </a:defRPr>
+            </a:lvl8pPr>
+            <a:lvl9pPr marL="3886200" indent="-228600" eaLnBrk="0" fontAlgn="base" hangingPunct="0">
+              <a:spcBef>
+                <a:spcPct val="0"/>
+              </a:spcBef>
+              <a:spcAft>
+                <a:spcPct val="0"/>
+              </a:spcAft>
+              <a:defRPr>
+                <a:solidFill>
+                  <a:schemeClr val="tx1"/>
+                </a:solidFill>
+                <a:latin typeface="Calibri" panose="020F0502020204030204" pitchFamily="34" charset="0"/>
+              </a:defRPr>
+            </a:lvl9pPr>
+          </a:lstStyle>
+          <a:p>
+            <a:pPr algn="ctr" eaLnBrk="1" hangingPunct="1"/>
+            <a:r>
+              <a:rPr lang="en-US" altLang="en-US" sz="1400" b="1" dirty="0">
+                <a:solidFill>
+                  <a:schemeClr val="bg1"/>
+                </a:solidFill>
+                <a:latin typeface="+mj-lt"/>
+                <a:ea typeface="Amazon Ember" panose="020B0603020204020204" pitchFamily="34" charset="0"/>
+                <a:cs typeface="Arial" panose="020B0604020202020204" pitchFamily="34" charset="0"/>
+              </a:rPr>
+              <a:t>AWS Security Hub</a:t>
+            </a:r>
+          </a:p>
+        </p:txBody>
+      </p:sp>
+      <p:pic>
+        <p:nvPicPr>
+          <p:cNvPr id="39" name="Graphic 16">
+            <a:extLst>
+              <a:ext uri="{FF2B5EF4-FFF2-40B4-BE49-F238E27FC236}">
+                <a16:creationId xmlns:a16="http://schemas.microsoft.com/office/drawing/2014/main" id="{0B15E7EF-81AB-9F76-740A-808EC8C56C65}"/>
+              </a:ext>
+            </a:extLst>
+          </p:cNvPr>
+          <p:cNvPicPr>
+            <a:picLocks noChangeAspect="1" noChangeArrowheads="1"/>
+          </p:cNvPicPr>
+          <p:nvPr/>
+        </p:nvPicPr>
+        <p:blipFill>
+          <a:blip r:embed="rId16">
+            <a:extLst>
+              <a:ext uri="{96DAC541-7B7A-43D3-8B79-37D633B846F1}">
+                <asvg:svgBlip xmlns:asvg="http://schemas.microsoft.com/office/drawing/2016/SVG/main" r:embed="rId17"/>
+              </a:ext>
+            </a:extLst>
+          </a:blip>
+          <a:srcRect/>
+          <a:stretch/>
+        </p:blipFill>
+        <p:spPr bwMode="auto">
+          <a:xfrm>
+            <a:off x="3392734" y="5552367"/>
+            <a:ext cx="640080" cy="640080"/>
+          </a:xfrm>
+          <a:prstGeom prst="rect">
+            <a:avLst/>
+          </a:prstGeom>
+          <a:noFill/>
+          <a:ln>
+            <a:noFill/>
+          </a:ln>
+          <a:extLst>
+            <a:ext uri="{909E8E84-426E-40DD-AFC4-6F175D3DCCD1}">
+              <a14:hiddenFill xmlns:a14="http://schemas.microsoft.com/office/drawing/2010/main">
+                <a:solidFill>
+                  <a:srgbClr val="FFFFFF"/>
+                </a:solidFill>
+              </a14:hiddenFill>
+            </a:ext>
+            <a:ext uri="{91240B29-F687-4F45-9708-019B960494DF}">
+              <a14:hiddenLine xmlns:a14="http://schemas.microsoft.com/office/drawing/2010/main" w="9525">
+                <a:solidFill>
+                  <a:srgbClr val="000000"/>
+                </a:solidFill>
+                <a:miter lim="800000"/>
+                <a:headEnd/>
+                <a:tailEnd/>
+              </a14:hiddenLine>
+            </a:ext>
+          </a:extLst>
+        </p:spPr>
+      </p:pic>
+      <p:sp>
+        <p:nvSpPr>
+          <p:cNvPr id="40" name="TextBox 33">
+            <a:extLst>
+              <a:ext uri="{FF2B5EF4-FFF2-40B4-BE49-F238E27FC236}">
+                <a16:creationId xmlns:a16="http://schemas.microsoft.com/office/drawing/2014/main" id="{2B9F4387-007C-A863-E06D-057C44D1A8B7}"/>
+              </a:ext>
+            </a:extLst>
+          </p:cNvPr>
+          <p:cNvSpPr txBox="1">
+            <a:spLocks noChangeArrowheads="1"/>
+          </p:cNvSpPr>
+          <p:nvPr/>
+        </p:nvSpPr>
+        <p:spPr bwMode="auto">
+          <a:xfrm>
+            <a:off x="3088711" y="6189532"/>
+            <a:ext cx="1260275" cy="523220"/>
+          </a:xfrm>
+          <a:prstGeom prst="rect">
+            <a:avLst/>
+          </a:prstGeom>
+          <a:noFill/>
+          <a:ln>
+            <a:noFill/>
+          </a:ln>
+          <a:extLst>
+            <a:ext uri="{909E8E84-426E-40DD-AFC4-6F175D3DCCD1}">
+              <a14:hiddenFill xmlns:a14="http://schemas.microsoft.com/office/drawing/2010/main">
+                <a:solidFill>
+                  <a:srgbClr val="FFFFFF"/>
+                </a:solidFill>
+              </a14:hiddenFill>
+            </a:ext>
+            <a:ext uri="{91240B29-F687-4F45-9708-019B960494DF}">
+              <a14:hiddenLine xmlns:a14="http://schemas.microsoft.com/office/drawing/2010/main" w="9525">
+                <a:solidFill>
+                  <a:srgbClr val="000000"/>
+                </a:solidFill>
+                <a:miter lim="800000"/>
+                <a:headEnd/>
+                <a:tailEnd/>
+              </a14:hiddenLine>
+            </a:ext>
+          </a:extLst>
+        </p:spPr>
+        <p:txBody>
+          <a:bodyPr wrap="square">
+            <a:spAutoFit/>
+          </a:bodyPr>
+          <a:lstStyle>
+            <a:lvl1pPr>
+              <a:defRPr>
+                <a:solidFill>
+                  <a:schemeClr val="tx1"/>
+                </a:solidFill>
+                <a:latin typeface="Calibri" panose="020F0502020204030204" pitchFamily="34" charset="0"/>
+              </a:defRPr>
+            </a:lvl1pPr>
+            <a:lvl2pPr marL="742950" indent="-285750">
+              <a:defRPr>
+                <a:solidFill>
+                  <a:schemeClr val="tx1"/>
+                </a:solidFill>
+                <a:latin typeface="Calibri" panose="020F0502020204030204" pitchFamily="34" charset="0"/>
+              </a:defRPr>
+            </a:lvl2pPr>
+            <a:lvl3pPr marL="1143000" indent="-228600">
+              <a:defRPr>
+                <a:solidFill>
+                  <a:schemeClr val="tx1"/>
+                </a:solidFill>
+                <a:latin typeface="Calibri" panose="020F0502020204030204" pitchFamily="34" charset="0"/>
+              </a:defRPr>
+            </a:lvl3pPr>
+            <a:lvl4pPr marL="1600200" indent="-228600">
+              <a:defRPr>
+                <a:solidFill>
+                  <a:schemeClr val="tx1"/>
+                </a:solidFill>
+                <a:latin typeface="Calibri" panose="020F0502020204030204" pitchFamily="34" charset="0"/>
+              </a:defRPr>
+            </a:lvl4pPr>
+            <a:lvl5pPr marL="2057400" indent="-228600">
+              <a:defRPr>
+                <a:solidFill>
+                  <a:schemeClr val="tx1"/>
+                </a:solidFill>
+                <a:latin typeface="Calibri" panose="020F0502020204030204" pitchFamily="34" charset="0"/>
+              </a:defRPr>
+            </a:lvl5pPr>
+            <a:lvl6pPr marL="2514600" indent="-228600" eaLnBrk="0" fontAlgn="base" hangingPunct="0">
+              <a:spcBef>
+                <a:spcPct val="0"/>
+              </a:spcBef>
+              <a:spcAft>
+                <a:spcPct val="0"/>
+              </a:spcAft>
+              <a:defRPr>
+                <a:solidFill>
+                  <a:schemeClr val="tx1"/>
+                </a:solidFill>
+                <a:latin typeface="Calibri" panose="020F0502020204030204" pitchFamily="34" charset="0"/>
+              </a:defRPr>
+            </a:lvl6pPr>
+            <a:lvl7pPr marL="2971800" indent="-228600" eaLnBrk="0" fontAlgn="base" hangingPunct="0">
+              <a:spcBef>
+                <a:spcPct val="0"/>
+              </a:spcBef>
+              <a:spcAft>
+                <a:spcPct val="0"/>
+              </a:spcAft>
+              <a:defRPr>
+                <a:solidFill>
+                  <a:schemeClr val="tx1"/>
+                </a:solidFill>
+                <a:latin typeface="Calibri" panose="020F0502020204030204" pitchFamily="34" charset="0"/>
+              </a:defRPr>
+            </a:lvl7pPr>
+            <a:lvl8pPr marL="3429000" indent="-228600" eaLnBrk="0" fontAlgn="base" hangingPunct="0">
+              <a:spcBef>
+                <a:spcPct val="0"/>
+              </a:spcBef>
+              <a:spcAft>
+                <a:spcPct val="0"/>
+              </a:spcAft>
+              <a:defRPr>
+                <a:solidFill>
+                  <a:schemeClr val="tx1"/>
+                </a:solidFill>
+                <a:latin typeface="Calibri" panose="020F0502020204030204" pitchFamily="34" charset="0"/>
+              </a:defRPr>
+            </a:lvl8pPr>
+            <a:lvl9pPr marL="3886200" indent="-228600" eaLnBrk="0" fontAlgn="base" hangingPunct="0">
+              <a:spcBef>
+                <a:spcPct val="0"/>
+              </a:spcBef>
+              <a:spcAft>
+                <a:spcPct val="0"/>
+              </a:spcAft>
+              <a:defRPr>
+                <a:solidFill>
+                  <a:schemeClr val="tx1"/>
+                </a:solidFill>
+                <a:latin typeface="Calibri" panose="020F0502020204030204" pitchFamily="34" charset="0"/>
+              </a:defRPr>
+            </a:lvl9pPr>
+          </a:lstStyle>
+          <a:p>
+            <a:pPr algn="ctr" eaLnBrk="1" hangingPunct="1"/>
+            <a:r>
+              <a:rPr lang="en-US" altLang="en-US" sz="1400" b="1" dirty="0">
+                <a:solidFill>
+                  <a:schemeClr val="bg1"/>
+                </a:solidFill>
+                <a:latin typeface="+mj-lt"/>
+                <a:cs typeface="Arial" panose="020B0604020202020204" pitchFamily="34" charset="0"/>
+              </a:rPr>
+              <a:t>HTML, JSON,</a:t>
+            </a:r>
+          </a:p>
+          <a:p>
+            <a:pPr algn="ctr" eaLnBrk="1" hangingPunct="1"/>
+            <a:r>
+              <a:rPr lang="en-US" altLang="en-US" sz="1400" b="1" dirty="0">
+                <a:solidFill>
+                  <a:schemeClr val="bg1"/>
+                </a:solidFill>
+                <a:latin typeface="+mj-lt"/>
+                <a:cs typeface="Arial" panose="020B0604020202020204" pitchFamily="34" charset="0"/>
+              </a:rPr>
+              <a:t>CSV</a:t>
+            </a:r>
+          </a:p>
+        </p:txBody>
+      </p:sp>
+      <p:pic>
+        <p:nvPicPr>
+          <p:cNvPr id="43" name="Graphic 18">
+            <a:extLst>
+              <a:ext uri="{FF2B5EF4-FFF2-40B4-BE49-F238E27FC236}">
+                <a16:creationId xmlns:a16="http://schemas.microsoft.com/office/drawing/2014/main" id="{46C1D956-00C8-E3E3-A65B-3466292AEC94}"/>
+              </a:ext>
+            </a:extLst>
+          </p:cNvPr>
+          <p:cNvPicPr>
+            <a:picLocks noChangeAspect="1" noChangeArrowheads="1"/>
+          </p:cNvPicPr>
+          <p:nvPr/>
+        </p:nvPicPr>
+        <p:blipFill>
+          <a:blip r:embed="rId18">
+            <a:extLst>
+              <a:ext uri="{28A0092B-C50C-407E-A947-70E740481C1C}">
+                <a14:useLocalDpi xmlns:a14="http://schemas.microsoft.com/office/drawing/2010/main" val="0"/>
+              </a:ext>
+            </a:extLst>
+          </a:blip>
+          <a:srcRect/>
+          <a:stretch>
+            <a:fillRect/>
+          </a:stretch>
+        </p:blipFill>
+        <p:spPr bwMode="auto">
+          <a:xfrm>
+            <a:off x="4417957" y="5552367"/>
+            <a:ext cx="640080" cy="640080"/>
+          </a:xfrm>
+          <a:prstGeom prst="rect">
+            <a:avLst/>
+          </a:prstGeom>
+          <a:noFill/>
+          <a:ln>
+            <a:noFill/>
+          </a:ln>
+          <a:extLst>
+            <a:ext uri="{909E8E84-426E-40DD-AFC4-6F175D3DCCD1}">
+              <a14:hiddenFill xmlns:a14="http://schemas.microsoft.com/office/drawing/2010/main">
+                <a:solidFill>
+                  <a:srgbClr val="FFFFFF"/>
+                </a:solidFill>
+              </a14:hiddenFill>
+            </a:ext>
+            <a:ext uri="{91240B29-F687-4F45-9708-019B960494DF}">
+              <a14:hiddenLine xmlns:a14="http://schemas.microsoft.com/office/drawing/2010/main" w="9525">
+                <a:solidFill>
+                  <a:srgbClr val="000000"/>
+                </a:solidFill>
+                <a:miter lim="800000"/>
+                <a:headEnd/>
+                <a:tailEnd/>
+              </a14:hiddenLine>
+            </a:ext>
+          </a:extLst>
+        </p:spPr>
+      </p:pic>
+      <p:sp>
+        <p:nvSpPr>
+          <p:cNvPr id="44" name="TextBox 11">
+            <a:extLst>
+              <a:ext uri="{FF2B5EF4-FFF2-40B4-BE49-F238E27FC236}">
+                <a16:creationId xmlns:a16="http://schemas.microsoft.com/office/drawing/2014/main" id="{AF0DFB57-0EA5-1522-9EE9-03E1643EF3C4}"/>
+              </a:ext>
+            </a:extLst>
+          </p:cNvPr>
+          <p:cNvSpPr txBox="1">
+            <a:spLocks noChangeArrowheads="1"/>
+          </p:cNvSpPr>
+          <p:nvPr/>
+        </p:nvSpPr>
+        <p:spPr bwMode="auto">
+          <a:xfrm>
+            <a:off x="4128263" y="6189532"/>
+            <a:ext cx="1207140" cy="523220"/>
+          </a:xfrm>
+          <a:prstGeom prst="rect">
+            <a:avLst/>
+          </a:prstGeom>
+          <a:noFill/>
+          <a:ln>
+            <a:noFill/>
+          </a:ln>
+          <a:extLst>
+            <a:ext uri="{909E8E84-426E-40DD-AFC4-6F175D3DCCD1}">
+              <a14:hiddenFill xmlns:a14="http://schemas.microsoft.com/office/drawing/2010/main">
+                <a:solidFill>
+                  <a:srgbClr val="FFFFFF"/>
+                </a:solidFill>
+              </a14:hiddenFill>
+            </a:ext>
+            <a:ext uri="{91240B29-F687-4F45-9708-019B960494DF}">
+              <a14:hiddenLine xmlns:a14="http://schemas.microsoft.com/office/drawing/2010/main" w="9525">
+                <a:solidFill>
+                  <a:srgbClr val="000000"/>
+                </a:solidFill>
+                <a:miter lim="800000"/>
+                <a:headEnd/>
+                <a:tailEnd/>
+              </a14:hiddenLine>
+            </a:ext>
+          </a:extLst>
+        </p:spPr>
+        <p:txBody>
+          <a:bodyPr wrap="square">
+            <a:spAutoFit/>
+          </a:bodyPr>
+          <a:lstStyle>
+            <a:lvl1pPr>
+              <a:defRPr>
+                <a:solidFill>
+                  <a:schemeClr val="tx1"/>
+                </a:solidFill>
+                <a:latin typeface="Calibri" panose="020F0502020204030204" pitchFamily="34" charset="0"/>
+              </a:defRPr>
+            </a:lvl1pPr>
+            <a:lvl2pPr marL="742950" indent="-285750">
+              <a:defRPr>
+                <a:solidFill>
+                  <a:schemeClr val="tx1"/>
+                </a:solidFill>
+                <a:latin typeface="Calibri" panose="020F0502020204030204" pitchFamily="34" charset="0"/>
+              </a:defRPr>
+            </a:lvl2pPr>
+            <a:lvl3pPr marL="1143000" indent="-228600">
+              <a:defRPr>
+                <a:solidFill>
+                  <a:schemeClr val="tx1"/>
+                </a:solidFill>
+                <a:latin typeface="Calibri" panose="020F0502020204030204" pitchFamily="34" charset="0"/>
+              </a:defRPr>
+            </a:lvl3pPr>
+            <a:lvl4pPr marL="1600200" indent="-228600">
+              <a:defRPr>
+                <a:solidFill>
+                  <a:schemeClr val="tx1"/>
+                </a:solidFill>
+                <a:latin typeface="Calibri" panose="020F0502020204030204" pitchFamily="34" charset="0"/>
+              </a:defRPr>
+            </a:lvl4pPr>
+            <a:lvl5pPr marL="2057400" indent="-228600">
+              <a:defRPr>
+                <a:solidFill>
+                  <a:schemeClr val="tx1"/>
+                </a:solidFill>
+                <a:latin typeface="Calibri" panose="020F0502020204030204" pitchFamily="34" charset="0"/>
+              </a:defRPr>
+            </a:lvl5pPr>
+            <a:lvl6pPr marL="2514600" indent="-228600" eaLnBrk="0" fontAlgn="base" hangingPunct="0">
+              <a:spcBef>
+                <a:spcPct val="0"/>
+              </a:spcBef>
+              <a:spcAft>
+                <a:spcPct val="0"/>
+              </a:spcAft>
+              <a:defRPr>
+                <a:solidFill>
+                  <a:schemeClr val="tx1"/>
+                </a:solidFill>
+                <a:latin typeface="Calibri" panose="020F0502020204030204" pitchFamily="34" charset="0"/>
+              </a:defRPr>
+            </a:lvl6pPr>
+            <a:lvl7pPr marL="2971800" indent="-228600" eaLnBrk="0" fontAlgn="base" hangingPunct="0">
+              <a:spcBef>
+                <a:spcPct val="0"/>
+              </a:spcBef>
+              <a:spcAft>
+                <a:spcPct val="0"/>
+              </a:spcAft>
+              <a:defRPr>
+                <a:solidFill>
+                  <a:schemeClr val="tx1"/>
+                </a:solidFill>
+                <a:latin typeface="Calibri" panose="020F0502020204030204" pitchFamily="34" charset="0"/>
+              </a:defRPr>
+            </a:lvl7pPr>
+            <a:lvl8pPr marL="3429000" indent="-228600" eaLnBrk="0" fontAlgn="base" hangingPunct="0">
+              <a:spcBef>
+                <a:spcPct val="0"/>
+              </a:spcBef>
+              <a:spcAft>
+                <a:spcPct val="0"/>
+              </a:spcAft>
+              <a:defRPr>
+                <a:solidFill>
+                  <a:schemeClr val="tx1"/>
+                </a:solidFill>
+                <a:latin typeface="Calibri" panose="020F0502020204030204" pitchFamily="34" charset="0"/>
+              </a:defRPr>
+            </a:lvl8pPr>
+            <a:lvl9pPr marL="3886200" indent="-228600" eaLnBrk="0" fontAlgn="base" hangingPunct="0">
+              <a:spcBef>
+                <a:spcPct val="0"/>
+              </a:spcBef>
+              <a:spcAft>
+                <a:spcPct val="0"/>
+              </a:spcAft>
+              <a:defRPr>
+                <a:solidFill>
+                  <a:schemeClr val="tx1"/>
+                </a:solidFill>
+                <a:latin typeface="Calibri" panose="020F0502020204030204" pitchFamily="34" charset="0"/>
+              </a:defRPr>
+            </a:lvl9pPr>
+          </a:lstStyle>
+          <a:p>
+            <a:pPr algn="ctr" eaLnBrk="1" hangingPunct="1"/>
+            <a:r>
+              <a:rPr lang="en-US" altLang="en-US" sz="1400" b="1" dirty="0">
+                <a:solidFill>
+                  <a:schemeClr val="bg1"/>
+                </a:solidFill>
+                <a:latin typeface="+mj-lt"/>
+                <a:ea typeface="Amazon Ember" panose="020B0603020204020204" pitchFamily="34" charset="0"/>
+                <a:cs typeface="Arial" panose="020B0604020202020204" pitchFamily="34" charset="0"/>
+              </a:rPr>
+              <a:t>Amazon DocumentDB</a:t>
+            </a:r>
+          </a:p>
+        </p:txBody>
+      </p:sp>
+      <p:sp>
+        <p:nvSpPr>
+          <p:cNvPr id="45" name="TextBox 11">
+            <a:extLst>
+              <a:ext uri="{FF2B5EF4-FFF2-40B4-BE49-F238E27FC236}">
+                <a16:creationId xmlns:a16="http://schemas.microsoft.com/office/drawing/2014/main" id="{5403259A-FD0E-15A7-723A-F88B42E0162C}"/>
+              </a:ext>
+            </a:extLst>
+          </p:cNvPr>
+          <p:cNvSpPr txBox="1">
+            <a:spLocks noChangeArrowheads="1"/>
+          </p:cNvSpPr>
+          <p:nvPr/>
+        </p:nvSpPr>
+        <p:spPr bwMode="auto">
+          <a:xfrm>
+            <a:off x="2171469" y="6189532"/>
+            <a:ext cx="1083324" cy="523220"/>
+          </a:xfrm>
+          <a:prstGeom prst="rect">
+            <a:avLst/>
+          </a:prstGeom>
+          <a:noFill/>
+          <a:ln>
+            <a:noFill/>
+          </a:ln>
+          <a:extLst>
+            <a:ext uri="{909E8E84-426E-40DD-AFC4-6F175D3DCCD1}">
+              <a14:hiddenFill xmlns:a14="http://schemas.microsoft.com/office/drawing/2010/main">
+                <a:solidFill>
+                  <a:srgbClr val="FFFFFF"/>
+                </a:solidFill>
+              </a14:hiddenFill>
+            </a:ext>
+            <a:ext uri="{91240B29-F687-4F45-9708-019B960494DF}">
+              <a14:hiddenLine xmlns:a14="http://schemas.microsoft.com/office/drawing/2010/main" w="9525">
+                <a:solidFill>
+                  <a:srgbClr val="000000"/>
+                </a:solidFill>
+                <a:miter lim="800000"/>
+                <a:headEnd/>
+                <a:tailEnd/>
+              </a14:hiddenLine>
+            </a:ext>
+          </a:extLst>
+        </p:spPr>
+        <p:txBody>
+          <a:bodyPr wrap="square">
+            <a:spAutoFit/>
+          </a:bodyPr>
+          <a:lstStyle>
+            <a:lvl1pPr>
+              <a:defRPr>
+                <a:solidFill>
+                  <a:schemeClr val="tx1"/>
+                </a:solidFill>
+                <a:latin typeface="Calibri" panose="020F0502020204030204" pitchFamily="34" charset="0"/>
+              </a:defRPr>
+            </a:lvl1pPr>
+            <a:lvl2pPr marL="742950" indent="-285750">
+              <a:defRPr>
+                <a:solidFill>
+                  <a:schemeClr val="tx1"/>
+                </a:solidFill>
+                <a:latin typeface="Calibri" panose="020F0502020204030204" pitchFamily="34" charset="0"/>
+              </a:defRPr>
+            </a:lvl2pPr>
+            <a:lvl3pPr marL="1143000" indent="-228600">
+              <a:defRPr>
+                <a:solidFill>
+                  <a:schemeClr val="tx1"/>
+                </a:solidFill>
+                <a:latin typeface="Calibri" panose="020F0502020204030204" pitchFamily="34" charset="0"/>
+              </a:defRPr>
+            </a:lvl3pPr>
+            <a:lvl4pPr marL="1600200" indent="-228600">
+              <a:defRPr>
+                <a:solidFill>
+                  <a:schemeClr val="tx1"/>
+                </a:solidFill>
+                <a:latin typeface="Calibri" panose="020F0502020204030204" pitchFamily="34" charset="0"/>
+              </a:defRPr>
+            </a:lvl4pPr>
+            <a:lvl5pPr marL="2057400" indent="-228600">
+              <a:defRPr>
+                <a:solidFill>
+                  <a:schemeClr val="tx1"/>
+                </a:solidFill>
+                <a:latin typeface="Calibri" panose="020F0502020204030204" pitchFamily="34" charset="0"/>
+              </a:defRPr>
+            </a:lvl5pPr>
+            <a:lvl6pPr marL="2514600" indent="-228600" eaLnBrk="0" fontAlgn="base" hangingPunct="0">
+              <a:spcBef>
+                <a:spcPct val="0"/>
+              </a:spcBef>
+              <a:spcAft>
+                <a:spcPct val="0"/>
+              </a:spcAft>
+              <a:defRPr>
+                <a:solidFill>
+                  <a:schemeClr val="tx1"/>
+                </a:solidFill>
+                <a:latin typeface="Calibri" panose="020F0502020204030204" pitchFamily="34" charset="0"/>
+              </a:defRPr>
+            </a:lvl6pPr>
+            <a:lvl7pPr marL="2971800" indent="-228600" eaLnBrk="0" fontAlgn="base" hangingPunct="0">
+              <a:spcBef>
+                <a:spcPct val="0"/>
+              </a:spcBef>
+              <a:spcAft>
+                <a:spcPct val="0"/>
+              </a:spcAft>
+              <a:defRPr>
+                <a:solidFill>
+                  <a:schemeClr val="tx1"/>
+                </a:solidFill>
+                <a:latin typeface="Calibri" panose="020F0502020204030204" pitchFamily="34" charset="0"/>
+              </a:defRPr>
+            </a:lvl7pPr>
+            <a:lvl8pPr marL="3429000" indent="-228600" eaLnBrk="0" fontAlgn="base" hangingPunct="0">
+              <a:spcBef>
+                <a:spcPct val="0"/>
+              </a:spcBef>
+              <a:spcAft>
+                <a:spcPct val="0"/>
+              </a:spcAft>
+              <a:defRPr>
+                <a:solidFill>
+                  <a:schemeClr val="tx1"/>
+                </a:solidFill>
+                <a:latin typeface="Calibri" panose="020F0502020204030204" pitchFamily="34" charset="0"/>
+              </a:defRPr>
+            </a:lvl8pPr>
+            <a:lvl9pPr marL="3886200" indent="-228600" eaLnBrk="0" fontAlgn="base" hangingPunct="0">
+              <a:spcBef>
+                <a:spcPct val="0"/>
+              </a:spcBef>
+              <a:spcAft>
+                <a:spcPct val="0"/>
+              </a:spcAft>
+              <a:defRPr>
+                <a:solidFill>
+                  <a:schemeClr val="tx1"/>
+                </a:solidFill>
+                <a:latin typeface="Calibri" panose="020F0502020204030204" pitchFamily="34" charset="0"/>
+              </a:defRPr>
+            </a:lvl9pPr>
+          </a:lstStyle>
+          <a:p>
+            <a:pPr algn="ctr" eaLnBrk="1" hangingPunct="1"/>
+            <a:r>
+              <a:rPr lang="en-US" altLang="en-US" sz="1400" b="1" dirty="0">
+                <a:solidFill>
+                  <a:schemeClr val="bg1"/>
+                </a:solidFill>
+                <a:latin typeface="+mj-lt"/>
+                <a:ea typeface="Amazon Ember" panose="020B0603020204020204" pitchFamily="34" charset="0"/>
+                <a:cs typeface="Arial" panose="020B0604020202020204" pitchFamily="34" charset="0"/>
+              </a:rPr>
+              <a:t>MongoDB,</a:t>
+            </a:r>
+          </a:p>
+          <a:p>
+            <a:pPr algn="ctr" eaLnBrk="1" hangingPunct="1"/>
+            <a:r>
+              <a:rPr lang="en-US" altLang="en-US" sz="1400" b="1" dirty="0">
+                <a:solidFill>
+                  <a:schemeClr val="bg1"/>
+                </a:solidFill>
+                <a:latin typeface="+mj-lt"/>
+                <a:ea typeface="Amazon Ember" panose="020B0603020204020204" pitchFamily="34" charset="0"/>
+                <a:cs typeface="Arial" panose="020B0604020202020204" pitchFamily="34" charset="0"/>
+              </a:rPr>
+              <a:t>PostgreSQL</a:t>
+            </a:r>
+          </a:p>
+        </p:txBody>
+      </p:sp>
+      <p:pic>
+        <p:nvPicPr>
+          <p:cNvPr id="46" name="Graphic 10">
+            <a:extLst>
+              <a:ext uri="{FF2B5EF4-FFF2-40B4-BE49-F238E27FC236}">
+                <a16:creationId xmlns:a16="http://schemas.microsoft.com/office/drawing/2014/main" id="{6617A1D9-409F-15DE-CC52-DE413211DE73}"/>
+              </a:ext>
+            </a:extLst>
+          </p:cNvPr>
+          <p:cNvPicPr>
+            <a:picLocks noChangeAspect="1" noChangeArrowheads="1"/>
+          </p:cNvPicPr>
+          <p:nvPr/>
+        </p:nvPicPr>
+        <p:blipFill>
+          <a:blip r:embed="rId19">
+            <a:extLst>
+              <a:ext uri="{28A0092B-C50C-407E-A947-70E740481C1C}">
+                <a14:useLocalDpi xmlns:a14="http://schemas.microsoft.com/office/drawing/2010/main" val="0"/>
+              </a:ext>
+            </a:extLst>
+          </a:blip>
+          <a:srcRect/>
+          <a:stretch>
+            <a:fillRect/>
+          </a:stretch>
+        </p:blipFill>
+        <p:spPr bwMode="auto">
+          <a:xfrm>
+            <a:off x="2367511" y="5552367"/>
+            <a:ext cx="640080" cy="640080"/>
+          </a:xfrm>
+          <a:prstGeom prst="rect">
+            <a:avLst/>
+          </a:prstGeom>
+          <a:noFill/>
+          <a:ln>
+            <a:noFill/>
+          </a:ln>
+          <a:extLst>
+            <a:ext uri="{909E8E84-426E-40DD-AFC4-6F175D3DCCD1}">
+              <a14:hiddenFill xmlns:a14="http://schemas.microsoft.com/office/drawing/2010/main">
+                <a:solidFill>
+                  <a:srgbClr val="FFFFFF"/>
+                </a:solidFill>
+              </a14:hiddenFill>
+            </a:ext>
+            <a:ext uri="{91240B29-F687-4F45-9708-019B960494DF}">
+              <a14:hiddenLine xmlns:a14="http://schemas.microsoft.com/office/drawing/2010/main" w="9525">
+                <a:solidFill>
+                  <a:srgbClr val="000000"/>
+                </a:solidFill>
+                <a:miter lim="800000"/>
+                <a:headEnd/>
+                <a:tailEnd/>
+              </a14:hiddenLine>
+            </a:ext>
+          </a:extLst>
+        </p:spPr>
+      </p:pic>
+      <p:sp>
+        <p:nvSpPr>
+          <p:cNvPr id="7" name="TextBox 11">
+            <a:extLst>
+              <a:ext uri="{FF2B5EF4-FFF2-40B4-BE49-F238E27FC236}">
+                <a16:creationId xmlns:a16="http://schemas.microsoft.com/office/drawing/2014/main" id="{9F78F5AA-A513-5719-7273-839BFED55752}"/>
+              </a:ext>
+            </a:extLst>
+          </p:cNvPr>
+          <p:cNvSpPr txBox="1">
+            <a:spLocks noChangeArrowheads="1"/>
+          </p:cNvSpPr>
+          <p:nvPr/>
+        </p:nvSpPr>
+        <p:spPr bwMode="auto">
+          <a:xfrm>
+            <a:off x="6181572" y="6189532"/>
+            <a:ext cx="1213783" cy="523220"/>
+          </a:xfrm>
+          <a:prstGeom prst="rect">
+            <a:avLst/>
+          </a:prstGeom>
+          <a:noFill/>
+          <a:ln>
+            <a:noFill/>
+          </a:ln>
+          <a:extLst>
+            <a:ext uri="{909E8E84-426E-40DD-AFC4-6F175D3DCCD1}">
+              <a14:hiddenFill xmlns:a14="http://schemas.microsoft.com/office/drawing/2010/main">
+                <a:solidFill>
+                  <a:srgbClr val="FFFFFF"/>
+                </a:solidFill>
+              </a14:hiddenFill>
+            </a:ext>
+            <a:ext uri="{91240B29-F687-4F45-9708-019B960494DF}">
+              <a14:hiddenLine xmlns:a14="http://schemas.microsoft.com/office/drawing/2010/main" w="9525">
+                <a:solidFill>
+                  <a:srgbClr val="000000"/>
+                </a:solidFill>
+                <a:miter lim="800000"/>
+                <a:headEnd/>
+                <a:tailEnd/>
+              </a14:hiddenLine>
+            </a:ext>
+          </a:extLst>
+        </p:spPr>
+        <p:txBody>
+          <a:bodyPr wrap="square">
+            <a:spAutoFit/>
+          </a:bodyPr>
+          <a:lstStyle>
+            <a:lvl1pPr>
+              <a:defRPr>
+                <a:solidFill>
+                  <a:schemeClr val="tx1"/>
+                </a:solidFill>
+                <a:latin typeface="Calibri" panose="020F0502020204030204" pitchFamily="34" charset="0"/>
+              </a:defRPr>
+            </a:lvl1pPr>
+            <a:lvl2pPr marL="742950" indent="-285750">
+              <a:defRPr>
+                <a:solidFill>
+                  <a:schemeClr val="tx1"/>
+                </a:solidFill>
+                <a:latin typeface="Calibri" panose="020F0502020204030204" pitchFamily="34" charset="0"/>
+              </a:defRPr>
+            </a:lvl2pPr>
+            <a:lvl3pPr marL="1143000" indent="-228600">
+              <a:defRPr>
+                <a:solidFill>
+                  <a:schemeClr val="tx1"/>
+                </a:solidFill>
+                <a:latin typeface="Calibri" panose="020F0502020204030204" pitchFamily="34" charset="0"/>
+              </a:defRPr>
+            </a:lvl3pPr>
+            <a:lvl4pPr marL="1600200" indent="-228600">
+              <a:defRPr>
+                <a:solidFill>
+                  <a:schemeClr val="tx1"/>
+                </a:solidFill>
+                <a:latin typeface="Calibri" panose="020F0502020204030204" pitchFamily="34" charset="0"/>
+              </a:defRPr>
+            </a:lvl4pPr>
+            <a:lvl5pPr marL="2057400" indent="-228600">
+              <a:defRPr>
+                <a:solidFill>
+                  <a:schemeClr val="tx1"/>
+                </a:solidFill>
+                <a:latin typeface="Calibri" panose="020F0502020204030204" pitchFamily="34" charset="0"/>
+              </a:defRPr>
+            </a:lvl5pPr>
+            <a:lvl6pPr marL="2514600" indent="-228600" eaLnBrk="0" fontAlgn="base" hangingPunct="0">
+              <a:spcBef>
+                <a:spcPct val="0"/>
+              </a:spcBef>
+              <a:spcAft>
+                <a:spcPct val="0"/>
+              </a:spcAft>
+              <a:defRPr>
+                <a:solidFill>
+                  <a:schemeClr val="tx1"/>
+                </a:solidFill>
+                <a:latin typeface="Calibri" panose="020F0502020204030204" pitchFamily="34" charset="0"/>
+              </a:defRPr>
+            </a:lvl6pPr>
+            <a:lvl7pPr marL="2971800" indent="-228600" eaLnBrk="0" fontAlgn="base" hangingPunct="0">
+              <a:spcBef>
+                <a:spcPct val="0"/>
+              </a:spcBef>
+              <a:spcAft>
+                <a:spcPct val="0"/>
+              </a:spcAft>
+              <a:defRPr>
+                <a:solidFill>
+                  <a:schemeClr val="tx1"/>
+                </a:solidFill>
+                <a:latin typeface="Calibri" panose="020F0502020204030204" pitchFamily="34" charset="0"/>
+              </a:defRPr>
+            </a:lvl7pPr>
+            <a:lvl8pPr marL="3429000" indent="-228600" eaLnBrk="0" fontAlgn="base" hangingPunct="0">
+              <a:spcBef>
+                <a:spcPct val="0"/>
+              </a:spcBef>
+              <a:spcAft>
+                <a:spcPct val="0"/>
+              </a:spcAft>
+              <a:defRPr>
+                <a:solidFill>
+                  <a:schemeClr val="tx1"/>
+                </a:solidFill>
+                <a:latin typeface="Calibri" panose="020F0502020204030204" pitchFamily="34" charset="0"/>
+              </a:defRPr>
+            </a:lvl8pPr>
+            <a:lvl9pPr marL="3886200" indent="-228600" eaLnBrk="0" fontAlgn="base" hangingPunct="0">
+              <a:spcBef>
+                <a:spcPct val="0"/>
+              </a:spcBef>
+              <a:spcAft>
+                <a:spcPct val="0"/>
+              </a:spcAft>
+              <a:defRPr>
+                <a:solidFill>
+                  <a:schemeClr val="tx1"/>
+                </a:solidFill>
+                <a:latin typeface="Calibri" panose="020F0502020204030204" pitchFamily="34" charset="0"/>
+              </a:defRPr>
+            </a:lvl9pPr>
+          </a:lstStyle>
+          <a:p>
+            <a:pPr algn="ctr" eaLnBrk="1" hangingPunct="1"/>
+            <a:r>
+              <a:rPr lang="en-US" altLang="en-US" sz="1400" b="1" dirty="0">
+                <a:solidFill>
+                  <a:schemeClr val="bg1"/>
+                </a:solidFill>
+                <a:latin typeface="+mj-lt"/>
+                <a:ea typeface="Amazon Ember" panose="020B0603020204020204" pitchFamily="34" charset="0"/>
+                <a:cs typeface="Arial" panose="020B0604020202020204" pitchFamily="34" charset="0"/>
+              </a:rPr>
+              <a:t>Firemon Cloud Defense</a:t>
+            </a:r>
+          </a:p>
+        </p:txBody>
+      </p:sp>
+      <p:pic>
+        <p:nvPicPr>
+          <p:cNvPr id="1026" name="Picture 2" descr="FireMon Company Updates | Glassdoor">
+            <a:extLst>
+              <a:ext uri="{FF2B5EF4-FFF2-40B4-BE49-F238E27FC236}">
+                <a16:creationId xmlns:a16="http://schemas.microsoft.com/office/drawing/2014/main" id="{EEFAA6CA-7B0D-3179-A8B7-CE0BB5626AD2}"/>
+              </a:ext>
+            </a:extLst>
+          </p:cNvPr>
+          <p:cNvPicPr>
+            <a:picLocks noChangeAspect="1" noChangeArrowheads="1"/>
+          </p:cNvPicPr>
+          <p:nvPr/>
+        </p:nvPicPr>
+        <p:blipFill>
+          <a:blip r:embed="rId20">
+            <a:extLst>
+              <a:ext uri="{28A0092B-C50C-407E-A947-70E740481C1C}">
+                <a14:useLocalDpi xmlns:a14="http://schemas.microsoft.com/office/drawing/2010/main" val="0"/>
+              </a:ext>
+            </a:extLst>
+          </a:blip>
+          <a:srcRect/>
+          <a:stretch>
+            <a:fillRect/>
+          </a:stretch>
+        </p:blipFill>
+        <p:spPr bwMode="auto">
+          <a:xfrm>
+            <a:off x="6468403" y="5552367"/>
+            <a:ext cx="640080" cy="640080"/>
           </a:xfrm>
           <a:prstGeom prst="rect">
             <a:avLst/>
@@ -14632,6 +14959,53 @@
           </a:extLst>
         </p:spPr>
       </p:pic>
+      <p:pic>
+        <p:nvPicPr>
+          <p:cNvPr id="50" name="Picture 4" descr="Oracle Cloud Infrastructure - YouTube">
+            <a:extLst>
+              <a:ext uri="{FF2B5EF4-FFF2-40B4-BE49-F238E27FC236}">
+                <a16:creationId xmlns:a16="http://schemas.microsoft.com/office/drawing/2014/main" id="{73D0EF48-EE4F-CAD8-9887-48C5E7772023}"/>
+              </a:ext>
+            </a:extLst>
+          </p:cNvPr>
+          <p:cNvPicPr>
+            <a:picLocks noChangeAspect="1" noChangeArrowheads="1"/>
+          </p:cNvPicPr>
+          <p:nvPr/>
+        </p:nvPicPr>
+        <p:blipFill>
+          <a:blip r:embed="rId21">
+            <a:extLst>
+              <a:ext uri="{28A0092B-C50C-407E-A947-70E740481C1C}">
+                <a14:useLocalDpi xmlns:a14="http://schemas.microsoft.com/office/drawing/2010/main" val="0"/>
+              </a:ext>
+            </a:extLst>
+          </a:blip>
+          <a:srcRect/>
+          <a:stretch>
+            <a:fillRect/>
+          </a:stretch>
+        </p:blipFill>
+        <p:spPr bwMode="auto">
+          <a:xfrm>
+            <a:off x="4838218" y="2666457"/>
+            <a:ext cx="822960" cy="822960"/>
+          </a:xfrm>
+          <a:prstGeom prst="rect">
+            <a:avLst/>
+          </a:prstGeom>
+          <a:noFill/>
+          <a:extLst>
+            <a:ext uri="{909E8E84-426E-40DD-AFC4-6F175D3DCCD1}">
+              <a14:hiddenFill xmlns:a14="http://schemas.microsoft.com/office/drawing/2010/main">
+                <a:solidFill>
+                  <a:srgbClr val="FFFFFF"/>
+                </a:solidFill>
+              </a14:hiddenFill>
+            </a:ext>
+          </a:extLst>
+        </p:spPr>
+      </p:pic>
       <p:sp>
         <p:nvSpPr>
           <p:cNvPr id="18" name="Rectangle: Rounded Corners 17">
@@ -14646,7 +15020,7 @@
         </p:nvSpPr>
         <p:spPr>
           <a:xfrm>
-            <a:off x="2271320" y="2648424"/>
+            <a:off x="3343205" y="2413720"/>
             <a:ext cx="1074420" cy="463441"/>
           </a:xfrm>
           <a:prstGeom prst="roundRect">
@@ -14706,7 +15080,7 @@
           <p:nvPr/>
         </p:nvPicPr>
         <p:blipFill>
-          <a:blip r:embed="rId21">
+          <a:blip r:embed="rId22">
             <a:extLst>
               <a:ext uri="{28A0092B-C50C-407E-A947-70E740481C1C}">
                 <a14:useLocalDpi xmlns:a14="http://schemas.microsoft.com/office/drawing/2010/main" val="0"/>
@@ -14720,8 +15094,8 @@
         </p:blipFill>
         <p:spPr bwMode="auto">
           <a:xfrm>
-            <a:off x="6051403" y="2867643"/>
-            <a:ext cx="996696" cy="996696"/>
+            <a:off x="6048273" y="2666457"/>
+            <a:ext cx="822960" cy="822960"/>
           </a:xfrm>
           <a:prstGeom prst="rect">
             <a:avLst/>
@@ -14753,7 +15127,7 @@
           <p:nvPr/>
         </p:nvPicPr>
         <p:blipFill>
-          <a:blip r:embed="rId22">
+          <a:blip r:embed="rId23">
             <a:extLst>
               <a:ext uri="{28A0092B-C50C-407E-A947-70E740481C1C}">
                 <a14:useLocalDpi xmlns:a14="http://schemas.microsoft.com/office/drawing/2010/main" val="0"/>
@@ -14767,8 +15141,8 @@
         </p:blipFill>
         <p:spPr bwMode="auto">
           <a:xfrm>
-            <a:off x="7858522" y="2881022"/>
-            <a:ext cx="996696" cy="996696"/>
+            <a:off x="8035134" y="2666457"/>
+            <a:ext cx="822960" cy="822960"/>
           </a:xfrm>
           <a:prstGeom prst="rect">
             <a:avLst/>
@@ -14799,8 +15173,8 @@
         </p:nvSpPr>
         <p:spPr>
           <a:xfrm>
-            <a:off x="2865667" y="1033195"/>
-            <a:ext cx="9176781" cy="365760"/>
+            <a:off x="2855111" y="1033195"/>
+            <a:ext cx="9187337" cy="365760"/>
           </a:xfrm>
           <a:prstGeom prst="roundRect">
             <a:avLst/>
@@ -14848,10 +15222,10 @@
       </p:sp>
       <p:sp>
         <p:nvSpPr>
-          <p:cNvPr id="19" name="Rectangle: Rounded Corners 18">
-            <a:extLst>
-              <a:ext uri="{FF2B5EF4-FFF2-40B4-BE49-F238E27FC236}">
-                <a16:creationId xmlns:a16="http://schemas.microsoft.com/office/drawing/2014/main" id="{5777DF44-469B-7A2F-8877-71FC31533BAB}"/>
+          <p:cNvPr id="2" name="Rectangle: Rounded Corners 1">
+            <a:extLst>
+              <a:ext uri="{FF2B5EF4-FFF2-40B4-BE49-F238E27FC236}">
+                <a16:creationId xmlns:a16="http://schemas.microsoft.com/office/drawing/2014/main" id="{2CBB7894-144C-A36C-3DB9-4368ED6A1E03}"/>
               </a:ext>
             </a:extLst>
           </p:cNvPr>
@@ -14860,7 +15234,1049 @@
         </p:nvSpPr>
         <p:spPr>
           <a:xfrm>
-            <a:off x="6916100" y="2650721"/>
+            <a:off x="6784476" y="3642597"/>
+            <a:ext cx="1337669" cy="388221"/>
+          </a:xfrm>
+          <a:prstGeom prst="roundRect">
+            <a:avLst/>
+          </a:prstGeom>
+          <a:solidFill>
+            <a:srgbClr val="00B0F0"/>
+          </a:solidFill>
+          <a:ln>
+            <a:noFill/>
+          </a:ln>
+        </p:spPr>
+        <p:style>
+          <a:lnRef idx="2">
+            <a:schemeClr val="accent1">
+              <a:shade val="50000"/>
+            </a:schemeClr>
+          </a:lnRef>
+          <a:fillRef idx="1">
+            <a:schemeClr val="accent1"/>
+          </a:fillRef>
+          <a:effectRef idx="0">
+            <a:schemeClr val="accent1"/>
+          </a:effectRef>
+          <a:fontRef idx="minor">
+            <a:schemeClr val="lt1"/>
+          </a:fontRef>
+        </p:style>
+        <p:txBody>
+          <a:bodyPr rtlCol="0" anchor="ctr"/>
+          <a:lstStyle/>
+          <a:p>
+            <a:pPr algn="ctr"/>
+            <a:r>
+              <a:rPr lang="en-US" sz="1600" b="1" dirty="0">
+                <a:solidFill>
+                  <a:schemeClr val="tx1"/>
+                </a:solidFill>
+              </a:rPr>
+              <a:t>COMING SOON!</a:t>
+            </a:r>
+          </a:p>
+        </p:txBody>
+      </p:sp>
+      <p:pic>
+        <p:nvPicPr>
+          <p:cNvPr id="3" name="Picture 2" descr="VirusTotal (@virustotal) / Twitter">
+            <a:extLst>
+              <a:ext uri="{FF2B5EF4-FFF2-40B4-BE49-F238E27FC236}">
+                <a16:creationId xmlns:a16="http://schemas.microsoft.com/office/drawing/2014/main" id="{B2203F62-B0B5-3ECC-F801-BAE4FC12F9F0}"/>
+              </a:ext>
+            </a:extLst>
+          </p:cNvPr>
+          <p:cNvPicPr>
+            <a:picLocks noChangeAspect="1" noChangeArrowheads="1"/>
+          </p:cNvPicPr>
+          <p:nvPr/>
+        </p:nvPicPr>
+        <p:blipFill>
+          <a:blip r:embed="rId24">
+            <a:extLst>
+              <a:ext uri="{28A0092B-C50C-407E-A947-70E740481C1C}">
+                <a14:useLocalDpi xmlns:a14="http://schemas.microsoft.com/office/drawing/2010/main" val="0"/>
+              </a:ext>
+            </a:extLst>
+          </a:blip>
+          <a:srcRect/>
+          <a:stretch>
+            <a:fillRect/>
+          </a:stretch>
+        </p:blipFill>
+        <p:spPr bwMode="auto">
+          <a:xfrm>
+            <a:off x="11219488" y="1480839"/>
+            <a:ext cx="822960" cy="822960"/>
+          </a:xfrm>
+          <a:prstGeom prst="rect">
+            <a:avLst/>
+          </a:prstGeom>
+          <a:noFill/>
+          <a:extLst>
+            <a:ext uri="{909E8E84-426E-40DD-AFC4-6F175D3DCCD1}">
+              <a14:hiddenFill xmlns:a14="http://schemas.microsoft.com/office/drawing/2010/main">
+                <a:solidFill>
+                  <a:srgbClr val="FFFFFF"/>
+                </a:solidFill>
+              </a14:hiddenFill>
+            </a:ext>
+          </a:extLst>
+        </p:spPr>
+      </p:pic>
+      <p:sp>
+        <p:nvSpPr>
+          <p:cNvPr id="22" name="Rectangle: Rounded Corners 21">
+            <a:extLst>
+              <a:ext uri="{FF2B5EF4-FFF2-40B4-BE49-F238E27FC236}">
+                <a16:creationId xmlns:a16="http://schemas.microsoft.com/office/drawing/2014/main" id="{9BC42681-91A3-C97D-E6CA-4B3ED1F1160A}"/>
+              </a:ext>
+            </a:extLst>
+          </p:cNvPr>
+          <p:cNvSpPr/>
+          <p:nvPr/>
+        </p:nvSpPr>
+        <p:spPr>
+          <a:xfrm>
+            <a:off x="6784476" y="2451330"/>
+            <a:ext cx="1337669" cy="388221"/>
+          </a:xfrm>
+          <a:prstGeom prst="roundRect">
+            <a:avLst/>
+          </a:prstGeom>
+          <a:solidFill>
+            <a:srgbClr val="00B0F0"/>
+          </a:solidFill>
+          <a:ln>
+            <a:noFill/>
+          </a:ln>
+        </p:spPr>
+        <p:style>
+          <a:lnRef idx="2">
+            <a:schemeClr val="accent1">
+              <a:shade val="50000"/>
+            </a:schemeClr>
+          </a:lnRef>
+          <a:fillRef idx="1">
+            <a:schemeClr val="accent1"/>
+          </a:fillRef>
+          <a:effectRef idx="0">
+            <a:schemeClr val="accent1"/>
+          </a:effectRef>
+          <a:fontRef idx="minor">
+            <a:schemeClr val="lt1"/>
+          </a:fontRef>
+        </p:style>
+        <p:txBody>
+          <a:bodyPr rtlCol="0" anchor="ctr"/>
+          <a:lstStyle/>
+          <a:p>
+            <a:pPr algn="ctr"/>
+            <a:r>
+              <a:rPr lang="en-US" sz="1600" b="1" dirty="0">
+                <a:solidFill>
+                  <a:schemeClr val="tx1"/>
+                </a:solidFill>
+              </a:rPr>
+              <a:t>COMING SOON!</a:t>
+            </a:r>
+          </a:p>
+        </p:txBody>
+      </p:sp>
+      <p:pic>
+        <p:nvPicPr>
+          <p:cNvPr id="38" name="Picture 10" descr="Media Kit | Slack">
+            <a:extLst>
+              <a:ext uri="{FF2B5EF4-FFF2-40B4-BE49-F238E27FC236}">
+                <a16:creationId xmlns:a16="http://schemas.microsoft.com/office/drawing/2014/main" id="{0A7F71D9-2FE9-EA9E-D0F5-34648CAD34C9}"/>
+              </a:ext>
+            </a:extLst>
+          </p:cNvPr>
+          <p:cNvPicPr>
+            <a:picLocks noChangeAspect="1" noChangeArrowheads="1"/>
+          </p:cNvPicPr>
+          <p:nvPr/>
+        </p:nvPicPr>
+        <p:blipFill>
+          <a:blip r:embed="rId25">
+            <a:extLst>
+              <a:ext uri="{28A0092B-C50C-407E-A947-70E740481C1C}">
+                <a14:useLocalDpi xmlns:a14="http://schemas.microsoft.com/office/drawing/2010/main" val="0"/>
+              </a:ext>
+            </a:extLst>
+          </a:blip>
+          <a:srcRect/>
+          <a:stretch>
+            <a:fillRect/>
+          </a:stretch>
+        </p:blipFill>
+        <p:spPr bwMode="auto">
+          <a:xfrm>
+            <a:off x="10569349" y="5552367"/>
+            <a:ext cx="640080" cy="640080"/>
+          </a:xfrm>
+          <a:prstGeom prst="rect">
+            <a:avLst/>
+          </a:prstGeom>
+          <a:noFill/>
+          <a:extLst>
+            <a:ext uri="{909E8E84-426E-40DD-AFC4-6F175D3DCCD1}">
+              <a14:hiddenFill xmlns:a14="http://schemas.microsoft.com/office/drawing/2010/main">
+                <a:solidFill>
+                  <a:srgbClr val="FFFFFF"/>
+                </a:solidFill>
+              </a14:hiddenFill>
+            </a:ext>
+          </a:extLst>
+        </p:spPr>
+      </p:pic>
+      <p:sp>
+        <p:nvSpPr>
+          <p:cNvPr id="41" name="TextBox 11">
+            <a:extLst>
+              <a:ext uri="{FF2B5EF4-FFF2-40B4-BE49-F238E27FC236}">
+                <a16:creationId xmlns:a16="http://schemas.microsoft.com/office/drawing/2014/main" id="{2D3DDA4F-AACD-3441-9AAF-BF1A75B056B4}"/>
+              </a:ext>
+            </a:extLst>
+          </p:cNvPr>
+          <p:cNvSpPr txBox="1">
+            <a:spLocks noChangeArrowheads="1"/>
+          </p:cNvSpPr>
+          <p:nvPr/>
+        </p:nvSpPr>
+        <p:spPr bwMode="auto">
+          <a:xfrm>
+            <a:off x="9430134" y="6189532"/>
+            <a:ext cx="868010" cy="523220"/>
+          </a:xfrm>
+          <a:prstGeom prst="rect">
+            <a:avLst/>
+          </a:prstGeom>
+          <a:noFill/>
+          <a:ln>
+            <a:noFill/>
+          </a:ln>
+          <a:extLst>
+            <a:ext uri="{909E8E84-426E-40DD-AFC4-6F175D3DCCD1}">
+              <a14:hiddenFill xmlns:a14="http://schemas.microsoft.com/office/drawing/2010/main">
+                <a:solidFill>
+                  <a:srgbClr val="FFFFFF"/>
+                </a:solidFill>
+              </a14:hiddenFill>
+            </a:ext>
+            <a:ext uri="{91240B29-F687-4F45-9708-019B960494DF}">
+              <a14:hiddenLine xmlns:a14="http://schemas.microsoft.com/office/drawing/2010/main" w="9525">
+                <a:solidFill>
+                  <a:srgbClr val="000000"/>
+                </a:solidFill>
+                <a:miter lim="800000"/>
+                <a:headEnd/>
+                <a:tailEnd/>
+              </a14:hiddenLine>
+            </a:ext>
+          </a:extLst>
+        </p:spPr>
+        <p:txBody>
+          <a:bodyPr wrap="square">
+            <a:spAutoFit/>
+          </a:bodyPr>
+          <a:lstStyle>
+            <a:defPPr>
+              <a:defRPr lang="en-US"/>
+            </a:defPPr>
+            <a:lvl1pPr algn="ctr">
+              <a:defRPr sz="1400" b="1">
+                <a:solidFill>
+                  <a:schemeClr val="bg1"/>
+                </a:solidFill>
+                <a:latin typeface="+mj-lt"/>
+                <a:ea typeface="Amazon Ember" panose="020B0603020204020204" pitchFamily="34" charset="0"/>
+                <a:cs typeface="Arial" panose="020B0604020202020204" pitchFamily="34" charset="0"/>
+              </a:defRPr>
+            </a:lvl1pPr>
+            <a:lvl2pPr marL="742950" indent="-285750">
+              <a:defRPr>
+                <a:latin typeface="Calibri" panose="020F0502020204030204" pitchFamily="34" charset="0"/>
+              </a:defRPr>
+            </a:lvl2pPr>
+            <a:lvl3pPr marL="1143000" indent="-228600">
+              <a:defRPr>
+                <a:latin typeface="Calibri" panose="020F0502020204030204" pitchFamily="34" charset="0"/>
+              </a:defRPr>
+            </a:lvl3pPr>
+            <a:lvl4pPr marL="1600200" indent="-228600">
+              <a:defRPr>
+                <a:latin typeface="Calibri" panose="020F0502020204030204" pitchFamily="34" charset="0"/>
+              </a:defRPr>
+            </a:lvl4pPr>
+            <a:lvl5pPr marL="2057400" indent="-228600">
+              <a:defRPr>
+                <a:latin typeface="Calibri" panose="020F0502020204030204" pitchFamily="34" charset="0"/>
+              </a:defRPr>
+            </a:lvl5pPr>
+            <a:lvl6pPr marL="2514600" indent="-228600" eaLnBrk="0" fontAlgn="base" hangingPunct="0">
+              <a:spcBef>
+                <a:spcPct val="0"/>
+              </a:spcBef>
+              <a:spcAft>
+                <a:spcPct val="0"/>
+              </a:spcAft>
+              <a:defRPr>
+                <a:latin typeface="Calibri" panose="020F0502020204030204" pitchFamily="34" charset="0"/>
+              </a:defRPr>
+            </a:lvl6pPr>
+            <a:lvl7pPr marL="2971800" indent="-228600" eaLnBrk="0" fontAlgn="base" hangingPunct="0">
+              <a:spcBef>
+                <a:spcPct val="0"/>
+              </a:spcBef>
+              <a:spcAft>
+                <a:spcPct val="0"/>
+              </a:spcAft>
+              <a:defRPr>
+                <a:latin typeface="Calibri" panose="020F0502020204030204" pitchFamily="34" charset="0"/>
+              </a:defRPr>
+            </a:lvl7pPr>
+            <a:lvl8pPr marL="3429000" indent="-228600" eaLnBrk="0" fontAlgn="base" hangingPunct="0">
+              <a:spcBef>
+                <a:spcPct val="0"/>
+              </a:spcBef>
+              <a:spcAft>
+                <a:spcPct val="0"/>
+              </a:spcAft>
+              <a:defRPr>
+                <a:latin typeface="Calibri" panose="020F0502020204030204" pitchFamily="34" charset="0"/>
+              </a:defRPr>
+            </a:lvl8pPr>
+            <a:lvl9pPr marL="3886200" indent="-228600" eaLnBrk="0" fontAlgn="base" hangingPunct="0">
+              <a:spcBef>
+                <a:spcPct val="0"/>
+              </a:spcBef>
+              <a:spcAft>
+                <a:spcPct val="0"/>
+              </a:spcAft>
+              <a:defRPr>
+                <a:latin typeface="Calibri" panose="020F0502020204030204" pitchFamily="34" charset="0"/>
+              </a:defRPr>
+            </a:lvl9pPr>
+          </a:lstStyle>
+          <a:p>
+            <a:r>
+              <a:rPr lang="en-US" altLang="en-US" dirty="0"/>
+              <a:t>Microsoft Teams</a:t>
+            </a:r>
+          </a:p>
+        </p:txBody>
+      </p:sp>
+      <p:sp>
+        <p:nvSpPr>
+          <p:cNvPr id="42" name="TextBox 11">
+            <a:extLst>
+              <a:ext uri="{FF2B5EF4-FFF2-40B4-BE49-F238E27FC236}">
+                <a16:creationId xmlns:a16="http://schemas.microsoft.com/office/drawing/2014/main" id="{C1DA38EA-1CFF-5F23-E10A-60E40B1F1D76}"/>
+              </a:ext>
+            </a:extLst>
+          </p:cNvPr>
+          <p:cNvSpPr txBox="1">
+            <a:spLocks noChangeArrowheads="1"/>
+          </p:cNvSpPr>
+          <p:nvPr/>
+        </p:nvSpPr>
+        <p:spPr bwMode="auto">
+          <a:xfrm>
+            <a:off x="10463821" y="6189532"/>
+            <a:ext cx="868010" cy="307777"/>
+          </a:xfrm>
+          <a:prstGeom prst="rect">
+            <a:avLst/>
+          </a:prstGeom>
+          <a:noFill/>
+          <a:ln>
+            <a:noFill/>
+          </a:ln>
+          <a:extLst>
+            <a:ext uri="{909E8E84-426E-40DD-AFC4-6F175D3DCCD1}">
+              <a14:hiddenFill xmlns:a14="http://schemas.microsoft.com/office/drawing/2010/main">
+                <a:solidFill>
+                  <a:srgbClr val="FFFFFF"/>
+                </a:solidFill>
+              </a14:hiddenFill>
+            </a:ext>
+            <a:ext uri="{91240B29-F687-4F45-9708-019B960494DF}">
+              <a14:hiddenLine xmlns:a14="http://schemas.microsoft.com/office/drawing/2010/main" w="9525">
+                <a:solidFill>
+                  <a:srgbClr val="000000"/>
+                </a:solidFill>
+                <a:miter lim="800000"/>
+                <a:headEnd/>
+                <a:tailEnd/>
+              </a14:hiddenLine>
+            </a:ext>
+          </a:extLst>
+        </p:spPr>
+        <p:txBody>
+          <a:bodyPr wrap="square">
+            <a:spAutoFit/>
+          </a:bodyPr>
+          <a:lstStyle>
+            <a:lvl1pPr>
+              <a:defRPr>
+                <a:solidFill>
+                  <a:schemeClr val="tx1"/>
+                </a:solidFill>
+                <a:latin typeface="Calibri" panose="020F0502020204030204" pitchFamily="34" charset="0"/>
+              </a:defRPr>
+            </a:lvl1pPr>
+            <a:lvl2pPr marL="742950" indent="-285750">
+              <a:defRPr>
+                <a:solidFill>
+                  <a:schemeClr val="tx1"/>
+                </a:solidFill>
+                <a:latin typeface="Calibri" panose="020F0502020204030204" pitchFamily="34" charset="0"/>
+              </a:defRPr>
+            </a:lvl2pPr>
+            <a:lvl3pPr marL="1143000" indent="-228600">
+              <a:defRPr>
+                <a:solidFill>
+                  <a:schemeClr val="tx1"/>
+                </a:solidFill>
+                <a:latin typeface="Calibri" panose="020F0502020204030204" pitchFamily="34" charset="0"/>
+              </a:defRPr>
+            </a:lvl3pPr>
+            <a:lvl4pPr marL="1600200" indent="-228600">
+              <a:defRPr>
+                <a:solidFill>
+                  <a:schemeClr val="tx1"/>
+                </a:solidFill>
+                <a:latin typeface="Calibri" panose="020F0502020204030204" pitchFamily="34" charset="0"/>
+              </a:defRPr>
+            </a:lvl4pPr>
+            <a:lvl5pPr marL="2057400" indent="-228600">
+              <a:defRPr>
+                <a:solidFill>
+                  <a:schemeClr val="tx1"/>
+                </a:solidFill>
+                <a:latin typeface="Calibri" panose="020F0502020204030204" pitchFamily="34" charset="0"/>
+              </a:defRPr>
+            </a:lvl5pPr>
+            <a:lvl6pPr marL="2514600" indent="-228600" eaLnBrk="0" fontAlgn="base" hangingPunct="0">
+              <a:spcBef>
+                <a:spcPct val="0"/>
+              </a:spcBef>
+              <a:spcAft>
+                <a:spcPct val="0"/>
+              </a:spcAft>
+              <a:defRPr>
+                <a:solidFill>
+                  <a:schemeClr val="tx1"/>
+                </a:solidFill>
+                <a:latin typeface="Calibri" panose="020F0502020204030204" pitchFamily="34" charset="0"/>
+              </a:defRPr>
+            </a:lvl6pPr>
+            <a:lvl7pPr marL="2971800" indent="-228600" eaLnBrk="0" fontAlgn="base" hangingPunct="0">
+              <a:spcBef>
+                <a:spcPct val="0"/>
+              </a:spcBef>
+              <a:spcAft>
+                <a:spcPct val="0"/>
+              </a:spcAft>
+              <a:defRPr>
+                <a:solidFill>
+                  <a:schemeClr val="tx1"/>
+                </a:solidFill>
+                <a:latin typeface="Calibri" panose="020F0502020204030204" pitchFamily="34" charset="0"/>
+              </a:defRPr>
+            </a:lvl7pPr>
+            <a:lvl8pPr marL="3429000" indent="-228600" eaLnBrk="0" fontAlgn="base" hangingPunct="0">
+              <a:spcBef>
+                <a:spcPct val="0"/>
+              </a:spcBef>
+              <a:spcAft>
+                <a:spcPct val="0"/>
+              </a:spcAft>
+              <a:defRPr>
+                <a:solidFill>
+                  <a:schemeClr val="tx1"/>
+                </a:solidFill>
+                <a:latin typeface="Calibri" panose="020F0502020204030204" pitchFamily="34" charset="0"/>
+              </a:defRPr>
+            </a:lvl8pPr>
+            <a:lvl9pPr marL="3886200" indent="-228600" eaLnBrk="0" fontAlgn="base" hangingPunct="0">
+              <a:spcBef>
+                <a:spcPct val="0"/>
+              </a:spcBef>
+              <a:spcAft>
+                <a:spcPct val="0"/>
+              </a:spcAft>
+              <a:defRPr>
+                <a:solidFill>
+                  <a:schemeClr val="tx1"/>
+                </a:solidFill>
+                <a:latin typeface="Calibri" panose="020F0502020204030204" pitchFamily="34" charset="0"/>
+              </a:defRPr>
+            </a:lvl9pPr>
+          </a:lstStyle>
+          <a:p>
+            <a:pPr algn="ctr" eaLnBrk="1" hangingPunct="1"/>
+            <a:r>
+              <a:rPr lang="en-US" altLang="en-US" sz="1400" b="1" dirty="0">
+                <a:solidFill>
+                  <a:schemeClr val="bg1"/>
+                </a:solidFill>
+                <a:latin typeface="+mj-lt"/>
+                <a:cs typeface="Arial" panose="020B0604020202020204" pitchFamily="34" charset="0"/>
+              </a:rPr>
+              <a:t>Slack</a:t>
+            </a:r>
+          </a:p>
+        </p:txBody>
+      </p:sp>
+      <p:pic>
+        <p:nvPicPr>
+          <p:cNvPr id="60" name="Picture 59">
+            <a:extLst>
+              <a:ext uri="{FF2B5EF4-FFF2-40B4-BE49-F238E27FC236}">
+                <a16:creationId xmlns:a16="http://schemas.microsoft.com/office/drawing/2014/main" id="{67EC8B23-2028-B168-86CF-367439AADE84}"/>
+              </a:ext>
+            </a:extLst>
+          </p:cNvPr>
+          <p:cNvPicPr>
+            <a:picLocks noChangeAspect="1"/>
+          </p:cNvPicPr>
+          <p:nvPr/>
+        </p:nvPicPr>
+        <p:blipFill>
+          <a:blip r:embed="rId26"/>
+          <a:stretch>
+            <a:fillRect/>
+          </a:stretch>
+        </p:blipFill>
+        <p:spPr>
+          <a:xfrm>
+            <a:off x="9544072" y="5552340"/>
+            <a:ext cx="640135" cy="640135"/>
+          </a:xfrm>
+          <a:prstGeom prst="rect">
+            <a:avLst/>
+          </a:prstGeom>
+        </p:spPr>
+      </p:pic>
+      <p:pic>
+        <p:nvPicPr>
+          <p:cNvPr id="62" name="Picture 6" descr="Alibaba Cloud (@alibaba_cloud) / Twitter">
+            <a:extLst>
+              <a:ext uri="{FF2B5EF4-FFF2-40B4-BE49-F238E27FC236}">
+                <a16:creationId xmlns:a16="http://schemas.microsoft.com/office/drawing/2014/main" id="{45CC141F-4B90-8FF2-8929-8C2F0CCEE089}"/>
+              </a:ext>
+            </a:extLst>
+          </p:cNvPr>
+          <p:cNvPicPr>
+            <a:picLocks noChangeAspect="1" noChangeArrowheads="1"/>
+          </p:cNvPicPr>
+          <p:nvPr/>
+        </p:nvPicPr>
+        <p:blipFill>
+          <a:blip r:embed="rId27">
+            <a:extLst>
+              <a:ext uri="{28A0092B-C50C-407E-A947-70E740481C1C}">
+                <a14:useLocalDpi xmlns:a14="http://schemas.microsoft.com/office/drawing/2010/main" val="0"/>
+              </a:ext>
+            </a:extLst>
+          </a:blip>
+          <a:srcRect/>
+          <a:stretch>
+            <a:fillRect/>
+          </a:stretch>
+        </p:blipFill>
+        <p:spPr bwMode="auto">
+          <a:xfrm>
+            <a:off x="4838218" y="3776099"/>
+            <a:ext cx="822960" cy="822960"/>
+          </a:xfrm>
+          <a:prstGeom prst="rect">
+            <a:avLst/>
+          </a:prstGeom>
+          <a:noFill/>
+          <a:extLst>
+            <a:ext uri="{909E8E84-426E-40DD-AFC4-6F175D3DCCD1}">
+              <a14:hiddenFill xmlns:a14="http://schemas.microsoft.com/office/drawing/2010/main">
+                <a:solidFill>
+                  <a:srgbClr val="FFFFFF"/>
+                </a:solidFill>
+              </a14:hiddenFill>
+            </a:ext>
+          </a:extLst>
+        </p:spPr>
+      </p:pic>
+      <p:sp>
+        <p:nvSpPr>
+          <p:cNvPr id="63" name="Rectangle: Rounded Corners 62">
+            <a:extLst>
+              <a:ext uri="{FF2B5EF4-FFF2-40B4-BE49-F238E27FC236}">
+                <a16:creationId xmlns:a16="http://schemas.microsoft.com/office/drawing/2014/main" id="{4C8F1166-317D-1DDF-0A35-7E87254180DC}"/>
+              </a:ext>
+            </a:extLst>
+          </p:cNvPr>
+          <p:cNvSpPr/>
+          <p:nvPr/>
+        </p:nvSpPr>
+        <p:spPr>
+          <a:xfrm>
+            <a:off x="3588872" y="3642596"/>
+            <a:ext cx="1337669" cy="388221"/>
+          </a:xfrm>
+          <a:prstGeom prst="roundRect">
+            <a:avLst/>
+          </a:prstGeom>
+          <a:solidFill>
+            <a:srgbClr val="00B0F0"/>
+          </a:solidFill>
+          <a:ln>
+            <a:noFill/>
+          </a:ln>
+        </p:spPr>
+        <p:style>
+          <a:lnRef idx="2">
+            <a:schemeClr val="accent1">
+              <a:shade val="50000"/>
+            </a:schemeClr>
+          </a:lnRef>
+          <a:fillRef idx="1">
+            <a:schemeClr val="accent1"/>
+          </a:fillRef>
+          <a:effectRef idx="0">
+            <a:schemeClr val="accent1"/>
+          </a:effectRef>
+          <a:fontRef idx="minor">
+            <a:schemeClr val="lt1"/>
+          </a:fontRef>
+        </p:style>
+        <p:txBody>
+          <a:bodyPr rtlCol="0" anchor="ctr"/>
+          <a:lstStyle/>
+          <a:p>
+            <a:pPr algn="ctr"/>
+            <a:r>
+              <a:rPr lang="en-US" sz="1600" b="1" dirty="0">
+                <a:solidFill>
+                  <a:schemeClr val="tx1"/>
+                </a:solidFill>
+              </a:rPr>
+              <a:t>COMING SOON!</a:t>
+            </a:r>
+          </a:p>
+        </p:txBody>
+      </p:sp>
+      <p:pic>
+        <p:nvPicPr>
+          <p:cNvPr id="1027" name="Graphic 26">
+            <a:extLst>
+              <a:ext uri="{FF2B5EF4-FFF2-40B4-BE49-F238E27FC236}">
+                <a16:creationId xmlns:a16="http://schemas.microsoft.com/office/drawing/2014/main" id="{C35311AC-E12E-6956-D63C-7D915D9009EF}"/>
+              </a:ext>
+            </a:extLst>
+          </p:cNvPr>
+          <p:cNvPicPr>
+            <a:picLocks noChangeAspect="1" noChangeArrowheads="1"/>
+          </p:cNvPicPr>
+          <p:nvPr/>
+        </p:nvPicPr>
+        <p:blipFill>
+          <a:blip r:embed="rId28">
+            <a:extLst>
+              <a:ext uri="{28A0092B-C50C-407E-A947-70E740481C1C}">
+                <a14:useLocalDpi xmlns:a14="http://schemas.microsoft.com/office/drawing/2010/main" val="0"/>
+              </a:ext>
+            </a:extLst>
+          </a:blip>
+          <a:srcRect/>
+          <a:stretch>
+            <a:fillRect/>
+          </a:stretch>
+        </p:blipFill>
+        <p:spPr bwMode="auto">
+          <a:xfrm>
+            <a:off x="7493626" y="5552367"/>
+            <a:ext cx="640080" cy="640080"/>
+          </a:xfrm>
+          <a:prstGeom prst="rect">
+            <a:avLst/>
+          </a:prstGeom>
+          <a:noFill/>
+          <a:ln>
+            <a:noFill/>
+          </a:ln>
+          <a:extLst>
+            <a:ext uri="{909E8E84-426E-40DD-AFC4-6F175D3DCCD1}">
+              <a14:hiddenFill xmlns:a14="http://schemas.microsoft.com/office/drawing/2010/main">
+                <a:solidFill>
+                  <a:srgbClr val="FFFFFF"/>
+                </a:solidFill>
+              </a14:hiddenFill>
+            </a:ext>
+            <a:ext uri="{91240B29-F687-4F45-9708-019B960494DF}">
+              <a14:hiddenLine xmlns:a14="http://schemas.microsoft.com/office/drawing/2010/main" w="9525">
+                <a:solidFill>
+                  <a:srgbClr val="000000"/>
+                </a:solidFill>
+                <a:miter lim="800000"/>
+                <a:headEnd/>
+                <a:tailEnd/>
+              </a14:hiddenLine>
+            </a:ext>
+          </a:extLst>
+        </p:spPr>
+      </p:pic>
+      <p:sp>
+        <p:nvSpPr>
+          <p:cNvPr id="1029" name="TextBox 11">
+            <a:extLst>
+              <a:ext uri="{FF2B5EF4-FFF2-40B4-BE49-F238E27FC236}">
+                <a16:creationId xmlns:a16="http://schemas.microsoft.com/office/drawing/2014/main" id="{D811A520-7264-4934-594F-B88FB3CB1538}"/>
+              </a:ext>
+            </a:extLst>
+          </p:cNvPr>
+          <p:cNvSpPr txBox="1">
+            <a:spLocks noChangeArrowheads="1"/>
+          </p:cNvSpPr>
+          <p:nvPr/>
+        </p:nvSpPr>
+        <p:spPr bwMode="auto">
+          <a:xfrm>
+            <a:off x="7373748" y="6189532"/>
+            <a:ext cx="873751" cy="523220"/>
+          </a:xfrm>
+          <a:prstGeom prst="rect">
+            <a:avLst/>
+          </a:prstGeom>
+          <a:noFill/>
+          <a:ln>
+            <a:noFill/>
+          </a:ln>
+          <a:extLst>
+            <a:ext uri="{909E8E84-426E-40DD-AFC4-6F175D3DCCD1}">
+              <a14:hiddenFill xmlns:a14="http://schemas.microsoft.com/office/drawing/2010/main">
+                <a:solidFill>
+                  <a:srgbClr val="FFFFFF"/>
+                </a:solidFill>
+              </a14:hiddenFill>
+            </a:ext>
+            <a:ext uri="{91240B29-F687-4F45-9708-019B960494DF}">
+              <a14:hiddenLine xmlns:a14="http://schemas.microsoft.com/office/drawing/2010/main" w="9525">
+                <a:solidFill>
+                  <a:srgbClr val="000000"/>
+                </a:solidFill>
+                <a:miter lim="800000"/>
+                <a:headEnd/>
+                <a:tailEnd/>
+              </a14:hiddenLine>
+            </a:ext>
+          </a:extLst>
+        </p:spPr>
+        <p:txBody>
+          <a:bodyPr wrap="square">
+            <a:spAutoFit/>
+          </a:bodyPr>
+          <a:lstStyle>
+            <a:defPPr>
+              <a:defRPr lang="en-US"/>
+            </a:defPPr>
+            <a:lvl1pPr algn="ctr">
+              <a:defRPr sz="1400" b="1">
+                <a:solidFill>
+                  <a:schemeClr val="bg1"/>
+                </a:solidFill>
+                <a:latin typeface="+mj-lt"/>
+                <a:ea typeface="Amazon Ember" panose="020B0603020204020204" pitchFamily="34" charset="0"/>
+                <a:cs typeface="Arial" panose="020B0604020202020204" pitchFamily="34" charset="0"/>
+              </a:defRPr>
+            </a:lvl1pPr>
+            <a:lvl2pPr marL="742950" indent="-285750">
+              <a:defRPr>
+                <a:latin typeface="Calibri" panose="020F0502020204030204" pitchFamily="34" charset="0"/>
+              </a:defRPr>
+            </a:lvl2pPr>
+            <a:lvl3pPr marL="1143000" indent="-228600">
+              <a:defRPr>
+                <a:latin typeface="Calibri" panose="020F0502020204030204" pitchFamily="34" charset="0"/>
+              </a:defRPr>
+            </a:lvl3pPr>
+            <a:lvl4pPr marL="1600200" indent="-228600">
+              <a:defRPr>
+                <a:latin typeface="Calibri" panose="020F0502020204030204" pitchFamily="34" charset="0"/>
+              </a:defRPr>
+            </a:lvl4pPr>
+            <a:lvl5pPr marL="2057400" indent="-228600">
+              <a:defRPr>
+                <a:latin typeface="Calibri" panose="020F0502020204030204" pitchFamily="34" charset="0"/>
+              </a:defRPr>
+            </a:lvl5pPr>
+            <a:lvl6pPr marL="2514600" indent="-228600" eaLnBrk="0" fontAlgn="base" hangingPunct="0">
+              <a:spcBef>
+                <a:spcPct val="0"/>
+              </a:spcBef>
+              <a:spcAft>
+                <a:spcPct val="0"/>
+              </a:spcAft>
+              <a:defRPr>
+                <a:latin typeface="Calibri" panose="020F0502020204030204" pitchFamily="34" charset="0"/>
+              </a:defRPr>
+            </a:lvl6pPr>
+            <a:lvl7pPr marL="2971800" indent="-228600" eaLnBrk="0" fontAlgn="base" hangingPunct="0">
+              <a:spcBef>
+                <a:spcPct val="0"/>
+              </a:spcBef>
+              <a:spcAft>
+                <a:spcPct val="0"/>
+              </a:spcAft>
+              <a:defRPr>
+                <a:latin typeface="Calibri" panose="020F0502020204030204" pitchFamily="34" charset="0"/>
+              </a:defRPr>
+            </a:lvl7pPr>
+            <a:lvl8pPr marL="3429000" indent="-228600" eaLnBrk="0" fontAlgn="base" hangingPunct="0">
+              <a:spcBef>
+                <a:spcPct val="0"/>
+              </a:spcBef>
+              <a:spcAft>
+                <a:spcPct val="0"/>
+              </a:spcAft>
+              <a:defRPr>
+                <a:latin typeface="Calibri" panose="020F0502020204030204" pitchFamily="34" charset="0"/>
+              </a:defRPr>
+            </a:lvl8pPr>
+            <a:lvl9pPr marL="3886200" indent="-228600" eaLnBrk="0" fontAlgn="base" hangingPunct="0">
+              <a:spcBef>
+                <a:spcPct val="0"/>
+              </a:spcBef>
+              <a:spcAft>
+                <a:spcPct val="0"/>
+              </a:spcAft>
+              <a:defRPr>
+                <a:latin typeface="Calibri" panose="020F0502020204030204" pitchFamily="34" charset="0"/>
+              </a:defRPr>
+            </a:lvl9pPr>
+          </a:lstStyle>
+          <a:p>
+            <a:r>
+              <a:rPr lang="en-US" altLang="en-US" dirty="0"/>
+              <a:t>Amazon SQS</a:t>
+            </a:r>
+          </a:p>
+        </p:txBody>
+      </p:sp>
+      <p:pic>
+        <p:nvPicPr>
+          <p:cNvPr id="1031" name="Graphic 23">
+            <a:extLst>
+              <a:ext uri="{FF2B5EF4-FFF2-40B4-BE49-F238E27FC236}">
+                <a16:creationId xmlns:a16="http://schemas.microsoft.com/office/drawing/2014/main" id="{CD18E920-16E4-6328-6DB3-B1C85C5C0463}"/>
+              </a:ext>
+            </a:extLst>
+          </p:cNvPr>
+          <p:cNvPicPr>
+            <a:picLocks noChangeAspect="1" noChangeArrowheads="1"/>
+          </p:cNvPicPr>
+          <p:nvPr/>
+        </p:nvPicPr>
+        <p:blipFill>
+          <a:blip r:embed="rId29">
+            <a:extLst>
+              <a:ext uri="{28A0092B-C50C-407E-A947-70E740481C1C}">
+                <a14:useLocalDpi xmlns:a14="http://schemas.microsoft.com/office/drawing/2010/main" val="0"/>
+              </a:ext>
+            </a:extLst>
+          </a:blip>
+          <a:srcRect/>
+          <a:stretch>
+            <a:fillRect/>
+          </a:stretch>
+        </p:blipFill>
+        <p:spPr bwMode="auto">
+          <a:xfrm>
+            <a:off x="8518849" y="5552367"/>
+            <a:ext cx="640080" cy="640080"/>
+          </a:xfrm>
+          <a:prstGeom prst="rect">
+            <a:avLst/>
+          </a:prstGeom>
+          <a:noFill/>
+          <a:ln>
+            <a:noFill/>
+          </a:ln>
+          <a:extLst>
+            <a:ext uri="{909E8E84-426E-40DD-AFC4-6F175D3DCCD1}">
+              <a14:hiddenFill xmlns:a14="http://schemas.microsoft.com/office/drawing/2010/main">
+                <a:solidFill>
+                  <a:srgbClr val="FFFFFF"/>
+                </a:solidFill>
+              </a14:hiddenFill>
+            </a:ext>
+            <a:ext uri="{91240B29-F687-4F45-9708-019B960494DF}">
+              <a14:hiddenLine xmlns:a14="http://schemas.microsoft.com/office/drawing/2010/main" w="9525">
+                <a:solidFill>
+                  <a:srgbClr val="000000"/>
+                </a:solidFill>
+                <a:miter lim="800000"/>
+                <a:headEnd/>
+                <a:tailEnd/>
+              </a14:hiddenLine>
+            </a:ext>
+          </a:extLst>
+        </p:spPr>
+      </p:pic>
+      <p:sp>
+        <p:nvSpPr>
+          <p:cNvPr id="1032" name="TextBox 12">
+            <a:extLst>
+              <a:ext uri="{FF2B5EF4-FFF2-40B4-BE49-F238E27FC236}">
+                <a16:creationId xmlns:a16="http://schemas.microsoft.com/office/drawing/2014/main" id="{A89816FC-B69F-1BC3-D26E-A9FBD4A1FB7C}"/>
+              </a:ext>
+            </a:extLst>
+          </p:cNvPr>
+          <p:cNvSpPr txBox="1">
+            <a:spLocks noChangeArrowheads="1"/>
+          </p:cNvSpPr>
+          <p:nvPr/>
+        </p:nvSpPr>
+        <p:spPr bwMode="auto">
+          <a:xfrm>
+            <a:off x="8321867" y="6189532"/>
+            <a:ext cx="1063522" cy="523220"/>
+          </a:xfrm>
+          <a:prstGeom prst="rect">
+            <a:avLst/>
+          </a:prstGeom>
+          <a:noFill/>
+          <a:ln>
+            <a:noFill/>
+          </a:ln>
+          <a:extLst>
+            <a:ext uri="{909E8E84-426E-40DD-AFC4-6F175D3DCCD1}">
+              <a14:hiddenFill xmlns:a14="http://schemas.microsoft.com/office/drawing/2010/main">
+                <a:solidFill>
+                  <a:srgbClr val="FFFFFF"/>
+                </a:solidFill>
+              </a14:hiddenFill>
+            </a:ext>
+            <a:ext uri="{91240B29-F687-4F45-9708-019B960494DF}">
+              <a14:hiddenLine xmlns:a14="http://schemas.microsoft.com/office/drawing/2010/main" w="9525">
+                <a:solidFill>
+                  <a:srgbClr val="000000"/>
+                </a:solidFill>
+                <a:miter lim="800000"/>
+                <a:headEnd/>
+                <a:tailEnd/>
+              </a14:hiddenLine>
+            </a:ext>
+          </a:extLst>
+        </p:spPr>
+        <p:txBody>
+          <a:bodyPr wrap="square">
+            <a:spAutoFit/>
+          </a:bodyPr>
+          <a:lstStyle>
+            <a:defPPr>
+              <a:defRPr lang="en-US"/>
+            </a:defPPr>
+            <a:lvl1pPr algn="ctr">
+              <a:defRPr sz="1400" b="1">
+                <a:solidFill>
+                  <a:schemeClr val="bg1"/>
+                </a:solidFill>
+                <a:latin typeface="+mj-lt"/>
+                <a:ea typeface="Amazon Ember" panose="020B0603020204020204" pitchFamily="34" charset="0"/>
+                <a:cs typeface="Arial" panose="020B0604020202020204" pitchFamily="34" charset="0"/>
+              </a:defRPr>
+            </a:lvl1pPr>
+            <a:lvl2pPr marL="742950" indent="-285750">
+              <a:defRPr>
+                <a:latin typeface="Calibri" panose="020F0502020204030204" pitchFamily="34" charset="0"/>
+              </a:defRPr>
+            </a:lvl2pPr>
+            <a:lvl3pPr marL="1143000" indent="-228600">
+              <a:defRPr>
+                <a:latin typeface="Calibri" panose="020F0502020204030204" pitchFamily="34" charset="0"/>
+              </a:defRPr>
+            </a:lvl3pPr>
+            <a:lvl4pPr marL="1600200" indent="-228600">
+              <a:defRPr>
+                <a:latin typeface="Calibri" panose="020F0502020204030204" pitchFamily="34" charset="0"/>
+              </a:defRPr>
+            </a:lvl4pPr>
+            <a:lvl5pPr marL="2057400" indent="-228600">
+              <a:defRPr>
+                <a:latin typeface="Calibri" panose="020F0502020204030204" pitchFamily="34" charset="0"/>
+              </a:defRPr>
+            </a:lvl5pPr>
+            <a:lvl6pPr marL="2514600" indent="-228600" eaLnBrk="0" fontAlgn="base" hangingPunct="0">
+              <a:spcBef>
+                <a:spcPct val="0"/>
+              </a:spcBef>
+              <a:spcAft>
+                <a:spcPct val="0"/>
+              </a:spcAft>
+              <a:defRPr>
+                <a:latin typeface="Calibri" panose="020F0502020204030204" pitchFamily="34" charset="0"/>
+              </a:defRPr>
+            </a:lvl6pPr>
+            <a:lvl7pPr marL="2971800" indent="-228600" eaLnBrk="0" fontAlgn="base" hangingPunct="0">
+              <a:spcBef>
+                <a:spcPct val="0"/>
+              </a:spcBef>
+              <a:spcAft>
+                <a:spcPct val="0"/>
+              </a:spcAft>
+              <a:defRPr>
+                <a:latin typeface="Calibri" panose="020F0502020204030204" pitchFamily="34" charset="0"/>
+              </a:defRPr>
+            </a:lvl7pPr>
+            <a:lvl8pPr marL="3429000" indent="-228600" eaLnBrk="0" fontAlgn="base" hangingPunct="0">
+              <a:spcBef>
+                <a:spcPct val="0"/>
+              </a:spcBef>
+              <a:spcAft>
+                <a:spcPct val="0"/>
+              </a:spcAft>
+              <a:defRPr>
+                <a:latin typeface="Calibri" panose="020F0502020204030204" pitchFamily="34" charset="0"/>
+              </a:defRPr>
+            </a:lvl8pPr>
+            <a:lvl9pPr marL="3886200" indent="-228600" eaLnBrk="0" fontAlgn="base" hangingPunct="0">
+              <a:spcBef>
+                <a:spcPct val="0"/>
+              </a:spcBef>
+              <a:spcAft>
+                <a:spcPct val="0"/>
+              </a:spcAft>
+              <a:defRPr>
+                <a:latin typeface="Calibri" panose="020F0502020204030204" pitchFamily="34" charset="0"/>
+              </a:defRPr>
+            </a:lvl9pPr>
+          </a:lstStyle>
+          <a:p>
+            <a:r>
+              <a:rPr lang="en-US" altLang="en-US" dirty="0"/>
+              <a:t>Amazon DynamoDB</a:t>
+            </a:r>
+          </a:p>
+        </p:txBody>
+      </p:sp>
+      <p:sp>
+        <p:nvSpPr>
+          <p:cNvPr id="1033" name="Rectangle: Rounded Corners 1032">
+            <a:extLst>
+              <a:ext uri="{FF2B5EF4-FFF2-40B4-BE49-F238E27FC236}">
+                <a16:creationId xmlns:a16="http://schemas.microsoft.com/office/drawing/2014/main" id="{44868CD6-A658-7D5E-D668-C3C0F5679508}"/>
+              </a:ext>
+            </a:extLst>
+          </p:cNvPr>
+          <p:cNvSpPr/>
+          <p:nvPr/>
+        </p:nvSpPr>
+        <p:spPr>
+          <a:xfrm>
+            <a:off x="7810623" y="5067850"/>
             <a:ext cx="1074420" cy="463441"/>
           </a:xfrm>
           <a:prstGeom prst="roundRect">
@@ -14907,10 +16323,10 @@
       </p:sp>
       <p:sp>
         <p:nvSpPr>
-          <p:cNvPr id="2" name="Rectangle: Rounded Corners 1">
-            <a:extLst>
-              <a:ext uri="{FF2B5EF4-FFF2-40B4-BE49-F238E27FC236}">
-                <a16:creationId xmlns:a16="http://schemas.microsoft.com/office/drawing/2014/main" id="{2CBB7894-144C-A36C-3DB9-4368ED6A1E03}"/>
+          <p:cNvPr id="1035" name="Rectangle: Rounded Corners 1034">
+            <a:extLst>
+              <a:ext uri="{FF2B5EF4-FFF2-40B4-BE49-F238E27FC236}">
+                <a16:creationId xmlns:a16="http://schemas.microsoft.com/office/drawing/2014/main" id="{7B10FD35-E90C-F251-3773-D31CEAD0A08F}"/>
               </a:ext>
             </a:extLst>
           </p:cNvPr>
@@ -14919,7 +16335,7 @@
         </p:nvSpPr>
         <p:spPr>
           <a:xfrm>
-            <a:off x="6916100" y="3967028"/>
+            <a:off x="9864139" y="5067823"/>
             <a:ext cx="1074420" cy="463441"/>
           </a:xfrm>
           <a:prstGeom prst="roundRect">

</xml_diff>

<commit_message>
Staging M365 Auditor, diagram changes, controls
</commit_message>
<xml_diff>
--- a/screenshots/extras/ElectricEye.pptx
+++ b/screenshots/extras/ElectricEye.pptx
@@ -116,7 +116,7 @@
 <file path=ppt/revisionInfo.xml><?xml version="1.0" encoding="utf-8"?>
 <p1510:revInfo xmlns:a="http://schemas.openxmlformats.org/drawingml/2006/main" xmlns:r="http://schemas.openxmlformats.org/officeDocument/2006/relationships" xmlns:p1510="http://schemas.microsoft.com/office/powerpoint/2015/10/main">
   <p1510:revLst>
-    <p1510:client id="{81BFAC01-EC3C-47A5-AFF3-09E0F97B7B12}" v="241" dt="2023-05-17T00:45:01.274"/>
+    <p1510:client id="{81BFAC01-EC3C-47A5-AFF3-09E0F97B7B12}" v="351" dt="2023-05-22T19:18:11.209"/>
   </p1510:revLst>
 </p1510:revInfo>
 </file>
@@ -126,12 +126,12 @@
   <pc:docChgLst>
     <pc:chgData name="Jonathan Rau" userId="01bd1429-ada3-4be3-b2f3-ae839e9d5ccc" providerId="ADAL" clId="{81BFAC01-EC3C-47A5-AFF3-09E0F97B7B12}"/>
     <pc:docChg chg="undo custSel modSld">
-      <pc:chgData name="Jonathan Rau" userId="01bd1429-ada3-4be3-b2f3-ae839e9d5ccc" providerId="ADAL" clId="{81BFAC01-EC3C-47A5-AFF3-09E0F97B7B12}" dt="2023-05-17T00:42:47.603" v="331" actId="1076"/>
+      <pc:chgData name="Jonathan Rau" userId="01bd1429-ada3-4be3-b2f3-ae839e9d5ccc" providerId="ADAL" clId="{81BFAC01-EC3C-47A5-AFF3-09E0F97B7B12}" dt="2023-05-22T19:18:30.023" v="600" actId="207"/>
       <pc:docMkLst>
         <pc:docMk/>
       </pc:docMkLst>
       <pc:sldChg chg="addSp delSp modSp mod">
-        <pc:chgData name="Jonathan Rau" userId="01bd1429-ada3-4be3-b2f3-ae839e9d5ccc" providerId="ADAL" clId="{81BFAC01-EC3C-47A5-AFF3-09E0F97B7B12}" dt="2023-05-17T00:42:47.603" v="331" actId="1076"/>
+        <pc:chgData name="Jonathan Rau" userId="01bd1429-ada3-4be3-b2f3-ae839e9d5ccc" providerId="ADAL" clId="{81BFAC01-EC3C-47A5-AFF3-09E0F97B7B12}" dt="2023-05-22T19:18:30.023" v="600" actId="207"/>
         <pc:sldMkLst>
           <pc:docMk/>
           <pc:sldMk cId="2927218767" sldId="258"/>
@@ -144,6 +144,14 @@
             <ac:spMk id="2" creationId="{2CBB7894-144C-A36C-3DB9-4368ED6A1E03}"/>
           </ac:spMkLst>
         </pc:spChg>
+        <pc:spChg chg="mod">
+          <ac:chgData name="Jonathan Rau" userId="01bd1429-ada3-4be3-b2f3-ae839e9d5ccc" providerId="ADAL" clId="{81BFAC01-EC3C-47A5-AFF3-09E0F97B7B12}" dt="2023-05-22T19:13:21.244" v="511" actId="1035"/>
+          <ac:spMkLst>
+            <pc:docMk/>
+            <pc:sldMk cId="2927218767" sldId="258"/>
+            <ac:spMk id="5" creationId="{50B9014E-CAC8-98AE-CB22-D756ECFEB685}"/>
+          </ac:spMkLst>
+        </pc:spChg>
         <pc:spChg chg="mod topLvl">
           <ac:chgData name="Jonathan Rau" userId="01bd1429-ada3-4be3-b2f3-ae839e9d5ccc" providerId="ADAL" clId="{81BFAC01-EC3C-47A5-AFF3-09E0F97B7B12}" dt="2023-05-17T00:42:33.807" v="327" actId="554"/>
           <ac:spMkLst>
@@ -168,8 +176,16 @@
             <ac:spMk id="12" creationId="{58895021-F83E-D759-168D-06CBA01F4452}"/>
           </ac:spMkLst>
         </pc:spChg>
+        <pc:spChg chg="add mod ord">
+          <ac:chgData name="Jonathan Rau" userId="01bd1429-ada3-4be3-b2f3-ae839e9d5ccc" providerId="ADAL" clId="{81BFAC01-EC3C-47A5-AFF3-09E0F97B7B12}" dt="2023-05-22T19:11:39.983" v="444" actId="164"/>
+          <ac:spMkLst>
+            <pc:docMk/>
+            <pc:sldMk cId="2927218767" sldId="258"/>
+            <ac:spMk id="13" creationId="{CE481AB8-2F0C-B561-2209-B0913550A2A5}"/>
+          </ac:spMkLst>
+        </pc:spChg>
         <pc:spChg chg="mod">
-          <ac:chgData name="Jonathan Rau" userId="01bd1429-ada3-4be3-b2f3-ae839e9d5ccc" providerId="ADAL" clId="{81BFAC01-EC3C-47A5-AFF3-09E0F97B7B12}" dt="2023-05-17T00:36:16.668" v="202" actId="553"/>
+          <ac:chgData name="Jonathan Rau" userId="01bd1429-ada3-4be3-b2f3-ae839e9d5ccc" providerId="ADAL" clId="{81BFAC01-EC3C-47A5-AFF3-09E0F97B7B12}" dt="2023-05-22T19:12:37.136" v="469" actId="20577"/>
           <ac:spMkLst>
             <pc:docMk/>
             <pc:sldMk cId="2927218767" sldId="258"/>
@@ -225,7 +241,7 @@
           </ac:spMkLst>
         </pc:spChg>
         <pc:spChg chg="mod">
-          <ac:chgData name="Jonathan Rau" userId="01bd1429-ada3-4be3-b2f3-ae839e9d5ccc" providerId="ADAL" clId="{81BFAC01-EC3C-47A5-AFF3-09E0F97B7B12}" dt="2023-05-17T00:24:33.663" v="65" actId="12789"/>
+          <ac:chgData name="Jonathan Rau" userId="01bd1429-ada3-4be3-b2f3-ae839e9d5ccc" providerId="ADAL" clId="{81BFAC01-EC3C-47A5-AFF3-09E0F97B7B12}" dt="2023-05-22T19:12:03.313" v="452" actId="1076"/>
           <ac:spMkLst>
             <pc:docMk/>
             <pc:sldMk cId="2927218767" sldId="258"/>
@@ -233,11 +249,27 @@
           </ac:spMkLst>
         </pc:spChg>
         <pc:spChg chg="mod">
-          <ac:chgData name="Jonathan Rau" userId="01bd1429-ada3-4be3-b2f3-ae839e9d5ccc" providerId="ADAL" clId="{81BFAC01-EC3C-47A5-AFF3-09E0F97B7B12}" dt="2023-05-17T00:24:50.028" v="79" actId="12789"/>
+          <ac:chgData name="Jonathan Rau" userId="01bd1429-ada3-4be3-b2f3-ae839e9d5ccc" providerId="ADAL" clId="{81BFAC01-EC3C-47A5-AFF3-09E0F97B7B12}" dt="2023-05-22T19:12:12.484" v="453" actId="1076"/>
           <ac:spMkLst>
             <pc:docMk/>
             <pc:sldMk cId="2927218767" sldId="258"/>
             <ac:spMk id="25" creationId="{060A3261-575A-DB40-A7E1-36B64B9B5F6A}"/>
+          </ac:spMkLst>
+        </pc:spChg>
+        <pc:spChg chg="mod">
+          <ac:chgData name="Jonathan Rau" userId="01bd1429-ada3-4be3-b2f3-ae839e9d5ccc" providerId="ADAL" clId="{81BFAC01-EC3C-47A5-AFF3-09E0F97B7B12}" dt="2023-05-22T19:11:40.576" v="445"/>
+          <ac:spMkLst>
+            <pc:docMk/>
+            <pc:sldMk cId="2927218767" sldId="258"/>
+            <ac:spMk id="29" creationId="{E077B603-BB7C-9047-7418-D14C45F4CFEB}"/>
+          </ac:spMkLst>
+        </pc:spChg>
+        <pc:spChg chg="mod">
+          <ac:chgData name="Jonathan Rau" userId="01bd1429-ada3-4be3-b2f3-ae839e9d5ccc" providerId="ADAL" clId="{81BFAC01-EC3C-47A5-AFF3-09E0F97B7B12}" dt="2023-05-22T19:11:43.907" v="447"/>
+          <ac:spMkLst>
+            <pc:docMk/>
+            <pc:sldMk cId="2927218767" sldId="258"/>
+            <ac:spMk id="33" creationId="{76639A8E-253F-E452-90AD-70224E90464F}"/>
           </ac:spMkLst>
         </pc:spChg>
         <pc:spChg chg="mod topLvl">
@@ -312,6 +344,14 @@
             <ac:spMk id="51" creationId="{1693654B-B9C5-BB57-C5AF-C57E58130215}"/>
           </ac:spMkLst>
         </pc:spChg>
+        <pc:spChg chg="add mod ord">
+          <ac:chgData name="Jonathan Rau" userId="01bd1429-ada3-4be3-b2f3-ae839e9d5ccc" providerId="ADAL" clId="{81BFAC01-EC3C-47A5-AFF3-09E0F97B7B12}" dt="2023-05-22T19:15:34.109" v="534" actId="1076"/>
+          <ac:spMkLst>
+            <pc:docMk/>
+            <pc:sldMk cId="2927218767" sldId="258"/>
+            <ac:spMk id="54" creationId="{A2CC6F51-0EB5-EF7C-E815-79BE9EDF6380}"/>
+          </ac:spMkLst>
+        </pc:spChg>
         <pc:spChg chg="mod">
           <ac:chgData name="Jonathan Rau" userId="01bd1429-ada3-4be3-b2f3-ae839e9d5ccc" providerId="ADAL" clId="{81BFAC01-EC3C-47A5-AFF3-09E0F97B7B12}" dt="2023-05-17T00:36:23.521" v="203" actId="14100"/>
           <ac:spMkLst>
@@ -329,6 +369,14 @@
           </ac:spMkLst>
         </pc:spChg>
         <pc:spChg chg="add mod">
+          <ac:chgData name="Jonathan Rau" userId="01bd1429-ada3-4be3-b2f3-ae839e9d5ccc" providerId="ADAL" clId="{81BFAC01-EC3C-47A5-AFF3-09E0F97B7B12}" dt="2023-05-22T19:18:30.023" v="600" actId="207"/>
+          <ac:spMkLst>
+            <pc:docMk/>
+            <pc:sldMk cId="2927218767" sldId="258"/>
+            <ac:spMk id="59" creationId="{5CC73447-0500-A8A3-8C4A-97103F0A5ED6}"/>
+          </ac:spMkLst>
+        </pc:spChg>
+        <pc:spChg chg="add mod">
           <ac:chgData name="Jonathan Rau" userId="01bd1429-ada3-4be3-b2f3-ae839e9d5ccc" providerId="ADAL" clId="{81BFAC01-EC3C-47A5-AFF3-09E0F97B7B12}" dt="2023-05-17T00:35:23.494" v="190" actId="1076"/>
           <ac:spMkLst>
             <pc:docMk/>
@@ -353,15 +401,15 @@
           </ac:spMkLst>
         </pc:spChg>
         <pc:spChg chg="add mod">
-          <ac:chgData name="Jonathan Rau" userId="01bd1429-ada3-4be3-b2f3-ae839e9d5ccc" providerId="ADAL" clId="{81BFAC01-EC3C-47A5-AFF3-09E0F97B7B12}" dt="2023-05-17T00:42:43.764" v="329" actId="1076"/>
+          <ac:chgData name="Jonathan Rau" userId="01bd1429-ada3-4be3-b2f3-ae839e9d5ccc" providerId="ADAL" clId="{81BFAC01-EC3C-47A5-AFF3-09E0F97B7B12}" dt="2023-05-22T19:08:05.835" v="339" actId="1076"/>
           <ac:spMkLst>
             <pc:docMk/>
             <pc:sldMk cId="2927218767" sldId="258"/>
             <ac:spMk id="1033" creationId="{44868CD6-A658-7D5E-D668-C3C0F5679508}"/>
           </ac:spMkLst>
         </pc:spChg>
-        <pc:spChg chg="add mod">
-          <ac:chgData name="Jonathan Rau" userId="01bd1429-ada3-4be3-b2f3-ae839e9d5ccc" providerId="ADAL" clId="{81BFAC01-EC3C-47A5-AFF3-09E0F97B7B12}" dt="2023-05-17T00:42:47.603" v="331" actId="1076"/>
+        <pc:spChg chg="add del mod">
+          <ac:chgData name="Jonathan Rau" userId="01bd1429-ada3-4be3-b2f3-ae839e9d5ccc" providerId="ADAL" clId="{81BFAC01-EC3C-47A5-AFF3-09E0F97B7B12}" dt="2023-05-22T19:07:47.267" v="337" actId="478"/>
           <ac:spMkLst>
             <pc:docMk/>
             <pc:sldMk cId="2927218767" sldId="258"/>
@@ -376,6 +424,22 @@
             <ac:grpSpMk id="10" creationId="{7BB619AD-693A-3B9C-6D20-247888B0204F}"/>
           </ac:grpSpMkLst>
         </pc:grpChg>
+        <pc:grpChg chg="add mod">
+          <ac:chgData name="Jonathan Rau" userId="01bd1429-ada3-4be3-b2f3-ae839e9d5ccc" providerId="ADAL" clId="{81BFAC01-EC3C-47A5-AFF3-09E0F97B7B12}" dt="2023-05-22T19:11:12.612" v="432" actId="164"/>
+          <ac:grpSpMkLst>
+            <pc:docMk/>
+            <pc:sldMk cId="2927218767" sldId="258"/>
+            <ac:grpSpMk id="14" creationId="{5D258590-1F9E-1B11-4B9A-1ED816997276}"/>
+          </ac:grpSpMkLst>
+        </pc:grpChg>
+        <pc:grpChg chg="add del mod">
+          <ac:chgData name="Jonathan Rau" userId="01bd1429-ada3-4be3-b2f3-ae839e9d5ccc" providerId="ADAL" clId="{81BFAC01-EC3C-47A5-AFF3-09E0F97B7B12}" dt="2023-05-22T19:11:47.029" v="450" actId="478"/>
+          <ac:grpSpMkLst>
+            <pc:docMk/>
+            <pc:sldMk cId="2927218767" sldId="258"/>
+            <ac:grpSpMk id="19" creationId="{327FB7DA-18C9-98CF-97B8-E6672531E3FD}"/>
+          </ac:grpSpMkLst>
+        </pc:grpChg>
         <pc:grpChg chg="mod">
           <ac:chgData name="Jonathan Rau" userId="01bd1429-ada3-4be3-b2f3-ae839e9d5ccc" providerId="ADAL" clId="{81BFAC01-EC3C-47A5-AFF3-09E0F97B7B12}" dt="2023-05-17T00:36:16.668" v="202" actId="553"/>
           <ac:grpSpMkLst>
@@ -385,7 +449,7 @@
           </ac:grpSpMkLst>
         </pc:grpChg>
         <pc:grpChg chg="mod">
-          <ac:chgData name="Jonathan Rau" userId="01bd1429-ada3-4be3-b2f3-ae839e9d5ccc" providerId="ADAL" clId="{81BFAC01-EC3C-47A5-AFF3-09E0F97B7B12}" dt="2023-05-17T00:24:33.663" v="65" actId="12789"/>
+          <ac:chgData name="Jonathan Rau" userId="01bd1429-ada3-4be3-b2f3-ae839e9d5ccc" providerId="ADAL" clId="{81BFAC01-EC3C-47A5-AFF3-09E0F97B7B12}" dt="2023-05-22T19:12:03.313" v="452" actId="1076"/>
           <ac:grpSpMkLst>
             <pc:docMk/>
             <pc:sldMk cId="2927218767" sldId="258"/>
@@ -400,6 +464,14 @@
             <ac:grpSpMk id="26" creationId="{6BAEA63F-A29D-8D2F-2B83-0919927ED399}"/>
           </ac:grpSpMkLst>
         </pc:grpChg>
+        <pc:grpChg chg="add del mod">
+          <ac:chgData name="Jonathan Rau" userId="01bd1429-ada3-4be3-b2f3-ae839e9d5ccc" providerId="ADAL" clId="{81BFAC01-EC3C-47A5-AFF3-09E0F97B7B12}" dt="2023-05-22T19:11:43.405" v="446"/>
+          <ac:grpSpMkLst>
+            <pc:docMk/>
+            <pc:sldMk cId="2927218767" sldId="258"/>
+            <ac:grpSpMk id="26" creationId="{7452FBF2-475C-6F50-0BFA-79A40F0D5AD0}"/>
+          </ac:grpSpMkLst>
+        </pc:grpChg>
         <pc:grpChg chg="del mod topLvl">
           <ac:chgData name="Jonathan Rau" userId="01bd1429-ada3-4be3-b2f3-ae839e9d5ccc" providerId="ADAL" clId="{81BFAC01-EC3C-47A5-AFF3-09E0F97B7B12}" dt="2023-05-17T00:25:50.027" v="112" actId="165"/>
           <ac:grpSpMkLst>
@@ -416,6 +488,14 @@
             <ac:grpSpMk id="30" creationId="{E30E038F-7FA5-A920-3A09-7E35AF378EA6}"/>
           </ac:grpSpMkLst>
         </pc:grpChg>
+        <pc:grpChg chg="add del mod">
+          <ac:chgData name="Jonathan Rau" userId="01bd1429-ada3-4be3-b2f3-ae839e9d5ccc" providerId="ADAL" clId="{81BFAC01-EC3C-47A5-AFF3-09E0F97B7B12}" dt="2023-05-22T19:11:45.452" v="448"/>
+          <ac:grpSpMkLst>
+            <pc:docMk/>
+            <pc:sldMk cId="2927218767" sldId="258"/>
+            <ac:grpSpMk id="32" creationId="{1D2BC94F-80A2-2FA3-0E0F-2EE689D91858}"/>
+          </ac:grpSpMkLst>
+        </pc:grpChg>
         <pc:grpChg chg="del mod topLvl">
           <ac:chgData name="Jonathan Rau" userId="01bd1429-ada3-4be3-b2f3-ae839e9d5ccc" providerId="ADAL" clId="{81BFAC01-EC3C-47A5-AFF3-09E0F97B7B12}" dt="2023-05-17T00:25:50.027" v="112" actId="165"/>
           <ac:grpSpMkLst>
@@ -448,6 +528,14 @@
             <ac:grpSpMk id="54" creationId="{C51952BB-F81A-0762-AC0E-86CB73DDDEDE}"/>
           </ac:grpSpMkLst>
         </pc:grpChg>
+        <pc:grpChg chg="add mod">
+          <ac:chgData name="Jonathan Rau" userId="01bd1429-ada3-4be3-b2f3-ae839e9d5ccc" providerId="ADAL" clId="{81BFAC01-EC3C-47A5-AFF3-09E0F97B7B12}" dt="2023-05-22T19:15:36.574" v="535" actId="167"/>
+          <ac:grpSpMkLst>
+            <pc:docMk/>
+            <pc:sldMk cId="2927218767" sldId="258"/>
+            <ac:grpSpMk id="56" creationId="{2098C48B-9276-0C34-A1E7-8B4D8B781943}"/>
+          </ac:grpSpMkLst>
+        </pc:grpChg>
         <pc:grpChg chg="add del mod">
           <ac:chgData name="Jonathan Rau" userId="01bd1429-ada3-4be3-b2f3-ae839e9d5ccc" providerId="ADAL" clId="{81BFAC01-EC3C-47A5-AFF3-09E0F97B7B12}" dt="2023-05-17T00:27:19.406" v="137"/>
           <ac:grpSpMkLst>
@@ -465,6 +553,14 @@
           </ac:picMkLst>
         </pc:picChg>
         <pc:picChg chg="mod">
+          <ac:chgData name="Jonathan Rau" userId="01bd1429-ada3-4be3-b2f3-ae839e9d5ccc" providerId="ADAL" clId="{81BFAC01-EC3C-47A5-AFF3-09E0F97B7B12}" dt="2023-05-22T19:13:21.244" v="511" actId="1035"/>
+          <ac:picMkLst>
+            <pc:docMk/>
+            <pc:sldMk cId="2927218767" sldId="258"/>
+            <ac:picMk id="4" creationId="{BC63CE32-56C9-DD4D-C00B-655BC485EE5F}"/>
+          </ac:picMkLst>
+        </pc:picChg>
+        <pc:picChg chg="mod">
           <ac:chgData name="Jonathan Rau" userId="01bd1429-ada3-4be3-b2f3-ae839e9d5ccc" providerId="ADAL" clId="{81BFAC01-EC3C-47A5-AFF3-09E0F97B7B12}" dt="2023-05-17T00:36:09.077" v="201" actId="552"/>
           <ac:picMkLst>
             <pc:docMk/>
@@ -488,6 +584,14 @@
             <ac:picMk id="11" creationId="{D418EA10-B69A-67EE-5365-0563704D2E0A}"/>
           </ac:picMkLst>
         </pc:picChg>
+        <pc:picChg chg="add mod modCrop">
+          <ac:chgData name="Jonathan Rau" userId="01bd1429-ada3-4be3-b2f3-ae839e9d5ccc" providerId="ADAL" clId="{81BFAC01-EC3C-47A5-AFF3-09E0F97B7B12}" dt="2023-05-22T19:11:39.983" v="444" actId="164"/>
+          <ac:picMkLst>
+            <pc:docMk/>
+            <pc:sldMk cId="2927218767" sldId="258"/>
+            <ac:picMk id="12" creationId="{05311CAF-B581-B823-E7E5-7E90A65DE968}"/>
+          </ac:picMkLst>
+        </pc:picChg>
         <pc:picChg chg="add mod">
           <ac:chgData name="Jonathan Rau" userId="01bd1429-ada3-4be3-b2f3-ae839e9d5ccc" providerId="ADAL" clId="{81BFAC01-EC3C-47A5-AFF3-09E0F97B7B12}" dt="2023-05-17T00:22:51.004" v="49" actId="571"/>
           <ac:picMkLst>
@@ -504,12 +608,36 @@
             <ac:picMk id="14" creationId="{11831F83-B7E8-E39F-0B97-FD45B487E616}"/>
           </ac:picMkLst>
         </pc:picChg>
+        <pc:picChg chg="mod">
+          <ac:chgData name="Jonathan Rau" userId="01bd1429-ada3-4be3-b2f3-ae839e9d5ccc" providerId="ADAL" clId="{81BFAC01-EC3C-47A5-AFF3-09E0F97B7B12}" dt="2023-05-22T19:11:40.576" v="445"/>
+          <ac:picMkLst>
+            <pc:docMk/>
+            <pc:sldMk cId="2927218767" sldId="258"/>
+            <ac:picMk id="30" creationId="{111B8821-4A88-39FA-0069-01B86284EC43}"/>
+          </ac:picMkLst>
+        </pc:picChg>
+        <pc:picChg chg="mod">
+          <ac:chgData name="Jonathan Rau" userId="01bd1429-ada3-4be3-b2f3-ae839e9d5ccc" providerId="ADAL" clId="{81BFAC01-EC3C-47A5-AFF3-09E0F97B7B12}" dt="2023-05-22T19:11:43.907" v="447"/>
+          <ac:picMkLst>
+            <pc:docMk/>
+            <pc:sldMk cId="2927218767" sldId="258"/>
+            <ac:picMk id="34" creationId="{388BB89C-036F-1115-532F-D1C57AC1B4F8}"/>
+          </ac:picMkLst>
+        </pc:picChg>
         <pc:picChg chg="mod topLvl">
           <ac:chgData name="Jonathan Rau" userId="01bd1429-ada3-4be3-b2f3-ae839e9d5ccc" providerId="ADAL" clId="{81BFAC01-EC3C-47A5-AFF3-09E0F97B7B12}" dt="2023-05-17T00:41:15.912" v="313" actId="408"/>
           <ac:picMkLst>
             <pc:docMk/>
             <pc:sldMk cId="2927218767" sldId="258"/>
             <ac:picMk id="35" creationId="{D2DAF613-D8BD-3380-58A8-5BAB202AF083}"/>
+          </ac:picMkLst>
+        </pc:picChg>
+        <pc:picChg chg="add mod">
+          <ac:chgData name="Jonathan Rau" userId="01bd1429-ada3-4be3-b2f3-ae839e9d5ccc" providerId="ADAL" clId="{81BFAC01-EC3C-47A5-AFF3-09E0F97B7B12}" dt="2023-05-22T19:11:57.352" v="451" actId="1076"/>
+          <ac:picMkLst>
+            <pc:docMk/>
+            <pc:sldMk cId="2927218767" sldId="258"/>
+            <ac:picMk id="37" creationId="{1934A7B0-8025-4823-246C-8E4DF0FBF33A}"/>
           </ac:picMkLst>
         </pc:picChg>
         <pc:picChg chg="add mod">
@@ -560,6 +688,22 @@
             <ac:picMk id="48" creationId="{A4564476-731A-47FC-E4FF-56B1FB190235}"/>
           </ac:picMkLst>
         </pc:picChg>
+        <pc:picChg chg="add mod">
+          <ac:chgData name="Jonathan Rau" userId="01bd1429-ada3-4be3-b2f3-ae839e9d5ccc" providerId="ADAL" clId="{81BFAC01-EC3C-47A5-AFF3-09E0F97B7B12}" dt="2023-05-22T19:15:34.109" v="534" actId="1076"/>
+          <ac:picMkLst>
+            <pc:docMk/>
+            <pc:sldMk cId="2927218767" sldId="258"/>
+            <ac:picMk id="48" creationId="{AD0A4B57-0FC9-6509-7EB8-F3EB36B78331}"/>
+          </ac:picMkLst>
+        </pc:picChg>
+        <pc:picChg chg="add del mod">
+          <ac:chgData name="Jonathan Rau" userId="01bd1429-ada3-4be3-b2f3-ae839e9d5ccc" providerId="ADAL" clId="{81BFAC01-EC3C-47A5-AFF3-09E0F97B7B12}" dt="2023-05-22T19:14:53.307" v="519"/>
+          <ac:picMkLst>
+            <pc:docMk/>
+            <pc:sldMk cId="2927218767" sldId="258"/>
+            <ac:picMk id="49" creationId="{EC323363-582C-BCCA-ED56-07A7AE23A17B}"/>
+          </ac:picMkLst>
+        </pc:picChg>
         <pc:picChg chg="mod">
           <ac:chgData name="Jonathan Rau" userId="01bd1429-ada3-4be3-b2f3-ae839e9d5ccc" providerId="ADAL" clId="{81BFAC01-EC3C-47A5-AFF3-09E0F97B7B12}" dt="2023-05-17T00:24:33.663" v="65" actId="12789"/>
           <ac:picMkLst>
@@ -584,6 +728,14 @@
             <ac:picMk id="55" creationId="{5FB33C35-4ABC-C3EF-7377-9B5091661884}"/>
           </ac:picMkLst>
         </pc:picChg>
+        <pc:picChg chg="add mod">
+          <ac:chgData name="Jonathan Rau" userId="01bd1429-ada3-4be3-b2f3-ae839e9d5ccc" providerId="ADAL" clId="{81BFAC01-EC3C-47A5-AFF3-09E0F97B7B12}" dt="2023-05-22T19:18:11.209" v="599" actId="1076"/>
+          <ac:picMkLst>
+            <pc:docMk/>
+            <pc:sldMk cId="2927218767" sldId="258"/>
+            <ac:picMk id="58" creationId="{8CC383B5-72D7-D07C-E83A-8BC781801C26}"/>
+          </ac:picMkLst>
+        </pc:picChg>
         <pc:picChg chg="mod">
           <ac:chgData name="Jonathan Rau" userId="01bd1429-ada3-4be3-b2f3-ae839e9d5ccc" providerId="ADAL" clId="{81BFAC01-EC3C-47A5-AFF3-09E0F97B7B12}" dt="2023-05-17T00:27:17.906" v="136"/>
           <ac:picMkLst>
@@ -657,7 +809,7 @@
           </ac:picMkLst>
         </pc:picChg>
         <pc:picChg chg="mod">
-          <ac:chgData name="Jonathan Rau" userId="01bd1429-ada3-4be3-b2f3-ae839e9d5ccc" providerId="ADAL" clId="{81BFAC01-EC3C-47A5-AFF3-09E0F97B7B12}" dt="2023-05-17T00:23:15.468" v="54" actId="1076"/>
+          <ac:chgData name="Jonathan Rau" userId="01bd1429-ada3-4be3-b2f3-ae839e9d5ccc" providerId="ADAL" clId="{81BFAC01-EC3C-47A5-AFF3-09E0F97B7B12}" dt="2023-05-22T19:08:28.976" v="340" actId="1076"/>
           <ac:picMkLst>
             <pc:docMk/>
             <pc:sldMk cId="2927218767" sldId="258"/>
@@ -689,7 +841,7 @@
           </ac:picMkLst>
         </pc:picChg>
         <pc:picChg chg="mod">
-          <ac:chgData name="Jonathan Rau" userId="01bd1429-ada3-4be3-b2f3-ae839e9d5ccc" providerId="ADAL" clId="{81BFAC01-EC3C-47A5-AFF3-09E0F97B7B12}" dt="2023-05-17T00:24:33.663" v="65" actId="12789"/>
+          <ac:chgData name="Jonathan Rau" userId="01bd1429-ada3-4be3-b2f3-ae839e9d5ccc" providerId="ADAL" clId="{81BFAC01-EC3C-47A5-AFF3-09E0F97B7B12}" dt="2023-05-22T19:12:03.313" v="452" actId="1076"/>
           <ac:picMkLst>
             <pc:docMk/>
             <pc:sldMk cId="2927218767" sldId="258"/>
@@ -697,7 +849,7 @@
           </ac:picMkLst>
         </pc:picChg>
         <pc:cxnChg chg="mod">
-          <ac:chgData name="Jonathan Rau" userId="01bd1429-ada3-4be3-b2f3-ae839e9d5ccc" providerId="ADAL" clId="{81BFAC01-EC3C-47A5-AFF3-09E0F97B7B12}" dt="2023-05-17T00:36:09.077" v="201" actId="552"/>
+          <ac:chgData name="Jonathan Rau" userId="01bd1429-ada3-4be3-b2f3-ae839e9d5ccc" providerId="ADAL" clId="{81BFAC01-EC3C-47A5-AFF3-09E0F97B7B12}" dt="2023-05-22T19:13:21.244" v="511" actId="1035"/>
           <ac:cxnSpMkLst>
             <pc:docMk/>
             <pc:sldMk cId="2927218767" sldId="258"/>
@@ -705,7 +857,7 @@
           </ac:cxnSpMkLst>
         </pc:cxnChg>
         <pc:cxnChg chg="mod">
-          <ac:chgData name="Jonathan Rau" userId="01bd1429-ada3-4be3-b2f3-ae839e9d5ccc" providerId="ADAL" clId="{81BFAC01-EC3C-47A5-AFF3-09E0F97B7B12}" dt="2023-05-17T00:24:56.523" v="80" actId="12788"/>
+          <ac:chgData name="Jonathan Rau" userId="01bd1429-ada3-4be3-b2f3-ae839e9d5ccc" providerId="ADAL" clId="{81BFAC01-EC3C-47A5-AFF3-09E0F97B7B12}" dt="2023-05-22T19:13:21.244" v="511" actId="1035"/>
           <ac:cxnSpMkLst>
             <pc:docMk/>
             <pc:sldMk cId="2927218767" sldId="258"/>
@@ -713,7 +865,7 @@
           </ac:cxnSpMkLst>
         </pc:cxnChg>
         <pc:cxnChg chg="mod">
-          <ac:chgData name="Jonathan Rau" userId="01bd1429-ada3-4be3-b2f3-ae839e9d5ccc" providerId="ADAL" clId="{81BFAC01-EC3C-47A5-AFF3-09E0F97B7B12}" dt="2023-05-17T00:36:16.668" v="202" actId="553"/>
+          <ac:chgData name="Jonathan Rau" userId="01bd1429-ada3-4be3-b2f3-ae839e9d5ccc" providerId="ADAL" clId="{81BFAC01-EC3C-47A5-AFF3-09E0F97B7B12}" dt="2023-05-22T19:13:21.244" v="511" actId="1035"/>
           <ac:cxnSpMkLst>
             <pc:docMk/>
             <pc:sldMk cId="2927218767" sldId="258"/>
@@ -721,7 +873,7 @@
           </ac:cxnSpMkLst>
         </pc:cxnChg>
         <pc:cxnChg chg="mod">
-          <ac:chgData name="Jonathan Rau" userId="01bd1429-ada3-4be3-b2f3-ae839e9d5ccc" providerId="ADAL" clId="{81BFAC01-EC3C-47A5-AFF3-09E0F97B7B12}" dt="2023-05-17T00:33:06.691" v="145" actId="1076"/>
+          <ac:chgData name="Jonathan Rau" userId="01bd1429-ada3-4be3-b2f3-ae839e9d5ccc" providerId="ADAL" clId="{81BFAC01-EC3C-47A5-AFF3-09E0F97B7B12}" dt="2023-05-22T19:13:21.244" v="511" actId="1035"/>
           <ac:cxnSpMkLst>
             <pc:docMk/>
             <pc:sldMk cId="2927218767" sldId="258"/>
@@ -1801,7 +1953,7 @@
           <a:p>
             <a:fld id="{A3104859-06A7-4B6C-9EBE-0886FFE8171A}" type="datetimeFigureOut">
               <a:rPr lang="en-US" smtClean="0"/>
-              <a:t>5/16/2023</a:t>
+              <a:t>5/22/2023</a:t>
             </a:fld>
             <a:endParaRPr lang="en-US"/>
           </a:p>
@@ -1999,7 +2151,7 @@
           <a:p>
             <a:fld id="{A3104859-06A7-4B6C-9EBE-0886FFE8171A}" type="datetimeFigureOut">
               <a:rPr lang="en-US" smtClean="0"/>
-              <a:t>5/16/2023</a:t>
+              <a:t>5/22/2023</a:t>
             </a:fld>
             <a:endParaRPr lang="en-US"/>
           </a:p>
@@ -2207,7 +2359,7 @@
           <a:p>
             <a:fld id="{A3104859-06A7-4B6C-9EBE-0886FFE8171A}" type="datetimeFigureOut">
               <a:rPr lang="en-US" smtClean="0"/>
-              <a:t>5/16/2023</a:t>
+              <a:t>5/22/2023</a:t>
             </a:fld>
             <a:endParaRPr lang="en-US"/>
           </a:p>
@@ -2405,7 +2557,7 @@
           <a:p>
             <a:fld id="{A3104859-06A7-4B6C-9EBE-0886FFE8171A}" type="datetimeFigureOut">
               <a:rPr lang="en-US" smtClean="0"/>
-              <a:t>5/16/2023</a:t>
+              <a:t>5/22/2023</a:t>
             </a:fld>
             <a:endParaRPr lang="en-US"/>
           </a:p>
@@ -2680,7 +2832,7 @@
           <a:p>
             <a:fld id="{A3104859-06A7-4B6C-9EBE-0886FFE8171A}" type="datetimeFigureOut">
               <a:rPr lang="en-US" smtClean="0"/>
-              <a:t>5/16/2023</a:t>
+              <a:t>5/22/2023</a:t>
             </a:fld>
             <a:endParaRPr lang="en-US"/>
           </a:p>
@@ -2945,7 +3097,7 @@
           <a:p>
             <a:fld id="{A3104859-06A7-4B6C-9EBE-0886FFE8171A}" type="datetimeFigureOut">
               <a:rPr lang="en-US" smtClean="0"/>
-              <a:t>5/16/2023</a:t>
+              <a:t>5/22/2023</a:t>
             </a:fld>
             <a:endParaRPr lang="en-US"/>
           </a:p>
@@ -3357,7 +3509,7 @@
           <a:p>
             <a:fld id="{A3104859-06A7-4B6C-9EBE-0886FFE8171A}" type="datetimeFigureOut">
               <a:rPr lang="en-US" smtClean="0"/>
-              <a:t>5/16/2023</a:t>
+              <a:t>5/22/2023</a:t>
             </a:fld>
             <a:endParaRPr lang="en-US"/>
           </a:p>
@@ -3498,7 +3650,7 @@
           <a:p>
             <a:fld id="{A3104859-06A7-4B6C-9EBE-0886FFE8171A}" type="datetimeFigureOut">
               <a:rPr lang="en-US" smtClean="0"/>
-              <a:t>5/16/2023</a:t>
+              <a:t>5/22/2023</a:t>
             </a:fld>
             <a:endParaRPr lang="en-US"/>
           </a:p>
@@ -3611,7 +3763,7 @@
           <a:p>
             <a:fld id="{A3104859-06A7-4B6C-9EBE-0886FFE8171A}" type="datetimeFigureOut">
               <a:rPr lang="en-US" smtClean="0"/>
-              <a:t>5/16/2023</a:t>
+              <a:t>5/22/2023</a:t>
             </a:fld>
             <a:endParaRPr lang="en-US"/>
           </a:p>
@@ -3922,7 +4074,7 @@
           <a:p>
             <a:fld id="{A3104859-06A7-4B6C-9EBE-0886FFE8171A}" type="datetimeFigureOut">
               <a:rPr lang="en-US" smtClean="0"/>
-              <a:t>5/16/2023</a:t>
+              <a:t>5/22/2023</a:t>
             </a:fld>
             <a:endParaRPr lang="en-US"/>
           </a:p>
@@ -4210,7 +4362,7 @@
           <a:p>
             <a:fld id="{A3104859-06A7-4B6C-9EBE-0886FFE8171A}" type="datetimeFigureOut">
               <a:rPr lang="en-US" smtClean="0"/>
-              <a:t>5/16/2023</a:t>
+              <a:t>5/22/2023</a:t>
             </a:fld>
             <a:endParaRPr lang="en-US"/>
           </a:p>
@@ -4451,7 +4603,7 @@
           <a:p>
             <a:fld id="{A3104859-06A7-4B6C-9EBE-0886FFE8171A}" type="datetimeFigureOut">
               <a:rPr lang="en-US" smtClean="0"/>
-              <a:t>5/16/2023</a:t>
+              <a:t>5/22/2023</a:t>
             </a:fld>
             <a:endParaRPr lang="en-US"/>
           </a:p>
@@ -12502,6 +12654,126 @@
           <a:chExt cx="0" cy="0"/>
         </a:xfrm>
       </p:grpSpPr>
+      <p:grpSp>
+        <p:nvGrpSpPr>
+          <p:cNvPr id="56" name="Group 55">
+            <a:extLst>
+              <a:ext uri="{FF2B5EF4-FFF2-40B4-BE49-F238E27FC236}">
+                <a16:creationId xmlns:a16="http://schemas.microsoft.com/office/drawing/2014/main" id="{2098C48B-9276-0C34-A1E7-8B4D8B781943}"/>
+              </a:ext>
+            </a:extLst>
+          </p:cNvPr>
+          <p:cNvGrpSpPr/>
+          <p:nvPr/>
+        </p:nvGrpSpPr>
+        <p:grpSpPr>
+          <a:xfrm>
+            <a:off x="8035134" y="3776099"/>
+            <a:ext cx="822960" cy="822960"/>
+            <a:chOff x="7863634" y="4211441"/>
+            <a:chExt cx="822960" cy="822960"/>
+          </a:xfrm>
+        </p:grpSpPr>
+        <p:sp>
+          <p:nvSpPr>
+            <p:cNvPr id="54" name="Rectangle 53">
+              <a:extLst>
+                <a:ext uri="{FF2B5EF4-FFF2-40B4-BE49-F238E27FC236}">
+                  <a16:creationId xmlns:a16="http://schemas.microsoft.com/office/drawing/2014/main" id="{A2CC6F51-0EB5-EF7C-E815-79BE9EDF6380}"/>
+                </a:ext>
+              </a:extLst>
+            </p:cNvPr>
+            <p:cNvSpPr/>
+            <p:nvPr/>
+          </p:nvSpPr>
+          <p:spPr>
+            <a:xfrm>
+              <a:off x="7863634" y="4211441"/>
+              <a:ext cx="822960" cy="822960"/>
+            </a:xfrm>
+            <a:prstGeom prst="rect">
+              <a:avLst/>
+            </a:prstGeom>
+            <a:solidFill>
+              <a:schemeClr val="bg1"/>
+            </a:solidFill>
+            <a:ln>
+              <a:noFill/>
+            </a:ln>
+          </p:spPr>
+          <p:style>
+            <a:lnRef idx="2">
+              <a:schemeClr val="accent1">
+                <a:shade val="50000"/>
+              </a:schemeClr>
+            </a:lnRef>
+            <a:fillRef idx="1">
+              <a:schemeClr val="accent1"/>
+            </a:fillRef>
+            <a:effectRef idx="0">
+              <a:schemeClr val="accent1"/>
+            </a:effectRef>
+            <a:fontRef idx="minor">
+              <a:schemeClr val="lt1"/>
+            </a:fontRef>
+          </p:style>
+          <p:txBody>
+            <a:bodyPr rtlCol="0" anchor="ctr"/>
+            <a:lstStyle/>
+            <a:p>
+              <a:pPr algn="ctr"/>
+              <a:endParaRPr lang="en-US"/>
+            </a:p>
+          </p:txBody>
+        </p:sp>
+        <p:pic>
+          <p:nvPicPr>
+            <p:cNvPr id="48" name="Picture 2">
+              <a:extLst>
+                <a:ext uri="{FF2B5EF4-FFF2-40B4-BE49-F238E27FC236}">
+                  <a16:creationId xmlns:a16="http://schemas.microsoft.com/office/drawing/2014/main" id="{AD0A4B57-0FC9-6509-7EB8-F3EB36B78331}"/>
+                </a:ext>
+              </a:extLst>
+            </p:cNvPr>
+            <p:cNvPicPr>
+              <a:picLocks noChangeAspect="1" noChangeArrowheads="1"/>
+            </p:cNvPicPr>
+            <p:nvPr/>
+          </p:nvPicPr>
+          <p:blipFill>
+            <a:blip r:embed="rId2">
+              <a:extLst>
+                <a:ext uri="{28A0092B-C50C-407E-A947-70E740481C1C}">
+                  <a14:useLocalDpi xmlns:a14="http://schemas.microsoft.com/office/drawing/2010/main" val="0"/>
+                </a:ext>
+              </a:extLst>
+            </a:blip>
+            <a:srcRect/>
+            <a:stretch>
+              <a:fillRect/>
+            </a:stretch>
+          </p:blipFill>
+          <p:spPr bwMode="auto">
+            <a:xfrm>
+              <a:off x="7863634" y="4335207"/>
+              <a:ext cx="822960" cy="575429"/>
+            </a:xfrm>
+            <a:prstGeom prst="rect">
+              <a:avLst/>
+            </a:prstGeom>
+            <a:noFill/>
+            <a:extLst>
+              <a:ext uri="{909E8E84-426E-40DD-AFC4-6F175D3DCCD1}">
+                <a14:hiddenFill xmlns:a14="http://schemas.microsoft.com/office/drawing/2010/main">
+                  <a:solidFill>
+                    <a:srgbClr val="FFFFFF"/>
+                  </a:solidFill>
+                </a14:hiddenFill>
+              </a:ext>
+            </a:extLst>
+          </p:spPr>
+        </p:pic>
+      </p:grpSp>
       <p:pic>
         <p:nvPicPr>
           <p:cNvPr id="1024" name="Graphic 7">
@@ -12517,7 +12789,7 @@
           <p:nvPr/>
         </p:nvPicPr>
         <p:blipFill>
-          <a:blip r:embed="rId2">
+          <a:blip r:embed="rId3">
             <a:extLst>
               <a:ext uri="{28A0092B-C50C-407E-A947-70E740481C1C}">
                 <a14:useLocalDpi xmlns:a14="http://schemas.microsoft.com/office/drawing/2010/main" val="0"/>
@@ -12577,13 +12849,13 @@
           <p:nvPr/>
         </p:nvPicPr>
         <p:blipFill>
-          <a:blip r:embed="rId3">
+          <a:blip r:embed="rId4">
             <a:extLst>
               <a:ext uri="{28A0092B-C50C-407E-A947-70E740481C1C}">
                 <a14:useLocalDpi xmlns:a14="http://schemas.microsoft.com/office/drawing/2010/main" val="0"/>
               </a:ext>
               <a:ext uri="{96DAC541-7B7A-43D3-8B79-37D633B846F1}">
-                <asvg:svgBlip xmlns:asvg="http://schemas.microsoft.com/office/drawing/2016/SVG/main" r:embed="rId4"/>
+                <asvg:svgBlip xmlns:asvg="http://schemas.microsoft.com/office/drawing/2016/SVG/main" r:embed="rId5"/>
               </a:ext>
             </a:extLst>
           </a:blip>
@@ -12593,7 +12865,7 @@
         </p:blipFill>
         <p:spPr>
           <a:xfrm>
-            <a:off x="670643" y="2692675"/>
+            <a:off x="670643" y="1931348"/>
             <a:ext cx="1472650" cy="1472650"/>
           </a:xfrm>
           <a:prstGeom prst="rect">
@@ -12615,7 +12887,7 @@
         </p:nvSpPr>
         <p:spPr>
           <a:xfrm>
-            <a:off x="594305" y="4110498"/>
+            <a:off x="594305" y="3349171"/>
             <a:ext cx="1625326" cy="923330"/>
           </a:xfrm>
           <a:prstGeom prst="rect">
@@ -12667,7 +12939,7 @@
           <p:nvPr/>
         </p:nvPicPr>
         <p:blipFill>
-          <a:blip r:embed="rId5">
+          <a:blip r:embed="rId6">
             <a:extLst>
               <a:ext uri="{28A0092B-C50C-407E-A947-70E740481C1C}">
                 <a14:useLocalDpi xmlns:a14="http://schemas.microsoft.com/office/drawing/2010/main" val="0"/>
@@ -12714,10 +12986,10 @@
           <p:nvPr/>
         </p:nvPicPr>
         <p:blipFill>
-          <a:blip r:embed="rId6">
+          <a:blip r:embed="rId7">
             <a:extLst>
               <a:ext uri="{96DAC541-7B7A-43D3-8B79-37D633B846F1}">
-                <asvg:svgBlip xmlns:asvg="http://schemas.microsoft.com/office/drawing/2016/SVG/main" r:embed="rId7"/>
+                <asvg:svgBlip xmlns:asvg="http://schemas.microsoft.com/office/drawing/2016/SVG/main" r:embed="rId8"/>
               </a:ext>
             </a:extLst>
           </a:blip>
@@ -12821,7 +13093,7 @@
             <p:nvPr/>
           </p:nvPicPr>
           <p:blipFill>
-            <a:blip r:embed="rId8"/>
+            <a:blip r:embed="rId9"/>
             <a:stretch>
               <a:fillRect/>
             </a:stretch>
@@ -12852,7 +13124,7 @@
           <p:nvPr/>
         </p:nvPicPr>
         <p:blipFill>
-          <a:blip r:embed="rId9">
+          <a:blip r:embed="rId10">
             <a:extLst>
               <a:ext uri="{28A0092B-C50C-407E-A947-70E740481C1C}">
                 <a14:useLocalDpi xmlns:a14="http://schemas.microsoft.com/office/drawing/2010/main" val="0"/>
@@ -12866,7 +13138,7 @@
         </p:blipFill>
         <p:spPr bwMode="auto">
           <a:xfrm>
-            <a:off x="8032257" y="3779981"/>
+            <a:off x="8035134" y="1480839"/>
             <a:ext cx="822960" cy="822960"/>
           </a:xfrm>
           <a:prstGeom prst="rect">
@@ -12899,7 +13171,7 @@
           <p:nvPr/>
         </p:nvPicPr>
         <p:blipFill>
-          <a:blip r:embed="rId10">
+          <a:blip r:embed="rId11">
             <a:extLst>
               <a:ext uri="{28A0092B-C50C-407E-A947-70E740481C1C}">
                 <a14:useLocalDpi xmlns:a14="http://schemas.microsoft.com/office/drawing/2010/main" val="0"/>
@@ -12987,7 +13259,7 @@
                   <a:schemeClr val="tx1"/>
                 </a:solidFill>
               </a:rPr>
-              <a:t>EXTERNAL ATTACK SURFACE MANAGEMENT (EASM)</a:t>
+              <a:t>ATTACK SURFACE MONITORING (ASM)</a:t>
             </a:r>
           </a:p>
         </p:txBody>
@@ -13129,7 +13401,7 @@
           <p:nvPr/>
         </p:nvPicPr>
         <p:blipFill>
-          <a:blip r:embed="rId11">
+          <a:blip r:embed="rId12">
             <a:extLst>
               <a:ext uri="{28A0092B-C50C-407E-A947-70E740481C1C}">
                 <a14:useLocalDpi xmlns:a14="http://schemas.microsoft.com/office/drawing/2010/main" val="0"/>
@@ -13253,7 +13525,7 @@
             <p:nvPr/>
           </p:nvPicPr>
           <p:blipFill>
-            <a:blip r:embed="rId12">
+            <a:blip r:embed="rId13">
               <a:extLst>
                 <a:ext uri="{28A0092B-C50C-407E-A947-70E740481C1C}">
                   <a14:useLocalDpi xmlns:a14="http://schemas.microsoft.com/office/drawing/2010/main" val="0"/>
@@ -13300,7 +13572,7 @@
         </p:nvGrpSpPr>
         <p:grpSpPr>
           <a:xfrm>
-            <a:off x="9234061" y="2666457"/>
+            <a:off x="9241435" y="3776099"/>
             <a:ext cx="822960" cy="822960"/>
             <a:chOff x="8853054" y="4006272"/>
             <a:chExt cx="996696" cy="996696"/>
@@ -13373,7 +13645,7 @@
             <p:nvPr/>
           </p:nvPicPr>
           <p:blipFill>
-            <a:blip r:embed="rId13">
+            <a:blip r:embed="rId14">
               <a:extLst>
                 <a:ext uri="{28A0092B-C50C-407E-A947-70E740481C1C}">
                   <a14:useLocalDpi xmlns:a14="http://schemas.microsoft.com/office/drawing/2010/main" val="0"/>
@@ -13420,7 +13692,7 @@
         </p:nvSpPr>
         <p:spPr>
           <a:xfrm>
-            <a:off x="9823414" y="2413720"/>
+            <a:off x="9760934" y="3604985"/>
             <a:ext cx="1074420" cy="463441"/>
           </a:xfrm>
           <a:prstGeom prst="roundRect">
@@ -13483,12 +13755,12 @@
         </p:nvCxnSpPr>
         <p:spPr>
           <a:xfrm rot="5400000" flipH="1" flipV="1">
-            <a:off x="1653450" y="89107"/>
-            <a:ext cx="2357087" cy="2850051"/>
+            <a:off x="2034113" y="-291557"/>
+            <a:ext cx="1595760" cy="2850051"/>
           </a:xfrm>
           <a:prstGeom prst="bentConnector3">
             <a:avLst>
-              <a:gd name="adj1" fmla="val 109698"/>
+              <a:gd name="adj1" fmla="val 114325"/>
             </a:avLst>
           </a:prstGeom>
           <a:ln w="19050">
@@ -13530,12 +13802,12 @@
         </p:nvCxnSpPr>
         <p:spPr>
           <a:xfrm rot="5400000" flipH="1" flipV="1">
-            <a:off x="3251596" y="-1509039"/>
-            <a:ext cx="2357087" cy="6046343"/>
+            <a:off x="3632259" y="-1889703"/>
+            <a:ext cx="1595760" cy="6046343"/>
           </a:xfrm>
           <a:prstGeom prst="bentConnector3">
             <a:avLst>
-              <a:gd name="adj1" fmla="val 109698"/>
+              <a:gd name="adj1" fmla="val 114325"/>
             </a:avLst>
           </a:prstGeom>
           <a:ln w="19050">
@@ -13577,12 +13849,12 @@
         </p:nvCxnSpPr>
         <p:spPr>
           <a:xfrm rot="5400000" flipH="1" flipV="1">
-            <a:off x="4845211" y="-3102654"/>
-            <a:ext cx="2357087" cy="9233573"/>
+            <a:off x="5225874" y="-3483318"/>
+            <a:ext cx="1595760" cy="9233573"/>
           </a:xfrm>
           <a:prstGeom prst="bentConnector3">
             <a:avLst>
-              <a:gd name="adj1" fmla="val 109698"/>
+              <a:gd name="adj1" fmla="val 114325"/>
             </a:avLst>
           </a:prstGeom>
           <a:ln w="19050">
@@ -13685,8 +13957,8 @@
         </p:nvCxnSpPr>
         <p:spPr>
           <a:xfrm rot="16200000" flipH="1">
-            <a:off x="1677996" y="4762799"/>
-            <a:ext cx="194268" cy="736325"/>
+            <a:off x="1297333" y="4382135"/>
+            <a:ext cx="955595" cy="736325"/>
           </a:xfrm>
           <a:prstGeom prst="bentConnector2">
             <a:avLst/>
@@ -13727,7 +13999,7 @@
           <p:nvPr/>
         </p:nvPicPr>
         <p:blipFill>
-          <a:blip r:embed="rId14">
+          <a:blip r:embed="rId15">
             <a:extLst>
               <a:ext uri="{28A0092B-C50C-407E-A947-70E740481C1C}">
                 <a14:useLocalDpi xmlns:a14="http://schemas.microsoft.com/office/drawing/2010/main" val="0"/>
@@ -13843,7 +14115,7 @@
           <p:nvPr/>
         </p:nvPicPr>
         <p:blipFill>
-          <a:blip r:embed="rId15">
+          <a:blip r:embed="rId16">
             <a:extLst>
               <a:ext uri="{28A0092B-C50C-407E-A947-70E740481C1C}">
                 <a14:useLocalDpi xmlns:a14="http://schemas.microsoft.com/office/drawing/2010/main" val="0"/>
@@ -14067,10 +14339,10 @@
           <p:nvPr/>
         </p:nvPicPr>
         <p:blipFill>
-          <a:blip r:embed="rId16">
+          <a:blip r:embed="rId17">
             <a:extLst>
               <a:ext uri="{96DAC541-7B7A-43D3-8B79-37D633B846F1}">
-                <asvg:svgBlip xmlns:asvg="http://schemas.microsoft.com/office/drawing/2016/SVG/main" r:embed="rId17"/>
+                <asvg:svgBlip xmlns:asvg="http://schemas.microsoft.com/office/drawing/2016/SVG/main" r:embed="rId18"/>
               </a:ext>
             </a:extLst>
           </a:blip>
@@ -14301,7 +14573,7 @@
           <p:nvPr/>
         </p:nvPicPr>
         <p:blipFill>
-          <a:blip r:embed="rId18">
+          <a:blip r:embed="rId19">
             <a:extLst>
               <a:ext uri="{28A0092B-C50C-407E-A947-70E740481C1C}">
                 <a14:useLocalDpi xmlns:a14="http://schemas.microsoft.com/office/drawing/2010/main" val="0"/>
@@ -14703,7 +14975,7 @@
           <p:nvPr/>
         </p:nvPicPr>
         <p:blipFill>
-          <a:blip r:embed="rId19">
+          <a:blip r:embed="rId20">
             <a:extLst>
               <a:ext uri="{28A0092B-C50C-407E-A947-70E740481C1C}">
                 <a14:useLocalDpi xmlns:a14="http://schemas.microsoft.com/office/drawing/2010/main" val="0"/>
@@ -14927,7 +15199,7 @@
           <p:nvPr/>
         </p:nvPicPr>
         <p:blipFill>
-          <a:blip r:embed="rId20">
+          <a:blip r:embed="rId21">
             <a:extLst>
               <a:ext uri="{28A0092B-C50C-407E-A947-70E740481C1C}">
                 <a14:useLocalDpi xmlns:a14="http://schemas.microsoft.com/office/drawing/2010/main" val="0"/>
@@ -14974,7 +15246,7 @@
           <p:nvPr/>
         </p:nvPicPr>
         <p:blipFill>
-          <a:blip r:embed="rId21">
+          <a:blip r:embed="rId22">
             <a:extLst>
               <a:ext uri="{28A0092B-C50C-407E-A947-70E740481C1C}">
                 <a14:useLocalDpi xmlns:a14="http://schemas.microsoft.com/office/drawing/2010/main" val="0"/>
@@ -15080,7 +15352,7 @@
           <p:nvPr/>
         </p:nvPicPr>
         <p:blipFill>
-          <a:blip r:embed="rId22">
+          <a:blip r:embed="rId23">
             <a:extLst>
               <a:ext uri="{28A0092B-C50C-407E-A947-70E740481C1C}">
                 <a14:useLocalDpi xmlns:a14="http://schemas.microsoft.com/office/drawing/2010/main" val="0"/>
@@ -15127,7 +15399,7 @@
           <p:nvPr/>
         </p:nvPicPr>
         <p:blipFill>
-          <a:blip r:embed="rId23">
+          <a:blip r:embed="rId24">
             <a:extLst>
               <a:ext uri="{28A0092B-C50C-407E-A947-70E740481C1C}">
                 <a14:useLocalDpi xmlns:a14="http://schemas.microsoft.com/office/drawing/2010/main" val="0"/>
@@ -15294,7 +15566,7 @@
           <p:nvPr/>
         </p:nvPicPr>
         <p:blipFill>
-          <a:blip r:embed="rId24">
+          <a:blip r:embed="rId25">
             <a:extLst>
               <a:ext uri="{28A0092B-C50C-407E-A947-70E740481C1C}">
                 <a14:useLocalDpi xmlns:a14="http://schemas.microsoft.com/office/drawing/2010/main" val="0"/>
@@ -15400,7 +15672,7 @@
           <p:nvPr/>
         </p:nvPicPr>
         <p:blipFill>
-          <a:blip r:embed="rId25">
+          <a:blip r:embed="rId26">
             <a:extLst>
               <a:ext uri="{28A0092B-C50C-407E-A947-70E740481C1C}">
                 <a14:useLocalDpi xmlns:a14="http://schemas.microsoft.com/office/drawing/2010/main" val="0"/>
@@ -15747,7 +16019,7 @@
           <p:nvPr/>
         </p:nvPicPr>
         <p:blipFill>
-          <a:blip r:embed="rId26"/>
+          <a:blip r:embed="rId27"/>
           <a:stretch>
             <a:fillRect/>
           </a:stretch>
@@ -15777,7 +16049,7 @@
           <p:nvPr/>
         </p:nvPicPr>
         <p:blipFill>
-          <a:blip r:embed="rId27">
+          <a:blip r:embed="rId28">
             <a:extLst>
               <a:ext uri="{28A0092B-C50C-407E-A947-70E740481C1C}">
                 <a14:useLocalDpi xmlns:a14="http://schemas.microsoft.com/office/drawing/2010/main" val="0"/>
@@ -15883,7 +16155,7 @@
           <p:nvPr/>
         </p:nvPicPr>
         <p:blipFill>
-          <a:blip r:embed="rId28">
+          <a:blip r:embed="rId29">
             <a:extLst>
               <a:ext uri="{28A0092B-C50C-407E-A947-70E740481C1C}">
                 <a14:useLocalDpi xmlns:a14="http://schemas.microsoft.com/office/drawing/2010/main" val="0"/>
@@ -16080,7 +16352,7 @@
           <p:nvPr/>
         </p:nvPicPr>
         <p:blipFill>
-          <a:blip r:embed="rId29">
+          <a:blip r:embed="rId30">
             <a:extLst>
               <a:ext uri="{28A0092B-C50C-407E-A947-70E740481C1C}">
                 <a14:useLocalDpi xmlns:a14="http://schemas.microsoft.com/office/drawing/2010/main" val="0"/>
@@ -16276,8 +16548,8 @@
         </p:nvSpPr>
         <p:spPr>
           <a:xfrm>
-            <a:off x="7810623" y="5067850"/>
-            <a:ext cx="1074420" cy="463441"/>
+            <a:off x="8817562" y="5206545"/>
+            <a:ext cx="976745" cy="421310"/>
           </a:xfrm>
           <a:prstGeom prst="roundRect">
             <a:avLst/>
@@ -16321,61 +16593,122 @@
           </a:p>
         </p:txBody>
       </p:sp>
+      <p:pic>
+        <p:nvPicPr>
+          <p:cNvPr id="37" name="Picture 36">
+            <a:extLst>
+              <a:ext uri="{FF2B5EF4-FFF2-40B4-BE49-F238E27FC236}">
+                <a16:creationId xmlns:a16="http://schemas.microsoft.com/office/drawing/2014/main" id="{1934A7B0-8025-4823-246C-8E4DF0FBF33A}"/>
+              </a:ext>
+            </a:extLst>
+          </p:cNvPr>
+          <p:cNvPicPr>
+            <a:picLocks noChangeAspect="1"/>
+          </p:cNvPicPr>
+          <p:nvPr/>
+        </p:nvPicPr>
+        <p:blipFill>
+          <a:blip r:embed="rId31"/>
+          <a:stretch>
+            <a:fillRect/>
+          </a:stretch>
+        </p:blipFill>
+        <p:spPr>
+          <a:xfrm>
+            <a:off x="9232627" y="2667785"/>
+            <a:ext cx="823031" cy="823031"/>
+          </a:xfrm>
+          <a:prstGeom prst="rect">
+            <a:avLst/>
+          </a:prstGeom>
+        </p:spPr>
+      </p:pic>
+      <p:pic>
+        <p:nvPicPr>
+          <p:cNvPr id="58" name="Picture 4" descr="Yelp.com · GitHub">
+            <a:extLst>
+              <a:ext uri="{FF2B5EF4-FFF2-40B4-BE49-F238E27FC236}">
+                <a16:creationId xmlns:a16="http://schemas.microsoft.com/office/drawing/2014/main" id="{8CC383B5-72D7-D07C-E83A-8BC781801C26}"/>
+              </a:ext>
+            </a:extLst>
+          </p:cNvPr>
+          <p:cNvPicPr>
+            <a:picLocks noChangeAspect="1" noChangeArrowheads="1"/>
+          </p:cNvPicPr>
+          <p:nvPr/>
+        </p:nvPicPr>
+        <p:blipFill>
+          <a:blip r:embed="rId32">
+            <a:extLst>
+              <a:ext uri="{28A0092B-C50C-407E-A947-70E740481C1C}">
+                <a14:useLocalDpi xmlns:a14="http://schemas.microsoft.com/office/drawing/2010/main" val="0"/>
+              </a:ext>
+            </a:extLst>
+          </a:blip>
+          <a:srcRect/>
+          <a:stretch>
+            <a:fillRect/>
+          </a:stretch>
+        </p:blipFill>
+        <p:spPr bwMode="auto">
+          <a:xfrm>
+            <a:off x="11219488" y="3776099"/>
+            <a:ext cx="822960" cy="822960"/>
+          </a:xfrm>
+          <a:prstGeom prst="rect">
+            <a:avLst/>
+          </a:prstGeom>
+          <a:noFill/>
+          <a:extLst>
+            <a:ext uri="{909E8E84-426E-40DD-AFC4-6F175D3DCCD1}">
+              <a14:hiddenFill xmlns:a14="http://schemas.microsoft.com/office/drawing/2010/main">
+                <a:solidFill>
+                  <a:srgbClr val="FFFFFF"/>
+                </a:solidFill>
+              </a14:hiddenFill>
+            </a:ext>
+          </a:extLst>
+        </p:spPr>
+      </p:pic>
       <p:sp>
         <p:nvSpPr>
-          <p:cNvPr id="1035" name="Rectangle: Rounded Corners 1034">
-            <a:extLst>
-              <a:ext uri="{FF2B5EF4-FFF2-40B4-BE49-F238E27FC236}">
-                <a16:creationId xmlns:a16="http://schemas.microsoft.com/office/drawing/2014/main" id="{7B10FD35-E90C-F251-3773-D31CEAD0A08F}"/>
-              </a:ext>
-            </a:extLst>
-          </p:cNvPr>
-          <p:cNvSpPr/>
+          <p:cNvPr id="59" name="TextBox 58">
+            <a:extLst>
+              <a:ext uri="{FF2B5EF4-FFF2-40B4-BE49-F238E27FC236}">
+                <a16:creationId xmlns:a16="http://schemas.microsoft.com/office/drawing/2014/main" id="{5CC73447-0500-A8A3-8C4A-97103F0A5ED6}"/>
+              </a:ext>
+            </a:extLst>
+          </p:cNvPr>
+          <p:cNvSpPr txBox="1"/>
           <p:nvPr/>
         </p:nvSpPr>
         <p:spPr>
           <a:xfrm>
-            <a:off x="9864139" y="5067823"/>
-            <a:ext cx="1074420" cy="463441"/>
+            <a:off x="11097970" y="4413255"/>
+            <a:ext cx="1065995" cy="200055"/>
           </a:xfrm>
-          <a:prstGeom prst="roundRect">
+          <a:prstGeom prst="rect">
             <a:avLst/>
           </a:prstGeom>
-          <a:solidFill>
-            <a:srgbClr val="00B0F0"/>
-          </a:solidFill>
-          <a:ln>
-            <a:noFill/>
-          </a:ln>
+          <a:noFill/>
         </p:spPr>
-        <p:style>
-          <a:lnRef idx="2">
-            <a:schemeClr val="accent1">
-              <a:shade val="50000"/>
-            </a:schemeClr>
-          </a:lnRef>
-          <a:fillRef idx="1">
-            <a:schemeClr val="accent1"/>
-          </a:fillRef>
-          <a:effectRef idx="0">
-            <a:schemeClr val="accent1"/>
-          </a:effectRef>
-          <a:fontRef idx="minor">
-            <a:schemeClr val="lt1"/>
-          </a:fontRef>
-        </p:style>
         <p:txBody>
-          <a:bodyPr rtlCol="0" anchor="ctr"/>
+          <a:bodyPr wrap="square" rtlCol="0">
+            <a:spAutoFit/>
+          </a:bodyPr>
           <a:lstStyle/>
           <a:p>
             <a:pPr algn="ctr"/>
             <a:r>
-              <a:rPr lang="en-US" sz="1600" b="1" dirty="0">
-                <a:solidFill>
-                  <a:schemeClr val="tx1"/>
-                </a:solidFill>
+              <a:rPr lang="en-US" sz="700" dirty="0">
+                <a:solidFill>
+                  <a:srgbClr val="FFFF00"/>
+                </a:solidFill>
+                <a:latin typeface="Cascadia Mono Light" panose="020B0609020000020004" pitchFamily="49" charset="0"/>
+                <a:ea typeface="Cascadia Mono Light" panose="020B0609020000020004" pitchFamily="49" charset="0"/>
+                <a:cs typeface="Cascadia Mono Light" panose="020B0609020000020004" pitchFamily="49" charset="0"/>
               </a:rPr>
-              <a:t>COMING SOON!</a:t>
+              <a:t>detect-secrets</a:t>
             </a:r>
           </a:p>
         </p:txBody>

</xml_diff>

<commit_message>
Add first SFDC Auditor, update architecture
</commit_message>
<xml_diff>
--- a/screenshots/extras/ElectricEye.pptx
+++ b/screenshots/extras/ElectricEye.pptx
@@ -124,6 +124,686 @@
 <file path=ppt/changesInfos/changesInfo1.xml><?xml version="1.0" encoding="utf-8"?>
 <pc:chgInfo xmlns:a="http://schemas.openxmlformats.org/drawingml/2006/main" xmlns:r="http://schemas.openxmlformats.org/officeDocument/2006/relationships" xmlns:ac="http://schemas.microsoft.com/office/drawing/2013/main/command" xmlns:pc="http://schemas.microsoft.com/office/powerpoint/2013/main/command">
   <pc:docChgLst>
+    <pc:chgData name="Jonathan Rau" userId="01bd1429-ada3-4be3-b2f3-ae839e9d5ccc" providerId="ADAL" clId="{3F5F48D2-2934-4288-A555-E6823DD1D0AE}"/>
+    <pc:docChg chg="undo custSel addSld modSld">
+      <pc:chgData name="Jonathan Rau" userId="01bd1429-ada3-4be3-b2f3-ae839e9d5ccc" providerId="ADAL" clId="{3F5F48D2-2934-4288-A555-E6823DD1D0AE}" dt="2023-05-01T22:11:35.855" v="1433" actId="1076"/>
+      <pc:docMkLst>
+        <pc:docMk/>
+      </pc:docMkLst>
+      <pc:sldChg chg="addSp delSp modSp new mod setBg">
+        <pc:chgData name="Jonathan Rau" userId="01bd1429-ada3-4be3-b2f3-ae839e9d5ccc" providerId="ADAL" clId="{3F5F48D2-2934-4288-A555-E6823DD1D0AE}" dt="2023-05-01T22:11:35.855" v="1433" actId="1076"/>
+        <pc:sldMkLst>
+          <pc:docMk/>
+          <pc:sldMk cId="2927218767" sldId="258"/>
+        </pc:sldMkLst>
+        <pc:spChg chg="add mod ord">
+          <ac:chgData name="Jonathan Rau" userId="01bd1429-ada3-4be3-b2f3-ae839e9d5ccc" providerId="ADAL" clId="{3F5F48D2-2934-4288-A555-E6823DD1D0AE}" dt="2023-05-01T22:08:19.422" v="1309" actId="12789"/>
+          <ac:spMkLst>
+            <pc:docMk/>
+            <pc:sldMk cId="2927218767" sldId="258"/>
+            <ac:spMk id="2" creationId="{2CBB7894-144C-A36C-3DB9-4368ED6A1E03}"/>
+          </ac:spMkLst>
+        </pc:spChg>
+        <pc:spChg chg="add del mod">
+          <ac:chgData name="Jonathan Rau" userId="01bd1429-ada3-4be3-b2f3-ae839e9d5ccc" providerId="ADAL" clId="{3F5F48D2-2934-4288-A555-E6823DD1D0AE}" dt="2023-04-14T19:42:55.247" v="40" actId="478"/>
+          <ac:spMkLst>
+            <pc:docMk/>
+            <pc:sldMk cId="2927218767" sldId="258"/>
+            <ac:spMk id="2" creationId="{C7D43765-3766-2114-A532-32A62A5B4E22}"/>
+          </ac:spMkLst>
+        </pc:spChg>
+        <pc:spChg chg="add mod">
+          <ac:chgData name="Jonathan Rau" userId="01bd1429-ada3-4be3-b2f3-ae839e9d5ccc" providerId="ADAL" clId="{3F5F48D2-2934-4288-A555-E6823DD1D0AE}" dt="2023-05-01T22:08:56.752" v="1363" actId="1076"/>
+          <ac:spMkLst>
+            <pc:docMk/>
+            <pc:sldMk cId="2927218767" sldId="258"/>
+            <ac:spMk id="5" creationId="{50B9014E-CAC8-98AE-CB22-D756ECFEB685}"/>
+          </ac:spMkLst>
+        </pc:spChg>
+        <pc:spChg chg="add mod topLvl">
+          <ac:chgData name="Jonathan Rau" userId="01bd1429-ada3-4be3-b2f3-ae839e9d5ccc" providerId="ADAL" clId="{3F5F48D2-2934-4288-A555-E6823DD1D0AE}" dt="2023-05-01T22:09:47.537" v="1401" actId="1035"/>
+          <ac:spMkLst>
+            <pc:docMk/>
+            <pc:sldMk cId="2927218767" sldId="258"/>
+            <ac:spMk id="7" creationId="{9F78F5AA-A513-5719-7273-839BFED55752}"/>
+          </ac:spMkLst>
+        </pc:spChg>
+        <pc:spChg chg="add del">
+          <ac:chgData name="Jonathan Rau" userId="01bd1429-ada3-4be3-b2f3-ae839e9d5ccc" providerId="ADAL" clId="{3F5F48D2-2934-4288-A555-E6823DD1D0AE}" dt="2023-04-14T19:48:24.676" v="175"/>
+          <ac:spMkLst>
+            <pc:docMk/>
+            <pc:sldMk cId="2927218767" sldId="258"/>
+            <ac:spMk id="7" creationId="{D5CA81DD-2F47-8FB5-5437-A77060607AF6}"/>
+          </ac:spMkLst>
+        </pc:spChg>
+        <pc:spChg chg="add mod ord">
+          <ac:chgData name="Jonathan Rau" userId="01bd1429-ada3-4be3-b2f3-ae839e9d5ccc" providerId="ADAL" clId="{3F5F48D2-2934-4288-A555-E6823DD1D0AE}" dt="2023-05-01T22:05:19.418" v="1287" actId="12789"/>
+          <ac:spMkLst>
+            <pc:docMk/>
+            <pc:sldMk cId="2927218767" sldId="258"/>
+            <ac:spMk id="9" creationId="{743AA06B-1021-9D58-8136-63E9F09D80F6}"/>
+          </ac:spMkLst>
+        </pc:spChg>
+        <pc:spChg chg="add mod">
+          <ac:chgData name="Jonathan Rau" userId="01bd1429-ada3-4be3-b2f3-ae839e9d5ccc" providerId="ADAL" clId="{3F5F48D2-2934-4288-A555-E6823DD1D0AE}" dt="2023-05-01T22:08:24.716" v="1310" actId="12788"/>
+          <ac:spMkLst>
+            <pc:docMk/>
+            <pc:sldMk cId="2927218767" sldId="258"/>
+            <ac:spMk id="15" creationId="{DD5C6FDF-7C59-4946-2CD5-F72284FC5851}"/>
+          </ac:spMkLst>
+        </pc:spChg>
+        <pc:spChg chg="add mod">
+          <ac:chgData name="Jonathan Rau" userId="01bd1429-ada3-4be3-b2f3-ae839e9d5ccc" providerId="ADAL" clId="{3F5F48D2-2934-4288-A555-E6823DD1D0AE}" dt="2023-05-01T22:08:00.467" v="1305" actId="552"/>
+          <ac:spMkLst>
+            <pc:docMk/>
+            <pc:sldMk cId="2927218767" sldId="258"/>
+            <ac:spMk id="16" creationId="{DFDE86E7-AF7B-3343-B83E-DFC8327B6214}"/>
+          </ac:spMkLst>
+        </pc:spChg>
+        <pc:spChg chg="add mod">
+          <ac:chgData name="Jonathan Rau" userId="01bd1429-ada3-4be3-b2f3-ae839e9d5ccc" providerId="ADAL" clId="{3F5F48D2-2934-4288-A555-E6823DD1D0AE}" dt="2023-05-01T22:08:10.226" v="1307" actId="553"/>
+          <ac:spMkLst>
+            <pc:docMk/>
+            <pc:sldMk cId="2927218767" sldId="258"/>
+            <ac:spMk id="17" creationId="{B6CB8600-7725-1B60-693D-12AD37216EA1}"/>
+          </ac:spMkLst>
+        </pc:spChg>
+        <pc:spChg chg="add mod ord">
+          <ac:chgData name="Jonathan Rau" userId="01bd1429-ada3-4be3-b2f3-ae839e9d5ccc" providerId="ADAL" clId="{3F5F48D2-2934-4288-A555-E6823DD1D0AE}" dt="2023-05-01T22:06:34.060" v="1294" actId="12789"/>
+          <ac:spMkLst>
+            <pc:docMk/>
+            <pc:sldMk cId="2927218767" sldId="258"/>
+            <ac:spMk id="18" creationId="{11380B01-5C11-2679-9594-77B4B9FFAF52}"/>
+          </ac:spMkLst>
+        </pc:spChg>
+        <pc:spChg chg="add mod ord">
+          <ac:chgData name="Jonathan Rau" userId="01bd1429-ada3-4be3-b2f3-ae839e9d5ccc" providerId="ADAL" clId="{3F5F48D2-2934-4288-A555-E6823DD1D0AE}" dt="2023-05-01T22:06:40.455" v="1295" actId="12788"/>
+          <ac:spMkLst>
+            <pc:docMk/>
+            <pc:sldMk cId="2927218767" sldId="258"/>
+            <ac:spMk id="19" creationId="{5777DF44-469B-7A2F-8877-71FC31533BAB}"/>
+          </ac:spMkLst>
+        </pc:spChg>
+        <pc:spChg chg="add mod ord">
+          <ac:chgData name="Jonathan Rau" userId="01bd1429-ada3-4be3-b2f3-ae839e9d5ccc" providerId="ADAL" clId="{3F5F48D2-2934-4288-A555-E6823DD1D0AE}" dt="2023-05-01T22:08:24.716" v="1310" actId="12788"/>
+          <ac:spMkLst>
+            <pc:docMk/>
+            <pc:sldMk cId="2927218767" sldId="258"/>
+            <ac:spMk id="20" creationId="{955587C0-591B-918F-2EFF-90D940181BF4}"/>
+          </ac:spMkLst>
+        </pc:spChg>
+        <pc:spChg chg="add mod ord">
+          <ac:chgData name="Jonathan Rau" userId="01bd1429-ada3-4be3-b2f3-ae839e9d5ccc" providerId="ADAL" clId="{3F5F48D2-2934-4288-A555-E6823DD1D0AE}" dt="2023-05-01T22:08:24.716" v="1310" actId="12788"/>
+          <ac:spMkLst>
+            <pc:docMk/>
+            <pc:sldMk cId="2927218767" sldId="258"/>
+            <ac:spMk id="23" creationId="{C3FF9F8B-DA2B-B229-1266-64F4BAA0AA3E}"/>
+          </ac:spMkLst>
+        </pc:spChg>
+        <pc:spChg chg="add mod">
+          <ac:chgData name="Jonathan Rau" userId="01bd1429-ada3-4be3-b2f3-ae839e9d5ccc" providerId="ADAL" clId="{3F5F48D2-2934-4288-A555-E6823DD1D0AE}" dt="2023-05-01T22:08:19.422" v="1309" actId="12789"/>
+          <ac:spMkLst>
+            <pc:docMk/>
+            <pc:sldMk cId="2927218767" sldId="258"/>
+            <ac:spMk id="25" creationId="{060A3261-575A-DB40-A7E1-36B64B9B5F6A}"/>
+          </ac:spMkLst>
+        </pc:spChg>
+        <pc:spChg chg="add del mod">
+          <ac:chgData name="Jonathan Rau" userId="01bd1429-ada3-4be3-b2f3-ae839e9d5ccc" providerId="ADAL" clId="{3F5F48D2-2934-4288-A555-E6823DD1D0AE}" dt="2023-04-14T19:59:14.340" v="685" actId="478"/>
+          <ac:spMkLst>
+            <pc:docMk/>
+            <pc:sldMk cId="2927218767" sldId="258"/>
+            <ac:spMk id="34" creationId="{CF211332-0D27-B046-09A3-AE3A5EDFAB1C}"/>
+          </ac:spMkLst>
+        </pc:spChg>
+        <pc:spChg chg="add mod topLvl">
+          <ac:chgData name="Jonathan Rau" userId="01bd1429-ada3-4be3-b2f3-ae839e9d5ccc" providerId="ADAL" clId="{3F5F48D2-2934-4288-A555-E6823DD1D0AE}" dt="2023-05-01T22:09:47.537" v="1401" actId="1035"/>
+          <ac:spMkLst>
+            <pc:docMk/>
+            <pc:sldMk cId="2927218767" sldId="258"/>
+            <ac:spMk id="36" creationId="{3168B3C9-C653-D5A4-3A61-2E0ED75D4320}"/>
+          </ac:spMkLst>
+        </pc:spChg>
+        <pc:spChg chg="add del mod topLvl">
+          <ac:chgData name="Jonathan Rau" userId="01bd1429-ada3-4be3-b2f3-ae839e9d5ccc" providerId="ADAL" clId="{3F5F48D2-2934-4288-A555-E6823DD1D0AE}" dt="2023-05-01T21:45:03.283" v="780" actId="478"/>
+          <ac:spMkLst>
+            <pc:docMk/>
+            <pc:sldMk cId="2927218767" sldId="258"/>
+            <ac:spMk id="37" creationId="{72850DCE-AA01-4284-6BAB-E56678FBD6F8}"/>
+          </ac:spMkLst>
+        </pc:spChg>
+        <pc:spChg chg="add mod topLvl">
+          <ac:chgData name="Jonathan Rau" userId="01bd1429-ada3-4be3-b2f3-ae839e9d5ccc" providerId="ADAL" clId="{3F5F48D2-2934-4288-A555-E6823DD1D0AE}" dt="2023-05-01T22:09:47.537" v="1401" actId="1035"/>
+          <ac:spMkLst>
+            <pc:docMk/>
+            <pc:sldMk cId="2927218767" sldId="258"/>
+            <ac:spMk id="40" creationId="{2B9F4387-007C-A863-E06D-057C44D1A8B7}"/>
+          </ac:spMkLst>
+        </pc:spChg>
+        <pc:spChg chg="add del mod topLvl">
+          <ac:chgData name="Jonathan Rau" userId="01bd1429-ada3-4be3-b2f3-ae839e9d5ccc" providerId="ADAL" clId="{3F5F48D2-2934-4288-A555-E6823DD1D0AE}" dt="2023-05-01T21:45:03.283" v="780" actId="478"/>
+          <ac:spMkLst>
+            <pc:docMk/>
+            <pc:sldMk cId="2927218767" sldId="258"/>
+            <ac:spMk id="42" creationId="{75A37B31-03FB-0E19-883C-B831E3DD86E8}"/>
+          </ac:spMkLst>
+        </pc:spChg>
+        <pc:spChg chg="add mod topLvl">
+          <ac:chgData name="Jonathan Rau" userId="01bd1429-ada3-4be3-b2f3-ae839e9d5ccc" providerId="ADAL" clId="{3F5F48D2-2934-4288-A555-E6823DD1D0AE}" dt="2023-05-01T22:09:47.537" v="1401" actId="1035"/>
+          <ac:spMkLst>
+            <pc:docMk/>
+            <pc:sldMk cId="2927218767" sldId="258"/>
+            <ac:spMk id="44" creationId="{AF0DFB57-0EA5-1522-9EE9-03E1643EF3C4}"/>
+          </ac:spMkLst>
+        </pc:spChg>
+        <pc:spChg chg="add mod topLvl">
+          <ac:chgData name="Jonathan Rau" userId="01bd1429-ada3-4be3-b2f3-ae839e9d5ccc" providerId="ADAL" clId="{3F5F48D2-2934-4288-A555-E6823DD1D0AE}" dt="2023-05-01T22:09:47.537" v="1401" actId="1035"/>
+          <ac:spMkLst>
+            <pc:docMk/>
+            <pc:sldMk cId="2927218767" sldId="258"/>
+            <ac:spMk id="45" creationId="{5403259A-FD0E-15A7-723A-F88B42E0162C}"/>
+          </ac:spMkLst>
+        </pc:spChg>
+        <pc:spChg chg="add mod ord topLvl">
+          <ac:chgData name="Jonathan Rau" userId="01bd1429-ada3-4be3-b2f3-ae839e9d5ccc" providerId="ADAL" clId="{3F5F48D2-2934-4288-A555-E6823DD1D0AE}" dt="2023-05-01T22:09:47.537" v="1401" actId="1035"/>
+          <ac:spMkLst>
+            <pc:docMk/>
+            <pc:sldMk cId="2927218767" sldId="258"/>
+            <ac:spMk id="47" creationId="{EDA5DF41-D325-4378-3FDC-CBE766C0E32E}"/>
+          </ac:spMkLst>
+        </pc:spChg>
+        <pc:spChg chg="add del mod">
+          <ac:chgData name="Jonathan Rau" userId="01bd1429-ada3-4be3-b2f3-ae839e9d5ccc" providerId="ADAL" clId="{3F5F48D2-2934-4288-A555-E6823DD1D0AE}" dt="2023-04-14T20:01:20.051" v="733" actId="478"/>
+          <ac:spMkLst>
+            <pc:docMk/>
+            <pc:sldMk cId="2927218767" sldId="258"/>
+            <ac:spMk id="50" creationId="{78AF7BB0-562E-4589-5090-9B7D1A3C3F61}"/>
+          </ac:spMkLst>
+        </pc:spChg>
+        <pc:spChg chg="add mod">
+          <ac:chgData name="Jonathan Rau" userId="01bd1429-ada3-4be3-b2f3-ae839e9d5ccc" providerId="ADAL" clId="{3F5F48D2-2934-4288-A555-E6823DD1D0AE}" dt="2023-05-01T22:11:35.855" v="1433" actId="1076"/>
+          <ac:spMkLst>
+            <pc:docMk/>
+            <pc:sldMk cId="2927218767" sldId="258"/>
+            <ac:spMk id="51" creationId="{1693654B-B9C5-BB57-C5AF-C57E58130215}"/>
+          </ac:spMkLst>
+        </pc:spChg>
+        <pc:spChg chg="add mod">
+          <ac:chgData name="Jonathan Rau" userId="01bd1429-ada3-4be3-b2f3-ae839e9d5ccc" providerId="ADAL" clId="{3F5F48D2-2934-4288-A555-E6823DD1D0AE}" dt="2023-05-01T22:09:17.588" v="1371" actId="14100"/>
+          <ac:spMkLst>
+            <pc:docMk/>
+            <pc:sldMk cId="2927218767" sldId="258"/>
+            <ac:spMk id="57" creationId="{87EC92A5-9254-25F8-0C42-0E676A517662}"/>
+          </ac:spMkLst>
+        </pc:spChg>
+        <pc:spChg chg="mod">
+          <ac:chgData name="Jonathan Rau" userId="01bd1429-ada3-4be3-b2f3-ae839e9d5ccc" providerId="ADAL" clId="{3F5F48D2-2934-4288-A555-E6823DD1D0AE}" dt="2023-05-01T22:05:15.503" v="1286" actId="571"/>
+          <ac:spMkLst>
+            <pc:docMk/>
+            <pc:sldMk cId="2927218767" sldId="258"/>
+            <ac:spMk id="59" creationId="{6CD57F62-034A-6DD1-B797-A65BBA7A1DEE}"/>
+          </ac:spMkLst>
+        </pc:spChg>
+        <pc:spChg chg="mod">
+          <ac:chgData name="Jonathan Rau" userId="01bd1429-ada3-4be3-b2f3-ae839e9d5ccc" providerId="ADAL" clId="{3F5F48D2-2934-4288-A555-E6823DD1D0AE}" dt="2023-05-01T22:05:15.503" v="1286" actId="571"/>
+          <ac:spMkLst>
+            <pc:docMk/>
+            <pc:sldMk cId="2927218767" sldId="258"/>
+            <ac:spMk id="62" creationId="{BB2850FC-D34E-5792-D9CD-FCCF401BA238}"/>
+          </ac:spMkLst>
+        </pc:spChg>
+        <pc:grpChg chg="add mod">
+          <ac:chgData name="Jonathan Rau" userId="01bd1429-ada3-4be3-b2f3-ae839e9d5ccc" providerId="ADAL" clId="{3F5F48D2-2934-4288-A555-E6823DD1D0AE}" dt="2023-05-01T22:08:00.467" v="1305" actId="552"/>
+          <ac:grpSpMkLst>
+            <pc:docMk/>
+            <pc:sldMk cId="2927218767" sldId="258"/>
+            <ac:grpSpMk id="10" creationId="{7BB619AD-693A-3B9C-6D20-247888B0204F}"/>
+          </ac:grpSpMkLst>
+        </pc:grpChg>
+        <pc:grpChg chg="add del mod">
+          <ac:chgData name="Jonathan Rau" userId="01bd1429-ada3-4be3-b2f3-ae839e9d5ccc" providerId="ADAL" clId="{3F5F48D2-2934-4288-A555-E6823DD1D0AE}" dt="2023-05-01T21:47:00.031" v="843" actId="165"/>
+          <ac:grpSpMkLst>
+            <pc:docMk/>
+            <pc:sldMk cId="2927218767" sldId="258"/>
+            <ac:grpSpMk id="11" creationId="{A3C8BF8A-A597-E40D-28E3-BB4DF4567CE3}"/>
+          </ac:grpSpMkLst>
+        </pc:grpChg>
+        <pc:grpChg chg="add del mod">
+          <ac:chgData name="Jonathan Rau" userId="01bd1429-ada3-4be3-b2f3-ae839e9d5ccc" providerId="ADAL" clId="{3F5F48D2-2934-4288-A555-E6823DD1D0AE}" dt="2023-05-01T21:52:07.405" v="1014" actId="165"/>
+          <ac:grpSpMkLst>
+            <pc:docMk/>
+            <pc:sldMk cId="2927218767" sldId="258"/>
+            <ac:grpSpMk id="12" creationId="{88EED4C6-963B-3C13-BCB7-9CE42780D7E6}"/>
+          </ac:grpSpMkLst>
+        </pc:grpChg>
+        <pc:grpChg chg="add del mod">
+          <ac:chgData name="Jonathan Rau" userId="01bd1429-ada3-4be3-b2f3-ae839e9d5ccc" providerId="ADAL" clId="{3F5F48D2-2934-4288-A555-E6823DD1D0AE}" dt="2023-05-01T21:52:07.405" v="1014" actId="165"/>
+          <ac:grpSpMkLst>
+            <pc:docMk/>
+            <pc:sldMk cId="2927218767" sldId="258"/>
+            <ac:grpSpMk id="13" creationId="{F6FA9303-CEFF-A9D8-4998-EC58587FE3AD}"/>
+          </ac:grpSpMkLst>
+        </pc:grpChg>
+        <pc:grpChg chg="add del mod">
+          <ac:chgData name="Jonathan Rau" userId="01bd1429-ada3-4be3-b2f3-ae839e9d5ccc" providerId="ADAL" clId="{3F5F48D2-2934-4288-A555-E6823DD1D0AE}" dt="2023-05-01T21:52:07.405" v="1014" actId="165"/>
+          <ac:grpSpMkLst>
+            <pc:docMk/>
+            <pc:sldMk cId="2927218767" sldId="258"/>
+            <ac:grpSpMk id="14" creationId="{4881A3DD-EE65-27DB-671F-8B799B3F4A08}"/>
+          </ac:grpSpMkLst>
+        </pc:grpChg>
+        <pc:grpChg chg="add mod">
+          <ac:chgData name="Jonathan Rau" userId="01bd1429-ada3-4be3-b2f3-ae839e9d5ccc" providerId="ADAL" clId="{3F5F48D2-2934-4288-A555-E6823DD1D0AE}" dt="2023-05-01T22:08:24.716" v="1310" actId="12788"/>
+          <ac:grpSpMkLst>
+            <pc:docMk/>
+            <pc:sldMk cId="2927218767" sldId="258"/>
+            <ac:grpSpMk id="21" creationId="{3710CA1F-8C31-5042-8A25-C3AD5A9F72C9}"/>
+          </ac:grpSpMkLst>
+        </pc:grpChg>
+        <pc:grpChg chg="add del mod">
+          <ac:chgData name="Jonathan Rau" userId="01bd1429-ada3-4be3-b2f3-ae839e9d5ccc" providerId="ADAL" clId="{3F5F48D2-2934-4288-A555-E6823DD1D0AE}" dt="2023-05-01T21:49:36.827" v="869" actId="165"/>
+          <ac:grpSpMkLst>
+            <pc:docMk/>
+            <pc:sldMk cId="2927218767" sldId="258"/>
+            <ac:grpSpMk id="22" creationId="{A4B1F169-4EBA-F8E1-64A9-45F89C6E71F1}"/>
+          </ac:grpSpMkLst>
+        </pc:grpChg>
+        <pc:grpChg chg="add mod">
+          <ac:chgData name="Jonathan Rau" userId="01bd1429-ada3-4be3-b2f3-ae839e9d5ccc" providerId="ADAL" clId="{3F5F48D2-2934-4288-A555-E6823DD1D0AE}" dt="2023-05-01T22:08:24.716" v="1310" actId="12788"/>
+          <ac:grpSpMkLst>
+            <pc:docMk/>
+            <pc:sldMk cId="2927218767" sldId="258"/>
+            <ac:grpSpMk id="24" creationId="{5AFCC57C-5A45-6C97-6F50-C7F1EA3CE99B}"/>
+          </ac:grpSpMkLst>
+        </pc:grpChg>
+        <pc:grpChg chg="add mod">
+          <ac:chgData name="Jonathan Rau" userId="01bd1429-ada3-4be3-b2f3-ae839e9d5ccc" providerId="ADAL" clId="{3F5F48D2-2934-4288-A555-E6823DD1D0AE}" dt="2023-05-01T22:09:47.537" v="1401" actId="1035"/>
+          <ac:grpSpMkLst>
+            <pc:docMk/>
+            <pc:sldMk cId="2927218767" sldId="258"/>
+            <ac:grpSpMk id="26" creationId="{6BAEA63F-A29D-8D2F-2B83-0919927ED399}"/>
+          </ac:grpSpMkLst>
+        </pc:grpChg>
+        <pc:grpChg chg="add mod">
+          <ac:chgData name="Jonathan Rau" userId="01bd1429-ada3-4be3-b2f3-ae839e9d5ccc" providerId="ADAL" clId="{3F5F48D2-2934-4288-A555-E6823DD1D0AE}" dt="2023-05-01T22:09:47.537" v="1401" actId="1035"/>
+          <ac:grpSpMkLst>
+            <pc:docMk/>
+            <pc:sldMk cId="2927218767" sldId="258"/>
+            <ac:grpSpMk id="29" creationId="{6C2D2B36-7017-0273-DE0A-222DC8FB537F}"/>
+          </ac:grpSpMkLst>
+        </pc:grpChg>
+        <pc:grpChg chg="add mod">
+          <ac:chgData name="Jonathan Rau" userId="01bd1429-ada3-4be3-b2f3-ae839e9d5ccc" providerId="ADAL" clId="{3F5F48D2-2934-4288-A555-E6823DD1D0AE}" dt="2023-05-01T22:09:47.537" v="1401" actId="1035"/>
+          <ac:grpSpMkLst>
+            <pc:docMk/>
+            <pc:sldMk cId="2927218767" sldId="258"/>
+            <ac:grpSpMk id="30" creationId="{E30E038F-7FA5-A920-3A09-7E35AF378EA6}"/>
+          </ac:grpSpMkLst>
+        </pc:grpChg>
+        <pc:grpChg chg="add mod">
+          <ac:chgData name="Jonathan Rau" userId="01bd1429-ada3-4be3-b2f3-ae839e9d5ccc" providerId="ADAL" clId="{3F5F48D2-2934-4288-A555-E6823DD1D0AE}" dt="2023-05-01T22:09:47.537" v="1401" actId="1035"/>
+          <ac:grpSpMkLst>
+            <pc:docMk/>
+            <pc:sldMk cId="2927218767" sldId="258"/>
+            <ac:grpSpMk id="32" creationId="{61FE9FAF-8CEE-A9FC-9802-5B6239F41C7B}"/>
+          </ac:grpSpMkLst>
+        </pc:grpChg>
+        <pc:grpChg chg="add mod">
+          <ac:chgData name="Jonathan Rau" userId="01bd1429-ada3-4be3-b2f3-ae839e9d5ccc" providerId="ADAL" clId="{3F5F48D2-2934-4288-A555-E6823DD1D0AE}" dt="2023-05-01T22:09:47.537" v="1401" actId="1035"/>
+          <ac:grpSpMkLst>
+            <pc:docMk/>
+            <pc:sldMk cId="2927218767" sldId="258"/>
+            <ac:grpSpMk id="33" creationId="{2F9B88CF-29AE-2D89-CD2B-F21FFEE9D7B8}"/>
+          </ac:grpSpMkLst>
+        </pc:grpChg>
+        <pc:grpChg chg="add mod">
+          <ac:chgData name="Jonathan Rau" userId="01bd1429-ada3-4be3-b2f3-ae839e9d5ccc" providerId="ADAL" clId="{3F5F48D2-2934-4288-A555-E6823DD1D0AE}" dt="2023-05-01T22:09:47.537" v="1401" actId="1035"/>
+          <ac:grpSpMkLst>
+            <pc:docMk/>
+            <pc:sldMk cId="2927218767" sldId="258"/>
+            <ac:grpSpMk id="34" creationId="{B0B80858-9883-3F5E-0753-1842B54739B1}"/>
+          </ac:grpSpMkLst>
+        </pc:grpChg>
+        <pc:grpChg chg="add del mod topLvl">
+          <ac:chgData name="Jonathan Rau" userId="01bd1429-ada3-4be3-b2f3-ae839e9d5ccc" providerId="ADAL" clId="{3F5F48D2-2934-4288-A555-E6823DD1D0AE}" dt="2023-05-01T21:44:58.129" v="779" actId="165"/>
+          <ac:grpSpMkLst>
+            <pc:docMk/>
+            <pc:sldMk cId="2927218767" sldId="258"/>
+            <ac:grpSpMk id="48" creationId="{C271047F-ADF7-6A2F-210B-142ADF8FE177}"/>
+          </ac:grpSpMkLst>
+        </pc:grpChg>
+        <pc:grpChg chg="add del mod">
+          <ac:chgData name="Jonathan Rau" userId="01bd1429-ada3-4be3-b2f3-ae839e9d5ccc" providerId="ADAL" clId="{3F5F48D2-2934-4288-A555-E6823DD1D0AE}" dt="2023-05-01T21:44:52.913" v="778" actId="165"/>
+          <ac:grpSpMkLst>
+            <pc:docMk/>
+            <pc:sldMk cId="2927218767" sldId="258"/>
+            <ac:grpSpMk id="49" creationId="{544F67E2-9F7F-A7FC-E95C-2D6E4BBFD252}"/>
+          </ac:grpSpMkLst>
+        </pc:grpChg>
+        <pc:grpChg chg="add mod">
+          <ac:chgData name="Jonathan Rau" userId="01bd1429-ada3-4be3-b2f3-ae839e9d5ccc" providerId="ADAL" clId="{3F5F48D2-2934-4288-A555-E6823DD1D0AE}" dt="2023-05-01T22:05:15.503" v="1286" actId="571"/>
+          <ac:grpSpMkLst>
+            <pc:docMk/>
+            <pc:sldMk cId="2927218767" sldId="258"/>
+            <ac:grpSpMk id="58" creationId="{264AA946-2DEC-FFFE-2570-ED57F57E4670}"/>
+          </ac:grpSpMkLst>
+        </pc:grpChg>
+        <pc:grpChg chg="add mod">
+          <ac:chgData name="Jonathan Rau" userId="01bd1429-ada3-4be3-b2f3-ae839e9d5ccc" providerId="ADAL" clId="{3F5F48D2-2934-4288-A555-E6823DD1D0AE}" dt="2023-05-01T22:05:15.503" v="1286" actId="571"/>
+          <ac:grpSpMkLst>
+            <pc:docMk/>
+            <pc:sldMk cId="2927218767" sldId="258"/>
+            <ac:grpSpMk id="61" creationId="{5DE8B0B6-FE61-F05A-64FD-88B68BF4735C}"/>
+          </ac:grpSpMkLst>
+        </pc:grpChg>
+        <pc:picChg chg="add del mod topLvl">
+          <ac:chgData name="Jonathan Rau" userId="01bd1429-ada3-4be3-b2f3-ae839e9d5ccc" providerId="ADAL" clId="{3F5F48D2-2934-4288-A555-E6823DD1D0AE}" dt="2023-05-01T21:49:39.203" v="870" actId="478"/>
+          <ac:picMkLst>
+            <pc:docMk/>
+            <pc:sldMk cId="2927218767" sldId="258"/>
+            <ac:picMk id="3" creationId="{1332A199-18EB-4E2B-DE68-1C157EDEB4F8}"/>
+          </ac:picMkLst>
+        </pc:picChg>
+        <pc:picChg chg="add mod">
+          <ac:chgData name="Jonathan Rau" userId="01bd1429-ada3-4be3-b2f3-ae839e9d5ccc" providerId="ADAL" clId="{3F5F48D2-2934-4288-A555-E6823DD1D0AE}" dt="2023-05-01T22:08:47.780" v="1362" actId="12789"/>
+          <ac:picMkLst>
+            <pc:docMk/>
+            <pc:sldMk cId="2927218767" sldId="258"/>
+            <ac:picMk id="4" creationId="{BC63CE32-56C9-DD4D-C00B-655BC485EE5F}"/>
+          </ac:picMkLst>
+        </pc:picChg>
+        <pc:picChg chg="add mod">
+          <ac:chgData name="Jonathan Rau" userId="01bd1429-ada3-4be3-b2f3-ae839e9d5ccc" providerId="ADAL" clId="{3F5F48D2-2934-4288-A555-E6823DD1D0AE}" dt="2023-05-01T22:08:00.467" v="1305" actId="552"/>
+          <ac:picMkLst>
+            <pc:docMk/>
+            <pc:sldMk cId="2927218767" sldId="258"/>
+            <ac:picMk id="6" creationId="{D3A71050-9A8D-D474-72E2-01BDD0982569}"/>
+          </ac:picMkLst>
+        </pc:picChg>
+        <pc:picChg chg="add mod">
+          <ac:chgData name="Jonathan Rau" userId="01bd1429-ada3-4be3-b2f3-ae839e9d5ccc" providerId="ADAL" clId="{3F5F48D2-2934-4288-A555-E6823DD1D0AE}" dt="2023-05-01T22:05:19.418" v="1287" actId="12789"/>
+          <ac:picMkLst>
+            <pc:docMk/>
+            <pc:sldMk cId="2927218767" sldId="258"/>
+            <ac:picMk id="8" creationId="{521D7AAB-D2BB-6EAD-3EDF-F0812CA538DE}"/>
+          </ac:picMkLst>
+        </pc:picChg>
+        <pc:picChg chg="add del mod">
+          <ac:chgData name="Jonathan Rau" userId="01bd1429-ada3-4be3-b2f3-ae839e9d5ccc" providerId="ADAL" clId="{3F5F48D2-2934-4288-A555-E6823DD1D0AE}" dt="2023-04-14T19:54:33.035" v="544" actId="478"/>
+          <ac:picMkLst>
+            <pc:docMk/>
+            <pc:sldMk cId="2927218767" sldId="258"/>
+            <ac:picMk id="11" creationId="{14061ED1-0E5B-92E4-105D-5FFC2B609128}"/>
+          </ac:picMkLst>
+        </pc:picChg>
+        <pc:picChg chg="add del mod">
+          <ac:chgData name="Jonathan Rau" userId="01bd1429-ada3-4be3-b2f3-ae839e9d5ccc" providerId="ADAL" clId="{3F5F48D2-2934-4288-A555-E6823DD1D0AE}" dt="2023-04-14T19:54:33.035" v="544" actId="478"/>
+          <ac:picMkLst>
+            <pc:docMk/>
+            <pc:sldMk cId="2927218767" sldId="258"/>
+            <ac:picMk id="12" creationId="{0F76B5BD-4C86-5FEA-5881-7FA430135142}"/>
+          </ac:picMkLst>
+        </pc:picChg>
+        <pc:picChg chg="add del mod">
+          <ac:chgData name="Jonathan Rau" userId="01bd1429-ada3-4be3-b2f3-ae839e9d5ccc" providerId="ADAL" clId="{3F5F48D2-2934-4288-A555-E6823DD1D0AE}" dt="2023-04-14T19:51:50.703" v="240"/>
+          <ac:picMkLst>
+            <pc:docMk/>
+            <pc:sldMk cId="2927218767" sldId="258"/>
+            <ac:picMk id="13" creationId="{3393AE31-942D-4F2A-5548-4F28B8A19382}"/>
+          </ac:picMkLst>
+        </pc:picChg>
+        <pc:picChg chg="add del mod">
+          <ac:chgData name="Jonathan Rau" userId="01bd1429-ada3-4be3-b2f3-ae839e9d5ccc" providerId="ADAL" clId="{3F5F48D2-2934-4288-A555-E6823DD1D0AE}" dt="2023-04-14T19:51:50.703" v="240"/>
+          <ac:picMkLst>
+            <pc:docMk/>
+            <pc:sldMk cId="2927218767" sldId="258"/>
+            <ac:picMk id="14" creationId="{06A240DE-4433-962C-913A-4890225522AF}"/>
+          </ac:picMkLst>
+        </pc:picChg>
+        <pc:picChg chg="add del mod">
+          <ac:chgData name="Jonathan Rau" userId="01bd1429-ada3-4be3-b2f3-ae839e9d5ccc" providerId="ADAL" clId="{3F5F48D2-2934-4288-A555-E6823DD1D0AE}" dt="2023-04-14T19:56:45.303" v="576"/>
+          <ac:picMkLst>
+            <pc:docMk/>
+            <pc:sldMk cId="2927218767" sldId="258"/>
+            <ac:picMk id="22" creationId="{C1FF35FC-AD1A-F89F-25C1-CD3E8DD9CC4F}"/>
+          </ac:picMkLst>
+        </pc:picChg>
+        <pc:picChg chg="add mod topLvl">
+          <ac:chgData name="Jonathan Rau" userId="01bd1429-ada3-4be3-b2f3-ae839e9d5ccc" providerId="ADAL" clId="{3F5F48D2-2934-4288-A555-E6823DD1D0AE}" dt="2023-05-01T22:09:47.537" v="1401" actId="1035"/>
+          <ac:picMkLst>
+            <pc:docMk/>
+            <pc:sldMk cId="2927218767" sldId="258"/>
+            <ac:picMk id="35" creationId="{D2DAF613-D8BD-3380-58A8-5BAB202AF083}"/>
+          </ac:picMkLst>
+        </pc:picChg>
+        <pc:picChg chg="add del mod topLvl">
+          <ac:chgData name="Jonathan Rau" userId="01bd1429-ada3-4be3-b2f3-ae839e9d5ccc" providerId="ADAL" clId="{3F5F48D2-2934-4288-A555-E6823DD1D0AE}" dt="2023-05-01T21:45:03.283" v="780" actId="478"/>
+          <ac:picMkLst>
+            <pc:docMk/>
+            <pc:sldMk cId="2927218767" sldId="258"/>
+            <ac:picMk id="38" creationId="{8B967596-2604-AD15-668D-7E808ADAB5D3}"/>
+          </ac:picMkLst>
+        </pc:picChg>
+        <pc:picChg chg="add mod topLvl">
+          <ac:chgData name="Jonathan Rau" userId="01bd1429-ada3-4be3-b2f3-ae839e9d5ccc" providerId="ADAL" clId="{3F5F48D2-2934-4288-A555-E6823DD1D0AE}" dt="2023-05-01T22:09:47.537" v="1401" actId="1035"/>
+          <ac:picMkLst>
+            <pc:docMk/>
+            <pc:sldMk cId="2927218767" sldId="258"/>
+            <ac:picMk id="39" creationId="{0B15E7EF-81AB-9F76-740A-808EC8C56C65}"/>
+          </ac:picMkLst>
+        </pc:picChg>
+        <pc:picChg chg="add del mod topLvl">
+          <ac:chgData name="Jonathan Rau" userId="01bd1429-ada3-4be3-b2f3-ae839e9d5ccc" providerId="ADAL" clId="{3F5F48D2-2934-4288-A555-E6823DD1D0AE}" dt="2023-05-01T21:45:03.283" v="780" actId="478"/>
+          <ac:picMkLst>
+            <pc:docMk/>
+            <pc:sldMk cId="2927218767" sldId="258"/>
+            <ac:picMk id="41" creationId="{20A3568B-2519-DB9D-EC3F-37EE079E3586}"/>
+          </ac:picMkLst>
+        </pc:picChg>
+        <pc:picChg chg="add mod topLvl">
+          <ac:chgData name="Jonathan Rau" userId="01bd1429-ada3-4be3-b2f3-ae839e9d5ccc" providerId="ADAL" clId="{3F5F48D2-2934-4288-A555-E6823DD1D0AE}" dt="2023-05-01T22:09:47.537" v="1401" actId="1035"/>
+          <ac:picMkLst>
+            <pc:docMk/>
+            <pc:sldMk cId="2927218767" sldId="258"/>
+            <ac:picMk id="43" creationId="{46C1D956-00C8-E3E3-A65B-3466292AEC94}"/>
+          </ac:picMkLst>
+        </pc:picChg>
+        <pc:picChg chg="add mod topLvl">
+          <ac:chgData name="Jonathan Rau" userId="01bd1429-ada3-4be3-b2f3-ae839e9d5ccc" providerId="ADAL" clId="{3F5F48D2-2934-4288-A555-E6823DD1D0AE}" dt="2023-05-01T22:09:47.537" v="1401" actId="1035"/>
+          <ac:picMkLst>
+            <pc:docMk/>
+            <pc:sldMk cId="2927218767" sldId="258"/>
+            <ac:picMk id="46" creationId="{6617A1D9-409F-15DE-CC52-DE413211DE73}"/>
+          </ac:picMkLst>
+        </pc:picChg>
+        <pc:picChg chg="add mod">
+          <ac:chgData name="Jonathan Rau" userId="01bd1429-ada3-4be3-b2f3-ae839e9d5ccc" providerId="ADAL" clId="{3F5F48D2-2934-4288-A555-E6823DD1D0AE}" dt="2023-05-01T22:05:19.418" v="1287" actId="12789"/>
+          <ac:picMkLst>
+            <pc:docMk/>
+            <pc:sldMk cId="2927218767" sldId="258"/>
+            <ac:picMk id="50" creationId="{73D0EF48-EE4F-CAD8-9887-48C5E7772023}"/>
+          </ac:picMkLst>
+        </pc:picChg>
+        <pc:picChg chg="add mod">
+          <ac:chgData name="Jonathan Rau" userId="01bd1429-ada3-4be3-b2f3-ae839e9d5ccc" providerId="ADAL" clId="{3F5F48D2-2934-4288-A555-E6823DD1D0AE}" dt="2023-05-01T22:08:10.226" v="1307" actId="553"/>
+          <ac:picMkLst>
+            <pc:docMk/>
+            <pc:sldMk cId="2927218767" sldId="258"/>
+            <ac:picMk id="53" creationId="{8903D04C-6DA0-E7D0-7EDF-6AE6E6C6EF0E}"/>
+          </ac:picMkLst>
+        </pc:picChg>
+        <pc:picChg chg="add mod">
+          <ac:chgData name="Jonathan Rau" userId="01bd1429-ada3-4be3-b2f3-ae839e9d5ccc" providerId="ADAL" clId="{3F5F48D2-2934-4288-A555-E6823DD1D0AE}" dt="2023-05-01T22:07:54.272" v="1304" actId="552"/>
+          <ac:picMkLst>
+            <pc:docMk/>
+            <pc:sldMk cId="2927218767" sldId="258"/>
+            <ac:picMk id="55" creationId="{5FB33C35-4ABC-C3EF-7377-9B5091661884}"/>
+          </ac:picMkLst>
+        </pc:picChg>
+        <pc:picChg chg="mod">
+          <ac:chgData name="Jonathan Rau" userId="01bd1429-ada3-4be3-b2f3-ae839e9d5ccc" providerId="ADAL" clId="{3F5F48D2-2934-4288-A555-E6823DD1D0AE}" dt="2023-05-01T22:05:15.503" v="1286" actId="571"/>
+          <ac:picMkLst>
+            <pc:docMk/>
+            <pc:sldMk cId="2927218767" sldId="258"/>
+            <ac:picMk id="60" creationId="{1789B676-E28C-E0F8-B66E-7044FE06C5FA}"/>
+          </ac:picMkLst>
+        </pc:picChg>
+        <pc:picChg chg="mod">
+          <ac:chgData name="Jonathan Rau" userId="01bd1429-ada3-4be3-b2f3-ae839e9d5ccc" providerId="ADAL" clId="{3F5F48D2-2934-4288-A555-E6823DD1D0AE}" dt="2023-05-01T22:05:15.503" v="1286" actId="571"/>
+          <ac:picMkLst>
+            <pc:docMk/>
+            <pc:sldMk cId="2927218767" sldId="258"/>
+            <ac:picMk id="63" creationId="{68785ECA-834A-CF97-FD2E-AF6ADAAA29DF}"/>
+          </ac:picMkLst>
+        </pc:picChg>
+        <pc:picChg chg="add mod">
+          <ac:chgData name="Jonathan Rau" userId="01bd1429-ada3-4be3-b2f3-ae839e9d5ccc" providerId="ADAL" clId="{3F5F48D2-2934-4288-A555-E6823DD1D0AE}" dt="2023-05-01T22:05:15.503" v="1286" actId="571"/>
+          <ac:picMkLst>
+            <pc:docMk/>
+            <pc:sldMk cId="2927218767" sldId="258"/>
+            <ac:picMk id="1024" creationId="{B5B2DF3F-3F6F-44E9-5017-4CA7B9DFF52C}"/>
+          </ac:picMkLst>
+        </pc:picChg>
+        <pc:picChg chg="add mod">
+          <ac:chgData name="Jonathan Rau" userId="01bd1429-ada3-4be3-b2f3-ae839e9d5ccc" providerId="ADAL" clId="{3F5F48D2-2934-4288-A555-E6823DD1D0AE}" dt="2023-05-01T22:05:15.503" v="1286" actId="571"/>
+          <ac:picMkLst>
+            <pc:docMk/>
+            <pc:sldMk cId="2927218767" sldId="258"/>
+            <ac:picMk id="1025" creationId="{2DEBD243-003B-B356-DBEB-FE8C84AA7735}"/>
+          </ac:picMkLst>
+        </pc:picChg>
+        <pc:picChg chg="add del">
+          <ac:chgData name="Jonathan Rau" userId="01bd1429-ada3-4be3-b2f3-ae839e9d5ccc" providerId="ADAL" clId="{3F5F48D2-2934-4288-A555-E6823DD1D0AE}" dt="2023-04-14T19:46:31.763" v="158"/>
+          <ac:picMkLst>
+            <pc:docMk/>
+            <pc:sldMk cId="2927218767" sldId="258"/>
+            <ac:picMk id="1026" creationId="{78C0063B-4CEE-65C8-3C5F-48CC50CC8447}"/>
+          </ac:picMkLst>
+        </pc:picChg>
+        <pc:picChg chg="add mod">
+          <ac:chgData name="Jonathan Rau" userId="01bd1429-ada3-4be3-b2f3-ae839e9d5ccc" providerId="ADAL" clId="{3F5F48D2-2934-4288-A555-E6823DD1D0AE}" dt="2023-05-01T22:09:47.537" v="1401" actId="1035"/>
+          <ac:picMkLst>
+            <pc:docMk/>
+            <pc:sldMk cId="2927218767" sldId="258"/>
+            <ac:picMk id="1026" creationId="{EEFAA6CA-7B0D-3179-A8B7-CE0BB5626AD2}"/>
+          </ac:picMkLst>
+        </pc:picChg>
+        <pc:picChg chg="add mod">
+          <ac:chgData name="Jonathan Rau" userId="01bd1429-ada3-4be3-b2f3-ae839e9d5ccc" providerId="ADAL" clId="{3F5F48D2-2934-4288-A555-E6823DD1D0AE}" dt="2023-05-01T22:07:40.815" v="1302" actId="12789"/>
+          <ac:picMkLst>
+            <pc:docMk/>
+            <pc:sldMk cId="2927218767" sldId="258"/>
+            <ac:picMk id="1028" creationId="{07E8CB6A-59CD-2711-37CA-9505B61B0841}"/>
+          </ac:picMkLst>
+        </pc:picChg>
+        <pc:picChg chg="add mod">
+          <ac:chgData name="Jonathan Rau" userId="01bd1429-ada3-4be3-b2f3-ae839e9d5ccc" providerId="ADAL" clId="{3F5F48D2-2934-4288-A555-E6823DD1D0AE}" dt="2023-05-01T22:07:54.272" v="1304" actId="552"/>
+          <ac:picMkLst>
+            <pc:docMk/>
+            <pc:sldMk cId="2927218767" sldId="258"/>
+            <ac:picMk id="1030" creationId="{ED0DC73D-5646-3483-56E7-858CFC2DE900}"/>
+          </ac:picMkLst>
+        </pc:picChg>
+        <pc:picChg chg="add del">
+          <ac:chgData name="Jonathan Rau" userId="01bd1429-ada3-4be3-b2f3-ae839e9d5ccc" providerId="ADAL" clId="{3F5F48D2-2934-4288-A555-E6823DD1D0AE}" dt="2023-05-01T22:01:28.715" v="1093"/>
+          <ac:picMkLst>
+            <pc:docMk/>
+            <pc:sldMk cId="2927218767" sldId="258"/>
+            <ac:picMk id="1032" creationId="{5E66348A-4D93-475D-DC66-4361BC1A746B}"/>
+          </ac:picMkLst>
+        </pc:picChg>
+        <pc:picChg chg="add del mod">
+          <ac:chgData name="Jonathan Rau" userId="01bd1429-ada3-4be3-b2f3-ae839e9d5ccc" providerId="ADAL" clId="{3F5F48D2-2934-4288-A555-E6823DD1D0AE}" dt="2023-04-14T20:02:17.037" v="745" actId="478"/>
+          <ac:picMkLst>
+            <pc:docMk/>
+            <pc:sldMk cId="2927218767" sldId="258"/>
+            <ac:picMk id="1032" creationId="{8B587A27-74EF-5D43-9AE9-BC5408B5F97C}"/>
+          </ac:picMkLst>
+        </pc:picChg>
+        <pc:picChg chg="add mod">
+          <ac:chgData name="Jonathan Rau" userId="01bd1429-ada3-4be3-b2f3-ae839e9d5ccc" providerId="ADAL" clId="{3F5F48D2-2934-4288-A555-E6823DD1D0AE}" dt="2023-05-01T22:08:14.951" v="1308" actId="12789"/>
+          <ac:picMkLst>
+            <pc:docMk/>
+            <pc:sldMk cId="2927218767" sldId="258"/>
+            <ac:picMk id="1034" creationId="{DCB85329-15A2-70C1-24B7-F19FB2212E48}"/>
+          </ac:picMkLst>
+        </pc:picChg>
+        <pc:picChg chg="add mod">
+          <ac:chgData name="Jonathan Rau" userId="01bd1429-ada3-4be3-b2f3-ae839e9d5ccc" providerId="ADAL" clId="{3F5F48D2-2934-4288-A555-E6823DD1D0AE}" dt="2023-05-01T22:08:14.951" v="1308" actId="12789"/>
+          <ac:picMkLst>
+            <pc:docMk/>
+            <pc:sldMk cId="2927218767" sldId="258"/>
+            <ac:picMk id="1036" creationId="{496A2C14-BC60-9D5D-ABEA-6629D23751CC}"/>
+          </ac:picMkLst>
+        </pc:picChg>
+        <pc:picChg chg="add del mod">
+          <ac:chgData name="Jonathan Rau" userId="01bd1429-ada3-4be3-b2f3-ae839e9d5ccc" providerId="ADAL" clId="{3F5F48D2-2934-4288-A555-E6823DD1D0AE}" dt="2023-04-14T19:54:48.276" v="548"/>
+          <ac:picMkLst>
+            <pc:docMk/>
+            <pc:sldMk cId="2927218767" sldId="258"/>
+            <ac:picMk id="1038" creationId="{BD39DF8B-C3DD-2CD1-7144-AB39FD8AF480}"/>
+          </ac:picMkLst>
+        </pc:picChg>
+        <pc:picChg chg="add mod">
+          <ac:chgData name="Jonathan Rau" userId="01bd1429-ada3-4be3-b2f3-ae839e9d5ccc" providerId="ADAL" clId="{3F5F48D2-2934-4288-A555-E6823DD1D0AE}" dt="2023-05-01T22:08:24.716" v="1310" actId="12788"/>
+          <ac:picMkLst>
+            <pc:docMk/>
+            <pc:sldMk cId="2927218767" sldId="258"/>
+            <ac:picMk id="1040" creationId="{DC856B39-E488-167A-CF4E-0B57775F3A28}"/>
+          </ac:picMkLst>
+        </pc:picChg>
+        <pc:picChg chg="add mod">
+          <ac:chgData name="Jonathan Rau" userId="01bd1429-ada3-4be3-b2f3-ae839e9d5ccc" providerId="ADAL" clId="{3F5F48D2-2934-4288-A555-E6823DD1D0AE}" dt="2023-05-01T22:08:24.716" v="1310" actId="12788"/>
+          <ac:picMkLst>
+            <pc:docMk/>
+            <pc:sldMk cId="2927218767" sldId="258"/>
+            <ac:picMk id="1042" creationId="{38EDB2A1-0556-030E-BFBC-A4AC66DC2B57}"/>
+          </ac:picMkLst>
+        </pc:picChg>
+        <pc:picChg chg="add mod">
+          <ac:chgData name="Jonathan Rau" userId="01bd1429-ada3-4be3-b2f3-ae839e9d5ccc" providerId="ADAL" clId="{3F5F48D2-2934-4288-A555-E6823DD1D0AE}" dt="2023-05-01T22:08:24.716" v="1310" actId="12788"/>
+          <ac:picMkLst>
+            <pc:docMk/>
+            <pc:sldMk cId="2927218767" sldId="258"/>
+            <ac:picMk id="1044" creationId="{568F28A0-1D11-A2E1-AD71-20DEEE9FAF32}"/>
+          </ac:picMkLst>
+        </pc:picChg>
+        <pc:cxnChg chg="add mod">
+          <ac:chgData name="Jonathan Rau" userId="01bd1429-ada3-4be3-b2f3-ae839e9d5ccc" providerId="ADAL" clId="{3F5F48D2-2934-4288-A555-E6823DD1D0AE}" dt="2023-05-01T22:08:47.780" v="1362" actId="12789"/>
+          <ac:cxnSpMkLst>
+            <pc:docMk/>
+            <pc:sldMk cId="2927218767" sldId="258"/>
+            <ac:cxnSpMk id="27" creationId="{61E8C62B-50C0-3EC7-F385-8397A4D38430}"/>
+          </ac:cxnSpMkLst>
+        </pc:cxnChg>
+        <pc:cxnChg chg="add mod">
+          <ac:chgData name="Jonathan Rau" userId="01bd1429-ada3-4be3-b2f3-ae839e9d5ccc" providerId="ADAL" clId="{3F5F48D2-2934-4288-A555-E6823DD1D0AE}" dt="2023-05-01T22:08:47.780" v="1362" actId="12789"/>
+          <ac:cxnSpMkLst>
+            <pc:docMk/>
+            <pc:sldMk cId="2927218767" sldId="258"/>
+            <ac:cxnSpMk id="28" creationId="{8EBD9BCC-9CC5-5009-83BE-6623A4D8D15B}"/>
+          </ac:cxnSpMkLst>
+        </pc:cxnChg>
+        <pc:cxnChg chg="add mod">
+          <ac:chgData name="Jonathan Rau" userId="01bd1429-ada3-4be3-b2f3-ae839e9d5ccc" providerId="ADAL" clId="{3F5F48D2-2934-4288-A555-E6823DD1D0AE}" dt="2023-05-01T22:08:47.780" v="1362" actId="12789"/>
+          <ac:cxnSpMkLst>
+            <pc:docMk/>
+            <pc:sldMk cId="2927218767" sldId="258"/>
+            <ac:cxnSpMk id="31" creationId="{7301F961-8B38-8B35-35DF-F4E2017D427A}"/>
+          </ac:cxnSpMkLst>
+        </pc:cxnChg>
+        <pc:cxnChg chg="add mod">
+          <ac:chgData name="Jonathan Rau" userId="01bd1429-ada3-4be3-b2f3-ae839e9d5ccc" providerId="ADAL" clId="{3F5F48D2-2934-4288-A555-E6823DD1D0AE}" dt="2023-05-01T22:11:35.855" v="1433" actId="1076"/>
+          <ac:cxnSpMkLst>
+            <pc:docMk/>
+            <pc:sldMk cId="2927218767" sldId="258"/>
+            <ac:cxnSpMk id="52" creationId="{951CB380-36EC-ADD9-7F54-C01D45161AAF}"/>
+          </ac:cxnSpMkLst>
+        </pc:cxnChg>
+      </pc:sldChg>
+    </pc:docChg>
+  </pc:docChgLst>
+  <pc:docChgLst>
     <pc:chgData name="Jonathan Rau" userId="01bd1429-ada3-4be3-b2f3-ae839e9d5ccc" providerId="ADAL" clId="{81BFAC01-EC3C-47A5-AFF3-09E0F97B7B12}"/>
     <pc:docChg chg="undo custSel modSld">
       <pc:chgData name="Jonathan Rau" userId="01bd1429-ada3-4be3-b2f3-ae839e9d5ccc" providerId="ADAL" clId="{81BFAC01-EC3C-47A5-AFF3-09E0F97B7B12}" dt="2023-05-22T19:18:30.023" v="600" actId="207"/>
@@ -1118,686 +1798,6 @@
             <pc:docMk/>
             <pc:sldMk cId="3655911485" sldId="257"/>
             <ac:cxnSpMk id="64" creationId="{A841E43A-A89B-46A8-AD0E-9E4AF72E0A27}"/>
-          </ac:cxnSpMkLst>
-        </pc:cxnChg>
-      </pc:sldChg>
-    </pc:docChg>
-  </pc:docChgLst>
-  <pc:docChgLst>
-    <pc:chgData name="Jonathan Rau" userId="01bd1429-ada3-4be3-b2f3-ae839e9d5ccc" providerId="ADAL" clId="{3F5F48D2-2934-4288-A555-E6823DD1D0AE}"/>
-    <pc:docChg chg="undo custSel addSld modSld">
-      <pc:chgData name="Jonathan Rau" userId="01bd1429-ada3-4be3-b2f3-ae839e9d5ccc" providerId="ADAL" clId="{3F5F48D2-2934-4288-A555-E6823DD1D0AE}" dt="2023-05-01T22:11:35.855" v="1433" actId="1076"/>
-      <pc:docMkLst>
-        <pc:docMk/>
-      </pc:docMkLst>
-      <pc:sldChg chg="addSp delSp modSp new mod setBg">
-        <pc:chgData name="Jonathan Rau" userId="01bd1429-ada3-4be3-b2f3-ae839e9d5ccc" providerId="ADAL" clId="{3F5F48D2-2934-4288-A555-E6823DD1D0AE}" dt="2023-05-01T22:11:35.855" v="1433" actId="1076"/>
-        <pc:sldMkLst>
-          <pc:docMk/>
-          <pc:sldMk cId="2927218767" sldId="258"/>
-        </pc:sldMkLst>
-        <pc:spChg chg="add mod ord">
-          <ac:chgData name="Jonathan Rau" userId="01bd1429-ada3-4be3-b2f3-ae839e9d5ccc" providerId="ADAL" clId="{3F5F48D2-2934-4288-A555-E6823DD1D0AE}" dt="2023-05-01T22:08:19.422" v="1309" actId="12789"/>
-          <ac:spMkLst>
-            <pc:docMk/>
-            <pc:sldMk cId="2927218767" sldId="258"/>
-            <ac:spMk id="2" creationId="{2CBB7894-144C-A36C-3DB9-4368ED6A1E03}"/>
-          </ac:spMkLst>
-        </pc:spChg>
-        <pc:spChg chg="add del mod">
-          <ac:chgData name="Jonathan Rau" userId="01bd1429-ada3-4be3-b2f3-ae839e9d5ccc" providerId="ADAL" clId="{3F5F48D2-2934-4288-A555-E6823DD1D0AE}" dt="2023-04-14T19:42:55.247" v="40" actId="478"/>
-          <ac:spMkLst>
-            <pc:docMk/>
-            <pc:sldMk cId="2927218767" sldId="258"/>
-            <ac:spMk id="2" creationId="{C7D43765-3766-2114-A532-32A62A5B4E22}"/>
-          </ac:spMkLst>
-        </pc:spChg>
-        <pc:spChg chg="add mod">
-          <ac:chgData name="Jonathan Rau" userId="01bd1429-ada3-4be3-b2f3-ae839e9d5ccc" providerId="ADAL" clId="{3F5F48D2-2934-4288-A555-E6823DD1D0AE}" dt="2023-05-01T22:08:56.752" v="1363" actId="1076"/>
-          <ac:spMkLst>
-            <pc:docMk/>
-            <pc:sldMk cId="2927218767" sldId="258"/>
-            <ac:spMk id="5" creationId="{50B9014E-CAC8-98AE-CB22-D756ECFEB685}"/>
-          </ac:spMkLst>
-        </pc:spChg>
-        <pc:spChg chg="add mod topLvl">
-          <ac:chgData name="Jonathan Rau" userId="01bd1429-ada3-4be3-b2f3-ae839e9d5ccc" providerId="ADAL" clId="{3F5F48D2-2934-4288-A555-E6823DD1D0AE}" dt="2023-05-01T22:09:47.537" v="1401" actId="1035"/>
-          <ac:spMkLst>
-            <pc:docMk/>
-            <pc:sldMk cId="2927218767" sldId="258"/>
-            <ac:spMk id="7" creationId="{9F78F5AA-A513-5719-7273-839BFED55752}"/>
-          </ac:spMkLst>
-        </pc:spChg>
-        <pc:spChg chg="add del">
-          <ac:chgData name="Jonathan Rau" userId="01bd1429-ada3-4be3-b2f3-ae839e9d5ccc" providerId="ADAL" clId="{3F5F48D2-2934-4288-A555-E6823DD1D0AE}" dt="2023-04-14T19:48:24.676" v="175"/>
-          <ac:spMkLst>
-            <pc:docMk/>
-            <pc:sldMk cId="2927218767" sldId="258"/>
-            <ac:spMk id="7" creationId="{D5CA81DD-2F47-8FB5-5437-A77060607AF6}"/>
-          </ac:spMkLst>
-        </pc:spChg>
-        <pc:spChg chg="add mod ord">
-          <ac:chgData name="Jonathan Rau" userId="01bd1429-ada3-4be3-b2f3-ae839e9d5ccc" providerId="ADAL" clId="{3F5F48D2-2934-4288-A555-E6823DD1D0AE}" dt="2023-05-01T22:05:19.418" v="1287" actId="12789"/>
-          <ac:spMkLst>
-            <pc:docMk/>
-            <pc:sldMk cId="2927218767" sldId="258"/>
-            <ac:spMk id="9" creationId="{743AA06B-1021-9D58-8136-63E9F09D80F6}"/>
-          </ac:spMkLst>
-        </pc:spChg>
-        <pc:spChg chg="add mod">
-          <ac:chgData name="Jonathan Rau" userId="01bd1429-ada3-4be3-b2f3-ae839e9d5ccc" providerId="ADAL" clId="{3F5F48D2-2934-4288-A555-E6823DD1D0AE}" dt="2023-05-01T22:08:24.716" v="1310" actId="12788"/>
-          <ac:spMkLst>
-            <pc:docMk/>
-            <pc:sldMk cId="2927218767" sldId="258"/>
-            <ac:spMk id="15" creationId="{DD5C6FDF-7C59-4946-2CD5-F72284FC5851}"/>
-          </ac:spMkLst>
-        </pc:spChg>
-        <pc:spChg chg="add mod">
-          <ac:chgData name="Jonathan Rau" userId="01bd1429-ada3-4be3-b2f3-ae839e9d5ccc" providerId="ADAL" clId="{3F5F48D2-2934-4288-A555-E6823DD1D0AE}" dt="2023-05-01T22:08:00.467" v="1305" actId="552"/>
-          <ac:spMkLst>
-            <pc:docMk/>
-            <pc:sldMk cId="2927218767" sldId="258"/>
-            <ac:spMk id="16" creationId="{DFDE86E7-AF7B-3343-B83E-DFC8327B6214}"/>
-          </ac:spMkLst>
-        </pc:spChg>
-        <pc:spChg chg="add mod">
-          <ac:chgData name="Jonathan Rau" userId="01bd1429-ada3-4be3-b2f3-ae839e9d5ccc" providerId="ADAL" clId="{3F5F48D2-2934-4288-A555-E6823DD1D0AE}" dt="2023-05-01T22:08:10.226" v="1307" actId="553"/>
-          <ac:spMkLst>
-            <pc:docMk/>
-            <pc:sldMk cId="2927218767" sldId="258"/>
-            <ac:spMk id="17" creationId="{B6CB8600-7725-1B60-693D-12AD37216EA1}"/>
-          </ac:spMkLst>
-        </pc:spChg>
-        <pc:spChg chg="add mod ord">
-          <ac:chgData name="Jonathan Rau" userId="01bd1429-ada3-4be3-b2f3-ae839e9d5ccc" providerId="ADAL" clId="{3F5F48D2-2934-4288-A555-E6823DD1D0AE}" dt="2023-05-01T22:06:34.060" v="1294" actId="12789"/>
-          <ac:spMkLst>
-            <pc:docMk/>
-            <pc:sldMk cId="2927218767" sldId="258"/>
-            <ac:spMk id="18" creationId="{11380B01-5C11-2679-9594-77B4B9FFAF52}"/>
-          </ac:spMkLst>
-        </pc:spChg>
-        <pc:spChg chg="add mod ord">
-          <ac:chgData name="Jonathan Rau" userId="01bd1429-ada3-4be3-b2f3-ae839e9d5ccc" providerId="ADAL" clId="{3F5F48D2-2934-4288-A555-E6823DD1D0AE}" dt="2023-05-01T22:06:40.455" v="1295" actId="12788"/>
-          <ac:spMkLst>
-            <pc:docMk/>
-            <pc:sldMk cId="2927218767" sldId="258"/>
-            <ac:spMk id="19" creationId="{5777DF44-469B-7A2F-8877-71FC31533BAB}"/>
-          </ac:spMkLst>
-        </pc:spChg>
-        <pc:spChg chg="add mod ord">
-          <ac:chgData name="Jonathan Rau" userId="01bd1429-ada3-4be3-b2f3-ae839e9d5ccc" providerId="ADAL" clId="{3F5F48D2-2934-4288-A555-E6823DD1D0AE}" dt="2023-05-01T22:08:24.716" v="1310" actId="12788"/>
-          <ac:spMkLst>
-            <pc:docMk/>
-            <pc:sldMk cId="2927218767" sldId="258"/>
-            <ac:spMk id="20" creationId="{955587C0-591B-918F-2EFF-90D940181BF4}"/>
-          </ac:spMkLst>
-        </pc:spChg>
-        <pc:spChg chg="add mod ord">
-          <ac:chgData name="Jonathan Rau" userId="01bd1429-ada3-4be3-b2f3-ae839e9d5ccc" providerId="ADAL" clId="{3F5F48D2-2934-4288-A555-E6823DD1D0AE}" dt="2023-05-01T22:08:24.716" v="1310" actId="12788"/>
-          <ac:spMkLst>
-            <pc:docMk/>
-            <pc:sldMk cId="2927218767" sldId="258"/>
-            <ac:spMk id="23" creationId="{C3FF9F8B-DA2B-B229-1266-64F4BAA0AA3E}"/>
-          </ac:spMkLst>
-        </pc:spChg>
-        <pc:spChg chg="add mod">
-          <ac:chgData name="Jonathan Rau" userId="01bd1429-ada3-4be3-b2f3-ae839e9d5ccc" providerId="ADAL" clId="{3F5F48D2-2934-4288-A555-E6823DD1D0AE}" dt="2023-05-01T22:08:19.422" v="1309" actId="12789"/>
-          <ac:spMkLst>
-            <pc:docMk/>
-            <pc:sldMk cId="2927218767" sldId="258"/>
-            <ac:spMk id="25" creationId="{060A3261-575A-DB40-A7E1-36B64B9B5F6A}"/>
-          </ac:spMkLst>
-        </pc:spChg>
-        <pc:spChg chg="add del mod">
-          <ac:chgData name="Jonathan Rau" userId="01bd1429-ada3-4be3-b2f3-ae839e9d5ccc" providerId="ADAL" clId="{3F5F48D2-2934-4288-A555-E6823DD1D0AE}" dt="2023-04-14T19:59:14.340" v="685" actId="478"/>
-          <ac:spMkLst>
-            <pc:docMk/>
-            <pc:sldMk cId="2927218767" sldId="258"/>
-            <ac:spMk id="34" creationId="{CF211332-0D27-B046-09A3-AE3A5EDFAB1C}"/>
-          </ac:spMkLst>
-        </pc:spChg>
-        <pc:spChg chg="add mod topLvl">
-          <ac:chgData name="Jonathan Rau" userId="01bd1429-ada3-4be3-b2f3-ae839e9d5ccc" providerId="ADAL" clId="{3F5F48D2-2934-4288-A555-E6823DD1D0AE}" dt="2023-05-01T22:09:47.537" v="1401" actId="1035"/>
-          <ac:spMkLst>
-            <pc:docMk/>
-            <pc:sldMk cId="2927218767" sldId="258"/>
-            <ac:spMk id="36" creationId="{3168B3C9-C653-D5A4-3A61-2E0ED75D4320}"/>
-          </ac:spMkLst>
-        </pc:spChg>
-        <pc:spChg chg="add del mod topLvl">
-          <ac:chgData name="Jonathan Rau" userId="01bd1429-ada3-4be3-b2f3-ae839e9d5ccc" providerId="ADAL" clId="{3F5F48D2-2934-4288-A555-E6823DD1D0AE}" dt="2023-05-01T21:45:03.283" v="780" actId="478"/>
-          <ac:spMkLst>
-            <pc:docMk/>
-            <pc:sldMk cId="2927218767" sldId="258"/>
-            <ac:spMk id="37" creationId="{72850DCE-AA01-4284-6BAB-E56678FBD6F8}"/>
-          </ac:spMkLst>
-        </pc:spChg>
-        <pc:spChg chg="add mod topLvl">
-          <ac:chgData name="Jonathan Rau" userId="01bd1429-ada3-4be3-b2f3-ae839e9d5ccc" providerId="ADAL" clId="{3F5F48D2-2934-4288-A555-E6823DD1D0AE}" dt="2023-05-01T22:09:47.537" v="1401" actId="1035"/>
-          <ac:spMkLst>
-            <pc:docMk/>
-            <pc:sldMk cId="2927218767" sldId="258"/>
-            <ac:spMk id="40" creationId="{2B9F4387-007C-A863-E06D-057C44D1A8B7}"/>
-          </ac:spMkLst>
-        </pc:spChg>
-        <pc:spChg chg="add del mod topLvl">
-          <ac:chgData name="Jonathan Rau" userId="01bd1429-ada3-4be3-b2f3-ae839e9d5ccc" providerId="ADAL" clId="{3F5F48D2-2934-4288-A555-E6823DD1D0AE}" dt="2023-05-01T21:45:03.283" v="780" actId="478"/>
-          <ac:spMkLst>
-            <pc:docMk/>
-            <pc:sldMk cId="2927218767" sldId="258"/>
-            <ac:spMk id="42" creationId="{75A37B31-03FB-0E19-883C-B831E3DD86E8}"/>
-          </ac:spMkLst>
-        </pc:spChg>
-        <pc:spChg chg="add mod topLvl">
-          <ac:chgData name="Jonathan Rau" userId="01bd1429-ada3-4be3-b2f3-ae839e9d5ccc" providerId="ADAL" clId="{3F5F48D2-2934-4288-A555-E6823DD1D0AE}" dt="2023-05-01T22:09:47.537" v="1401" actId="1035"/>
-          <ac:spMkLst>
-            <pc:docMk/>
-            <pc:sldMk cId="2927218767" sldId="258"/>
-            <ac:spMk id="44" creationId="{AF0DFB57-0EA5-1522-9EE9-03E1643EF3C4}"/>
-          </ac:spMkLst>
-        </pc:spChg>
-        <pc:spChg chg="add mod topLvl">
-          <ac:chgData name="Jonathan Rau" userId="01bd1429-ada3-4be3-b2f3-ae839e9d5ccc" providerId="ADAL" clId="{3F5F48D2-2934-4288-A555-E6823DD1D0AE}" dt="2023-05-01T22:09:47.537" v="1401" actId="1035"/>
-          <ac:spMkLst>
-            <pc:docMk/>
-            <pc:sldMk cId="2927218767" sldId="258"/>
-            <ac:spMk id="45" creationId="{5403259A-FD0E-15A7-723A-F88B42E0162C}"/>
-          </ac:spMkLst>
-        </pc:spChg>
-        <pc:spChg chg="add mod ord topLvl">
-          <ac:chgData name="Jonathan Rau" userId="01bd1429-ada3-4be3-b2f3-ae839e9d5ccc" providerId="ADAL" clId="{3F5F48D2-2934-4288-A555-E6823DD1D0AE}" dt="2023-05-01T22:09:47.537" v="1401" actId="1035"/>
-          <ac:spMkLst>
-            <pc:docMk/>
-            <pc:sldMk cId="2927218767" sldId="258"/>
-            <ac:spMk id="47" creationId="{EDA5DF41-D325-4378-3FDC-CBE766C0E32E}"/>
-          </ac:spMkLst>
-        </pc:spChg>
-        <pc:spChg chg="add del mod">
-          <ac:chgData name="Jonathan Rau" userId="01bd1429-ada3-4be3-b2f3-ae839e9d5ccc" providerId="ADAL" clId="{3F5F48D2-2934-4288-A555-E6823DD1D0AE}" dt="2023-04-14T20:01:20.051" v="733" actId="478"/>
-          <ac:spMkLst>
-            <pc:docMk/>
-            <pc:sldMk cId="2927218767" sldId="258"/>
-            <ac:spMk id="50" creationId="{78AF7BB0-562E-4589-5090-9B7D1A3C3F61}"/>
-          </ac:spMkLst>
-        </pc:spChg>
-        <pc:spChg chg="add mod">
-          <ac:chgData name="Jonathan Rau" userId="01bd1429-ada3-4be3-b2f3-ae839e9d5ccc" providerId="ADAL" clId="{3F5F48D2-2934-4288-A555-E6823DD1D0AE}" dt="2023-05-01T22:11:35.855" v="1433" actId="1076"/>
-          <ac:spMkLst>
-            <pc:docMk/>
-            <pc:sldMk cId="2927218767" sldId="258"/>
-            <ac:spMk id="51" creationId="{1693654B-B9C5-BB57-C5AF-C57E58130215}"/>
-          </ac:spMkLst>
-        </pc:spChg>
-        <pc:spChg chg="add mod">
-          <ac:chgData name="Jonathan Rau" userId="01bd1429-ada3-4be3-b2f3-ae839e9d5ccc" providerId="ADAL" clId="{3F5F48D2-2934-4288-A555-E6823DD1D0AE}" dt="2023-05-01T22:09:17.588" v="1371" actId="14100"/>
-          <ac:spMkLst>
-            <pc:docMk/>
-            <pc:sldMk cId="2927218767" sldId="258"/>
-            <ac:spMk id="57" creationId="{87EC92A5-9254-25F8-0C42-0E676A517662}"/>
-          </ac:spMkLst>
-        </pc:spChg>
-        <pc:spChg chg="mod">
-          <ac:chgData name="Jonathan Rau" userId="01bd1429-ada3-4be3-b2f3-ae839e9d5ccc" providerId="ADAL" clId="{3F5F48D2-2934-4288-A555-E6823DD1D0AE}" dt="2023-05-01T22:05:15.503" v="1286" actId="571"/>
-          <ac:spMkLst>
-            <pc:docMk/>
-            <pc:sldMk cId="2927218767" sldId="258"/>
-            <ac:spMk id="59" creationId="{6CD57F62-034A-6DD1-B797-A65BBA7A1DEE}"/>
-          </ac:spMkLst>
-        </pc:spChg>
-        <pc:spChg chg="mod">
-          <ac:chgData name="Jonathan Rau" userId="01bd1429-ada3-4be3-b2f3-ae839e9d5ccc" providerId="ADAL" clId="{3F5F48D2-2934-4288-A555-E6823DD1D0AE}" dt="2023-05-01T22:05:15.503" v="1286" actId="571"/>
-          <ac:spMkLst>
-            <pc:docMk/>
-            <pc:sldMk cId="2927218767" sldId="258"/>
-            <ac:spMk id="62" creationId="{BB2850FC-D34E-5792-D9CD-FCCF401BA238}"/>
-          </ac:spMkLst>
-        </pc:spChg>
-        <pc:grpChg chg="add mod">
-          <ac:chgData name="Jonathan Rau" userId="01bd1429-ada3-4be3-b2f3-ae839e9d5ccc" providerId="ADAL" clId="{3F5F48D2-2934-4288-A555-E6823DD1D0AE}" dt="2023-05-01T22:08:00.467" v="1305" actId="552"/>
-          <ac:grpSpMkLst>
-            <pc:docMk/>
-            <pc:sldMk cId="2927218767" sldId="258"/>
-            <ac:grpSpMk id="10" creationId="{7BB619AD-693A-3B9C-6D20-247888B0204F}"/>
-          </ac:grpSpMkLst>
-        </pc:grpChg>
-        <pc:grpChg chg="add del mod">
-          <ac:chgData name="Jonathan Rau" userId="01bd1429-ada3-4be3-b2f3-ae839e9d5ccc" providerId="ADAL" clId="{3F5F48D2-2934-4288-A555-E6823DD1D0AE}" dt="2023-05-01T21:47:00.031" v="843" actId="165"/>
-          <ac:grpSpMkLst>
-            <pc:docMk/>
-            <pc:sldMk cId="2927218767" sldId="258"/>
-            <ac:grpSpMk id="11" creationId="{A3C8BF8A-A597-E40D-28E3-BB4DF4567CE3}"/>
-          </ac:grpSpMkLst>
-        </pc:grpChg>
-        <pc:grpChg chg="add del mod">
-          <ac:chgData name="Jonathan Rau" userId="01bd1429-ada3-4be3-b2f3-ae839e9d5ccc" providerId="ADAL" clId="{3F5F48D2-2934-4288-A555-E6823DD1D0AE}" dt="2023-05-01T21:52:07.405" v="1014" actId="165"/>
-          <ac:grpSpMkLst>
-            <pc:docMk/>
-            <pc:sldMk cId="2927218767" sldId="258"/>
-            <ac:grpSpMk id="12" creationId="{88EED4C6-963B-3C13-BCB7-9CE42780D7E6}"/>
-          </ac:grpSpMkLst>
-        </pc:grpChg>
-        <pc:grpChg chg="add del mod">
-          <ac:chgData name="Jonathan Rau" userId="01bd1429-ada3-4be3-b2f3-ae839e9d5ccc" providerId="ADAL" clId="{3F5F48D2-2934-4288-A555-E6823DD1D0AE}" dt="2023-05-01T21:52:07.405" v="1014" actId="165"/>
-          <ac:grpSpMkLst>
-            <pc:docMk/>
-            <pc:sldMk cId="2927218767" sldId="258"/>
-            <ac:grpSpMk id="13" creationId="{F6FA9303-CEFF-A9D8-4998-EC58587FE3AD}"/>
-          </ac:grpSpMkLst>
-        </pc:grpChg>
-        <pc:grpChg chg="add del mod">
-          <ac:chgData name="Jonathan Rau" userId="01bd1429-ada3-4be3-b2f3-ae839e9d5ccc" providerId="ADAL" clId="{3F5F48D2-2934-4288-A555-E6823DD1D0AE}" dt="2023-05-01T21:52:07.405" v="1014" actId="165"/>
-          <ac:grpSpMkLst>
-            <pc:docMk/>
-            <pc:sldMk cId="2927218767" sldId="258"/>
-            <ac:grpSpMk id="14" creationId="{4881A3DD-EE65-27DB-671F-8B799B3F4A08}"/>
-          </ac:grpSpMkLst>
-        </pc:grpChg>
-        <pc:grpChg chg="add mod">
-          <ac:chgData name="Jonathan Rau" userId="01bd1429-ada3-4be3-b2f3-ae839e9d5ccc" providerId="ADAL" clId="{3F5F48D2-2934-4288-A555-E6823DD1D0AE}" dt="2023-05-01T22:08:24.716" v="1310" actId="12788"/>
-          <ac:grpSpMkLst>
-            <pc:docMk/>
-            <pc:sldMk cId="2927218767" sldId="258"/>
-            <ac:grpSpMk id="21" creationId="{3710CA1F-8C31-5042-8A25-C3AD5A9F72C9}"/>
-          </ac:grpSpMkLst>
-        </pc:grpChg>
-        <pc:grpChg chg="add del mod">
-          <ac:chgData name="Jonathan Rau" userId="01bd1429-ada3-4be3-b2f3-ae839e9d5ccc" providerId="ADAL" clId="{3F5F48D2-2934-4288-A555-E6823DD1D0AE}" dt="2023-05-01T21:49:36.827" v="869" actId="165"/>
-          <ac:grpSpMkLst>
-            <pc:docMk/>
-            <pc:sldMk cId="2927218767" sldId="258"/>
-            <ac:grpSpMk id="22" creationId="{A4B1F169-4EBA-F8E1-64A9-45F89C6E71F1}"/>
-          </ac:grpSpMkLst>
-        </pc:grpChg>
-        <pc:grpChg chg="add mod">
-          <ac:chgData name="Jonathan Rau" userId="01bd1429-ada3-4be3-b2f3-ae839e9d5ccc" providerId="ADAL" clId="{3F5F48D2-2934-4288-A555-E6823DD1D0AE}" dt="2023-05-01T22:08:24.716" v="1310" actId="12788"/>
-          <ac:grpSpMkLst>
-            <pc:docMk/>
-            <pc:sldMk cId="2927218767" sldId="258"/>
-            <ac:grpSpMk id="24" creationId="{5AFCC57C-5A45-6C97-6F50-C7F1EA3CE99B}"/>
-          </ac:grpSpMkLst>
-        </pc:grpChg>
-        <pc:grpChg chg="add mod">
-          <ac:chgData name="Jonathan Rau" userId="01bd1429-ada3-4be3-b2f3-ae839e9d5ccc" providerId="ADAL" clId="{3F5F48D2-2934-4288-A555-E6823DD1D0AE}" dt="2023-05-01T22:09:47.537" v="1401" actId="1035"/>
-          <ac:grpSpMkLst>
-            <pc:docMk/>
-            <pc:sldMk cId="2927218767" sldId="258"/>
-            <ac:grpSpMk id="26" creationId="{6BAEA63F-A29D-8D2F-2B83-0919927ED399}"/>
-          </ac:grpSpMkLst>
-        </pc:grpChg>
-        <pc:grpChg chg="add mod">
-          <ac:chgData name="Jonathan Rau" userId="01bd1429-ada3-4be3-b2f3-ae839e9d5ccc" providerId="ADAL" clId="{3F5F48D2-2934-4288-A555-E6823DD1D0AE}" dt="2023-05-01T22:09:47.537" v="1401" actId="1035"/>
-          <ac:grpSpMkLst>
-            <pc:docMk/>
-            <pc:sldMk cId="2927218767" sldId="258"/>
-            <ac:grpSpMk id="29" creationId="{6C2D2B36-7017-0273-DE0A-222DC8FB537F}"/>
-          </ac:grpSpMkLst>
-        </pc:grpChg>
-        <pc:grpChg chg="add mod">
-          <ac:chgData name="Jonathan Rau" userId="01bd1429-ada3-4be3-b2f3-ae839e9d5ccc" providerId="ADAL" clId="{3F5F48D2-2934-4288-A555-E6823DD1D0AE}" dt="2023-05-01T22:09:47.537" v="1401" actId="1035"/>
-          <ac:grpSpMkLst>
-            <pc:docMk/>
-            <pc:sldMk cId="2927218767" sldId="258"/>
-            <ac:grpSpMk id="30" creationId="{E30E038F-7FA5-A920-3A09-7E35AF378EA6}"/>
-          </ac:grpSpMkLst>
-        </pc:grpChg>
-        <pc:grpChg chg="add mod">
-          <ac:chgData name="Jonathan Rau" userId="01bd1429-ada3-4be3-b2f3-ae839e9d5ccc" providerId="ADAL" clId="{3F5F48D2-2934-4288-A555-E6823DD1D0AE}" dt="2023-05-01T22:09:47.537" v="1401" actId="1035"/>
-          <ac:grpSpMkLst>
-            <pc:docMk/>
-            <pc:sldMk cId="2927218767" sldId="258"/>
-            <ac:grpSpMk id="32" creationId="{61FE9FAF-8CEE-A9FC-9802-5B6239F41C7B}"/>
-          </ac:grpSpMkLst>
-        </pc:grpChg>
-        <pc:grpChg chg="add mod">
-          <ac:chgData name="Jonathan Rau" userId="01bd1429-ada3-4be3-b2f3-ae839e9d5ccc" providerId="ADAL" clId="{3F5F48D2-2934-4288-A555-E6823DD1D0AE}" dt="2023-05-01T22:09:47.537" v="1401" actId="1035"/>
-          <ac:grpSpMkLst>
-            <pc:docMk/>
-            <pc:sldMk cId="2927218767" sldId="258"/>
-            <ac:grpSpMk id="33" creationId="{2F9B88CF-29AE-2D89-CD2B-F21FFEE9D7B8}"/>
-          </ac:grpSpMkLst>
-        </pc:grpChg>
-        <pc:grpChg chg="add mod">
-          <ac:chgData name="Jonathan Rau" userId="01bd1429-ada3-4be3-b2f3-ae839e9d5ccc" providerId="ADAL" clId="{3F5F48D2-2934-4288-A555-E6823DD1D0AE}" dt="2023-05-01T22:09:47.537" v="1401" actId="1035"/>
-          <ac:grpSpMkLst>
-            <pc:docMk/>
-            <pc:sldMk cId="2927218767" sldId="258"/>
-            <ac:grpSpMk id="34" creationId="{B0B80858-9883-3F5E-0753-1842B54739B1}"/>
-          </ac:grpSpMkLst>
-        </pc:grpChg>
-        <pc:grpChg chg="add del mod topLvl">
-          <ac:chgData name="Jonathan Rau" userId="01bd1429-ada3-4be3-b2f3-ae839e9d5ccc" providerId="ADAL" clId="{3F5F48D2-2934-4288-A555-E6823DD1D0AE}" dt="2023-05-01T21:44:58.129" v="779" actId="165"/>
-          <ac:grpSpMkLst>
-            <pc:docMk/>
-            <pc:sldMk cId="2927218767" sldId="258"/>
-            <ac:grpSpMk id="48" creationId="{C271047F-ADF7-6A2F-210B-142ADF8FE177}"/>
-          </ac:grpSpMkLst>
-        </pc:grpChg>
-        <pc:grpChg chg="add del mod">
-          <ac:chgData name="Jonathan Rau" userId="01bd1429-ada3-4be3-b2f3-ae839e9d5ccc" providerId="ADAL" clId="{3F5F48D2-2934-4288-A555-E6823DD1D0AE}" dt="2023-05-01T21:44:52.913" v="778" actId="165"/>
-          <ac:grpSpMkLst>
-            <pc:docMk/>
-            <pc:sldMk cId="2927218767" sldId="258"/>
-            <ac:grpSpMk id="49" creationId="{544F67E2-9F7F-A7FC-E95C-2D6E4BBFD252}"/>
-          </ac:grpSpMkLst>
-        </pc:grpChg>
-        <pc:grpChg chg="add mod">
-          <ac:chgData name="Jonathan Rau" userId="01bd1429-ada3-4be3-b2f3-ae839e9d5ccc" providerId="ADAL" clId="{3F5F48D2-2934-4288-A555-E6823DD1D0AE}" dt="2023-05-01T22:05:15.503" v="1286" actId="571"/>
-          <ac:grpSpMkLst>
-            <pc:docMk/>
-            <pc:sldMk cId="2927218767" sldId="258"/>
-            <ac:grpSpMk id="58" creationId="{264AA946-2DEC-FFFE-2570-ED57F57E4670}"/>
-          </ac:grpSpMkLst>
-        </pc:grpChg>
-        <pc:grpChg chg="add mod">
-          <ac:chgData name="Jonathan Rau" userId="01bd1429-ada3-4be3-b2f3-ae839e9d5ccc" providerId="ADAL" clId="{3F5F48D2-2934-4288-A555-E6823DD1D0AE}" dt="2023-05-01T22:05:15.503" v="1286" actId="571"/>
-          <ac:grpSpMkLst>
-            <pc:docMk/>
-            <pc:sldMk cId="2927218767" sldId="258"/>
-            <ac:grpSpMk id="61" creationId="{5DE8B0B6-FE61-F05A-64FD-88B68BF4735C}"/>
-          </ac:grpSpMkLst>
-        </pc:grpChg>
-        <pc:picChg chg="add del mod topLvl">
-          <ac:chgData name="Jonathan Rau" userId="01bd1429-ada3-4be3-b2f3-ae839e9d5ccc" providerId="ADAL" clId="{3F5F48D2-2934-4288-A555-E6823DD1D0AE}" dt="2023-05-01T21:49:39.203" v="870" actId="478"/>
-          <ac:picMkLst>
-            <pc:docMk/>
-            <pc:sldMk cId="2927218767" sldId="258"/>
-            <ac:picMk id="3" creationId="{1332A199-18EB-4E2B-DE68-1C157EDEB4F8}"/>
-          </ac:picMkLst>
-        </pc:picChg>
-        <pc:picChg chg="add mod">
-          <ac:chgData name="Jonathan Rau" userId="01bd1429-ada3-4be3-b2f3-ae839e9d5ccc" providerId="ADAL" clId="{3F5F48D2-2934-4288-A555-E6823DD1D0AE}" dt="2023-05-01T22:08:47.780" v="1362" actId="12789"/>
-          <ac:picMkLst>
-            <pc:docMk/>
-            <pc:sldMk cId="2927218767" sldId="258"/>
-            <ac:picMk id="4" creationId="{BC63CE32-56C9-DD4D-C00B-655BC485EE5F}"/>
-          </ac:picMkLst>
-        </pc:picChg>
-        <pc:picChg chg="add mod">
-          <ac:chgData name="Jonathan Rau" userId="01bd1429-ada3-4be3-b2f3-ae839e9d5ccc" providerId="ADAL" clId="{3F5F48D2-2934-4288-A555-E6823DD1D0AE}" dt="2023-05-01T22:08:00.467" v="1305" actId="552"/>
-          <ac:picMkLst>
-            <pc:docMk/>
-            <pc:sldMk cId="2927218767" sldId="258"/>
-            <ac:picMk id="6" creationId="{D3A71050-9A8D-D474-72E2-01BDD0982569}"/>
-          </ac:picMkLst>
-        </pc:picChg>
-        <pc:picChg chg="add mod">
-          <ac:chgData name="Jonathan Rau" userId="01bd1429-ada3-4be3-b2f3-ae839e9d5ccc" providerId="ADAL" clId="{3F5F48D2-2934-4288-A555-E6823DD1D0AE}" dt="2023-05-01T22:05:19.418" v="1287" actId="12789"/>
-          <ac:picMkLst>
-            <pc:docMk/>
-            <pc:sldMk cId="2927218767" sldId="258"/>
-            <ac:picMk id="8" creationId="{521D7AAB-D2BB-6EAD-3EDF-F0812CA538DE}"/>
-          </ac:picMkLst>
-        </pc:picChg>
-        <pc:picChg chg="add del mod">
-          <ac:chgData name="Jonathan Rau" userId="01bd1429-ada3-4be3-b2f3-ae839e9d5ccc" providerId="ADAL" clId="{3F5F48D2-2934-4288-A555-E6823DD1D0AE}" dt="2023-04-14T19:54:33.035" v="544" actId="478"/>
-          <ac:picMkLst>
-            <pc:docMk/>
-            <pc:sldMk cId="2927218767" sldId="258"/>
-            <ac:picMk id="11" creationId="{14061ED1-0E5B-92E4-105D-5FFC2B609128}"/>
-          </ac:picMkLst>
-        </pc:picChg>
-        <pc:picChg chg="add del mod">
-          <ac:chgData name="Jonathan Rau" userId="01bd1429-ada3-4be3-b2f3-ae839e9d5ccc" providerId="ADAL" clId="{3F5F48D2-2934-4288-A555-E6823DD1D0AE}" dt="2023-04-14T19:54:33.035" v="544" actId="478"/>
-          <ac:picMkLst>
-            <pc:docMk/>
-            <pc:sldMk cId="2927218767" sldId="258"/>
-            <ac:picMk id="12" creationId="{0F76B5BD-4C86-5FEA-5881-7FA430135142}"/>
-          </ac:picMkLst>
-        </pc:picChg>
-        <pc:picChg chg="add del mod">
-          <ac:chgData name="Jonathan Rau" userId="01bd1429-ada3-4be3-b2f3-ae839e9d5ccc" providerId="ADAL" clId="{3F5F48D2-2934-4288-A555-E6823DD1D0AE}" dt="2023-04-14T19:51:50.703" v="240"/>
-          <ac:picMkLst>
-            <pc:docMk/>
-            <pc:sldMk cId="2927218767" sldId="258"/>
-            <ac:picMk id="13" creationId="{3393AE31-942D-4F2A-5548-4F28B8A19382}"/>
-          </ac:picMkLst>
-        </pc:picChg>
-        <pc:picChg chg="add del mod">
-          <ac:chgData name="Jonathan Rau" userId="01bd1429-ada3-4be3-b2f3-ae839e9d5ccc" providerId="ADAL" clId="{3F5F48D2-2934-4288-A555-E6823DD1D0AE}" dt="2023-04-14T19:51:50.703" v="240"/>
-          <ac:picMkLst>
-            <pc:docMk/>
-            <pc:sldMk cId="2927218767" sldId="258"/>
-            <ac:picMk id="14" creationId="{06A240DE-4433-962C-913A-4890225522AF}"/>
-          </ac:picMkLst>
-        </pc:picChg>
-        <pc:picChg chg="add del mod">
-          <ac:chgData name="Jonathan Rau" userId="01bd1429-ada3-4be3-b2f3-ae839e9d5ccc" providerId="ADAL" clId="{3F5F48D2-2934-4288-A555-E6823DD1D0AE}" dt="2023-04-14T19:56:45.303" v="576"/>
-          <ac:picMkLst>
-            <pc:docMk/>
-            <pc:sldMk cId="2927218767" sldId="258"/>
-            <ac:picMk id="22" creationId="{C1FF35FC-AD1A-F89F-25C1-CD3E8DD9CC4F}"/>
-          </ac:picMkLst>
-        </pc:picChg>
-        <pc:picChg chg="add mod topLvl">
-          <ac:chgData name="Jonathan Rau" userId="01bd1429-ada3-4be3-b2f3-ae839e9d5ccc" providerId="ADAL" clId="{3F5F48D2-2934-4288-A555-E6823DD1D0AE}" dt="2023-05-01T22:09:47.537" v="1401" actId="1035"/>
-          <ac:picMkLst>
-            <pc:docMk/>
-            <pc:sldMk cId="2927218767" sldId="258"/>
-            <ac:picMk id="35" creationId="{D2DAF613-D8BD-3380-58A8-5BAB202AF083}"/>
-          </ac:picMkLst>
-        </pc:picChg>
-        <pc:picChg chg="add del mod topLvl">
-          <ac:chgData name="Jonathan Rau" userId="01bd1429-ada3-4be3-b2f3-ae839e9d5ccc" providerId="ADAL" clId="{3F5F48D2-2934-4288-A555-E6823DD1D0AE}" dt="2023-05-01T21:45:03.283" v="780" actId="478"/>
-          <ac:picMkLst>
-            <pc:docMk/>
-            <pc:sldMk cId="2927218767" sldId="258"/>
-            <ac:picMk id="38" creationId="{8B967596-2604-AD15-668D-7E808ADAB5D3}"/>
-          </ac:picMkLst>
-        </pc:picChg>
-        <pc:picChg chg="add mod topLvl">
-          <ac:chgData name="Jonathan Rau" userId="01bd1429-ada3-4be3-b2f3-ae839e9d5ccc" providerId="ADAL" clId="{3F5F48D2-2934-4288-A555-E6823DD1D0AE}" dt="2023-05-01T22:09:47.537" v="1401" actId="1035"/>
-          <ac:picMkLst>
-            <pc:docMk/>
-            <pc:sldMk cId="2927218767" sldId="258"/>
-            <ac:picMk id="39" creationId="{0B15E7EF-81AB-9F76-740A-808EC8C56C65}"/>
-          </ac:picMkLst>
-        </pc:picChg>
-        <pc:picChg chg="add del mod topLvl">
-          <ac:chgData name="Jonathan Rau" userId="01bd1429-ada3-4be3-b2f3-ae839e9d5ccc" providerId="ADAL" clId="{3F5F48D2-2934-4288-A555-E6823DD1D0AE}" dt="2023-05-01T21:45:03.283" v="780" actId="478"/>
-          <ac:picMkLst>
-            <pc:docMk/>
-            <pc:sldMk cId="2927218767" sldId="258"/>
-            <ac:picMk id="41" creationId="{20A3568B-2519-DB9D-EC3F-37EE079E3586}"/>
-          </ac:picMkLst>
-        </pc:picChg>
-        <pc:picChg chg="add mod topLvl">
-          <ac:chgData name="Jonathan Rau" userId="01bd1429-ada3-4be3-b2f3-ae839e9d5ccc" providerId="ADAL" clId="{3F5F48D2-2934-4288-A555-E6823DD1D0AE}" dt="2023-05-01T22:09:47.537" v="1401" actId="1035"/>
-          <ac:picMkLst>
-            <pc:docMk/>
-            <pc:sldMk cId="2927218767" sldId="258"/>
-            <ac:picMk id="43" creationId="{46C1D956-00C8-E3E3-A65B-3466292AEC94}"/>
-          </ac:picMkLst>
-        </pc:picChg>
-        <pc:picChg chg="add mod topLvl">
-          <ac:chgData name="Jonathan Rau" userId="01bd1429-ada3-4be3-b2f3-ae839e9d5ccc" providerId="ADAL" clId="{3F5F48D2-2934-4288-A555-E6823DD1D0AE}" dt="2023-05-01T22:09:47.537" v="1401" actId="1035"/>
-          <ac:picMkLst>
-            <pc:docMk/>
-            <pc:sldMk cId="2927218767" sldId="258"/>
-            <ac:picMk id="46" creationId="{6617A1D9-409F-15DE-CC52-DE413211DE73}"/>
-          </ac:picMkLst>
-        </pc:picChg>
-        <pc:picChg chg="add mod">
-          <ac:chgData name="Jonathan Rau" userId="01bd1429-ada3-4be3-b2f3-ae839e9d5ccc" providerId="ADAL" clId="{3F5F48D2-2934-4288-A555-E6823DD1D0AE}" dt="2023-05-01T22:05:19.418" v="1287" actId="12789"/>
-          <ac:picMkLst>
-            <pc:docMk/>
-            <pc:sldMk cId="2927218767" sldId="258"/>
-            <ac:picMk id="50" creationId="{73D0EF48-EE4F-CAD8-9887-48C5E7772023}"/>
-          </ac:picMkLst>
-        </pc:picChg>
-        <pc:picChg chg="add mod">
-          <ac:chgData name="Jonathan Rau" userId="01bd1429-ada3-4be3-b2f3-ae839e9d5ccc" providerId="ADAL" clId="{3F5F48D2-2934-4288-A555-E6823DD1D0AE}" dt="2023-05-01T22:08:10.226" v="1307" actId="553"/>
-          <ac:picMkLst>
-            <pc:docMk/>
-            <pc:sldMk cId="2927218767" sldId="258"/>
-            <ac:picMk id="53" creationId="{8903D04C-6DA0-E7D0-7EDF-6AE6E6C6EF0E}"/>
-          </ac:picMkLst>
-        </pc:picChg>
-        <pc:picChg chg="add mod">
-          <ac:chgData name="Jonathan Rau" userId="01bd1429-ada3-4be3-b2f3-ae839e9d5ccc" providerId="ADAL" clId="{3F5F48D2-2934-4288-A555-E6823DD1D0AE}" dt="2023-05-01T22:07:54.272" v="1304" actId="552"/>
-          <ac:picMkLst>
-            <pc:docMk/>
-            <pc:sldMk cId="2927218767" sldId="258"/>
-            <ac:picMk id="55" creationId="{5FB33C35-4ABC-C3EF-7377-9B5091661884}"/>
-          </ac:picMkLst>
-        </pc:picChg>
-        <pc:picChg chg="mod">
-          <ac:chgData name="Jonathan Rau" userId="01bd1429-ada3-4be3-b2f3-ae839e9d5ccc" providerId="ADAL" clId="{3F5F48D2-2934-4288-A555-E6823DD1D0AE}" dt="2023-05-01T22:05:15.503" v="1286" actId="571"/>
-          <ac:picMkLst>
-            <pc:docMk/>
-            <pc:sldMk cId="2927218767" sldId="258"/>
-            <ac:picMk id="60" creationId="{1789B676-E28C-E0F8-B66E-7044FE06C5FA}"/>
-          </ac:picMkLst>
-        </pc:picChg>
-        <pc:picChg chg="mod">
-          <ac:chgData name="Jonathan Rau" userId="01bd1429-ada3-4be3-b2f3-ae839e9d5ccc" providerId="ADAL" clId="{3F5F48D2-2934-4288-A555-E6823DD1D0AE}" dt="2023-05-01T22:05:15.503" v="1286" actId="571"/>
-          <ac:picMkLst>
-            <pc:docMk/>
-            <pc:sldMk cId="2927218767" sldId="258"/>
-            <ac:picMk id="63" creationId="{68785ECA-834A-CF97-FD2E-AF6ADAAA29DF}"/>
-          </ac:picMkLst>
-        </pc:picChg>
-        <pc:picChg chg="add mod">
-          <ac:chgData name="Jonathan Rau" userId="01bd1429-ada3-4be3-b2f3-ae839e9d5ccc" providerId="ADAL" clId="{3F5F48D2-2934-4288-A555-E6823DD1D0AE}" dt="2023-05-01T22:05:15.503" v="1286" actId="571"/>
-          <ac:picMkLst>
-            <pc:docMk/>
-            <pc:sldMk cId="2927218767" sldId="258"/>
-            <ac:picMk id="1024" creationId="{B5B2DF3F-3F6F-44E9-5017-4CA7B9DFF52C}"/>
-          </ac:picMkLst>
-        </pc:picChg>
-        <pc:picChg chg="add mod">
-          <ac:chgData name="Jonathan Rau" userId="01bd1429-ada3-4be3-b2f3-ae839e9d5ccc" providerId="ADAL" clId="{3F5F48D2-2934-4288-A555-E6823DD1D0AE}" dt="2023-05-01T22:05:15.503" v="1286" actId="571"/>
-          <ac:picMkLst>
-            <pc:docMk/>
-            <pc:sldMk cId="2927218767" sldId="258"/>
-            <ac:picMk id="1025" creationId="{2DEBD243-003B-B356-DBEB-FE8C84AA7735}"/>
-          </ac:picMkLst>
-        </pc:picChg>
-        <pc:picChg chg="add del">
-          <ac:chgData name="Jonathan Rau" userId="01bd1429-ada3-4be3-b2f3-ae839e9d5ccc" providerId="ADAL" clId="{3F5F48D2-2934-4288-A555-E6823DD1D0AE}" dt="2023-04-14T19:46:31.763" v="158"/>
-          <ac:picMkLst>
-            <pc:docMk/>
-            <pc:sldMk cId="2927218767" sldId="258"/>
-            <ac:picMk id="1026" creationId="{78C0063B-4CEE-65C8-3C5F-48CC50CC8447}"/>
-          </ac:picMkLst>
-        </pc:picChg>
-        <pc:picChg chg="add mod">
-          <ac:chgData name="Jonathan Rau" userId="01bd1429-ada3-4be3-b2f3-ae839e9d5ccc" providerId="ADAL" clId="{3F5F48D2-2934-4288-A555-E6823DD1D0AE}" dt="2023-05-01T22:09:47.537" v="1401" actId="1035"/>
-          <ac:picMkLst>
-            <pc:docMk/>
-            <pc:sldMk cId="2927218767" sldId="258"/>
-            <ac:picMk id="1026" creationId="{EEFAA6CA-7B0D-3179-A8B7-CE0BB5626AD2}"/>
-          </ac:picMkLst>
-        </pc:picChg>
-        <pc:picChg chg="add mod">
-          <ac:chgData name="Jonathan Rau" userId="01bd1429-ada3-4be3-b2f3-ae839e9d5ccc" providerId="ADAL" clId="{3F5F48D2-2934-4288-A555-E6823DD1D0AE}" dt="2023-05-01T22:07:40.815" v="1302" actId="12789"/>
-          <ac:picMkLst>
-            <pc:docMk/>
-            <pc:sldMk cId="2927218767" sldId="258"/>
-            <ac:picMk id="1028" creationId="{07E8CB6A-59CD-2711-37CA-9505B61B0841}"/>
-          </ac:picMkLst>
-        </pc:picChg>
-        <pc:picChg chg="add mod">
-          <ac:chgData name="Jonathan Rau" userId="01bd1429-ada3-4be3-b2f3-ae839e9d5ccc" providerId="ADAL" clId="{3F5F48D2-2934-4288-A555-E6823DD1D0AE}" dt="2023-05-01T22:07:54.272" v="1304" actId="552"/>
-          <ac:picMkLst>
-            <pc:docMk/>
-            <pc:sldMk cId="2927218767" sldId="258"/>
-            <ac:picMk id="1030" creationId="{ED0DC73D-5646-3483-56E7-858CFC2DE900}"/>
-          </ac:picMkLst>
-        </pc:picChg>
-        <pc:picChg chg="add del">
-          <ac:chgData name="Jonathan Rau" userId="01bd1429-ada3-4be3-b2f3-ae839e9d5ccc" providerId="ADAL" clId="{3F5F48D2-2934-4288-A555-E6823DD1D0AE}" dt="2023-05-01T22:01:28.715" v="1093"/>
-          <ac:picMkLst>
-            <pc:docMk/>
-            <pc:sldMk cId="2927218767" sldId="258"/>
-            <ac:picMk id="1032" creationId="{5E66348A-4D93-475D-DC66-4361BC1A746B}"/>
-          </ac:picMkLst>
-        </pc:picChg>
-        <pc:picChg chg="add del mod">
-          <ac:chgData name="Jonathan Rau" userId="01bd1429-ada3-4be3-b2f3-ae839e9d5ccc" providerId="ADAL" clId="{3F5F48D2-2934-4288-A555-E6823DD1D0AE}" dt="2023-04-14T20:02:17.037" v="745" actId="478"/>
-          <ac:picMkLst>
-            <pc:docMk/>
-            <pc:sldMk cId="2927218767" sldId="258"/>
-            <ac:picMk id="1032" creationId="{8B587A27-74EF-5D43-9AE9-BC5408B5F97C}"/>
-          </ac:picMkLst>
-        </pc:picChg>
-        <pc:picChg chg="add mod">
-          <ac:chgData name="Jonathan Rau" userId="01bd1429-ada3-4be3-b2f3-ae839e9d5ccc" providerId="ADAL" clId="{3F5F48D2-2934-4288-A555-E6823DD1D0AE}" dt="2023-05-01T22:08:14.951" v="1308" actId="12789"/>
-          <ac:picMkLst>
-            <pc:docMk/>
-            <pc:sldMk cId="2927218767" sldId="258"/>
-            <ac:picMk id="1034" creationId="{DCB85329-15A2-70C1-24B7-F19FB2212E48}"/>
-          </ac:picMkLst>
-        </pc:picChg>
-        <pc:picChg chg="add mod">
-          <ac:chgData name="Jonathan Rau" userId="01bd1429-ada3-4be3-b2f3-ae839e9d5ccc" providerId="ADAL" clId="{3F5F48D2-2934-4288-A555-E6823DD1D0AE}" dt="2023-05-01T22:08:14.951" v="1308" actId="12789"/>
-          <ac:picMkLst>
-            <pc:docMk/>
-            <pc:sldMk cId="2927218767" sldId="258"/>
-            <ac:picMk id="1036" creationId="{496A2C14-BC60-9D5D-ABEA-6629D23751CC}"/>
-          </ac:picMkLst>
-        </pc:picChg>
-        <pc:picChg chg="add del mod">
-          <ac:chgData name="Jonathan Rau" userId="01bd1429-ada3-4be3-b2f3-ae839e9d5ccc" providerId="ADAL" clId="{3F5F48D2-2934-4288-A555-E6823DD1D0AE}" dt="2023-04-14T19:54:48.276" v="548"/>
-          <ac:picMkLst>
-            <pc:docMk/>
-            <pc:sldMk cId="2927218767" sldId="258"/>
-            <ac:picMk id="1038" creationId="{BD39DF8B-C3DD-2CD1-7144-AB39FD8AF480}"/>
-          </ac:picMkLst>
-        </pc:picChg>
-        <pc:picChg chg="add mod">
-          <ac:chgData name="Jonathan Rau" userId="01bd1429-ada3-4be3-b2f3-ae839e9d5ccc" providerId="ADAL" clId="{3F5F48D2-2934-4288-A555-E6823DD1D0AE}" dt="2023-05-01T22:08:24.716" v="1310" actId="12788"/>
-          <ac:picMkLst>
-            <pc:docMk/>
-            <pc:sldMk cId="2927218767" sldId="258"/>
-            <ac:picMk id="1040" creationId="{DC856B39-E488-167A-CF4E-0B57775F3A28}"/>
-          </ac:picMkLst>
-        </pc:picChg>
-        <pc:picChg chg="add mod">
-          <ac:chgData name="Jonathan Rau" userId="01bd1429-ada3-4be3-b2f3-ae839e9d5ccc" providerId="ADAL" clId="{3F5F48D2-2934-4288-A555-E6823DD1D0AE}" dt="2023-05-01T22:08:24.716" v="1310" actId="12788"/>
-          <ac:picMkLst>
-            <pc:docMk/>
-            <pc:sldMk cId="2927218767" sldId="258"/>
-            <ac:picMk id="1042" creationId="{38EDB2A1-0556-030E-BFBC-A4AC66DC2B57}"/>
-          </ac:picMkLst>
-        </pc:picChg>
-        <pc:picChg chg="add mod">
-          <ac:chgData name="Jonathan Rau" userId="01bd1429-ada3-4be3-b2f3-ae839e9d5ccc" providerId="ADAL" clId="{3F5F48D2-2934-4288-A555-E6823DD1D0AE}" dt="2023-05-01T22:08:24.716" v="1310" actId="12788"/>
-          <ac:picMkLst>
-            <pc:docMk/>
-            <pc:sldMk cId="2927218767" sldId="258"/>
-            <ac:picMk id="1044" creationId="{568F28A0-1D11-A2E1-AD71-20DEEE9FAF32}"/>
-          </ac:picMkLst>
-        </pc:picChg>
-        <pc:cxnChg chg="add mod">
-          <ac:chgData name="Jonathan Rau" userId="01bd1429-ada3-4be3-b2f3-ae839e9d5ccc" providerId="ADAL" clId="{3F5F48D2-2934-4288-A555-E6823DD1D0AE}" dt="2023-05-01T22:08:47.780" v="1362" actId="12789"/>
-          <ac:cxnSpMkLst>
-            <pc:docMk/>
-            <pc:sldMk cId="2927218767" sldId="258"/>
-            <ac:cxnSpMk id="27" creationId="{61E8C62B-50C0-3EC7-F385-8397A4D38430}"/>
-          </ac:cxnSpMkLst>
-        </pc:cxnChg>
-        <pc:cxnChg chg="add mod">
-          <ac:chgData name="Jonathan Rau" userId="01bd1429-ada3-4be3-b2f3-ae839e9d5ccc" providerId="ADAL" clId="{3F5F48D2-2934-4288-A555-E6823DD1D0AE}" dt="2023-05-01T22:08:47.780" v="1362" actId="12789"/>
-          <ac:cxnSpMkLst>
-            <pc:docMk/>
-            <pc:sldMk cId="2927218767" sldId="258"/>
-            <ac:cxnSpMk id="28" creationId="{8EBD9BCC-9CC5-5009-83BE-6623A4D8D15B}"/>
-          </ac:cxnSpMkLst>
-        </pc:cxnChg>
-        <pc:cxnChg chg="add mod">
-          <ac:chgData name="Jonathan Rau" userId="01bd1429-ada3-4be3-b2f3-ae839e9d5ccc" providerId="ADAL" clId="{3F5F48D2-2934-4288-A555-E6823DD1D0AE}" dt="2023-05-01T22:08:47.780" v="1362" actId="12789"/>
-          <ac:cxnSpMkLst>
-            <pc:docMk/>
-            <pc:sldMk cId="2927218767" sldId="258"/>
-            <ac:cxnSpMk id="31" creationId="{7301F961-8B38-8B35-35DF-F4E2017D427A}"/>
-          </ac:cxnSpMkLst>
-        </pc:cxnChg>
-        <pc:cxnChg chg="add mod">
-          <ac:chgData name="Jonathan Rau" userId="01bd1429-ada3-4be3-b2f3-ae839e9d5ccc" providerId="ADAL" clId="{3F5F48D2-2934-4288-A555-E6823DD1D0AE}" dt="2023-05-01T22:11:35.855" v="1433" actId="1076"/>
-          <ac:cxnSpMkLst>
-            <pc:docMk/>
-            <pc:sldMk cId="2927218767" sldId="258"/>
-            <ac:cxnSpMk id="52" creationId="{951CB380-36EC-ADD9-7F54-C01D45161AAF}"/>
           </ac:cxnSpMkLst>
         </pc:cxnChg>
       </pc:sldChg>
@@ -1953,7 +1953,7 @@
           <a:p>
             <a:fld id="{A3104859-06A7-4B6C-9EBE-0886FFE8171A}" type="datetimeFigureOut">
               <a:rPr lang="en-US" smtClean="0"/>
-              <a:t>5/22/2023</a:t>
+              <a:t>6/28/2023</a:t>
             </a:fld>
             <a:endParaRPr lang="en-US"/>
           </a:p>
@@ -2151,7 +2151,7 @@
           <a:p>
             <a:fld id="{A3104859-06A7-4B6C-9EBE-0886FFE8171A}" type="datetimeFigureOut">
               <a:rPr lang="en-US" smtClean="0"/>
-              <a:t>5/22/2023</a:t>
+              <a:t>6/28/2023</a:t>
             </a:fld>
             <a:endParaRPr lang="en-US"/>
           </a:p>
@@ -2359,7 +2359,7 @@
           <a:p>
             <a:fld id="{A3104859-06A7-4B6C-9EBE-0886FFE8171A}" type="datetimeFigureOut">
               <a:rPr lang="en-US" smtClean="0"/>
-              <a:t>5/22/2023</a:t>
+              <a:t>6/28/2023</a:t>
             </a:fld>
             <a:endParaRPr lang="en-US"/>
           </a:p>
@@ -2557,7 +2557,7 @@
           <a:p>
             <a:fld id="{A3104859-06A7-4B6C-9EBE-0886FFE8171A}" type="datetimeFigureOut">
               <a:rPr lang="en-US" smtClean="0"/>
-              <a:t>5/22/2023</a:t>
+              <a:t>6/28/2023</a:t>
             </a:fld>
             <a:endParaRPr lang="en-US"/>
           </a:p>
@@ -2832,7 +2832,7 @@
           <a:p>
             <a:fld id="{A3104859-06A7-4B6C-9EBE-0886FFE8171A}" type="datetimeFigureOut">
               <a:rPr lang="en-US" smtClean="0"/>
-              <a:t>5/22/2023</a:t>
+              <a:t>6/28/2023</a:t>
             </a:fld>
             <a:endParaRPr lang="en-US"/>
           </a:p>
@@ -3097,7 +3097,7 @@
           <a:p>
             <a:fld id="{A3104859-06A7-4B6C-9EBE-0886FFE8171A}" type="datetimeFigureOut">
               <a:rPr lang="en-US" smtClean="0"/>
-              <a:t>5/22/2023</a:t>
+              <a:t>6/28/2023</a:t>
             </a:fld>
             <a:endParaRPr lang="en-US"/>
           </a:p>
@@ -3509,7 +3509,7 @@
           <a:p>
             <a:fld id="{A3104859-06A7-4B6C-9EBE-0886FFE8171A}" type="datetimeFigureOut">
               <a:rPr lang="en-US" smtClean="0"/>
-              <a:t>5/22/2023</a:t>
+              <a:t>6/28/2023</a:t>
             </a:fld>
             <a:endParaRPr lang="en-US"/>
           </a:p>
@@ -3650,7 +3650,7 @@
           <a:p>
             <a:fld id="{A3104859-06A7-4B6C-9EBE-0886FFE8171A}" type="datetimeFigureOut">
               <a:rPr lang="en-US" smtClean="0"/>
-              <a:t>5/22/2023</a:t>
+              <a:t>6/28/2023</a:t>
             </a:fld>
             <a:endParaRPr lang="en-US"/>
           </a:p>
@@ -3763,7 +3763,7 @@
           <a:p>
             <a:fld id="{A3104859-06A7-4B6C-9EBE-0886FFE8171A}" type="datetimeFigureOut">
               <a:rPr lang="en-US" smtClean="0"/>
-              <a:t>5/22/2023</a:t>
+              <a:t>6/28/2023</a:t>
             </a:fld>
             <a:endParaRPr lang="en-US"/>
           </a:p>
@@ -4074,7 +4074,7 @@
           <a:p>
             <a:fld id="{A3104859-06A7-4B6C-9EBE-0886FFE8171A}" type="datetimeFigureOut">
               <a:rPr lang="en-US" smtClean="0"/>
-              <a:t>5/22/2023</a:t>
+              <a:t>6/28/2023</a:t>
             </a:fld>
             <a:endParaRPr lang="en-US"/>
           </a:p>
@@ -4362,7 +4362,7 @@
           <a:p>
             <a:fld id="{A3104859-06A7-4B6C-9EBE-0886FFE8171A}" type="datetimeFigureOut">
               <a:rPr lang="en-US" smtClean="0"/>
-              <a:t>5/22/2023</a:t>
+              <a:t>6/28/2023</a:t>
             </a:fld>
             <a:endParaRPr lang="en-US"/>
           </a:p>
@@ -4603,7 +4603,7 @@
           <a:p>
             <a:fld id="{A3104859-06A7-4B6C-9EBE-0886FFE8171A}" type="datetimeFigureOut">
               <a:rPr lang="en-US" smtClean="0"/>
-              <a:t>5/22/2023</a:t>
+              <a:t>6/28/2023</a:t>
             </a:fld>
             <a:endParaRPr lang="en-US"/>
           </a:p>
@@ -12654,132 +12654,42 @@
           <a:chExt cx="0" cy="0"/>
         </a:xfrm>
       </p:grpSpPr>
-      <p:grpSp>
-        <p:nvGrpSpPr>
-          <p:cNvPr id="56" name="Group 55">
-            <a:extLst>
-              <a:ext uri="{FF2B5EF4-FFF2-40B4-BE49-F238E27FC236}">
-                <a16:creationId xmlns:a16="http://schemas.microsoft.com/office/drawing/2014/main" id="{2098C48B-9276-0C34-A1E7-8B4D8B781943}"/>
-              </a:ext>
-            </a:extLst>
-          </p:cNvPr>
-          <p:cNvGrpSpPr/>
-          <p:nvPr/>
-        </p:nvGrpSpPr>
-        <p:grpSpPr>
-          <a:xfrm>
-            <a:off x="8035134" y="3776099"/>
-            <a:ext cx="822960" cy="822960"/>
-            <a:chOff x="7863634" y="4211441"/>
-            <a:chExt cx="822960" cy="822960"/>
-          </a:xfrm>
-        </p:grpSpPr>
-        <p:sp>
-          <p:nvSpPr>
-            <p:cNvPr id="54" name="Rectangle 53">
-              <a:extLst>
-                <a:ext uri="{FF2B5EF4-FFF2-40B4-BE49-F238E27FC236}">
-                  <a16:creationId xmlns:a16="http://schemas.microsoft.com/office/drawing/2014/main" id="{A2CC6F51-0EB5-EF7C-E815-79BE9EDF6380}"/>
-                </a:ext>
-              </a:extLst>
-            </p:cNvPr>
-            <p:cNvSpPr/>
-            <p:nvPr/>
-          </p:nvSpPr>
-          <p:spPr>
-            <a:xfrm>
-              <a:off x="7863634" y="4211441"/>
-              <a:ext cx="822960" cy="822960"/>
-            </a:xfrm>
-            <a:prstGeom prst="rect">
-              <a:avLst/>
-            </a:prstGeom>
-            <a:solidFill>
-              <a:schemeClr val="bg1"/>
-            </a:solidFill>
-            <a:ln>
-              <a:noFill/>
-            </a:ln>
-          </p:spPr>
-          <p:style>
-            <a:lnRef idx="2">
-              <a:schemeClr val="accent1">
-                <a:shade val="50000"/>
-              </a:schemeClr>
-            </a:lnRef>
-            <a:fillRef idx="1">
-              <a:schemeClr val="accent1"/>
-            </a:fillRef>
-            <a:effectRef idx="0">
-              <a:schemeClr val="accent1"/>
-            </a:effectRef>
-            <a:fontRef idx="minor">
-              <a:schemeClr val="lt1"/>
-            </a:fontRef>
-          </p:style>
-          <p:txBody>
-            <a:bodyPr rtlCol="0" anchor="ctr"/>
-            <a:lstStyle/>
-            <a:p>
-              <a:pPr algn="ctr"/>
-              <a:endParaRPr lang="en-US"/>
-            </a:p>
-          </p:txBody>
-        </p:sp>
-        <p:pic>
-          <p:nvPicPr>
-            <p:cNvPr id="48" name="Picture 2">
-              <a:extLst>
-                <a:ext uri="{FF2B5EF4-FFF2-40B4-BE49-F238E27FC236}">
-                  <a16:creationId xmlns:a16="http://schemas.microsoft.com/office/drawing/2014/main" id="{AD0A4B57-0FC9-6509-7EB8-F3EB36B78331}"/>
-                </a:ext>
-              </a:extLst>
-            </p:cNvPr>
-            <p:cNvPicPr>
-              <a:picLocks noChangeAspect="1" noChangeArrowheads="1"/>
-            </p:cNvPicPr>
-            <p:nvPr/>
-          </p:nvPicPr>
-          <p:blipFill>
-            <a:blip r:embed="rId2">
-              <a:extLst>
-                <a:ext uri="{28A0092B-C50C-407E-A947-70E740481C1C}">
-                  <a14:useLocalDpi xmlns:a14="http://schemas.microsoft.com/office/drawing/2010/main" val="0"/>
-                </a:ext>
-              </a:extLst>
-            </a:blip>
-            <a:srcRect/>
-            <a:stretch>
-              <a:fillRect/>
-            </a:stretch>
-          </p:blipFill>
-          <p:spPr bwMode="auto">
-            <a:xfrm>
-              <a:off x="7863634" y="4335207"/>
-              <a:ext cx="822960" cy="575429"/>
-            </a:xfrm>
-            <a:prstGeom prst="rect">
-              <a:avLst/>
-            </a:prstGeom>
-            <a:noFill/>
-            <a:extLst>
-              <a:ext uri="{909E8E84-426E-40DD-AFC4-6F175D3DCCD1}">
-                <a14:hiddenFill xmlns:a14="http://schemas.microsoft.com/office/drawing/2010/main">
-                  <a:solidFill>
-                    <a:srgbClr val="FFFFFF"/>
-                  </a:solidFill>
-                </a14:hiddenFill>
-              </a:ext>
-            </a:extLst>
-          </p:spPr>
-        </p:pic>
-      </p:grpSp>
       <p:pic>
         <p:nvPicPr>
-          <p:cNvPr id="1024" name="Graphic 7">
-            <a:extLst>
-              <a:ext uri="{FF2B5EF4-FFF2-40B4-BE49-F238E27FC236}">
-                <a16:creationId xmlns:a16="http://schemas.microsoft.com/office/drawing/2014/main" id="{4F33251F-56E6-35B2-121C-37506A1E71F8}"/>
+          <p:cNvPr id="61" name="Picture 60">
+            <a:extLst>
+              <a:ext uri="{FF2B5EF4-FFF2-40B4-BE49-F238E27FC236}">
+                <a16:creationId xmlns:a16="http://schemas.microsoft.com/office/drawing/2014/main" id="{1DB636EC-DA81-23C8-0AD7-41C63AB219BD}"/>
+              </a:ext>
+            </a:extLst>
+          </p:cNvPr>
+          <p:cNvPicPr>
+            <a:picLocks noChangeAspect="1"/>
+          </p:cNvPicPr>
+          <p:nvPr/>
+        </p:nvPicPr>
+        <p:blipFill>
+          <a:blip r:embed="rId2"/>
+          <a:stretch>
+            <a:fillRect/>
+          </a:stretch>
+        </p:blipFill>
+        <p:spPr>
+          <a:xfrm>
+            <a:off x="2855075" y="2657311"/>
+            <a:ext cx="823031" cy="823031"/>
+          </a:xfrm>
+          <a:prstGeom prst="rect">
+            <a:avLst/>
+          </a:prstGeom>
+        </p:spPr>
+      </p:pic>
+      <p:pic>
+        <p:nvPicPr>
+          <p:cNvPr id="53" name="Picture 10" descr="Workday - Apps on Google Play">
+            <a:extLst>
+              <a:ext uri="{FF2B5EF4-FFF2-40B4-BE49-F238E27FC236}">
+                <a16:creationId xmlns:a16="http://schemas.microsoft.com/office/drawing/2014/main" id="{8903D04C-6DA0-E7D0-7EDF-6AE6E6C6EF0E}"/>
               </a:ext>
             </a:extLst>
           </p:cNvPr>
@@ -12790,6 +12700,53 @@
         </p:nvPicPr>
         <p:blipFill>
           <a:blip r:embed="rId3">
+            <a:extLst>
+              <a:ext uri="{28A0092B-C50C-407E-A947-70E740481C1C}">
+                <a14:useLocalDpi xmlns:a14="http://schemas.microsoft.com/office/drawing/2010/main" val="0"/>
+              </a:ext>
+            </a:extLst>
+          </a:blip>
+          <a:srcRect/>
+          <a:stretch>
+            <a:fillRect/>
+          </a:stretch>
+        </p:blipFill>
+        <p:spPr bwMode="auto">
+          <a:xfrm>
+            <a:off x="8035133" y="3779786"/>
+            <a:ext cx="822960" cy="822960"/>
+          </a:xfrm>
+          <a:prstGeom prst="rect">
+            <a:avLst/>
+          </a:prstGeom>
+          <a:noFill/>
+          <a:extLst>
+            <a:ext uri="{909E8E84-426E-40DD-AFC4-6F175D3DCCD1}">
+              <a14:hiddenFill xmlns:a14="http://schemas.microsoft.com/office/drawing/2010/main">
+                <a:solidFill>
+                  <a:srgbClr val="FFFFFF"/>
+                </a:solidFill>
+              </a14:hiddenFill>
+            </a:ext>
+          </a:extLst>
+        </p:spPr>
+      </p:pic>
+      <p:pic>
+        <p:nvPicPr>
+          <p:cNvPr id="1024" name="Graphic 7">
+            <a:extLst>
+              <a:ext uri="{FF2B5EF4-FFF2-40B4-BE49-F238E27FC236}">
+                <a16:creationId xmlns:a16="http://schemas.microsoft.com/office/drawing/2014/main" id="{4F33251F-56E6-35B2-121C-37506A1E71F8}"/>
+              </a:ext>
+            </a:extLst>
+          </p:cNvPr>
+          <p:cNvPicPr>
+            <a:picLocks noChangeAspect="1" noChangeArrowheads="1"/>
+          </p:cNvPicPr>
+          <p:nvPr/>
+        </p:nvPicPr>
+        <p:blipFill>
+          <a:blip r:embed="rId4">
             <a:extLst>
               <a:ext uri="{28A0092B-C50C-407E-A947-70E740481C1C}">
                 <a14:useLocalDpi xmlns:a14="http://schemas.microsoft.com/office/drawing/2010/main" val="0"/>
@@ -12849,13 +12806,13 @@
           <p:nvPr/>
         </p:nvPicPr>
         <p:blipFill>
-          <a:blip r:embed="rId4">
+          <a:blip r:embed="rId5">
             <a:extLst>
               <a:ext uri="{28A0092B-C50C-407E-A947-70E740481C1C}">
                 <a14:useLocalDpi xmlns:a14="http://schemas.microsoft.com/office/drawing/2010/main" val="0"/>
               </a:ext>
               <a:ext uri="{96DAC541-7B7A-43D3-8B79-37D633B846F1}">
-                <asvg:svgBlip xmlns:asvg="http://schemas.microsoft.com/office/drawing/2016/SVG/main" r:embed="rId5"/>
+                <asvg:svgBlip xmlns:asvg="http://schemas.microsoft.com/office/drawing/2016/SVG/main" r:embed="rId6"/>
               </a:ext>
             </a:extLst>
           </a:blip>
@@ -12939,7 +12896,7 @@
           <p:nvPr/>
         </p:nvPicPr>
         <p:blipFill>
-          <a:blip r:embed="rId6">
+          <a:blip r:embed="rId7">
             <a:extLst>
               <a:ext uri="{28A0092B-C50C-407E-A947-70E740481C1C}">
                 <a14:useLocalDpi xmlns:a14="http://schemas.microsoft.com/office/drawing/2010/main" val="0"/>
@@ -12986,10 +12943,10 @@
           <p:nvPr/>
         </p:nvPicPr>
         <p:blipFill>
-          <a:blip r:embed="rId7">
+          <a:blip r:embed="rId8">
             <a:extLst>
               <a:ext uri="{96DAC541-7B7A-43D3-8B79-37D633B846F1}">
-                <asvg:svgBlip xmlns:asvg="http://schemas.microsoft.com/office/drawing/2016/SVG/main" r:embed="rId8"/>
+                <asvg:svgBlip xmlns:asvg="http://schemas.microsoft.com/office/drawing/2016/SVG/main" r:embed="rId9"/>
               </a:ext>
             </a:extLst>
           </a:blip>
@@ -13006,109 +12963,6 @@
           </a:prstGeom>
         </p:spPr>
       </p:pic>
-      <p:grpSp>
-        <p:nvGrpSpPr>
-          <p:cNvPr id="10" name="Group 9">
-            <a:extLst>
-              <a:ext uri="{FF2B5EF4-FFF2-40B4-BE49-F238E27FC236}">
-                <a16:creationId xmlns:a16="http://schemas.microsoft.com/office/drawing/2014/main" id="{7BB619AD-693A-3B9C-6D20-247888B0204F}"/>
-              </a:ext>
-            </a:extLst>
-          </p:cNvPr>
-          <p:cNvGrpSpPr/>
-          <p:nvPr/>
-        </p:nvGrpSpPr>
-        <p:grpSpPr>
-          <a:xfrm>
-            <a:off x="2855111" y="2666457"/>
-            <a:ext cx="822960" cy="822960"/>
-            <a:chOff x="7220319" y="1826836"/>
-            <a:chExt cx="996696" cy="996696"/>
-          </a:xfrm>
-        </p:grpSpPr>
-        <p:sp>
-          <p:nvSpPr>
-            <p:cNvPr id="9" name="Rectangle 8">
-              <a:extLst>
-                <a:ext uri="{FF2B5EF4-FFF2-40B4-BE49-F238E27FC236}">
-                  <a16:creationId xmlns:a16="http://schemas.microsoft.com/office/drawing/2014/main" id="{743AA06B-1021-9D58-8136-63E9F09D80F6}"/>
-                </a:ext>
-              </a:extLst>
-            </p:cNvPr>
-            <p:cNvSpPr/>
-            <p:nvPr/>
-          </p:nvSpPr>
-          <p:spPr>
-            <a:xfrm>
-              <a:off x="7220319" y="1826836"/>
-              <a:ext cx="996696" cy="996696"/>
-            </a:xfrm>
-            <a:prstGeom prst="rect">
-              <a:avLst/>
-            </a:prstGeom>
-            <a:solidFill>
-              <a:schemeClr val="bg1"/>
-            </a:solidFill>
-            <a:ln>
-              <a:noFill/>
-            </a:ln>
-          </p:spPr>
-          <p:style>
-            <a:lnRef idx="2">
-              <a:schemeClr val="accent1">
-                <a:shade val="50000"/>
-              </a:schemeClr>
-            </a:lnRef>
-            <a:fillRef idx="1">
-              <a:schemeClr val="accent1"/>
-            </a:fillRef>
-            <a:effectRef idx="0">
-              <a:schemeClr val="accent1"/>
-            </a:effectRef>
-            <a:fontRef idx="minor">
-              <a:schemeClr val="lt1"/>
-            </a:fontRef>
-          </p:style>
-          <p:txBody>
-            <a:bodyPr rtlCol="0" anchor="ctr"/>
-            <a:lstStyle/>
-            <a:p>
-              <a:pPr algn="ctr"/>
-              <a:endParaRPr lang="en-US"/>
-            </a:p>
-          </p:txBody>
-        </p:sp>
-        <p:pic>
-          <p:nvPicPr>
-            <p:cNvPr id="8" name="Picture 7">
-              <a:extLst>
-                <a:ext uri="{FF2B5EF4-FFF2-40B4-BE49-F238E27FC236}">
-                  <a16:creationId xmlns:a16="http://schemas.microsoft.com/office/drawing/2014/main" id="{521D7AAB-D2BB-6EAD-3EDF-F0812CA538DE}"/>
-                </a:ext>
-              </a:extLst>
-            </p:cNvPr>
-            <p:cNvPicPr>
-              <a:picLocks noChangeAspect="1"/>
-            </p:cNvPicPr>
-            <p:nvPr/>
-          </p:nvPicPr>
-          <p:blipFill>
-            <a:blip r:embed="rId9"/>
-            <a:stretch>
-              <a:fillRect/>
-            </a:stretch>
-          </p:blipFill>
-          <p:spPr>
-            <a:xfrm>
-              <a:off x="7220319" y="1826836"/>
-              <a:ext cx="996696" cy="996696"/>
-            </a:xfrm>
-            <a:prstGeom prst="rect">
-              <a:avLst/>
-            </a:prstGeom>
-          </p:spPr>
-        </p:pic>
-      </p:grpSp>
       <p:pic>
         <p:nvPicPr>
           <p:cNvPr id="1034" name="Picture 10" descr="Microsoft 365 (@Microsoft365) / Twitter">
@@ -13438,126 +13292,6 @@
           </a:extLst>
         </p:spPr>
       </p:pic>
-      <p:grpSp>
-        <p:nvGrpSpPr>
-          <p:cNvPr id="21" name="Group 20">
-            <a:extLst>
-              <a:ext uri="{FF2B5EF4-FFF2-40B4-BE49-F238E27FC236}">
-                <a16:creationId xmlns:a16="http://schemas.microsoft.com/office/drawing/2014/main" id="{3710CA1F-8C31-5042-8A25-C3AD5A9F72C9}"/>
-              </a:ext>
-            </a:extLst>
-          </p:cNvPr>
-          <p:cNvGrpSpPr/>
-          <p:nvPr/>
-        </p:nvGrpSpPr>
-        <p:grpSpPr>
-          <a:xfrm>
-            <a:off x="11219488" y="2666457"/>
-            <a:ext cx="822960" cy="822960"/>
-            <a:chOff x="7974302" y="4505311"/>
-            <a:chExt cx="996696" cy="996696"/>
-          </a:xfrm>
-        </p:grpSpPr>
-        <p:sp>
-          <p:nvSpPr>
-            <p:cNvPr id="20" name="Rectangle 19">
-              <a:extLst>
-                <a:ext uri="{FF2B5EF4-FFF2-40B4-BE49-F238E27FC236}">
-                  <a16:creationId xmlns:a16="http://schemas.microsoft.com/office/drawing/2014/main" id="{955587C0-591B-918F-2EFF-90D940181BF4}"/>
-                </a:ext>
-              </a:extLst>
-            </p:cNvPr>
-            <p:cNvSpPr/>
-            <p:nvPr/>
-          </p:nvSpPr>
-          <p:spPr>
-            <a:xfrm>
-              <a:off x="7974302" y="4505311"/>
-              <a:ext cx="996696" cy="996696"/>
-            </a:xfrm>
-            <a:prstGeom prst="rect">
-              <a:avLst/>
-            </a:prstGeom>
-            <a:solidFill>
-              <a:schemeClr val="bg1"/>
-            </a:solidFill>
-            <a:ln>
-              <a:noFill/>
-            </a:ln>
-          </p:spPr>
-          <p:style>
-            <a:lnRef idx="2">
-              <a:schemeClr val="accent1">
-                <a:shade val="50000"/>
-              </a:schemeClr>
-            </a:lnRef>
-            <a:fillRef idx="1">
-              <a:schemeClr val="accent1"/>
-            </a:fillRef>
-            <a:effectRef idx="0">
-              <a:schemeClr val="accent1"/>
-            </a:effectRef>
-            <a:fontRef idx="minor">
-              <a:schemeClr val="lt1"/>
-            </a:fontRef>
-          </p:style>
-          <p:txBody>
-            <a:bodyPr rtlCol="0" anchor="ctr"/>
-            <a:lstStyle/>
-            <a:p>
-              <a:pPr algn="ctr"/>
-              <a:endParaRPr lang="en-US"/>
-            </a:p>
-          </p:txBody>
-        </p:sp>
-        <p:pic>
-          <p:nvPicPr>
-            <p:cNvPr id="1042" name="Picture 18" descr="Nmap.org: /images/">
-              <a:extLst>
-                <a:ext uri="{FF2B5EF4-FFF2-40B4-BE49-F238E27FC236}">
-                  <a16:creationId xmlns:a16="http://schemas.microsoft.com/office/drawing/2014/main" id="{38EDB2A1-0556-030E-BFBC-A4AC66DC2B57}"/>
-                </a:ext>
-              </a:extLst>
-            </p:cNvPr>
-            <p:cNvPicPr>
-              <a:picLocks noChangeAspect="1" noChangeArrowheads="1"/>
-            </p:cNvPicPr>
-            <p:nvPr/>
-          </p:nvPicPr>
-          <p:blipFill>
-            <a:blip r:embed="rId13">
-              <a:extLst>
-                <a:ext uri="{28A0092B-C50C-407E-A947-70E740481C1C}">
-                  <a14:useLocalDpi xmlns:a14="http://schemas.microsoft.com/office/drawing/2010/main" val="0"/>
-                </a:ext>
-              </a:extLst>
-            </a:blip>
-            <a:srcRect/>
-            <a:stretch>
-              <a:fillRect/>
-            </a:stretch>
-          </p:blipFill>
-          <p:spPr bwMode="auto">
-            <a:xfrm>
-              <a:off x="7974302" y="4505311"/>
-              <a:ext cx="996696" cy="996696"/>
-            </a:xfrm>
-            <a:prstGeom prst="rect">
-              <a:avLst/>
-            </a:prstGeom>
-            <a:noFill/>
-            <a:extLst>
-              <a:ext uri="{909E8E84-426E-40DD-AFC4-6F175D3DCCD1}">
-                <a14:hiddenFill xmlns:a14="http://schemas.microsoft.com/office/drawing/2010/main">
-                  <a:solidFill>
-                    <a:srgbClr val="FFFFFF"/>
-                  </a:solidFill>
-                </a14:hiddenFill>
-              </a:ext>
-            </a:extLst>
-          </p:spPr>
-        </p:pic>
-      </p:grpSp>
       <p:grpSp>
         <p:nvGrpSpPr>
           <p:cNvPr id="24" name="Group 23">
@@ -13645,7 +13379,7 @@
             <p:nvPr/>
           </p:nvPicPr>
           <p:blipFill>
-            <a:blip r:embed="rId14">
+            <a:blip r:embed="rId13">
               <a:extLst>
                 <a:ext uri="{28A0092B-C50C-407E-A947-70E740481C1C}">
                   <a14:useLocalDpi xmlns:a14="http://schemas.microsoft.com/office/drawing/2010/main" val="0"/>
@@ -13999,7 +13733,7 @@
           <p:nvPr/>
         </p:nvPicPr>
         <p:blipFill>
-          <a:blip r:embed="rId15">
+          <a:blip r:embed="rId14">
             <a:extLst>
               <a:ext uri="{28A0092B-C50C-407E-A947-70E740481C1C}">
                 <a14:useLocalDpi xmlns:a14="http://schemas.microsoft.com/office/drawing/2010/main" val="0"/>
@@ -14115,7 +13849,7 @@
           <p:nvPr/>
         </p:nvPicPr>
         <p:blipFill>
-          <a:blip r:embed="rId16">
+          <a:blip r:embed="rId15">
             <a:extLst>
               <a:ext uri="{28A0092B-C50C-407E-A947-70E740481C1C}">
                 <a14:useLocalDpi xmlns:a14="http://schemas.microsoft.com/office/drawing/2010/main" val="0"/>
@@ -14339,10 +14073,10 @@
           <p:nvPr/>
         </p:nvPicPr>
         <p:blipFill>
-          <a:blip r:embed="rId17">
+          <a:blip r:embed="rId16">
             <a:extLst>
               <a:ext uri="{96DAC541-7B7A-43D3-8B79-37D633B846F1}">
-                <asvg:svgBlip xmlns:asvg="http://schemas.microsoft.com/office/drawing/2016/SVG/main" r:embed="rId18"/>
+                <asvg:svgBlip xmlns:asvg="http://schemas.microsoft.com/office/drawing/2016/SVG/main" r:embed="rId17"/>
               </a:ext>
             </a:extLst>
           </a:blip>
@@ -14573,7 +14307,7 @@
           <p:nvPr/>
         </p:nvPicPr>
         <p:blipFill>
-          <a:blip r:embed="rId19">
+          <a:blip r:embed="rId18">
             <a:extLst>
               <a:ext uri="{28A0092B-C50C-407E-A947-70E740481C1C}">
                 <a14:useLocalDpi xmlns:a14="http://schemas.microsoft.com/office/drawing/2010/main" val="0"/>
@@ -14975,7 +14709,7 @@
           <p:nvPr/>
         </p:nvPicPr>
         <p:blipFill>
-          <a:blip r:embed="rId20">
+          <a:blip r:embed="rId19">
             <a:extLst>
               <a:ext uri="{28A0092B-C50C-407E-A947-70E740481C1C}">
                 <a14:useLocalDpi xmlns:a14="http://schemas.microsoft.com/office/drawing/2010/main" val="0"/>
@@ -15199,7 +14933,7 @@
           <p:nvPr/>
         </p:nvPicPr>
         <p:blipFill>
-          <a:blip r:embed="rId21">
+          <a:blip r:embed="rId20">
             <a:extLst>
               <a:ext uri="{28A0092B-C50C-407E-A947-70E740481C1C}">
                 <a14:useLocalDpi xmlns:a14="http://schemas.microsoft.com/office/drawing/2010/main" val="0"/>
@@ -15246,7 +14980,7 @@
           <p:nvPr/>
         </p:nvPicPr>
         <p:blipFill>
-          <a:blip r:embed="rId22">
+          <a:blip r:embed="rId21">
             <a:extLst>
               <a:ext uri="{28A0092B-C50C-407E-A947-70E740481C1C}">
                 <a14:useLocalDpi xmlns:a14="http://schemas.microsoft.com/office/drawing/2010/main" val="0"/>
@@ -15260,7 +14994,7 @@
         </p:blipFill>
         <p:spPr bwMode="auto">
           <a:xfrm>
-            <a:off x="4838218" y="2666457"/>
+            <a:off x="4838218" y="2657346"/>
             <a:ext cx="822960" cy="822960"/>
           </a:xfrm>
           <a:prstGeom prst="rect">
@@ -15352,7 +15086,7 @@
           <p:nvPr/>
         </p:nvPicPr>
         <p:blipFill>
-          <a:blip r:embed="rId23">
+          <a:blip r:embed="rId22">
             <a:extLst>
               <a:ext uri="{28A0092B-C50C-407E-A947-70E740481C1C}">
                 <a14:useLocalDpi xmlns:a14="http://schemas.microsoft.com/office/drawing/2010/main" val="0"/>
@@ -15366,54 +15100,7 @@
         </p:blipFill>
         <p:spPr bwMode="auto">
           <a:xfrm>
-            <a:off x="6048273" y="2666457"/>
-            <a:ext cx="822960" cy="822960"/>
-          </a:xfrm>
-          <a:prstGeom prst="rect">
-            <a:avLst/>
-          </a:prstGeom>
-          <a:noFill/>
-          <a:extLst>
-            <a:ext uri="{909E8E84-426E-40DD-AFC4-6F175D3DCCD1}">
-              <a14:hiddenFill xmlns:a14="http://schemas.microsoft.com/office/drawing/2010/main">
-                <a:solidFill>
-                  <a:srgbClr val="FFFFFF"/>
-                </a:solidFill>
-              </a14:hiddenFill>
-            </a:ext>
-          </a:extLst>
-        </p:spPr>
-      </p:pic>
-      <p:pic>
-        <p:nvPicPr>
-          <p:cNvPr id="53" name="Picture 10" descr="Workday - Apps on Google Play">
-            <a:extLst>
-              <a:ext uri="{FF2B5EF4-FFF2-40B4-BE49-F238E27FC236}">
-                <a16:creationId xmlns:a16="http://schemas.microsoft.com/office/drawing/2014/main" id="{8903D04C-6DA0-E7D0-7EDF-6AE6E6C6EF0E}"/>
-              </a:ext>
-            </a:extLst>
-          </p:cNvPr>
-          <p:cNvPicPr>
-            <a:picLocks noChangeAspect="1" noChangeArrowheads="1"/>
-          </p:cNvPicPr>
-          <p:nvPr/>
-        </p:nvPicPr>
-        <p:blipFill>
-          <a:blip r:embed="rId24">
-            <a:extLst>
-              <a:ext uri="{28A0092B-C50C-407E-A947-70E740481C1C}">
-                <a14:useLocalDpi xmlns:a14="http://schemas.microsoft.com/office/drawing/2010/main" val="0"/>
-              </a:ext>
-            </a:extLst>
-          </a:blip>
-          <a:srcRect/>
-          <a:stretch>
-            <a:fillRect/>
-          </a:stretch>
-        </p:blipFill>
-        <p:spPr bwMode="auto">
-          <a:xfrm>
-            <a:off x="8035134" y="2666457"/>
+            <a:off x="6048273" y="2657346"/>
             <a:ext cx="822960" cy="822960"/>
           </a:xfrm>
           <a:prstGeom prst="rect">
@@ -15566,7 +15253,7 @@
           <p:nvPr/>
         </p:nvPicPr>
         <p:blipFill>
-          <a:blip r:embed="rId25">
+          <a:blip r:embed="rId23">
             <a:extLst>
               <a:ext uri="{28A0092B-C50C-407E-A947-70E740481C1C}">
                 <a14:useLocalDpi xmlns:a14="http://schemas.microsoft.com/office/drawing/2010/main" val="0"/>
@@ -15598,65 +15285,6 @@
           </a:extLst>
         </p:spPr>
       </p:pic>
-      <p:sp>
-        <p:nvSpPr>
-          <p:cNvPr id="22" name="Rectangle: Rounded Corners 21">
-            <a:extLst>
-              <a:ext uri="{FF2B5EF4-FFF2-40B4-BE49-F238E27FC236}">
-                <a16:creationId xmlns:a16="http://schemas.microsoft.com/office/drawing/2014/main" id="{9BC42681-91A3-C97D-E6CA-4B3ED1F1160A}"/>
-              </a:ext>
-            </a:extLst>
-          </p:cNvPr>
-          <p:cNvSpPr/>
-          <p:nvPr/>
-        </p:nvSpPr>
-        <p:spPr>
-          <a:xfrm>
-            <a:off x="6784476" y="2451330"/>
-            <a:ext cx="1337669" cy="388221"/>
-          </a:xfrm>
-          <a:prstGeom prst="roundRect">
-            <a:avLst/>
-          </a:prstGeom>
-          <a:solidFill>
-            <a:srgbClr val="00B0F0"/>
-          </a:solidFill>
-          <a:ln>
-            <a:noFill/>
-          </a:ln>
-        </p:spPr>
-        <p:style>
-          <a:lnRef idx="2">
-            <a:schemeClr val="accent1">
-              <a:shade val="50000"/>
-            </a:schemeClr>
-          </a:lnRef>
-          <a:fillRef idx="1">
-            <a:schemeClr val="accent1"/>
-          </a:fillRef>
-          <a:effectRef idx="0">
-            <a:schemeClr val="accent1"/>
-          </a:effectRef>
-          <a:fontRef idx="minor">
-            <a:schemeClr val="lt1"/>
-          </a:fontRef>
-        </p:style>
-        <p:txBody>
-          <a:bodyPr rtlCol="0" anchor="ctr"/>
-          <a:lstStyle/>
-          <a:p>
-            <a:pPr algn="ctr"/>
-            <a:r>
-              <a:rPr lang="en-US" sz="1600" b="1" dirty="0">
-                <a:solidFill>
-                  <a:schemeClr val="tx1"/>
-                </a:solidFill>
-              </a:rPr>
-              <a:t>COMING SOON!</a:t>
-            </a:r>
-          </a:p>
-        </p:txBody>
-      </p:sp>
       <p:pic>
         <p:nvPicPr>
           <p:cNvPr id="38" name="Picture 10" descr="Media Kit | Slack">
@@ -15672,7 +15300,7 @@
           <p:nvPr/>
         </p:nvPicPr>
         <p:blipFill>
-          <a:blip r:embed="rId26">
+          <a:blip r:embed="rId24">
             <a:extLst>
               <a:ext uri="{28A0092B-C50C-407E-A947-70E740481C1C}">
                 <a14:useLocalDpi xmlns:a14="http://schemas.microsoft.com/office/drawing/2010/main" val="0"/>
@@ -16019,7 +15647,7 @@
           <p:nvPr/>
         </p:nvPicPr>
         <p:blipFill>
-          <a:blip r:embed="rId27"/>
+          <a:blip r:embed="rId25"/>
           <a:stretch>
             <a:fillRect/>
           </a:stretch>
@@ -16049,7 +15677,7 @@
           <p:nvPr/>
         </p:nvPicPr>
         <p:blipFill>
-          <a:blip r:embed="rId28">
+          <a:blip r:embed="rId26">
             <a:extLst>
               <a:ext uri="{28A0092B-C50C-407E-A947-70E740481C1C}">
                 <a14:useLocalDpi xmlns:a14="http://schemas.microsoft.com/office/drawing/2010/main" val="0"/>
@@ -16155,7 +15783,7 @@
           <p:nvPr/>
         </p:nvPicPr>
         <p:blipFill>
-          <a:blip r:embed="rId29">
+          <a:blip r:embed="rId27">
             <a:extLst>
               <a:ext uri="{28A0092B-C50C-407E-A947-70E740481C1C}">
                 <a14:useLocalDpi xmlns:a14="http://schemas.microsoft.com/office/drawing/2010/main" val="0"/>
@@ -16352,7 +15980,7 @@
           <p:nvPr/>
         </p:nvPicPr>
         <p:blipFill>
-          <a:blip r:embed="rId30">
+          <a:blip r:embed="rId28">
             <a:extLst>
               <a:ext uri="{28A0092B-C50C-407E-A947-70E740481C1C}">
                 <a14:useLocalDpi xmlns:a14="http://schemas.microsoft.com/office/drawing/2010/main" val="0"/>
@@ -16608,14 +16236,14 @@
           <p:nvPr/>
         </p:nvPicPr>
         <p:blipFill>
-          <a:blip r:embed="rId31"/>
+          <a:blip r:embed="rId29"/>
           <a:stretch>
             <a:fillRect/>
           </a:stretch>
         </p:blipFill>
         <p:spPr>
           <a:xfrm>
-            <a:off x="9232627" y="2667785"/>
+            <a:off x="9232627" y="2657311"/>
             <a:ext cx="823031" cy="823031"/>
           </a:xfrm>
           <a:prstGeom prst="rect">
@@ -16638,7 +16266,7 @@
           <p:nvPr/>
         </p:nvPicPr>
         <p:blipFill>
-          <a:blip r:embed="rId32">
+          <a:blip r:embed="rId30">
             <a:extLst>
               <a:ext uri="{28A0092B-C50C-407E-A947-70E740481C1C}">
                 <a14:useLocalDpi xmlns:a14="http://schemas.microsoft.com/office/drawing/2010/main" val="0"/>
@@ -16713,6 +16341,125 @@
           </a:p>
         </p:txBody>
       </p:sp>
+      <p:sp>
+        <p:nvSpPr>
+          <p:cNvPr id="11" name="Rectangle: Rounded Corners 10">
+            <a:extLst>
+              <a:ext uri="{FF2B5EF4-FFF2-40B4-BE49-F238E27FC236}">
+                <a16:creationId xmlns:a16="http://schemas.microsoft.com/office/drawing/2014/main" id="{7569B3E5-F7BC-C2EC-5455-D85AC6D37D61}"/>
+              </a:ext>
+            </a:extLst>
+          </p:cNvPr>
+          <p:cNvSpPr/>
+          <p:nvPr/>
+        </p:nvSpPr>
+        <p:spPr>
+          <a:xfrm>
+            <a:off x="6530824" y="2408539"/>
+            <a:ext cx="1074420" cy="463441"/>
+          </a:xfrm>
+          <a:prstGeom prst="roundRect">
+            <a:avLst/>
+          </a:prstGeom>
+          <a:solidFill>
+            <a:srgbClr val="00B0F0"/>
+          </a:solidFill>
+          <a:ln>
+            <a:noFill/>
+          </a:ln>
+        </p:spPr>
+        <p:style>
+          <a:lnRef idx="2">
+            <a:schemeClr val="accent1">
+              <a:shade val="50000"/>
+            </a:schemeClr>
+          </a:lnRef>
+          <a:fillRef idx="1">
+            <a:schemeClr val="accent1"/>
+          </a:fillRef>
+          <a:effectRef idx="0">
+            <a:schemeClr val="accent1"/>
+          </a:effectRef>
+          <a:fontRef idx="minor">
+            <a:schemeClr val="lt1"/>
+          </a:fontRef>
+        </p:style>
+        <p:txBody>
+          <a:bodyPr rtlCol="0" anchor="ctr"/>
+          <a:lstStyle/>
+          <a:p>
+            <a:pPr algn="ctr"/>
+            <a:r>
+              <a:rPr lang="en-US" sz="1600" b="1" dirty="0">
+                <a:solidFill>
+                  <a:schemeClr val="tx1"/>
+                </a:solidFill>
+              </a:rPr>
+              <a:t>COMING SOON!</a:t>
+            </a:r>
+          </a:p>
+        </p:txBody>
+      </p:sp>
+      <p:pic>
+        <p:nvPicPr>
+          <p:cNvPr id="19" name="Picture 18">
+            <a:extLst>
+              <a:ext uri="{FF2B5EF4-FFF2-40B4-BE49-F238E27FC236}">
+                <a16:creationId xmlns:a16="http://schemas.microsoft.com/office/drawing/2014/main" id="{06423CCA-40FD-0BC1-2796-C25F2EDDFB94}"/>
+              </a:ext>
+            </a:extLst>
+          </p:cNvPr>
+          <p:cNvPicPr>
+            <a:picLocks noChangeAspect="1"/>
+          </p:cNvPicPr>
+          <p:nvPr/>
+        </p:nvPicPr>
+        <p:blipFill>
+          <a:blip r:embed="rId31"/>
+          <a:stretch>
+            <a:fillRect/>
+          </a:stretch>
+        </p:blipFill>
+        <p:spPr>
+          <a:xfrm>
+            <a:off x="8035098" y="2657311"/>
+            <a:ext cx="823031" cy="823031"/>
+          </a:xfrm>
+          <a:prstGeom prst="rect">
+            <a:avLst/>
+          </a:prstGeom>
+        </p:spPr>
+      </p:pic>
+      <p:pic>
+        <p:nvPicPr>
+          <p:cNvPr id="32" name="Picture 31">
+            <a:extLst>
+              <a:ext uri="{FF2B5EF4-FFF2-40B4-BE49-F238E27FC236}">
+                <a16:creationId xmlns:a16="http://schemas.microsoft.com/office/drawing/2014/main" id="{FBB41150-91DB-0C09-5A99-7BA31FC0C72D}"/>
+              </a:ext>
+            </a:extLst>
+          </p:cNvPr>
+          <p:cNvPicPr>
+            <a:picLocks noChangeAspect="1"/>
+          </p:cNvPicPr>
+          <p:nvPr/>
+        </p:nvPicPr>
+        <p:blipFill>
+          <a:blip r:embed="rId32"/>
+          <a:stretch>
+            <a:fillRect/>
+          </a:stretch>
+        </p:blipFill>
+        <p:spPr>
+          <a:xfrm>
+            <a:off x="11219417" y="2657275"/>
+            <a:ext cx="823031" cy="823031"/>
+          </a:xfrm>
+          <a:prstGeom prst="rect">
+            <a:avLst/>
+          </a:prstGeom>
+        </p:spPr>
+      </p:pic>
     </p:spTree>
     <p:extLst>
       <p:ext uri="{BB962C8B-B14F-4D97-AF65-F5344CB8AC3E}">

</xml_diff>

<commit_message>
roadmap & architecture update
</commit_message>
<xml_diff>
--- a/screenshots/extras/ElectricEye.pptx
+++ b/screenshots/extras/ElectricEye.pptx
@@ -1952,7 +1952,7 @@
           <a:p>
             <a:fld id="{A3104859-06A7-4B6C-9EBE-0886FFE8171A}" type="datetimeFigureOut">
               <a:rPr lang="en-US" smtClean="0"/>
-              <a:t>2/4/2024</a:t>
+              <a:t>2/19/2024</a:t>
             </a:fld>
             <a:endParaRPr lang="en-US"/>
           </a:p>
@@ -2150,7 +2150,7 @@
           <a:p>
             <a:fld id="{A3104859-06A7-4B6C-9EBE-0886FFE8171A}" type="datetimeFigureOut">
               <a:rPr lang="en-US" smtClean="0"/>
-              <a:t>2/4/2024</a:t>
+              <a:t>2/19/2024</a:t>
             </a:fld>
             <a:endParaRPr lang="en-US"/>
           </a:p>
@@ -2358,7 +2358,7 @@
           <a:p>
             <a:fld id="{A3104859-06A7-4B6C-9EBE-0886FFE8171A}" type="datetimeFigureOut">
               <a:rPr lang="en-US" smtClean="0"/>
-              <a:t>2/4/2024</a:t>
+              <a:t>2/19/2024</a:t>
             </a:fld>
             <a:endParaRPr lang="en-US"/>
           </a:p>
@@ -2556,7 +2556,7 @@
           <a:p>
             <a:fld id="{A3104859-06A7-4B6C-9EBE-0886FFE8171A}" type="datetimeFigureOut">
               <a:rPr lang="en-US" smtClean="0"/>
-              <a:t>2/4/2024</a:t>
+              <a:t>2/19/2024</a:t>
             </a:fld>
             <a:endParaRPr lang="en-US"/>
           </a:p>
@@ -2831,7 +2831,7 @@
           <a:p>
             <a:fld id="{A3104859-06A7-4B6C-9EBE-0886FFE8171A}" type="datetimeFigureOut">
               <a:rPr lang="en-US" smtClean="0"/>
-              <a:t>2/4/2024</a:t>
+              <a:t>2/19/2024</a:t>
             </a:fld>
             <a:endParaRPr lang="en-US"/>
           </a:p>
@@ -3096,7 +3096,7 @@
           <a:p>
             <a:fld id="{A3104859-06A7-4B6C-9EBE-0886FFE8171A}" type="datetimeFigureOut">
               <a:rPr lang="en-US" smtClean="0"/>
-              <a:t>2/4/2024</a:t>
+              <a:t>2/19/2024</a:t>
             </a:fld>
             <a:endParaRPr lang="en-US"/>
           </a:p>
@@ -3508,7 +3508,7 @@
           <a:p>
             <a:fld id="{A3104859-06A7-4B6C-9EBE-0886FFE8171A}" type="datetimeFigureOut">
               <a:rPr lang="en-US" smtClean="0"/>
-              <a:t>2/4/2024</a:t>
+              <a:t>2/19/2024</a:t>
             </a:fld>
             <a:endParaRPr lang="en-US"/>
           </a:p>
@@ -3649,7 +3649,7 @@
           <a:p>
             <a:fld id="{A3104859-06A7-4B6C-9EBE-0886FFE8171A}" type="datetimeFigureOut">
               <a:rPr lang="en-US" smtClean="0"/>
-              <a:t>2/4/2024</a:t>
+              <a:t>2/19/2024</a:t>
             </a:fld>
             <a:endParaRPr lang="en-US"/>
           </a:p>
@@ -3762,7 +3762,7 @@
           <a:p>
             <a:fld id="{A3104859-06A7-4B6C-9EBE-0886FFE8171A}" type="datetimeFigureOut">
               <a:rPr lang="en-US" smtClean="0"/>
-              <a:t>2/4/2024</a:t>
+              <a:t>2/19/2024</a:t>
             </a:fld>
             <a:endParaRPr lang="en-US"/>
           </a:p>
@@ -4073,7 +4073,7 @@
           <a:p>
             <a:fld id="{A3104859-06A7-4B6C-9EBE-0886FFE8171A}" type="datetimeFigureOut">
               <a:rPr lang="en-US" smtClean="0"/>
-              <a:t>2/4/2024</a:t>
+              <a:t>2/19/2024</a:t>
             </a:fld>
             <a:endParaRPr lang="en-US"/>
           </a:p>
@@ -4361,7 +4361,7 @@
           <a:p>
             <a:fld id="{A3104859-06A7-4B6C-9EBE-0886FFE8171A}" type="datetimeFigureOut">
               <a:rPr lang="en-US" smtClean="0"/>
-              <a:t>2/4/2024</a:t>
+              <a:t>2/19/2024</a:t>
             </a:fld>
             <a:endParaRPr lang="en-US"/>
           </a:p>
@@ -4602,7 +4602,7 @@
           <a:p>
             <a:fld id="{A3104859-06A7-4B6C-9EBE-0886FFE8171A}" type="datetimeFigureOut">
               <a:rPr lang="en-US" smtClean="0"/>
-              <a:t>2/4/2024</a:t>
+              <a:t>2/19/2024</a:t>
             </a:fld>
             <a:endParaRPr lang="en-US"/>
           </a:p>
@@ -5056,7 +5056,7 @@
         </p:blipFill>
         <p:spPr bwMode="auto">
           <a:xfrm>
-            <a:off x="9174174" y="4730481"/>
+            <a:off x="9174174" y="4825482"/>
             <a:ext cx="640080" cy="640080"/>
           </a:xfrm>
           <a:prstGeom prst="rect">
@@ -5281,697 +5281,383 @@
           </a:p>
         </p:txBody>
       </p:sp>
-      <p:grpSp>
-        <p:nvGrpSpPr>
-          <p:cNvPr id="1043" name="Group 1042">
-            <a:extLst>
-              <a:ext uri="{FF2B5EF4-FFF2-40B4-BE49-F238E27FC236}">
-                <a16:creationId xmlns:a16="http://schemas.microsoft.com/office/drawing/2014/main" id="{8416F0DC-252B-EB9C-AB53-428A60FF90AF}"/>
-              </a:ext>
-            </a:extLst>
-          </p:cNvPr>
-          <p:cNvGrpSpPr/>
+      <p:pic>
+        <p:nvPicPr>
+          <p:cNvPr id="29" name="Picture 28">
+            <a:extLst>
+              <a:ext uri="{FF2B5EF4-FFF2-40B4-BE49-F238E27FC236}">
+                <a16:creationId xmlns:a16="http://schemas.microsoft.com/office/drawing/2014/main" id="{B425692B-70D0-F823-3D7C-8B1169DB97DB}"/>
+              </a:ext>
+            </a:extLst>
+          </p:cNvPr>
+          <p:cNvPicPr>
+            <a:picLocks noChangeAspect="1"/>
+          </p:cNvPicPr>
           <p:nvPr/>
-        </p:nvGrpSpPr>
-        <p:grpSpPr>
+        </p:nvPicPr>
+        <p:blipFill>
+          <a:blip r:embed="rId4"/>
+          <a:stretch>
+            <a:fillRect/>
+          </a:stretch>
+        </p:blipFill>
+        <p:spPr>
           <a:xfrm>
-            <a:off x="272399" y="1165536"/>
-            <a:ext cx="2802986" cy="1792405"/>
-            <a:chOff x="271895" y="647947"/>
-            <a:chExt cx="2802986" cy="1792405"/>
+            <a:off x="225077" y="2228844"/>
+            <a:ext cx="731520" cy="731520"/>
           </a:xfrm>
-        </p:grpSpPr>
-        <p:pic>
-          <p:nvPicPr>
-            <p:cNvPr id="29" name="Picture 28">
-              <a:extLst>
-                <a:ext uri="{FF2B5EF4-FFF2-40B4-BE49-F238E27FC236}">
-                  <a16:creationId xmlns:a16="http://schemas.microsoft.com/office/drawing/2014/main" id="{B425692B-70D0-F823-3D7C-8B1169DB97DB}"/>
-                </a:ext>
-              </a:extLst>
-            </p:cNvPr>
-            <p:cNvPicPr>
-              <a:picLocks noChangeAspect="1"/>
-            </p:cNvPicPr>
-            <p:nvPr/>
-          </p:nvPicPr>
-          <p:blipFill>
-            <a:blip r:embed="rId4"/>
-            <a:stretch>
-              <a:fillRect/>
-            </a:stretch>
-          </p:blipFill>
-          <p:spPr>
-            <a:xfrm>
-              <a:off x="271895" y="1708832"/>
-              <a:ext cx="731520" cy="731520"/>
-            </a:xfrm>
-            <a:prstGeom prst="rect">
-              <a:avLst/>
-            </a:prstGeom>
-          </p:spPr>
-        </p:pic>
-        <p:pic>
-          <p:nvPicPr>
-            <p:cNvPr id="30" name="Graphic 7">
-              <a:extLst>
-                <a:ext uri="{FF2B5EF4-FFF2-40B4-BE49-F238E27FC236}">
-                  <a16:creationId xmlns:a16="http://schemas.microsoft.com/office/drawing/2014/main" id="{447C94FA-9445-6D14-FBFF-E8502A23A99D}"/>
-                </a:ext>
-              </a:extLst>
-            </p:cNvPr>
-            <p:cNvPicPr>
-              <a:picLocks noChangeAspect="1" noChangeArrowheads="1"/>
-            </p:cNvPicPr>
-            <p:nvPr/>
-          </p:nvPicPr>
-          <p:blipFill>
-            <a:blip r:embed="rId5">
-              <a:extLst>
-                <a:ext uri="{28A0092B-C50C-407E-A947-70E740481C1C}">
-                  <a14:useLocalDpi xmlns:a14="http://schemas.microsoft.com/office/drawing/2010/main" val="0"/>
-                </a:ext>
-              </a:extLst>
-            </a:blip>
-            <a:srcRect/>
-            <a:stretch>
-              <a:fillRect/>
-            </a:stretch>
-          </p:blipFill>
-          <p:spPr bwMode="auto">
-            <a:xfrm>
-              <a:off x="1308766" y="1708832"/>
-              <a:ext cx="731520" cy="731520"/>
-            </a:xfrm>
-            <a:prstGeom prst="rect">
-              <a:avLst/>
-            </a:prstGeom>
-            <a:noFill/>
-            <a:ln>
-              <a:noFill/>
-            </a:ln>
-            <a:extLst>
-              <a:ext uri="{909E8E84-426E-40DD-AFC4-6F175D3DCCD1}">
-                <a14:hiddenFill xmlns:a14="http://schemas.microsoft.com/office/drawing/2010/main">
-                  <a:solidFill>
-                    <a:srgbClr val="FFFFFF"/>
-                  </a:solidFill>
-                </a14:hiddenFill>
-              </a:ext>
-              <a:ext uri="{91240B29-F687-4F45-9708-019B960494DF}">
-                <a14:hiddenLine xmlns:a14="http://schemas.microsoft.com/office/drawing/2010/main" w="9525">
-                  <a:solidFill>
-                    <a:srgbClr val="000000"/>
-                  </a:solidFill>
-                  <a:miter lim="800000"/>
-                  <a:headEnd/>
-                  <a:tailEnd/>
-                </a14:hiddenLine>
-              </a:ext>
-            </a:extLst>
-          </p:spPr>
-        </p:pic>
-        <p:pic>
-          <p:nvPicPr>
-            <p:cNvPr id="33" name="Picture 4" descr="Google-Cloud-Platform-GCP-logo - Databerry">
-              <a:extLst>
-                <a:ext uri="{FF2B5EF4-FFF2-40B4-BE49-F238E27FC236}">
-                  <a16:creationId xmlns:a16="http://schemas.microsoft.com/office/drawing/2014/main" id="{57259873-45A6-3880-40F0-A990FE6E4717}"/>
-                </a:ext>
-              </a:extLst>
-            </p:cNvPr>
-            <p:cNvPicPr>
-              <a:picLocks noChangeAspect="1" noChangeArrowheads="1"/>
-            </p:cNvPicPr>
-            <p:nvPr/>
-          </p:nvPicPr>
-          <p:blipFill>
-            <a:blip r:embed="rId6">
-              <a:extLst>
-                <a:ext uri="{28A0092B-C50C-407E-A947-70E740481C1C}">
-                  <a14:useLocalDpi xmlns:a14="http://schemas.microsoft.com/office/drawing/2010/main" val="0"/>
-                </a:ext>
-              </a:extLst>
-            </a:blip>
-            <a:srcRect/>
-            <a:stretch>
-              <a:fillRect/>
-            </a:stretch>
-          </p:blipFill>
-          <p:spPr bwMode="auto">
-            <a:xfrm>
-              <a:off x="1308766" y="647947"/>
-              <a:ext cx="731520" cy="731520"/>
-            </a:xfrm>
-            <a:prstGeom prst="rect">
-              <a:avLst/>
-            </a:prstGeom>
-            <a:noFill/>
-            <a:extLst>
-              <a:ext uri="{909E8E84-426E-40DD-AFC4-6F175D3DCCD1}">
-                <a14:hiddenFill xmlns:a14="http://schemas.microsoft.com/office/drawing/2010/main">
-                  <a:solidFill>
-                    <a:srgbClr val="FFFFFF"/>
-                  </a:solidFill>
-                </a14:hiddenFill>
-              </a:ext>
-            </a:extLst>
-          </p:spPr>
-        </p:pic>
-        <p:pic>
-          <p:nvPicPr>
-            <p:cNvPr id="34" name="Graphic 33">
-              <a:extLst>
-                <a:ext uri="{FF2B5EF4-FFF2-40B4-BE49-F238E27FC236}">
-                  <a16:creationId xmlns:a16="http://schemas.microsoft.com/office/drawing/2014/main" id="{1475B9AD-B6B5-B008-70F0-5B0476647342}"/>
-                </a:ext>
-              </a:extLst>
-            </p:cNvPr>
-            <p:cNvPicPr>
-              <a:picLocks noChangeAspect="1"/>
-            </p:cNvPicPr>
-            <p:nvPr/>
-          </p:nvPicPr>
-          <p:blipFill>
-            <a:blip r:embed="rId7">
-              <a:extLst>
-                <a:ext uri="{96DAC541-7B7A-43D3-8B79-37D633B846F1}">
-                  <asvg:svgBlip xmlns:asvg="http://schemas.microsoft.com/office/drawing/2016/SVG/main" r:embed="rId8"/>
-                </a:ext>
-              </a:extLst>
-            </a:blip>
-            <a:srcRect/>
-            <a:stretch/>
-          </p:blipFill>
-          <p:spPr>
-            <a:xfrm>
-              <a:off x="271895" y="647947"/>
-              <a:ext cx="731520" cy="731520"/>
-            </a:xfrm>
-            <a:prstGeom prst="rect">
-              <a:avLst/>
-            </a:prstGeom>
-          </p:spPr>
-        </p:pic>
-        <p:pic>
-          <p:nvPicPr>
-            <p:cNvPr id="48" name="Picture 4" descr="Oracle Cloud Infrastructure - YouTube">
-              <a:extLst>
-                <a:ext uri="{FF2B5EF4-FFF2-40B4-BE49-F238E27FC236}">
-                  <a16:creationId xmlns:a16="http://schemas.microsoft.com/office/drawing/2014/main" id="{CD954503-7D94-AC77-DF1A-67B05EC0F7CF}"/>
-                </a:ext>
-              </a:extLst>
-            </p:cNvPr>
-            <p:cNvPicPr>
-              <a:picLocks noChangeAspect="1" noChangeArrowheads="1"/>
-            </p:cNvPicPr>
-            <p:nvPr/>
-          </p:nvPicPr>
-          <p:blipFill>
-            <a:blip r:embed="rId9">
-              <a:extLst>
-                <a:ext uri="{28A0092B-C50C-407E-A947-70E740481C1C}">
-                  <a14:useLocalDpi xmlns:a14="http://schemas.microsoft.com/office/drawing/2010/main" val="0"/>
-                </a:ext>
-              </a:extLst>
-            </a:blip>
-            <a:srcRect/>
-            <a:stretch>
-              <a:fillRect/>
-            </a:stretch>
-          </p:blipFill>
-          <p:spPr bwMode="auto">
-            <a:xfrm>
-              <a:off x="2343361" y="647947"/>
-              <a:ext cx="731520" cy="731520"/>
-            </a:xfrm>
-            <a:prstGeom prst="rect">
-              <a:avLst/>
-            </a:prstGeom>
-            <a:noFill/>
-            <a:extLst>
-              <a:ext uri="{909E8E84-426E-40DD-AFC4-6F175D3DCCD1}">
-                <a14:hiddenFill xmlns:a14="http://schemas.microsoft.com/office/drawing/2010/main">
-                  <a:solidFill>
-                    <a:srgbClr val="FFFFFF"/>
-                  </a:solidFill>
-                </a14:hiddenFill>
-              </a:ext>
-            </a:extLst>
-          </p:spPr>
-        </p:pic>
-        <p:pic>
-          <p:nvPicPr>
-            <p:cNvPr id="54" name="Picture 6" descr="Alibaba Cloud (@alibaba_cloud) / Twitter">
-              <a:extLst>
-                <a:ext uri="{FF2B5EF4-FFF2-40B4-BE49-F238E27FC236}">
-                  <a16:creationId xmlns:a16="http://schemas.microsoft.com/office/drawing/2014/main" id="{3FD8E1A6-E926-7D42-9F21-08E1E54125C1}"/>
-                </a:ext>
-              </a:extLst>
-            </p:cNvPr>
-            <p:cNvPicPr>
-              <a:picLocks noChangeAspect="1" noChangeArrowheads="1"/>
-            </p:cNvPicPr>
-            <p:nvPr/>
-          </p:nvPicPr>
-          <p:blipFill>
-            <a:blip r:embed="rId10">
-              <a:extLst>
-                <a:ext uri="{28A0092B-C50C-407E-A947-70E740481C1C}">
-                  <a14:useLocalDpi xmlns:a14="http://schemas.microsoft.com/office/drawing/2010/main" val="0"/>
-                </a:ext>
-              </a:extLst>
-            </a:blip>
-            <a:srcRect/>
-            <a:stretch>
-              <a:fillRect/>
-            </a:stretch>
-          </p:blipFill>
-          <p:spPr bwMode="auto">
-            <a:xfrm>
-              <a:off x="2343361" y="1708832"/>
-              <a:ext cx="731520" cy="731520"/>
-            </a:xfrm>
-            <a:prstGeom prst="rect">
-              <a:avLst/>
-            </a:prstGeom>
-            <a:noFill/>
-            <a:extLst>
-              <a:ext uri="{909E8E84-426E-40DD-AFC4-6F175D3DCCD1}">
-                <a14:hiddenFill xmlns:a14="http://schemas.microsoft.com/office/drawing/2010/main">
-                  <a:solidFill>
-                    <a:srgbClr val="FFFFFF"/>
-                  </a:solidFill>
-                </a14:hiddenFill>
-              </a:ext>
-            </a:extLst>
-          </p:spPr>
-        </p:pic>
-        <p:sp>
-          <p:nvSpPr>
-            <p:cNvPr id="56" name="Rectangle: Rounded Corners 55">
-              <a:extLst>
-                <a:ext uri="{FF2B5EF4-FFF2-40B4-BE49-F238E27FC236}">
-                  <a16:creationId xmlns:a16="http://schemas.microsoft.com/office/drawing/2014/main" id="{366F32A8-288E-03A2-9825-5676C4A85980}"/>
-                </a:ext>
-              </a:extLst>
-            </p:cNvPr>
-            <p:cNvSpPr/>
-            <p:nvPr/>
-          </p:nvSpPr>
-          <p:spPr>
-            <a:xfrm>
-              <a:off x="485732" y="1497177"/>
-              <a:ext cx="2377588" cy="301143"/>
-            </a:xfrm>
-            <a:prstGeom prst="roundRect">
-              <a:avLst/>
-            </a:prstGeom>
-            <a:solidFill>
-              <a:srgbClr val="00B0F0"/>
-            </a:solidFill>
-            <a:ln>
-              <a:noFill/>
-            </a:ln>
-          </p:spPr>
-          <p:style>
-            <a:lnRef idx="2">
-              <a:schemeClr val="accent1">
-                <a:shade val="50000"/>
-              </a:schemeClr>
-            </a:lnRef>
-            <a:fillRef idx="1">
-              <a:schemeClr val="accent1"/>
-            </a:fillRef>
-            <a:effectRef idx="0">
-              <a:schemeClr val="accent1"/>
-            </a:effectRef>
-            <a:fontRef idx="minor">
-              <a:schemeClr val="lt1"/>
-            </a:fontRef>
-          </p:style>
-          <p:txBody>
-            <a:bodyPr rtlCol="0" anchor="ctr"/>
-            <a:lstStyle/>
-            <a:p>
-              <a:pPr algn="ctr"/>
-              <a:r>
-                <a:rPr lang="en-US" sz="1600" b="1" dirty="0">
-                  <a:solidFill>
-                    <a:schemeClr val="tx1"/>
-                  </a:solidFill>
-                </a:rPr>
-                <a:t>COMING SOON!</a:t>
-              </a:r>
-            </a:p>
-          </p:txBody>
-        </p:sp>
-      </p:grpSp>
-      <p:grpSp>
-        <p:nvGrpSpPr>
-          <p:cNvPr id="1045" name="Group 1044">
-            <a:extLst>
-              <a:ext uri="{FF2B5EF4-FFF2-40B4-BE49-F238E27FC236}">
-                <a16:creationId xmlns:a16="http://schemas.microsoft.com/office/drawing/2014/main" id="{F19D731D-582C-9366-A0E3-B092F704F8E0}"/>
-              </a:ext>
-            </a:extLst>
-          </p:cNvPr>
-          <p:cNvGrpSpPr/>
+          <a:prstGeom prst="rect">
+            <a:avLst/>
+          </a:prstGeom>
+        </p:spPr>
+      </p:pic>
+      <p:pic>
+        <p:nvPicPr>
+          <p:cNvPr id="33" name="Picture 4" descr="Google-Cloud-Platform-GCP-logo - Databerry">
+            <a:extLst>
+              <a:ext uri="{FF2B5EF4-FFF2-40B4-BE49-F238E27FC236}">
+                <a16:creationId xmlns:a16="http://schemas.microsoft.com/office/drawing/2014/main" id="{57259873-45A6-3880-40F0-A990FE6E4717}"/>
+              </a:ext>
+            </a:extLst>
+          </p:cNvPr>
+          <p:cNvPicPr>
+            <a:picLocks noChangeAspect="1" noChangeArrowheads="1"/>
+          </p:cNvPicPr>
           <p:nvPr/>
-        </p:nvGrpSpPr>
-        <p:grpSpPr>
+        </p:nvPicPr>
+        <p:blipFill>
+          <a:blip r:embed="rId5">
+            <a:extLst>
+              <a:ext uri="{28A0092B-C50C-407E-A947-70E740481C1C}">
+                <a14:useLocalDpi xmlns:a14="http://schemas.microsoft.com/office/drawing/2010/main" val="0"/>
+              </a:ext>
+            </a:extLst>
+          </a:blip>
+          <a:srcRect/>
+          <a:stretch>
+            <a:fillRect/>
+          </a:stretch>
+        </p:blipFill>
+        <p:spPr bwMode="auto">
           <a:xfrm>
-            <a:off x="253533" y="4148956"/>
-            <a:ext cx="2840718" cy="1792915"/>
-            <a:chOff x="271895" y="3063239"/>
-            <a:chExt cx="2840718" cy="1792915"/>
+            <a:off x="1284471" y="1165536"/>
+            <a:ext cx="731520" cy="731520"/>
           </a:xfrm>
-        </p:grpSpPr>
-        <p:pic>
-          <p:nvPicPr>
-            <p:cNvPr id="1025" name="Picture 10" descr="Workday - Apps on Google Play">
-              <a:extLst>
-                <a:ext uri="{FF2B5EF4-FFF2-40B4-BE49-F238E27FC236}">
-                  <a16:creationId xmlns:a16="http://schemas.microsoft.com/office/drawing/2014/main" id="{839A29C1-D1AB-9002-CCBE-A7AED472F578}"/>
-                </a:ext>
-              </a:extLst>
-            </p:cNvPr>
-            <p:cNvPicPr>
-              <a:picLocks noChangeAspect="1" noChangeArrowheads="1"/>
-            </p:cNvPicPr>
-            <p:nvPr/>
-          </p:nvPicPr>
-          <p:blipFill>
-            <a:blip r:embed="rId11">
-              <a:extLst>
-                <a:ext uri="{28A0092B-C50C-407E-A947-70E740481C1C}">
-                  <a14:useLocalDpi xmlns:a14="http://schemas.microsoft.com/office/drawing/2010/main" val="0"/>
-                </a:ext>
-              </a:extLst>
-            </a:blip>
-            <a:srcRect/>
-            <a:stretch>
-              <a:fillRect/>
-            </a:stretch>
-          </p:blipFill>
-          <p:spPr bwMode="auto">
-            <a:xfrm>
-              <a:off x="1310213" y="4124634"/>
-              <a:ext cx="731520" cy="731520"/>
-            </a:xfrm>
-            <a:prstGeom prst="rect">
-              <a:avLst/>
-            </a:prstGeom>
-            <a:noFill/>
-            <a:extLst>
-              <a:ext uri="{909E8E84-426E-40DD-AFC4-6F175D3DCCD1}">
-                <a14:hiddenFill xmlns:a14="http://schemas.microsoft.com/office/drawing/2010/main">
-                  <a:solidFill>
-                    <a:srgbClr val="FFFFFF"/>
-                  </a:solidFill>
-                </a14:hiddenFill>
-              </a:ext>
-            </a:extLst>
-          </p:spPr>
-        </p:pic>
-        <p:pic>
-          <p:nvPicPr>
-            <p:cNvPr id="1035" name="Picture 10" descr="Microsoft 365 (@Microsoft365) / Twitter">
-              <a:extLst>
-                <a:ext uri="{FF2B5EF4-FFF2-40B4-BE49-F238E27FC236}">
-                  <a16:creationId xmlns:a16="http://schemas.microsoft.com/office/drawing/2014/main" id="{C0848C12-29F2-DE6D-B11F-7A850839755C}"/>
-                </a:ext>
-              </a:extLst>
-            </p:cNvPr>
-            <p:cNvPicPr>
-              <a:picLocks noChangeAspect="1" noChangeArrowheads="1"/>
-            </p:cNvPicPr>
-            <p:nvPr/>
-          </p:nvPicPr>
-          <p:blipFill>
-            <a:blip r:embed="rId12">
-              <a:extLst>
-                <a:ext uri="{28A0092B-C50C-407E-A947-70E740481C1C}">
-                  <a14:useLocalDpi xmlns:a14="http://schemas.microsoft.com/office/drawing/2010/main" val="0"/>
-                </a:ext>
-              </a:extLst>
-            </a:blip>
-            <a:srcRect/>
-            <a:stretch>
-              <a:fillRect/>
-            </a:stretch>
-          </p:blipFill>
-          <p:spPr bwMode="auto">
-            <a:xfrm>
-              <a:off x="1308766" y="3063239"/>
-              <a:ext cx="731520" cy="731520"/>
-            </a:xfrm>
-            <a:prstGeom prst="rect">
-              <a:avLst/>
-            </a:prstGeom>
-            <a:noFill/>
-            <a:extLst>
-              <a:ext uri="{909E8E84-426E-40DD-AFC4-6F175D3DCCD1}">
-                <a14:hiddenFill xmlns:a14="http://schemas.microsoft.com/office/drawing/2010/main">
-                  <a:solidFill>
-                    <a:srgbClr val="FFFFFF"/>
-                  </a:solidFill>
-                </a14:hiddenFill>
-              </a:ext>
-            </a:extLst>
-          </p:spPr>
-        </p:pic>
-        <p:pic>
-          <p:nvPicPr>
-            <p:cNvPr id="1037" name="Picture 12" descr="GitHub Logos and Usage · GitHub">
-              <a:extLst>
-                <a:ext uri="{FF2B5EF4-FFF2-40B4-BE49-F238E27FC236}">
-                  <a16:creationId xmlns:a16="http://schemas.microsoft.com/office/drawing/2014/main" id="{166583F7-3E81-72E2-2CD2-D2C83CC747FF}"/>
-                </a:ext>
-              </a:extLst>
-            </p:cNvPr>
-            <p:cNvPicPr>
-              <a:picLocks noChangeAspect="1" noChangeArrowheads="1"/>
-            </p:cNvPicPr>
-            <p:nvPr/>
-          </p:nvPicPr>
-          <p:blipFill>
-            <a:blip r:embed="rId13">
-              <a:extLst>
-                <a:ext uri="{28A0092B-C50C-407E-A947-70E740481C1C}">
-                  <a14:useLocalDpi xmlns:a14="http://schemas.microsoft.com/office/drawing/2010/main" val="0"/>
-                </a:ext>
-              </a:extLst>
-            </a:blip>
-            <a:srcRect/>
-            <a:stretch>
-              <a:fillRect/>
-            </a:stretch>
-          </p:blipFill>
-          <p:spPr bwMode="auto">
-            <a:xfrm>
-              <a:off x="271895" y="4124124"/>
-              <a:ext cx="731520" cy="731520"/>
-            </a:xfrm>
-            <a:prstGeom prst="rect">
-              <a:avLst/>
-            </a:prstGeom>
-            <a:noFill/>
-            <a:extLst>
-              <a:ext uri="{909E8E84-426E-40DD-AFC4-6F175D3DCCD1}">
-                <a14:hiddenFill xmlns:a14="http://schemas.microsoft.com/office/drawing/2010/main">
-                  <a:solidFill>
-                    <a:srgbClr val="FFFFFF"/>
-                  </a:solidFill>
-                </a14:hiddenFill>
-              </a:ext>
-            </a:extLst>
-          </p:spPr>
-        </p:pic>
-        <p:pic>
-          <p:nvPicPr>
-            <p:cNvPr id="1038" name="Picture 20">
-              <a:extLst>
-                <a:ext uri="{FF2B5EF4-FFF2-40B4-BE49-F238E27FC236}">
-                  <a16:creationId xmlns:a16="http://schemas.microsoft.com/office/drawing/2014/main" id="{2D551EF3-FF47-0A98-A7E8-4A047FA4EBB5}"/>
-                </a:ext>
-              </a:extLst>
-            </p:cNvPr>
-            <p:cNvPicPr>
-              <a:picLocks noChangeAspect="1" noChangeArrowheads="1"/>
-            </p:cNvPicPr>
-            <p:nvPr/>
-          </p:nvPicPr>
-          <p:blipFill>
-            <a:blip r:embed="rId14">
-              <a:extLst>
-                <a:ext uri="{28A0092B-C50C-407E-A947-70E740481C1C}">
-                  <a14:useLocalDpi xmlns:a14="http://schemas.microsoft.com/office/drawing/2010/main" val="0"/>
-                </a:ext>
-              </a:extLst>
-            </a:blip>
-            <a:srcRect/>
-            <a:stretch>
-              <a:fillRect/>
-            </a:stretch>
-          </p:blipFill>
-          <p:spPr bwMode="auto">
-            <a:xfrm>
-              <a:off x="271895" y="3063240"/>
-              <a:ext cx="731520" cy="731520"/>
-            </a:xfrm>
-            <a:prstGeom prst="rect">
-              <a:avLst/>
-            </a:prstGeom>
-            <a:noFill/>
-            <a:extLst>
-              <a:ext uri="{909E8E84-426E-40DD-AFC4-6F175D3DCCD1}">
-                <a14:hiddenFill xmlns:a14="http://schemas.microsoft.com/office/drawing/2010/main">
-                  <a:solidFill>
-                    <a:srgbClr val="FFFFFF"/>
-                  </a:solidFill>
-                </a14:hiddenFill>
-              </a:ext>
-            </a:extLst>
-          </p:spPr>
-        </p:pic>
-        <p:pic>
-          <p:nvPicPr>
-            <p:cNvPr id="1039" name="Picture 6" descr="Google Workspace | Business Apps &amp; Collaboration Tools">
-              <a:extLst>
-                <a:ext uri="{FF2B5EF4-FFF2-40B4-BE49-F238E27FC236}">
-                  <a16:creationId xmlns:a16="http://schemas.microsoft.com/office/drawing/2014/main" id="{860F17F4-9905-9ED8-E12C-4C79E98C8F68}"/>
-                </a:ext>
-              </a:extLst>
-            </p:cNvPr>
-            <p:cNvPicPr>
-              <a:picLocks noChangeAspect="1" noChangeArrowheads="1"/>
-            </p:cNvPicPr>
-            <p:nvPr/>
-          </p:nvPicPr>
-          <p:blipFill>
-            <a:blip r:embed="rId15">
-              <a:extLst>
-                <a:ext uri="{28A0092B-C50C-407E-A947-70E740481C1C}">
-                  <a14:useLocalDpi xmlns:a14="http://schemas.microsoft.com/office/drawing/2010/main" val="0"/>
-                </a:ext>
-              </a:extLst>
-            </a:blip>
-            <a:srcRect/>
-            <a:stretch>
-              <a:fillRect/>
-            </a:stretch>
-          </p:blipFill>
-          <p:spPr bwMode="auto">
-            <a:xfrm>
-              <a:off x="2381093" y="4122345"/>
-              <a:ext cx="731520" cy="731520"/>
-            </a:xfrm>
-            <a:prstGeom prst="rect">
-              <a:avLst/>
-            </a:prstGeom>
-            <a:noFill/>
-            <a:extLst>
-              <a:ext uri="{909E8E84-426E-40DD-AFC4-6F175D3DCCD1}">
-                <a14:hiddenFill xmlns:a14="http://schemas.microsoft.com/office/drawing/2010/main">
-                  <a:solidFill>
-                    <a:srgbClr val="FFFFFF"/>
-                  </a:solidFill>
-                </a14:hiddenFill>
-              </a:ext>
-            </a:extLst>
-          </p:spPr>
-        </p:pic>
-        <p:pic>
-          <p:nvPicPr>
-            <p:cNvPr id="1041" name="Picture 1040">
-              <a:extLst>
-                <a:ext uri="{FF2B5EF4-FFF2-40B4-BE49-F238E27FC236}">
-                  <a16:creationId xmlns:a16="http://schemas.microsoft.com/office/drawing/2014/main" id="{B91AD20E-A2B6-32C3-08EC-08EA70C387EA}"/>
-                </a:ext>
-              </a:extLst>
-            </p:cNvPr>
-            <p:cNvPicPr>
-              <a:picLocks noChangeAspect="1"/>
-            </p:cNvPicPr>
-            <p:nvPr/>
-          </p:nvPicPr>
-          <p:blipFill>
-            <a:blip r:embed="rId16"/>
-            <a:stretch>
-              <a:fillRect/>
-            </a:stretch>
-          </p:blipFill>
-          <p:spPr>
-            <a:xfrm>
-              <a:off x="2381093" y="3063239"/>
-              <a:ext cx="731520" cy="731520"/>
-            </a:xfrm>
-            <a:prstGeom prst="rect">
-              <a:avLst/>
-            </a:prstGeom>
-          </p:spPr>
-        </p:pic>
-        <p:sp>
-          <p:nvSpPr>
-            <p:cNvPr id="1042" name="Rectangle: Rounded Corners 1041">
-              <a:extLst>
-                <a:ext uri="{FF2B5EF4-FFF2-40B4-BE49-F238E27FC236}">
-                  <a16:creationId xmlns:a16="http://schemas.microsoft.com/office/drawing/2014/main" id="{3D5590D3-9399-7316-9E47-047495866DEF}"/>
-                </a:ext>
-              </a:extLst>
-            </p:cNvPr>
-            <p:cNvSpPr/>
-            <p:nvPr/>
-          </p:nvSpPr>
-          <p:spPr>
-            <a:xfrm>
-              <a:off x="345167" y="3911378"/>
-              <a:ext cx="1590733" cy="301143"/>
-            </a:xfrm>
-            <a:prstGeom prst="roundRect">
-              <a:avLst/>
-            </a:prstGeom>
-            <a:solidFill>
-              <a:srgbClr val="00B0F0"/>
-            </a:solidFill>
-            <a:ln>
-              <a:noFill/>
-            </a:ln>
-          </p:spPr>
-          <p:style>
-            <a:lnRef idx="2">
-              <a:schemeClr val="accent1">
-                <a:shade val="50000"/>
-              </a:schemeClr>
-            </a:lnRef>
-            <a:fillRef idx="1">
-              <a:schemeClr val="accent1"/>
-            </a:fillRef>
-            <a:effectRef idx="0">
-              <a:schemeClr val="accent1"/>
-            </a:effectRef>
-            <a:fontRef idx="minor">
-              <a:schemeClr val="lt1"/>
-            </a:fontRef>
-          </p:style>
-          <p:txBody>
-            <a:bodyPr rtlCol="0" anchor="ctr"/>
-            <a:lstStyle/>
-            <a:p>
-              <a:pPr algn="ctr"/>
-              <a:r>
-                <a:rPr lang="en-US" sz="1600" b="1" dirty="0">
-                  <a:solidFill>
-                    <a:schemeClr val="tx1"/>
-                  </a:solidFill>
-                </a:rPr>
-                <a:t>COMING SOON!</a:t>
-              </a:r>
-            </a:p>
-          </p:txBody>
-        </p:sp>
-      </p:grpSp>
+          <a:prstGeom prst="rect">
+            <a:avLst/>
+          </a:prstGeom>
+          <a:noFill/>
+          <a:extLst>
+            <a:ext uri="{909E8E84-426E-40DD-AFC4-6F175D3DCCD1}">
+              <a14:hiddenFill xmlns:a14="http://schemas.microsoft.com/office/drawing/2010/main">
+                <a:solidFill>
+                  <a:srgbClr val="FFFFFF"/>
+                </a:solidFill>
+              </a14:hiddenFill>
+            </a:ext>
+          </a:extLst>
+        </p:spPr>
+      </p:pic>
+      <p:pic>
+        <p:nvPicPr>
+          <p:cNvPr id="34" name="Graphic 33">
+            <a:extLst>
+              <a:ext uri="{FF2B5EF4-FFF2-40B4-BE49-F238E27FC236}">
+                <a16:creationId xmlns:a16="http://schemas.microsoft.com/office/drawing/2014/main" id="{1475B9AD-B6B5-B008-70F0-5B0476647342}"/>
+              </a:ext>
+            </a:extLst>
+          </p:cNvPr>
+          <p:cNvPicPr>
+            <a:picLocks noChangeAspect="1"/>
+          </p:cNvPicPr>
+          <p:nvPr/>
+        </p:nvPicPr>
+        <p:blipFill>
+          <a:blip r:embed="rId6">
+            <a:extLst>
+              <a:ext uri="{96DAC541-7B7A-43D3-8B79-37D633B846F1}">
+                <asvg:svgBlip xmlns:asvg="http://schemas.microsoft.com/office/drawing/2016/SVG/main" r:embed="rId7"/>
+              </a:ext>
+            </a:extLst>
+          </a:blip>
+          <a:srcRect/>
+          <a:stretch/>
+        </p:blipFill>
+        <p:spPr>
+          <a:xfrm>
+            <a:off x="225077" y="1165536"/>
+            <a:ext cx="731520" cy="731520"/>
+          </a:xfrm>
+          <a:prstGeom prst="rect">
+            <a:avLst/>
+          </a:prstGeom>
+        </p:spPr>
+      </p:pic>
+      <p:pic>
+        <p:nvPicPr>
+          <p:cNvPr id="48" name="Picture 4" descr="Oracle Cloud Infrastructure - YouTube">
+            <a:extLst>
+              <a:ext uri="{FF2B5EF4-FFF2-40B4-BE49-F238E27FC236}">
+                <a16:creationId xmlns:a16="http://schemas.microsoft.com/office/drawing/2014/main" id="{CD954503-7D94-AC77-DF1A-67B05EC0F7CF}"/>
+              </a:ext>
+            </a:extLst>
+          </p:cNvPr>
+          <p:cNvPicPr>
+            <a:picLocks noChangeAspect="1" noChangeArrowheads="1"/>
+          </p:cNvPicPr>
+          <p:nvPr/>
+        </p:nvPicPr>
+        <p:blipFill>
+          <a:blip r:embed="rId8">
+            <a:extLst>
+              <a:ext uri="{28A0092B-C50C-407E-A947-70E740481C1C}">
+                <a14:useLocalDpi xmlns:a14="http://schemas.microsoft.com/office/drawing/2010/main" val="0"/>
+              </a:ext>
+            </a:extLst>
+          </a:blip>
+          <a:srcRect/>
+          <a:stretch>
+            <a:fillRect/>
+          </a:stretch>
+        </p:blipFill>
+        <p:spPr bwMode="auto">
+          <a:xfrm>
+            <a:off x="2343865" y="1165536"/>
+            <a:ext cx="731520" cy="731520"/>
+          </a:xfrm>
+          <a:prstGeom prst="rect">
+            <a:avLst/>
+          </a:prstGeom>
+          <a:noFill/>
+          <a:extLst>
+            <a:ext uri="{909E8E84-426E-40DD-AFC4-6F175D3DCCD1}">
+              <a14:hiddenFill xmlns:a14="http://schemas.microsoft.com/office/drawing/2010/main">
+                <a:solidFill>
+                  <a:srgbClr val="FFFFFF"/>
+                </a:solidFill>
+              </a14:hiddenFill>
+            </a:ext>
+          </a:extLst>
+        </p:spPr>
+      </p:pic>
+      <p:pic>
+        <p:nvPicPr>
+          <p:cNvPr id="54" name="Picture 6" descr="Alibaba Cloud (@alibaba_cloud) / Twitter">
+            <a:extLst>
+              <a:ext uri="{FF2B5EF4-FFF2-40B4-BE49-F238E27FC236}">
+                <a16:creationId xmlns:a16="http://schemas.microsoft.com/office/drawing/2014/main" id="{3FD8E1A6-E926-7D42-9F21-08E1E54125C1}"/>
+              </a:ext>
+            </a:extLst>
+          </p:cNvPr>
+          <p:cNvPicPr>
+            <a:picLocks noChangeAspect="1" noChangeArrowheads="1"/>
+          </p:cNvPicPr>
+          <p:nvPr/>
+        </p:nvPicPr>
+        <p:blipFill>
+          <a:blip r:embed="rId9">
+            <a:extLst>
+              <a:ext uri="{28A0092B-C50C-407E-A947-70E740481C1C}">
+                <a14:useLocalDpi xmlns:a14="http://schemas.microsoft.com/office/drawing/2010/main" val="0"/>
+              </a:ext>
+            </a:extLst>
+          </a:blip>
+          <a:srcRect/>
+          <a:stretch>
+            <a:fillRect/>
+          </a:stretch>
+        </p:blipFill>
+        <p:spPr bwMode="auto">
+          <a:xfrm>
+            <a:off x="1289213" y="2228844"/>
+            <a:ext cx="731520" cy="731520"/>
+          </a:xfrm>
+          <a:prstGeom prst="rect">
+            <a:avLst/>
+          </a:prstGeom>
+          <a:noFill/>
+          <a:extLst>
+            <a:ext uri="{909E8E84-426E-40DD-AFC4-6F175D3DCCD1}">
+              <a14:hiddenFill xmlns:a14="http://schemas.microsoft.com/office/drawing/2010/main">
+                <a:solidFill>
+                  <a:srgbClr val="FFFFFF"/>
+                </a:solidFill>
+              </a14:hiddenFill>
+            </a:ext>
+          </a:extLst>
+        </p:spPr>
+      </p:pic>
+      <p:pic>
+        <p:nvPicPr>
+          <p:cNvPr id="1035" name="Picture 10" descr="Microsoft 365 (@Microsoft365) / Twitter">
+            <a:extLst>
+              <a:ext uri="{FF2B5EF4-FFF2-40B4-BE49-F238E27FC236}">
+                <a16:creationId xmlns:a16="http://schemas.microsoft.com/office/drawing/2014/main" id="{C0848C12-29F2-DE6D-B11F-7A850839755C}"/>
+              </a:ext>
+            </a:extLst>
+          </p:cNvPr>
+          <p:cNvPicPr>
+            <a:picLocks noChangeAspect="1" noChangeArrowheads="1"/>
+          </p:cNvPicPr>
+          <p:nvPr/>
+        </p:nvPicPr>
+        <p:blipFill>
+          <a:blip r:embed="rId10">
+            <a:extLst>
+              <a:ext uri="{28A0092B-C50C-407E-A947-70E740481C1C}">
+                <a14:useLocalDpi xmlns:a14="http://schemas.microsoft.com/office/drawing/2010/main" val="0"/>
+              </a:ext>
+            </a:extLst>
+          </a:blip>
+          <a:srcRect/>
+          <a:stretch>
+            <a:fillRect/>
+          </a:stretch>
+        </p:blipFill>
+        <p:spPr bwMode="auto">
+          <a:xfrm>
+            <a:off x="1293904" y="4148956"/>
+            <a:ext cx="731520" cy="731520"/>
+          </a:xfrm>
+          <a:prstGeom prst="rect">
+            <a:avLst/>
+          </a:prstGeom>
+          <a:noFill/>
+          <a:extLst>
+            <a:ext uri="{909E8E84-426E-40DD-AFC4-6F175D3DCCD1}">
+              <a14:hiddenFill xmlns:a14="http://schemas.microsoft.com/office/drawing/2010/main">
+                <a:solidFill>
+                  <a:srgbClr val="FFFFFF"/>
+                </a:solidFill>
+              </a14:hiddenFill>
+            </a:ext>
+          </a:extLst>
+        </p:spPr>
+      </p:pic>
+      <p:pic>
+        <p:nvPicPr>
+          <p:cNvPr id="1038" name="Picture 20">
+            <a:extLst>
+              <a:ext uri="{FF2B5EF4-FFF2-40B4-BE49-F238E27FC236}">
+                <a16:creationId xmlns:a16="http://schemas.microsoft.com/office/drawing/2014/main" id="{2D551EF3-FF47-0A98-A7E8-4A047FA4EBB5}"/>
+              </a:ext>
+            </a:extLst>
+          </p:cNvPr>
+          <p:cNvPicPr>
+            <a:picLocks noChangeAspect="1" noChangeArrowheads="1"/>
+          </p:cNvPicPr>
+          <p:nvPr/>
+        </p:nvPicPr>
+        <p:blipFill>
+          <a:blip r:embed="rId11">
+            <a:extLst>
+              <a:ext uri="{28A0092B-C50C-407E-A947-70E740481C1C}">
+                <a14:useLocalDpi xmlns:a14="http://schemas.microsoft.com/office/drawing/2010/main" val="0"/>
+              </a:ext>
+            </a:extLst>
+          </a:blip>
+          <a:srcRect/>
+          <a:stretch>
+            <a:fillRect/>
+          </a:stretch>
+        </p:blipFill>
+        <p:spPr bwMode="auto">
+          <a:xfrm>
+            <a:off x="225077" y="4148956"/>
+            <a:ext cx="731520" cy="731520"/>
+          </a:xfrm>
+          <a:prstGeom prst="rect">
+            <a:avLst/>
+          </a:prstGeom>
+          <a:noFill/>
+          <a:extLst>
+            <a:ext uri="{909E8E84-426E-40DD-AFC4-6F175D3DCCD1}">
+              <a14:hiddenFill xmlns:a14="http://schemas.microsoft.com/office/drawing/2010/main">
+                <a:solidFill>
+                  <a:srgbClr val="FFFFFF"/>
+                </a:solidFill>
+              </a14:hiddenFill>
+            </a:ext>
+          </a:extLst>
+        </p:spPr>
+      </p:pic>
+      <p:pic>
+        <p:nvPicPr>
+          <p:cNvPr id="1039" name="Picture 6" descr="Google Workspace | Business Apps &amp; Collaboration Tools">
+            <a:extLst>
+              <a:ext uri="{FF2B5EF4-FFF2-40B4-BE49-F238E27FC236}">
+                <a16:creationId xmlns:a16="http://schemas.microsoft.com/office/drawing/2014/main" id="{860F17F4-9905-9ED8-E12C-4C79E98C8F68}"/>
+              </a:ext>
+            </a:extLst>
+          </p:cNvPr>
+          <p:cNvPicPr>
+            <a:picLocks noChangeAspect="1" noChangeArrowheads="1"/>
+          </p:cNvPicPr>
+          <p:nvPr/>
+        </p:nvPicPr>
+        <p:blipFill>
+          <a:blip r:embed="rId12">
+            <a:extLst>
+              <a:ext uri="{28A0092B-C50C-407E-A947-70E740481C1C}">
+                <a14:useLocalDpi xmlns:a14="http://schemas.microsoft.com/office/drawing/2010/main" val="0"/>
+              </a:ext>
+            </a:extLst>
+          </a:blip>
+          <a:srcRect/>
+          <a:stretch>
+            <a:fillRect/>
+          </a:stretch>
+        </p:blipFill>
+        <p:spPr bwMode="auto">
+          <a:xfrm>
+            <a:off x="225077" y="5208062"/>
+            <a:ext cx="731520" cy="731520"/>
+          </a:xfrm>
+          <a:prstGeom prst="rect">
+            <a:avLst/>
+          </a:prstGeom>
+          <a:noFill/>
+          <a:extLst>
+            <a:ext uri="{909E8E84-426E-40DD-AFC4-6F175D3DCCD1}">
+              <a14:hiddenFill xmlns:a14="http://schemas.microsoft.com/office/drawing/2010/main">
+                <a:solidFill>
+                  <a:srgbClr val="FFFFFF"/>
+                </a:solidFill>
+              </a14:hiddenFill>
+            </a:ext>
+          </a:extLst>
+        </p:spPr>
+      </p:pic>
+      <p:pic>
+        <p:nvPicPr>
+          <p:cNvPr id="1041" name="Picture 1040">
+            <a:extLst>
+              <a:ext uri="{FF2B5EF4-FFF2-40B4-BE49-F238E27FC236}">
+                <a16:creationId xmlns:a16="http://schemas.microsoft.com/office/drawing/2014/main" id="{B91AD20E-A2B6-32C3-08EC-08EA70C387EA}"/>
+              </a:ext>
+            </a:extLst>
+          </p:cNvPr>
+          <p:cNvPicPr>
+            <a:picLocks noChangeAspect="1"/>
+          </p:cNvPicPr>
+          <p:nvPr/>
+        </p:nvPicPr>
+        <p:blipFill>
+          <a:blip r:embed="rId13"/>
+          <a:stretch>
+            <a:fillRect/>
+          </a:stretch>
+        </p:blipFill>
+        <p:spPr>
+          <a:xfrm>
+            <a:off x="2362731" y="4148956"/>
+            <a:ext cx="731520" cy="731520"/>
+          </a:xfrm>
+          <a:prstGeom prst="rect">
+            <a:avLst/>
+          </a:prstGeom>
+        </p:spPr>
+      </p:pic>
       <p:sp>
         <p:nvSpPr>
           <p:cNvPr id="1046" name="Rectangle: Rounded Corners 1045">
@@ -6111,7 +5797,7 @@
           <p:nvPr/>
         </p:nvPicPr>
         <p:blipFill>
-          <a:blip r:embed="rId17">
+          <a:blip r:embed="rId14">
             <a:extLst>
               <a:ext uri="{28A0092B-C50C-407E-A947-70E740481C1C}">
                 <a14:useLocalDpi xmlns:a14="http://schemas.microsoft.com/office/drawing/2010/main" val="0"/>
@@ -6163,7 +5849,7 @@
           <p:nvPr/>
         </p:nvPicPr>
         <p:blipFill>
-          <a:blip r:embed="rId18">
+          <a:blip r:embed="rId15">
             <a:extLst>
               <a:ext uri="{28A0092B-C50C-407E-A947-70E740481C1C}">
                 <a14:useLocalDpi xmlns:a14="http://schemas.microsoft.com/office/drawing/2010/main" val="0"/>
@@ -6210,7 +5896,7 @@
           <p:nvPr/>
         </p:nvPicPr>
         <p:blipFill>
-          <a:blip r:embed="rId19"/>
+          <a:blip r:embed="rId16"/>
           <a:stretch>
             <a:fillRect/>
           </a:stretch>
@@ -6240,7 +5926,7 @@
           <p:nvPr/>
         </p:nvPicPr>
         <p:blipFill>
-          <a:blip r:embed="rId20"/>
+          <a:blip r:embed="rId17"/>
           <a:stretch>
             <a:fillRect/>
           </a:stretch>
@@ -6270,7 +5956,7 @@
           <p:nvPr/>
         </p:nvPicPr>
         <p:blipFill>
-          <a:blip r:embed="rId21"/>
+          <a:blip r:embed="rId18"/>
           <a:stretch>
             <a:fillRect/>
           </a:stretch>
@@ -6300,7 +5986,7 @@
           <p:nvPr/>
         </p:nvPicPr>
         <p:blipFill>
-          <a:blip r:embed="rId22">
+          <a:blip r:embed="rId19">
             <a:extLst>
               <a:ext uri="{28A0092B-C50C-407E-A947-70E740481C1C}">
                 <a14:useLocalDpi xmlns:a14="http://schemas.microsoft.com/office/drawing/2010/main" val="0"/>
@@ -6590,7 +6276,7 @@
           <p:nvPr/>
         </p:nvPicPr>
         <p:blipFill>
-          <a:blip r:embed="rId23">
+          <a:blip r:embed="rId20">
             <a:extLst>
               <a:ext uri="{28A0092B-C50C-407E-A947-70E740481C1C}">
                 <a14:useLocalDpi xmlns:a14="http://schemas.microsoft.com/office/drawing/2010/main" val="0"/>
@@ -6604,7 +6290,7 @@
         </p:blipFill>
         <p:spPr bwMode="auto">
           <a:xfrm>
-            <a:off x="11350658" y="3461459"/>
+            <a:off x="11350658" y="2325525"/>
             <a:ext cx="640080" cy="640080"/>
           </a:xfrm>
           <a:prstGeom prst="rect">
@@ -6651,7 +6337,7 @@
         </p:nvSpPr>
         <p:spPr bwMode="auto">
           <a:xfrm>
-            <a:off x="11105880" y="4099743"/>
+            <a:off x="11105880" y="2977526"/>
             <a:ext cx="1129637" cy="523220"/>
           </a:xfrm>
           <a:prstGeom prst="rect">
@@ -6814,10 +6500,10 @@
           <p:nvPr/>
         </p:nvPicPr>
         <p:blipFill>
-          <a:blip r:embed="rId24">
+          <a:blip r:embed="rId21">
             <a:extLst>
               <a:ext uri="{96DAC541-7B7A-43D3-8B79-37D633B846F1}">
-                <asvg:svgBlip xmlns:asvg="http://schemas.microsoft.com/office/drawing/2016/SVG/main" r:embed="rId25"/>
+                <asvg:svgBlip xmlns:asvg="http://schemas.microsoft.com/office/drawing/2016/SVG/main" r:embed="rId22"/>
               </a:ext>
             </a:extLst>
           </a:blip>
@@ -6826,7 +6512,7 @@
         </p:blipFill>
         <p:spPr bwMode="auto">
           <a:xfrm>
-            <a:off x="9174174" y="1167156"/>
+            <a:off x="9174174" y="1178374"/>
             <a:ext cx="640080" cy="640080"/>
           </a:xfrm>
           <a:prstGeom prst="rect">
@@ -6873,8 +6559,8 @@
         </p:nvSpPr>
         <p:spPr bwMode="auto">
           <a:xfrm>
-            <a:off x="8864077" y="1814106"/>
-            <a:ext cx="1260275" cy="307777"/>
+            <a:off x="8864077" y="1818764"/>
+            <a:ext cx="1260275" cy="523220"/>
           </a:xfrm>
           <a:prstGeom prst="rect">
             <a:avLst/>
@@ -7015,7 +6701,7 @@
                 <a:latin typeface="+mj-lt"/>
                 <a:cs typeface="Arial" panose="020B0604020202020204" pitchFamily="34" charset="0"/>
               </a:rPr>
-              <a:t>JSON (x3)</a:t>
+              <a:t>JSON, CSV, HTML</a:t>
             </a:r>
           </a:p>
         </p:txBody>
@@ -7035,7 +6721,7 @@
           <p:nvPr/>
         </p:nvPicPr>
         <p:blipFill>
-          <a:blip r:embed="rId26">
+          <a:blip r:embed="rId23">
             <a:extLst>
               <a:ext uri="{28A0092B-C50C-407E-A947-70E740481C1C}">
                 <a14:useLocalDpi xmlns:a14="http://schemas.microsoft.com/office/drawing/2010/main" val="0"/>
@@ -7049,7 +6735,7 @@
         </p:blipFill>
         <p:spPr bwMode="auto">
           <a:xfrm>
-            <a:off x="10292286" y="3461459"/>
+            <a:off x="10292286" y="2325525"/>
             <a:ext cx="640080" cy="640080"/>
           </a:xfrm>
           <a:prstGeom prst="rect">
@@ -7096,7 +6782,7 @@
         </p:nvSpPr>
         <p:spPr bwMode="auto">
           <a:xfrm>
-            <a:off x="10008756" y="4099743"/>
+            <a:off x="10008756" y="2977526"/>
             <a:ext cx="1207140" cy="523220"/>
           </a:xfrm>
           <a:prstGeom prst="rect">
@@ -7260,7 +6946,7 @@
         </p:nvSpPr>
         <p:spPr bwMode="auto">
           <a:xfrm>
-            <a:off x="8952552" y="2923167"/>
+            <a:off x="8952552" y="2977526"/>
             <a:ext cx="1083324" cy="307777"/>
           </a:xfrm>
           <a:prstGeom prst="rect">
@@ -7423,7 +7109,7 @@
           <p:nvPr/>
         </p:nvPicPr>
         <p:blipFill>
-          <a:blip r:embed="rId27">
+          <a:blip r:embed="rId24">
             <a:extLst>
               <a:ext uri="{28A0092B-C50C-407E-A947-70E740481C1C}">
                 <a14:useLocalDpi xmlns:a14="http://schemas.microsoft.com/office/drawing/2010/main" val="0"/>
@@ -7437,7 +7123,7 @@
         </p:blipFill>
         <p:spPr bwMode="auto">
           <a:xfrm>
-            <a:off x="9174174" y="2305871"/>
+            <a:off x="9174174" y="2325525"/>
             <a:ext cx="640080" cy="640080"/>
           </a:xfrm>
           <a:prstGeom prst="rect">
@@ -7484,7 +7170,7 @@
         </p:nvSpPr>
         <p:spPr bwMode="auto">
           <a:xfrm>
-            <a:off x="10005435" y="5395662"/>
+            <a:off x="10005435" y="4267507"/>
             <a:ext cx="1213783" cy="523220"/>
           </a:xfrm>
           <a:prstGeom prst="rect">
@@ -7658,7 +7344,7 @@
           <p:nvPr/>
         </p:nvPicPr>
         <p:blipFill>
-          <a:blip r:embed="rId28">
+          <a:blip r:embed="rId25">
             <a:extLst>
               <a:ext uri="{28A0092B-C50C-407E-A947-70E740481C1C}">
                 <a14:useLocalDpi xmlns:a14="http://schemas.microsoft.com/office/drawing/2010/main" val="0"/>
@@ -7672,7 +7358,7 @@
         </p:blipFill>
         <p:spPr bwMode="auto">
           <a:xfrm>
-            <a:off x="10292286" y="4730481"/>
+            <a:off x="10292286" y="3603148"/>
             <a:ext cx="640080" cy="640080"/>
           </a:xfrm>
           <a:prstGeom prst="rect">
@@ -7705,7 +7391,7 @@
           <p:nvPr/>
         </p:nvPicPr>
         <p:blipFill>
-          <a:blip r:embed="rId29">
+          <a:blip r:embed="rId26">
             <a:extLst>
               <a:ext uri="{28A0092B-C50C-407E-A947-70E740481C1C}">
                 <a14:useLocalDpi xmlns:a14="http://schemas.microsoft.com/office/drawing/2010/main" val="0"/>
@@ -7719,7 +7405,7 @@
         </p:blipFill>
         <p:spPr bwMode="auto">
           <a:xfrm>
-            <a:off x="11350658" y="4730481"/>
+            <a:off x="11350658" y="3603148"/>
             <a:ext cx="640080" cy="640080"/>
           </a:xfrm>
           <a:prstGeom prst="rect">
@@ -7753,7 +7439,7 @@
         </p:nvSpPr>
         <p:spPr bwMode="auto">
           <a:xfrm>
-            <a:off x="11236693" y="5395662"/>
+            <a:off x="11236693" y="4267507"/>
             <a:ext cx="868010" cy="307777"/>
           </a:xfrm>
           <a:prstGeom prst="rect">
@@ -7915,7 +7601,7 @@
           <p:nvPr/>
         </p:nvPicPr>
         <p:blipFill>
-          <a:blip r:embed="rId30">
+          <a:blip r:embed="rId27">
             <a:extLst>
               <a:ext uri="{28A0092B-C50C-407E-A947-70E740481C1C}">
                 <a14:useLocalDpi xmlns:a14="http://schemas.microsoft.com/office/drawing/2010/main" val="0"/>
@@ -7929,7 +7615,7 @@
         </p:blipFill>
         <p:spPr bwMode="auto">
           <a:xfrm>
-            <a:off x="11350658" y="2305871"/>
+            <a:off x="11350658" y="1178374"/>
             <a:ext cx="640080" cy="640080"/>
           </a:xfrm>
           <a:prstGeom prst="rect">
@@ -7976,7 +7662,7 @@
         </p:nvSpPr>
         <p:spPr bwMode="auto">
           <a:xfrm>
-            <a:off x="11233823" y="2923167"/>
+            <a:off x="11233823" y="1818764"/>
             <a:ext cx="873751" cy="523220"/>
           </a:xfrm>
           <a:prstGeom prst="rect">
@@ -8113,7 +7799,7 @@
         </p:nvSpPr>
         <p:spPr bwMode="auto">
           <a:xfrm>
-            <a:off x="8962453" y="5373482"/>
+            <a:off x="8962453" y="5468483"/>
             <a:ext cx="1063522" cy="523220"/>
           </a:xfrm>
           <a:prstGeom prst="rect">
@@ -8230,448 +7916,6 @@
             <a:r>
               <a:rPr lang="en-US" altLang="en-US" dirty="0"/>
               <a:t>AWS Kinesis Firehose</a:t>
-            </a:r>
-          </a:p>
-        </p:txBody>
-      </p:sp>
-      <p:pic>
-        <p:nvPicPr>
-          <p:cNvPr id="1096" name="Graphic 16">
-            <a:extLst>
-              <a:ext uri="{FF2B5EF4-FFF2-40B4-BE49-F238E27FC236}">
-                <a16:creationId xmlns:a16="http://schemas.microsoft.com/office/drawing/2014/main" id="{C57CB79A-DAFB-ECE1-0436-DAA569DBFCE5}"/>
-              </a:ext>
-            </a:extLst>
-          </p:cNvPr>
-          <p:cNvPicPr>
-            <a:picLocks noChangeAspect="1" noChangeArrowheads="1"/>
-          </p:cNvPicPr>
-          <p:nvPr/>
-        </p:nvPicPr>
-        <p:blipFill>
-          <a:blip r:embed="rId24">
-            <a:extLst>
-              <a:ext uri="{96DAC541-7B7A-43D3-8B79-37D633B846F1}">
-                <asvg:svgBlip xmlns:asvg="http://schemas.microsoft.com/office/drawing/2016/SVG/main" r:embed="rId25"/>
-              </a:ext>
-            </a:extLst>
-          </a:blip>
-          <a:srcRect/>
-          <a:stretch/>
-        </p:blipFill>
-        <p:spPr bwMode="auto">
-          <a:xfrm>
-            <a:off x="10292286" y="1167156"/>
-            <a:ext cx="640080" cy="640080"/>
-          </a:xfrm>
-          <a:prstGeom prst="rect">
-            <a:avLst/>
-          </a:prstGeom>
-          <a:noFill/>
-          <a:ln>
-            <a:noFill/>
-          </a:ln>
-          <a:extLst>
-            <a:ext uri="{909E8E84-426E-40DD-AFC4-6F175D3DCCD1}">
-              <a14:hiddenFill xmlns:a14="http://schemas.microsoft.com/office/drawing/2010/main">
-                <a:solidFill>
-                  <a:srgbClr val="FFFFFF"/>
-                </a:solidFill>
-              </a14:hiddenFill>
-            </a:ext>
-            <a:ext uri="{91240B29-F687-4F45-9708-019B960494DF}">
-              <a14:hiddenLine xmlns:a14="http://schemas.microsoft.com/office/drawing/2010/main" w="9525">
-                <a:solidFill>
-                  <a:srgbClr val="000000"/>
-                </a:solidFill>
-                <a:miter lim="800000"/>
-                <a:headEnd/>
-                <a:tailEnd/>
-              </a14:hiddenLine>
-            </a:ext>
-          </a:extLst>
-        </p:spPr>
-      </p:pic>
-      <p:sp>
-        <p:nvSpPr>
-          <p:cNvPr id="1097" name="TextBox 33">
-            <a:extLst>
-              <a:ext uri="{FF2B5EF4-FFF2-40B4-BE49-F238E27FC236}">
-                <a16:creationId xmlns:a16="http://schemas.microsoft.com/office/drawing/2014/main" id="{46B0A287-0BF4-CEFA-23E7-51181129F8BD}"/>
-              </a:ext>
-            </a:extLst>
-          </p:cNvPr>
-          <p:cNvSpPr txBox="1">
-            <a:spLocks noChangeArrowheads="1"/>
-          </p:cNvSpPr>
-          <p:nvPr/>
-        </p:nvSpPr>
-        <p:spPr bwMode="auto">
-          <a:xfrm>
-            <a:off x="9982189" y="1814106"/>
-            <a:ext cx="1260275" cy="307777"/>
-          </a:xfrm>
-          <a:prstGeom prst="rect">
-            <a:avLst/>
-          </a:prstGeom>
-          <a:noFill/>
-          <a:ln>
-            <a:noFill/>
-          </a:ln>
-          <a:extLst>
-            <a:ext uri="{909E8E84-426E-40DD-AFC4-6F175D3DCCD1}">
-              <a14:hiddenFill xmlns:a14="http://schemas.microsoft.com/office/drawing/2010/main">
-                <a:solidFill>
-                  <a:srgbClr val="FFFFFF"/>
-                </a:solidFill>
-              </a14:hiddenFill>
-            </a:ext>
-            <a:ext uri="{91240B29-F687-4F45-9708-019B960494DF}">
-              <a14:hiddenLine xmlns:a14="http://schemas.microsoft.com/office/drawing/2010/main" w="9525">
-                <a:solidFill>
-                  <a:srgbClr val="000000"/>
-                </a:solidFill>
-                <a:miter lim="800000"/>
-                <a:headEnd/>
-                <a:tailEnd/>
-              </a14:hiddenLine>
-            </a:ext>
-          </a:extLst>
-        </p:spPr>
-        <p:txBody>
-          <a:bodyPr wrap="square">
-            <a:spAutoFit/>
-          </a:bodyPr>
-          <a:lstStyle>
-            <a:lvl1pPr>
-              <a:defRPr>
-                <a:solidFill>
-                  <a:schemeClr val="tx1"/>
-                </a:solidFill>
-                <a:latin typeface="Calibri" panose="020F0502020204030204" pitchFamily="34" charset="0"/>
-              </a:defRPr>
-            </a:lvl1pPr>
-            <a:lvl2pPr marL="742950" indent="-285750">
-              <a:defRPr>
-                <a:solidFill>
-                  <a:schemeClr val="tx1"/>
-                </a:solidFill>
-                <a:latin typeface="Calibri" panose="020F0502020204030204" pitchFamily="34" charset="0"/>
-              </a:defRPr>
-            </a:lvl2pPr>
-            <a:lvl3pPr marL="1143000" indent="-228600">
-              <a:defRPr>
-                <a:solidFill>
-                  <a:schemeClr val="tx1"/>
-                </a:solidFill>
-                <a:latin typeface="Calibri" panose="020F0502020204030204" pitchFamily="34" charset="0"/>
-              </a:defRPr>
-            </a:lvl3pPr>
-            <a:lvl4pPr marL="1600200" indent="-228600">
-              <a:defRPr>
-                <a:solidFill>
-                  <a:schemeClr val="tx1"/>
-                </a:solidFill>
-                <a:latin typeface="Calibri" panose="020F0502020204030204" pitchFamily="34" charset="0"/>
-              </a:defRPr>
-            </a:lvl4pPr>
-            <a:lvl5pPr marL="2057400" indent="-228600">
-              <a:defRPr>
-                <a:solidFill>
-                  <a:schemeClr val="tx1"/>
-                </a:solidFill>
-                <a:latin typeface="Calibri" panose="020F0502020204030204" pitchFamily="34" charset="0"/>
-              </a:defRPr>
-            </a:lvl5pPr>
-            <a:lvl6pPr marL="2514600" indent="-228600" eaLnBrk="0" fontAlgn="base" hangingPunct="0">
-              <a:spcBef>
-                <a:spcPct val="0"/>
-              </a:spcBef>
-              <a:spcAft>
-                <a:spcPct val="0"/>
-              </a:spcAft>
-              <a:defRPr>
-                <a:solidFill>
-                  <a:schemeClr val="tx1"/>
-                </a:solidFill>
-                <a:latin typeface="Calibri" panose="020F0502020204030204" pitchFamily="34" charset="0"/>
-              </a:defRPr>
-            </a:lvl6pPr>
-            <a:lvl7pPr marL="2971800" indent="-228600" eaLnBrk="0" fontAlgn="base" hangingPunct="0">
-              <a:spcBef>
-                <a:spcPct val="0"/>
-              </a:spcBef>
-              <a:spcAft>
-                <a:spcPct val="0"/>
-              </a:spcAft>
-              <a:defRPr>
-                <a:solidFill>
-                  <a:schemeClr val="tx1"/>
-                </a:solidFill>
-                <a:latin typeface="Calibri" panose="020F0502020204030204" pitchFamily="34" charset="0"/>
-              </a:defRPr>
-            </a:lvl7pPr>
-            <a:lvl8pPr marL="3429000" indent="-228600" eaLnBrk="0" fontAlgn="base" hangingPunct="0">
-              <a:spcBef>
-                <a:spcPct val="0"/>
-              </a:spcBef>
-              <a:spcAft>
-                <a:spcPct val="0"/>
-              </a:spcAft>
-              <a:defRPr>
-                <a:solidFill>
-                  <a:schemeClr val="tx1"/>
-                </a:solidFill>
-                <a:latin typeface="Calibri" panose="020F0502020204030204" pitchFamily="34" charset="0"/>
-              </a:defRPr>
-            </a:lvl8pPr>
-            <a:lvl9pPr marL="3886200" indent="-228600" eaLnBrk="0" fontAlgn="base" hangingPunct="0">
-              <a:spcBef>
-                <a:spcPct val="0"/>
-              </a:spcBef>
-              <a:spcAft>
-                <a:spcPct val="0"/>
-              </a:spcAft>
-              <a:defRPr>
-                <a:solidFill>
-                  <a:schemeClr val="tx1"/>
-                </a:solidFill>
-                <a:latin typeface="Calibri" panose="020F0502020204030204" pitchFamily="34" charset="0"/>
-              </a:defRPr>
-            </a:lvl9pPr>
-          </a:lstStyle>
-          <a:p>
-            <a:pPr algn="ctr" eaLnBrk="1" hangingPunct="1"/>
-            <a:r>
-              <a:rPr lang="en-US" altLang="en-US" sz="1400" b="1" dirty="0">
-                <a:solidFill>
-                  <a:schemeClr val="bg1"/>
-                </a:solidFill>
-                <a:latin typeface="+mj-lt"/>
-                <a:cs typeface="Arial" panose="020B0604020202020204" pitchFamily="34" charset="0"/>
-              </a:rPr>
-              <a:t>CSV</a:t>
-            </a:r>
-          </a:p>
-        </p:txBody>
-      </p:sp>
-      <p:pic>
-        <p:nvPicPr>
-          <p:cNvPr id="1098" name="Graphic 16">
-            <a:extLst>
-              <a:ext uri="{FF2B5EF4-FFF2-40B4-BE49-F238E27FC236}">
-                <a16:creationId xmlns:a16="http://schemas.microsoft.com/office/drawing/2014/main" id="{5ADCCC43-C8DE-0EBD-8134-42C63EFAC4C0}"/>
-              </a:ext>
-            </a:extLst>
-          </p:cNvPr>
-          <p:cNvPicPr>
-            <a:picLocks noChangeAspect="1" noChangeArrowheads="1"/>
-          </p:cNvPicPr>
-          <p:nvPr/>
-        </p:nvPicPr>
-        <p:blipFill>
-          <a:blip r:embed="rId24">
-            <a:extLst>
-              <a:ext uri="{96DAC541-7B7A-43D3-8B79-37D633B846F1}">
-                <asvg:svgBlip xmlns:asvg="http://schemas.microsoft.com/office/drawing/2016/SVG/main" r:embed="rId25"/>
-              </a:ext>
-            </a:extLst>
-          </a:blip>
-          <a:srcRect/>
-          <a:stretch/>
-        </p:blipFill>
-        <p:spPr bwMode="auto">
-          <a:xfrm>
-            <a:off x="11350658" y="1167156"/>
-            <a:ext cx="640080" cy="640080"/>
-          </a:xfrm>
-          <a:prstGeom prst="rect">
-            <a:avLst/>
-          </a:prstGeom>
-          <a:noFill/>
-          <a:ln>
-            <a:noFill/>
-          </a:ln>
-          <a:extLst>
-            <a:ext uri="{909E8E84-426E-40DD-AFC4-6F175D3DCCD1}">
-              <a14:hiddenFill xmlns:a14="http://schemas.microsoft.com/office/drawing/2010/main">
-                <a:solidFill>
-                  <a:srgbClr val="FFFFFF"/>
-                </a:solidFill>
-              </a14:hiddenFill>
-            </a:ext>
-            <a:ext uri="{91240B29-F687-4F45-9708-019B960494DF}">
-              <a14:hiddenLine xmlns:a14="http://schemas.microsoft.com/office/drawing/2010/main" w="9525">
-                <a:solidFill>
-                  <a:srgbClr val="000000"/>
-                </a:solidFill>
-                <a:miter lim="800000"/>
-                <a:headEnd/>
-                <a:tailEnd/>
-              </a14:hiddenLine>
-            </a:ext>
-          </a:extLst>
-        </p:spPr>
-      </p:pic>
-      <p:sp>
-        <p:nvSpPr>
-          <p:cNvPr id="1099" name="TextBox 33">
-            <a:extLst>
-              <a:ext uri="{FF2B5EF4-FFF2-40B4-BE49-F238E27FC236}">
-                <a16:creationId xmlns:a16="http://schemas.microsoft.com/office/drawing/2014/main" id="{09C173D0-B6E7-4F25-0F2F-C9D0A396110C}"/>
-              </a:ext>
-            </a:extLst>
-          </p:cNvPr>
-          <p:cNvSpPr txBox="1">
-            <a:spLocks noChangeArrowheads="1"/>
-          </p:cNvSpPr>
-          <p:nvPr/>
-        </p:nvSpPr>
-        <p:spPr bwMode="auto">
-          <a:xfrm>
-            <a:off x="11040561" y="1814106"/>
-            <a:ext cx="1260275" cy="307777"/>
-          </a:xfrm>
-          <a:prstGeom prst="rect">
-            <a:avLst/>
-          </a:prstGeom>
-          <a:noFill/>
-          <a:ln>
-            <a:noFill/>
-          </a:ln>
-          <a:extLst>
-            <a:ext uri="{909E8E84-426E-40DD-AFC4-6F175D3DCCD1}">
-              <a14:hiddenFill xmlns:a14="http://schemas.microsoft.com/office/drawing/2010/main">
-                <a:solidFill>
-                  <a:srgbClr val="FFFFFF"/>
-                </a:solidFill>
-              </a14:hiddenFill>
-            </a:ext>
-            <a:ext uri="{91240B29-F687-4F45-9708-019B960494DF}">
-              <a14:hiddenLine xmlns:a14="http://schemas.microsoft.com/office/drawing/2010/main" w="9525">
-                <a:solidFill>
-                  <a:srgbClr val="000000"/>
-                </a:solidFill>
-                <a:miter lim="800000"/>
-                <a:headEnd/>
-                <a:tailEnd/>
-              </a14:hiddenLine>
-            </a:ext>
-          </a:extLst>
-        </p:spPr>
-        <p:txBody>
-          <a:bodyPr wrap="square">
-            <a:spAutoFit/>
-          </a:bodyPr>
-          <a:lstStyle>
-            <a:lvl1pPr>
-              <a:defRPr>
-                <a:solidFill>
-                  <a:schemeClr val="tx1"/>
-                </a:solidFill>
-                <a:latin typeface="Calibri" panose="020F0502020204030204" pitchFamily="34" charset="0"/>
-              </a:defRPr>
-            </a:lvl1pPr>
-            <a:lvl2pPr marL="742950" indent="-285750">
-              <a:defRPr>
-                <a:solidFill>
-                  <a:schemeClr val="tx1"/>
-                </a:solidFill>
-                <a:latin typeface="Calibri" panose="020F0502020204030204" pitchFamily="34" charset="0"/>
-              </a:defRPr>
-            </a:lvl2pPr>
-            <a:lvl3pPr marL="1143000" indent="-228600">
-              <a:defRPr>
-                <a:solidFill>
-                  <a:schemeClr val="tx1"/>
-                </a:solidFill>
-                <a:latin typeface="Calibri" panose="020F0502020204030204" pitchFamily="34" charset="0"/>
-              </a:defRPr>
-            </a:lvl3pPr>
-            <a:lvl4pPr marL="1600200" indent="-228600">
-              <a:defRPr>
-                <a:solidFill>
-                  <a:schemeClr val="tx1"/>
-                </a:solidFill>
-                <a:latin typeface="Calibri" panose="020F0502020204030204" pitchFamily="34" charset="0"/>
-              </a:defRPr>
-            </a:lvl4pPr>
-            <a:lvl5pPr marL="2057400" indent="-228600">
-              <a:defRPr>
-                <a:solidFill>
-                  <a:schemeClr val="tx1"/>
-                </a:solidFill>
-                <a:latin typeface="Calibri" panose="020F0502020204030204" pitchFamily="34" charset="0"/>
-              </a:defRPr>
-            </a:lvl5pPr>
-            <a:lvl6pPr marL="2514600" indent="-228600" eaLnBrk="0" fontAlgn="base" hangingPunct="0">
-              <a:spcBef>
-                <a:spcPct val="0"/>
-              </a:spcBef>
-              <a:spcAft>
-                <a:spcPct val="0"/>
-              </a:spcAft>
-              <a:defRPr>
-                <a:solidFill>
-                  <a:schemeClr val="tx1"/>
-                </a:solidFill>
-                <a:latin typeface="Calibri" panose="020F0502020204030204" pitchFamily="34" charset="0"/>
-              </a:defRPr>
-            </a:lvl6pPr>
-            <a:lvl7pPr marL="2971800" indent="-228600" eaLnBrk="0" fontAlgn="base" hangingPunct="0">
-              <a:spcBef>
-                <a:spcPct val="0"/>
-              </a:spcBef>
-              <a:spcAft>
-                <a:spcPct val="0"/>
-              </a:spcAft>
-              <a:defRPr>
-                <a:solidFill>
-                  <a:schemeClr val="tx1"/>
-                </a:solidFill>
-                <a:latin typeface="Calibri" panose="020F0502020204030204" pitchFamily="34" charset="0"/>
-              </a:defRPr>
-            </a:lvl7pPr>
-            <a:lvl8pPr marL="3429000" indent="-228600" eaLnBrk="0" fontAlgn="base" hangingPunct="0">
-              <a:spcBef>
-                <a:spcPct val="0"/>
-              </a:spcBef>
-              <a:spcAft>
-                <a:spcPct val="0"/>
-              </a:spcAft>
-              <a:defRPr>
-                <a:solidFill>
-                  <a:schemeClr val="tx1"/>
-                </a:solidFill>
-                <a:latin typeface="Calibri" panose="020F0502020204030204" pitchFamily="34" charset="0"/>
-              </a:defRPr>
-            </a:lvl8pPr>
-            <a:lvl9pPr marL="3886200" indent="-228600" eaLnBrk="0" fontAlgn="base" hangingPunct="0">
-              <a:spcBef>
-                <a:spcPct val="0"/>
-              </a:spcBef>
-              <a:spcAft>
-                <a:spcPct val="0"/>
-              </a:spcAft>
-              <a:defRPr>
-                <a:solidFill>
-                  <a:schemeClr val="tx1"/>
-                </a:solidFill>
-                <a:latin typeface="Calibri" panose="020F0502020204030204" pitchFamily="34" charset="0"/>
-              </a:defRPr>
-            </a:lvl9pPr>
-          </a:lstStyle>
-          <a:p>
-            <a:pPr algn="ctr" eaLnBrk="1" hangingPunct="1"/>
-            <a:r>
-              <a:rPr lang="en-US" altLang="en-US" sz="1400" b="1" dirty="0">
-                <a:solidFill>
-                  <a:schemeClr val="bg1"/>
-                </a:solidFill>
-                <a:latin typeface="+mj-lt"/>
-                <a:cs typeface="Arial" panose="020B0604020202020204" pitchFamily="34" charset="0"/>
-              </a:rPr>
-              <a:t>HTML (x2)</a:t>
             </a:r>
           </a:p>
         </p:txBody>
@@ -8768,7 +8012,7 @@
         </p:nvSpPr>
         <p:spPr bwMode="auto">
           <a:xfrm>
-            <a:off x="10070664" y="2923167"/>
+            <a:off x="10070664" y="1818764"/>
             <a:ext cx="1083324" cy="307777"/>
           </a:xfrm>
           <a:prstGeom prst="rect">
@@ -8931,7 +8175,7 @@
           <p:nvPr/>
         </p:nvPicPr>
         <p:blipFill>
-          <a:blip r:embed="rId27">
+          <a:blip r:embed="rId24">
             <a:extLst>
               <a:ext uri="{28A0092B-C50C-407E-A947-70E740481C1C}">
                 <a14:useLocalDpi xmlns:a14="http://schemas.microsoft.com/office/drawing/2010/main" val="0"/>
@@ -8945,7 +8189,7 @@
         </p:blipFill>
         <p:spPr bwMode="auto">
           <a:xfrm>
-            <a:off x="10292286" y="2305871"/>
+            <a:off x="10292286" y="1178374"/>
             <a:ext cx="640080" cy="640080"/>
           </a:xfrm>
           <a:prstGeom prst="rect">
@@ -9505,7 +8749,7 @@
           <p:nvPr/>
         </p:nvPicPr>
         <p:blipFill>
-          <a:blip r:embed="rId31">
+          <a:blip r:embed="rId28">
             <a:extLst>
               <a:ext uri="{28A0092B-C50C-407E-A947-70E740481C1C}">
                 <a14:useLocalDpi xmlns:a14="http://schemas.microsoft.com/office/drawing/2010/main" val="0"/>
@@ -9519,7 +8763,7 @@
         </p:blipFill>
         <p:spPr bwMode="auto">
           <a:xfrm>
-            <a:off x="9174174" y="3461459"/>
+            <a:off x="9174174" y="3603148"/>
             <a:ext cx="640080" cy="640080"/>
           </a:xfrm>
           <a:prstGeom prst="rect">
@@ -9558,7 +8802,7 @@
         </p:nvSpPr>
         <p:spPr bwMode="auto">
           <a:xfrm>
-            <a:off x="8890644" y="4099743"/>
+            <a:off x="8890644" y="4267507"/>
             <a:ext cx="1207140" cy="307777"/>
           </a:xfrm>
           <a:prstGeom prst="rect">
@@ -9702,6 +8946,230 @@
                 <a:cs typeface="Arial" panose="020B0604020202020204" pitchFamily="34" charset="0"/>
               </a:rPr>
               <a:t>OCSF v1.1.0</a:t>
+            </a:r>
+          </a:p>
+        </p:txBody>
+      </p:sp>
+      <p:sp>
+        <p:nvSpPr>
+          <p:cNvPr id="3" name="Rectangle: Rounded Corners 2">
+            <a:extLst>
+              <a:ext uri="{FF2B5EF4-FFF2-40B4-BE49-F238E27FC236}">
+                <a16:creationId xmlns:a16="http://schemas.microsoft.com/office/drawing/2014/main" id="{FA851D43-221A-6E4F-EE4F-2892D053C33A}"/>
+              </a:ext>
+            </a:extLst>
+          </p:cNvPr>
+          <p:cNvSpPr/>
+          <p:nvPr/>
+        </p:nvSpPr>
+        <p:spPr>
+          <a:xfrm rot="2524373">
+            <a:off x="1167922" y="2399130"/>
+            <a:ext cx="975643" cy="421310"/>
+          </a:xfrm>
+          <a:prstGeom prst="roundRect">
+            <a:avLst/>
+          </a:prstGeom>
+          <a:solidFill>
+            <a:srgbClr val="00B0F0"/>
+          </a:solidFill>
+          <a:ln>
+            <a:noFill/>
+          </a:ln>
+        </p:spPr>
+        <p:style>
+          <a:lnRef idx="2">
+            <a:schemeClr val="accent1">
+              <a:shade val="50000"/>
+            </a:schemeClr>
+          </a:lnRef>
+          <a:fillRef idx="1">
+            <a:schemeClr val="accent1"/>
+          </a:fillRef>
+          <a:effectRef idx="0">
+            <a:schemeClr val="accent1"/>
+          </a:effectRef>
+          <a:fontRef idx="minor">
+            <a:schemeClr val="lt1"/>
+          </a:fontRef>
+        </p:style>
+        <p:txBody>
+          <a:bodyPr rtlCol="0" anchor="ctr"/>
+          <a:lstStyle/>
+          <a:p>
+            <a:pPr algn="ctr"/>
+            <a:r>
+              <a:rPr lang="en-US" sz="1600" b="1" dirty="0">
+                <a:solidFill>
+                  <a:schemeClr val="tx1"/>
+                </a:solidFill>
+              </a:rPr>
+              <a:t>COMING SOON!</a:t>
+            </a:r>
+          </a:p>
+        </p:txBody>
+      </p:sp>
+      <p:sp>
+        <p:nvSpPr>
+          <p:cNvPr id="4" name="Rectangle: Rounded Corners 3">
+            <a:extLst>
+              <a:ext uri="{FF2B5EF4-FFF2-40B4-BE49-F238E27FC236}">
+                <a16:creationId xmlns:a16="http://schemas.microsoft.com/office/drawing/2014/main" id="{79C06418-71E2-B91B-F500-D08FABC07A72}"/>
+              </a:ext>
+            </a:extLst>
+          </p:cNvPr>
+          <p:cNvSpPr/>
+          <p:nvPr/>
+        </p:nvSpPr>
+        <p:spPr>
+          <a:xfrm rot="2524373">
+            <a:off x="103016" y="5363167"/>
+            <a:ext cx="975643" cy="421310"/>
+          </a:xfrm>
+          <a:prstGeom prst="roundRect">
+            <a:avLst/>
+          </a:prstGeom>
+          <a:solidFill>
+            <a:srgbClr val="00B0F0"/>
+          </a:solidFill>
+          <a:ln>
+            <a:noFill/>
+          </a:ln>
+        </p:spPr>
+        <p:style>
+          <a:lnRef idx="2">
+            <a:schemeClr val="accent1">
+              <a:shade val="50000"/>
+            </a:schemeClr>
+          </a:lnRef>
+          <a:fillRef idx="1">
+            <a:schemeClr val="accent1"/>
+          </a:fillRef>
+          <a:effectRef idx="0">
+            <a:schemeClr val="accent1"/>
+          </a:effectRef>
+          <a:fontRef idx="minor">
+            <a:schemeClr val="lt1"/>
+          </a:fontRef>
+        </p:style>
+        <p:txBody>
+          <a:bodyPr rtlCol="0" anchor="ctr"/>
+          <a:lstStyle/>
+          <a:p>
+            <a:pPr algn="ctr"/>
+            <a:r>
+              <a:rPr lang="en-US" sz="1600" b="1" dirty="0">
+                <a:solidFill>
+                  <a:schemeClr val="tx1"/>
+                </a:solidFill>
+              </a:rPr>
+              <a:t>COMING SOON!</a:t>
+            </a:r>
+          </a:p>
+        </p:txBody>
+      </p:sp>
+      <p:pic>
+        <p:nvPicPr>
+          <p:cNvPr id="5" name="Picture 2" descr="Snowflake reviews, pricing and features 2024 | PeerSpot">
+            <a:extLst>
+              <a:ext uri="{FF2B5EF4-FFF2-40B4-BE49-F238E27FC236}">
+                <a16:creationId xmlns:a16="http://schemas.microsoft.com/office/drawing/2014/main" id="{3F21ED64-E231-B3A7-C401-1DCE35E3325E}"/>
+              </a:ext>
+            </a:extLst>
+          </p:cNvPr>
+          <p:cNvPicPr>
+            <a:picLocks noChangeAspect="1" noChangeArrowheads="1"/>
+          </p:cNvPicPr>
+          <p:nvPr/>
+        </p:nvPicPr>
+        <p:blipFill>
+          <a:blip r:embed="rId29">
+            <a:extLst>
+              <a:ext uri="{28A0092B-C50C-407E-A947-70E740481C1C}">
+                <a14:useLocalDpi xmlns:a14="http://schemas.microsoft.com/office/drawing/2010/main" val="0"/>
+              </a:ext>
+            </a:extLst>
+          </a:blip>
+          <a:srcRect/>
+          <a:stretch>
+            <a:fillRect/>
+          </a:stretch>
+        </p:blipFill>
+        <p:spPr bwMode="auto">
+          <a:xfrm>
+            <a:off x="1284471" y="5208062"/>
+            <a:ext cx="731520" cy="731520"/>
+          </a:xfrm>
+          <a:prstGeom prst="rect">
+            <a:avLst/>
+          </a:prstGeom>
+          <a:noFill/>
+          <a:extLst>
+            <a:ext uri="{909E8E84-426E-40DD-AFC4-6F175D3DCCD1}">
+              <a14:hiddenFill xmlns:a14="http://schemas.microsoft.com/office/drawing/2010/main">
+                <a:solidFill>
+                  <a:srgbClr val="FFFFFF"/>
+                </a:solidFill>
+              </a14:hiddenFill>
+            </a:ext>
+          </a:extLst>
+        </p:spPr>
+      </p:pic>
+      <p:sp>
+        <p:nvSpPr>
+          <p:cNvPr id="6" name="Rectangle: Rounded Corners 5">
+            <a:extLst>
+              <a:ext uri="{FF2B5EF4-FFF2-40B4-BE49-F238E27FC236}">
+                <a16:creationId xmlns:a16="http://schemas.microsoft.com/office/drawing/2014/main" id="{61577166-D777-D3C1-0912-AD90CE5D0EFE}"/>
+              </a:ext>
+            </a:extLst>
+          </p:cNvPr>
+          <p:cNvSpPr/>
+          <p:nvPr/>
+        </p:nvSpPr>
+        <p:spPr>
+          <a:xfrm rot="2524373">
+            <a:off x="1167923" y="5334080"/>
+            <a:ext cx="975643" cy="421310"/>
+          </a:xfrm>
+          <a:prstGeom prst="roundRect">
+            <a:avLst/>
+          </a:prstGeom>
+          <a:solidFill>
+            <a:srgbClr val="00B0F0"/>
+          </a:solidFill>
+          <a:ln>
+            <a:noFill/>
+          </a:ln>
+        </p:spPr>
+        <p:style>
+          <a:lnRef idx="2">
+            <a:schemeClr val="accent1">
+              <a:shade val="50000"/>
+            </a:schemeClr>
+          </a:lnRef>
+          <a:fillRef idx="1">
+            <a:schemeClr val="accent1"/>
+          </a:fillRef>
+          <a:effectRef idx="0">
+            <a:schemeClr val="accent1"/>
+          </a:effectRef>
+          <a:fontRef idx="minor">
+            <a:schemeClr val="lt1"/>
+          </a:fontRef>
+        </p:style>
+        <p:txBody>
+          <a:bodyPr rtlCol="0" anchor="ctr"/>
+          <a:lstStyle/>
+          <a:p>
+            <a:pPr algn="ctr"/>
+            <a:r>
+              <a:rPr lang="en-US" sz="1600" b="1" dirty="0">
+                <a:solidFill>
+                  <a:schemeClr val="tx1"/>
+                </a:solidFill>
+              </a:rPr>
+              <a:t>COMING SOON!</a:t>
             </a:r>
           </a:p>
         </p:txBody>

</xml_diff>